<commit_message>
Added: Finished content for Presentation
</commit_message>
<xml_diff>
--- a/MonoGame - 4.19.2019/Presentation.pptx
+++ b/MonoGame - 4.19.2019/Presentation.pptx
@@ -134,6 +134,753 @@
 </file>
 
 <file path=ppt/diagrams/colors1.xml><?xml version="1.0" encoding="utf-8"?>
+<dgm:colorsDef xmlns:dgm="http://schemas.openxmlformats.org/drawingml/2006/diagram" xmlns:a="http://schemas.openxmlformats.org/drawingml/2006/main" uniqueId="urn:microsoft.com/office/officeart/2005/8/colors/accent1_2">
+  <dgm:title val=""/>
+  <dgm:desc val=""/>
+  <dgm:catLst>
+    <dgm:cat type="accent1" pri="11200"/>
+  </dgm:catLst>
+  <dgm:styleLbl name="node0">
+    <dgm:fillClrLst meth="repeat">
+      <a:schemeClr val="accent1"/>
+    </dgm:fillClrLst>
+    <dgm:linClrLst meth="repeat">
+      <a:schemeClr val="lt1"/>
+    </dgm:linClrLst>
+    <dgm:effectClrLst/>
+    <dgm:txLinClrLst/>
+    <dgm:txFillClrLst/>
+    <dgm:txEffectClrLst/>
+  </dgm:styleLbl>
+  <dgm:styleLbl name="alignNode1">
+    <dgm:fillClrLst meth="repeat">
+      <a:schemeClr val="accent1"/>
+    </dgm:fillClrLst>
+    <dgm:linClrLst meth="repeat">
+      <a:schemeClr val="accent1"/>
+    </dgm:linClrLst>
+    <dgm:effectClrLst/>
+    <dgm:txLinClrLst/>
+    <dgm:txFillClrLst/>
+    <dgm:txEffectClrLst/>
+  </dgm:styleLbl>
+  <dgm:styleLbl name="node1">
+    <dgm:fillClrLst meth="repeat">
+      <a:schemeClr val="accent1"/>
+    </dgm:fillClrLst>
+    <dgm:linClrLst meth="repeat">
+      <a:schemeClr val="lt1"/>
+    </dgm:linClrLst>
+    <dgm:effectClrLst/>
+    <dgm:txLinClrLst/>
+    <dgm:txFillClrLst/>
+    <dgm:txEffectClrLst/>
+  </dgm:styleLbl>
+  <dgm:styleLbl name="lnNode1">
+    <dgm:fillClrLst meth="repeat">
+      <a:schemeClr val="accent1"/>
+    </dgm:fillClrLst>
+    <dgm:linClrLst meth="repeat">
+      <a:schemeClr val="lt1"/>
+    </dgm:linClrLst>
+    <dgm:effectClrLst/>
+    <dgm:txLinClrLst/>
+    <dgm:txFillClrLst/>
+    <dgm:txEffectClrLst/>
+  </dgm:styleLbl>
+  <dgm:styleLbl name="vennNode1">
+    <dgm:fillClrLst meth="repeat">
+      <a:schemeClr val="accent1">
+        <a:alpha val="50000"/>
+      </a:schemeClr>
+    </dgm:fillClrLst>
+    <dgm:linClrLst meth="repeat">
+      <a:schemeClr val="lt1"/>
+    </dgm:linClrLst>
+    <dgm:effectClrLst/>
+    <dgm:txLinClrLst/>
+    <dgm:txFillClrLst/>
+    <dgm:txEffectClrLst/>
+  </dgm:styleLbl>
+  <dgm:styleLbl name="node2">
+    <dgm:fillClrLst meth="repeat">
+      <a:schemeClr val="accent1"/>
+    </dgm:fillClrLst>
+    <dgm:linClrLst meth="repeat">
+      <a:schemeClr val="lt1"/>
+    </dgm:linClrLst>
+    <dgm:effectClrLst/>
+    <dgm:txLinClrLst/>
+    <dgm:txFillClrLst/>
+    <dgm:txEffectClrLst/>
+  </dgm:styleLbl>
+  <dgm:styleLbl name="node3">
+    <dgm:fillClrLst meth="repeat">
+      <a:schemeClr val="accent1"/>
+    </dgm:fillClrLst>
+    <dgm:linClrLst meth="repeat">
+      <a:schemeClr val="lt1"/>
+    </dgm:linClrLst>
+    <dgm:effectClrLst/>
+    <dgm:txLinClrLst/>
+    <dgm:txFillClrLst/>
+    <dgm:txEffectClrLst/>
+  </dgm:styleLbl>
+  <dgm:styleLbl name="node4">
+    <dgm:fillClrLst meth="repeat">
+      <a:schemeClr val="accent1"/>
+    </dgm:fillClrLst>
+    <dgm:linClrLst meth="repeat">
+      <a:schemeClr val="lt1"/>
+    </dgm:linClrLst>
+    <dgm:effectClrLst/>
+    <dgm:txLinClrLst/>
+    <dgm:txFillClrLst/>
+    <dgm:txEffectClrLst/>
+  </dgm:styleLbl>
+  <dgm:styleLbl name="fgImgPlace1">
+    <dgm:fillClrLst meth="repeat">
+      <a:schemeClr val="accent1">
+        <a:tint val="50000"/>
+      </a:schemeClr>
+    </dgm:fillClrLst>
+    <dgm:linClrLst meth="repeat">
+      <a:schemeClr val="lt1"/>
+    </dgm:linClrLst>
+    <dgm:effectClrLst/>
+    <dgm:txLinClrLst/>
+    <dgm:txFillClrLst meth="repeat">
+      <a:schemeClr val="lt1"/>
+    </dgm:txFillClrLst>
+    <dgm:txEffectClrLst/>
+  </dgm:styleLbl>
+  <dgm:styleLbl name="alignImgPlace1">
+    <dgm:fillClrLst meth="repeat">
+      <a:schemeClr val="accent1">
+        <a:tint val="50000"/>
+      </a:schemeClr>
+    </dgm:fillClrLst>
+    <dgm:linClrLst meth="repeat">
+      <a:schemeClr val="lt1"/>
+    </dgm:linClrLst>
+    <dgm:effectClrLst/>
+    <dgm:txLinClrLst/>
+    <dgm:txFillClrLst meth="repeat">
+      <a:schemeClr val="lt1"/>
+    </dgm:txFillClrLst>
+    <dgm:txEffectClrLst/>
+  </dgm:styleLbl>
+  <dgm:styleLbl name="bgImgPlace1">
+    <dgm:fillClrLst meth="repeat">
+      <a:schemeClr val="accent1">
+        <a:tint val="50000"/>
+      </a:schemeClr>
+    </dgm:fillClrLst>
+    <dgm:linClrLst meth="repeat">
+      <a:schemeClr val="lt1"/>
+    </dgm:linClrLst>
+    <dgm:effectClrLst/>
+    <dgm:txLinClrLst/>
+    <dgm:txFillClrLst meth="repeat">
+      <a:schemeClr val="lt1"/>
+    </dgm:txFillClrLst>
+    <dgm:txEffectClrLst/>
+  </dgm:styleLbl>
+  <dgm:styleLbl name="sibTrans2D1">
+    <dgm:fillClrLst meth="repeat">
+      <a:schemeClr val="accent1">
+        <a:tint val="60000"/>
+      </a:schemeClr>
+    </dgm:fillClrLst>
+    <dgm:linClrLst meth="repeat">
+      <a:schemeClr val="accent1">
+        <a:tint val="60000"/>
+      </a:schemeClr>
+    </dgm:linClrLst>
+    <dgm:effectClrLst/>
+    <dgm:txLinClrLst/>
+    <dgm:txFillClrLst/>
+    <dgm:txEffectClrLst/>
+  </dgm:styleLbl>
+  <dgm:styleLbl name="fgSibTrans2D1">
+    <dgm:fillClrLst meth="repeat">
+      <a:schemeClr val="accent1">
+        <a:tint val="60000"/>
+      </a:schemeClr>
+    </dgm:fillClrLst>
+    <dgm:linClrLst meth="repeat">
+      <a:schemeClr val="accent1">
+        <a:tint val="60000"/>
+      </a:schemeClr>
+    </dgm:linClrLst>
+    <dgm:effectClrLst/>
+    <dgm:txLinClrLst/>
+    <dgm:txFillClrLst/>
+    <dgm:txEffectClrLst/>
+  </dgm:styleLbl>
+  <dgm:styleLbl name="bgSibTrans2D1">
+    <dgm:fillClrLst meth="repeat">
+      <a:schemeClr val="accent1">
+        <a:tint val="60000"/>
+      </a:schemeClr>
+    </dgm:fillClrLst>
+    <dgm:linClrLst meth="repeat">
+      <a:schemeClr val="accent1">
+        <a:tint val="60000"/>
+      </a:schemeClr>
+    </dgm:linClrLst>
+    <dgm:effectClrLst/>
+    <dgm:txLinClrLst/>
+    <dgm:txFillClrLst/>
+    <dgm:txEffectClrLst/>
+  </dgm:styleLbl>
+  <dgm:styleLbl name="sibTrans1D1">
+    <dgm:fillClrLst meth="repeat">
+      <a:schemeClr val="accent1"/>
+    </dgm:fillClrLst>
+    <dgm:linClrLst meth="repeat">
+      <a:schemeClr val="accent1"/>
+    </dgm:linClrLst>
+    <dgm:effectClrLst/>
+    <dgm:txLinClrLst/>
+    <dgm:txFillClrLst meth="repeat">
+      <a:schemeClr val="tx1"/>
+    </dgm:txFillClrLst>
+    <dgm:txEffectClrLst/>
+  </dgm:styleLbl>
+  <dgm:styleLbl name="callout">
+    <dgm:fillClrLst meth="repeat">
+      <a:schemeClr val="accent1"/>
+    </dgm:fillClrLst>
+    <dgm:linClrLst meth="repeat">
+      <a:schemeClr val="accent1">
+        <a:tint val="50000"/>
+      </a:schemeClr>
+    </dgm:linClrLst>
+    <dgm:effectClrLst/>
+    <dgm:txLinClrLst/>
+    <dgm:txFillClrLst meth="repeat">
+      <a:schemeClr val="tx1"/>
+    </dgm:txFillClrLst>
+    <dgm:txEffectClrLst/>
+  </dgm:styleLbl>
+  <dgm:styleLbl name="asst0">
+    <dgm:fillClrLst meth="repeat">
+      <a:schemeClr val="accent1"/>
+    </dgm:fillClrLst>
+    <dgm:linClrLst meth="repeat">
+      <a:schemeClr val="lt1"/>
+    </dgm:linClrLst>
+    <dgm:effectClrLst/>
+    <dgm:txLinClrLst/>
+    <dgm:txFillClrLst/>
+    <dgm:txEffectClrLst/>
+  </dgm:styleLbl>
+  <dgm:styleLbl name="asst1">
+    <dgm:fillClrLst meth="repeat">
+      <a:schemeClr val="accent1"/>
+    </dgm:fillClrLst>
+    <dgm:linClrLst meth="repeat">
+      <a:schemeClr val="lt1"/>
+    </dgm:linClrLst>
+    <dgm:effectClrLst/>
+    <dgm:txLinClrLst/>
+    <dgm:txFillClrLst/>
+    <dgm:txEffectClrLst/>
+  </dgm:styleLbl>
+  <dgm:styleLbl name="asst2">
+    <dgm:fillClrLst meth="repeat">
+      <a:schemeClr val="accent1"/>
+    </dgm:fillClrLst>
+    <dgm:linClrLst meth="repeat">
+      <a:schemeClr val="lt1"/>
+    </dgm:linClrLst>
+    <dgm:effectClrLst/>
+    <dgm:txLinClrLst/>
+    <dgm:txFillClrLst/>
+    <dgm:txEffectClrLst/>
+  </dgm:styleLbl>
+  <dgm:styleLbl name="asst3">
+    <dgm:fillClrLst meth="repeat">
+      <a:schemeClr val="accent1"/>
+    </dgm:fillClrLst>
+    <dgm:linClrLst meth="repeat">
+      <a:schemeClr val="lt1"/>
+    </dgm:linClrLst>
+    <dgm:effectClrLst/>
+    <dgm:txLinClrLst/>
+    <dgm:txFillClrLst/>
+    <dgm:txEffectClrLst/>
+  </dgm:styleLbl>
+  <dgm:styleLbl name="asst4">
+    <dgm:fillClrLst meth="repeat">
+      <a:schemeClr val="accent1"/>
+    </dgm:fillClrLst>
+    <dgm:linClrLst meth="repeat">
+      <a:schemeClr val="lt1"/>
+    </dgm:linClrLst>
+    <dgm:effectClrLst/>
+    <dgm:txLinClrLst/>
+    <dgm:txFillClrLst/>
+    <dgm:txEffectClrLst/>
+  </dgm:styleLbl>
+  <dgm:styleLbl name="parChTrans2D1">
+    <dgm:fillClrLst meth="repeat">
+      <a:schemeClr val="accent1">
+        <a:tint val="60000"/>
+      </a:schemeClr>
+    </dgm:fillClrLst>
+    <dgm:linClrLst meth="repeat">
+      <a:schemeClr val="accent1">
+        <a:tint val="60000"/>
+      </a:schemeClr>
+    </dgm:linClrLst>
+    <dgm:effectClrLst/>
+    <dgm:txLinClrLst/>
+    <dgm:txFillClrLst meth="repeat">
+      <a:schemeClr val="lt1"/>
+    </dgm:txFillClrLst>
+    <dgm:txEffectClrLst/>
+  </dgm:styleLbl>
+  <dgm:styleLbl name="parChTrans2D2">
+    <dgm:fillClrLst meth="repeat">
+      <a:schemeClr val="accent1"/>
+    </dgm:fillClrLst>
+    <dgm:linClrLst meth="repeat">
+      <a:schemeClr val="accent1"/>
+    </dgm:linClrLst>
+    <dgm:effectClrLst/>
+    <dgm:txLinClrLst/>
+    <dgm:txFillClrLst meth="repeat">
+      <a:schemeClr val="lt1"/>
+    </dgm:txFillClrLst>
+    <dgm:txEffectClrLst/>
+  </dgm:styleLbl>
+  <dgm:styleLbl name="parChTrans2D3">
+    <dgm:fillClrLst meth="repeat">
+      <a:schemeClr val="accent1"/>
+    </dgm:fillClrLst>
+    <dgm:linClrLst meth="repeat">
+      <a:schemeClr val="accent1"/>
+    </dgm:linClrLst>
+    <dgm:effectClrLst/>
+    <dgm:txLinClrLst/>
+    <dgm:txFillClrLst meth="repeat">
+      <a:schemeClr val="lt1"/>
+    </dgm:txFillClrLst>
+    <dgm:txEffectClrLst/>
+  </dgm:styleLbl>
+  <dgm:styleLbl name="parChTrans2D4">
+    <dgm:fillClrLst meth="repeat">
+      <a:schemeClr val="accent1"/>
+    </dgm:fillClrLst>
+    <dgm:linClrLst meth="repeat">
+      <a:schemeClr val="accent1"/>
+    </dgm:linClrLst>
+    <dgm:effectClrLst/>
+    <dgm:txLinClrLst/>
+    <dgm:txFillClrLst meth="repeat">
+      <a:schemeClr val="lt1"/>
+    </dgm:txFillClrLst>
+    <dgm:txEffectClrLst/>
+  </dgm:styleLbl>
+  <dgm:styleLbl name="parChTrans1D1">
+    <dgm:fillClrLst meth="repeat">
+      <a:schemeClr val="accent1"/>
+    </dgm:fillClrLst>
+    <dgm:linClrLst meth="repeat">
+      <a:schemeClr val="accent1">
+        <a:shade val="60000"/>
+      </a:schemeClr>
+    </dgm:linClrLst>
+    <dgm:effectClrLst/>
+    <dgm:txLinClrLst/>
+    <dgm:txFillClrLst meth="repeat">
+      <a:schemeClr val="tx1"/>
+    </dgm:txFillClrLst>
+    <dgm:txEffectClrLst/>
+  </dgm:styleLbl>
+  <dgm:styleLbl name="parChTrans1D2">
+    <dgm:fillClrLst meth="repeat">
+      <a:schemeClr val="accent1"/>
+    </dgm:fillClrLst>
+    <dgm:linClrLst meth="repeat">
+      <a:schemeClr val="accent1">
+        <a:shade val="60000"/>
+      </a:schemeClr>
+    </dgm:linClrLst>
+    <dgm:effectClrLst/>
+    <dgm:txLinClrLst/>
+    <dgm:txFillClrLst meth="repeat">
+      <a:schemeClr val="tx1"/>
+    </dgm:txFillClrLst>
+    <dgm:txEffectClrLst/>
+  </dgm:styleLbl>
+  <dgm:styleLbl name="parChTrans1D3">
+    <dgm:fillClrLst meth="repeat">
+      <a:schemeClr val="accent1"/>
+    </dgm:fillClrLst>
+    <dgm:linClrLst meth="repeat">
+      <a:schemeClr val="accent1">
+        <a:shade val="80000"/>
+      </a:schemeClr>
+    </dgm:linClrLst>
+    <dgm:effectClrLst/>
+    <dgm:txLinClrLst/>
+    <dgm:txFillClrLst meth="repeat">
+      <a:schemeClr val="tx1"/>
+    </dgm:txFillClrLst>
+    <dgm:txEffectClrLst/>
+  </dgm:styleLbl>
+  <dgm:styleLbl name="parChTrans1D4">
+    <dgm:fillClrLst meth="repeat">
+      <a:schemeClr val="accent1"/>
+    </dgm:fillClrLst>
+    <dgm:linClrLst meth="repeat">
+      <a:schemeClr val="accent1">
+        <a:shade val="80000"/>
+      </a:schemeClr>
+    </dgm:linClrLst>
+    <dgm:effectClrLst/>
+    <dgm:txLinClrLst/>
+    <dgm:txFillClrLst meth="repeat">
+      <a:schemeClr val="tx1"/>
+    </dgm:txFillClrLst>
+    <dgm:txEffectClrLst/>
+  </dgm:styleLbl>
+  <dgm:styleLbl name="fgAcc1">
+    <dgm:fillClrLst meth="repeat">
+      <a:schemeClr val="lt1">
+        <a:alpha val="90000"/>
+      </a:schemeClr>
+    </dgm:fillClrLst>
+    <dgm:linClrLst meth="repeat">
+      <a:schemeClr val="accent1"/>
+    </dgm:linClrLst>
+    <dgm:effectClrLst/>
+    <dgm:txLinClrLst/>
+    <dgm:txFillClrLst meth="repeat">
+      <a:schemeClr val="dk1"/>
+    </dgm:txFillClrLst>
+    <dgm:txEffectClrLst/>
+  </dgm:styleLbl>
+  <dgm:styleLbl name="conFgAcc1">
+    <dgm:fillClrLst meth="repeat">
+      <a:schemeClr val="lt1">
+        <a:alpha val="90000"/>
+      </a:schemeClr>
+    </dgm:fillClrLst>
+    <dgm:linClrLst meth="repeat">
+      <a:schemeClr val="accent1"/>
+    </dgm:linClrLst>
+    <dgm:effectClrLst/>
+    <dgm:txLinClrLst/>
+    <dgm:txFillClrLst meth="repeat">
+      <a:schemeClr val="dk1"/>
+    </dgm:txFillClrLst>
+    <dgm:txEffectClrLst/>
+  </dgm:styleLbl>
+  <dgm:styleLbl name="alignAcc1">
+    <dgm:fillClrLst meth="repeat">
+      <a:schemeClr val="lt1">
+        <a:alpha val="90000"/>
+      </a:schemeClr>
+    </dgm:fillClrLst>
+    <dgm:linClrLst meth="repeat">
+      <a:schemeClr val="accent1"/>
+    </dgm:linClrLst>
+    <dgm:effectClrLst/>
+    <dgm:txLinClrLst/>
+    <dgm:txFillClrLst meth="repeat">
+      <a:schemeClr val="dk1"/>
+    </dgm:txFillClrLst>
+    <dgm:txEffectClrLst/>
+  </dgm:styleLbl>
+  <dgm:styleLbl name="trAlignAcc1">
+    <dgm:fillClrLst meth="repeat">
+      <a:schemeClr val="lt1">
+        <a:alpha val="40000"/>
+      </a:schemeClr>
+    </dgm:fillClrLst>
+    <dgm:linClrLst meth="repeat">
+      <a:schemeClr val="accent1"/>
+    </dgm:linClrLst>
+    <dgm:effectClrLst/>
+    <dgm:txLinClrLst/>
+    <dgm:txFillClrLst meth="repeat">
+      <a:schemeClr val="dk1"/>
+    </dgm:txFillClrLst>
+    <dgm:txEffectClrLst/>
+  </dgm:styleLbl>
+  <dgm:styleLbl name="bgAcc1">
+    <dgm:fillClrLst meth="repeat">
+      <a:schemeClr val="lt1">
+        <a:alpha val="90000"/>
+      </a:schemeClr>
+    </dgm:fillClrLst>
+    <dgm:linClrLst meth="repeat">
+      <a:schemeClr val="accent1"/>
+    </dgm:linClrLst>
+    <dgm:effectClrLst/>
+    <dgm:txLinClrLst/>
+    <dgm:txFillClrLst meth="repeat">
+      <a:schemeClr val="dk1"/>
+    </dgm:txFillClrLst>
+    <dgm:txEffectClrLst/>
+  </dgm:styleLbl>
+  <dgm:styleLbl name="solidFgAcc1">
+    <dgm:fillClrLst meth="repeat">
+      <a:schemeClr val="lt1"/>
+    </dgm:fillClrLst>
+    <dgm:linClrLst meth="repeat">
+      <a:schemeClr val="accent1"/>
+    </dgm:linClrLst>
+    <dgm:effectClrLst/>
+    <dgm:txLinClrLst/>
+    <dgm:txFillClrLst meth="repeat">
+      <a:schemeClr val="dk1"/>
+    </dgm:txFillClrLst>
+    <dgm:txEffectClrLst/>
+  </dgm:styleLbl>
+  <dgm:styleLbl name="solidAlignAcc1">
+    <dgm:fillClrLst meth="repeat">
+      <a:schemeClr val="lt1"/>
+    </dgm:fillClrLst>
+    <dgm:linClrLst meth="repeat">
+      <a:schemeClr val="accent1"/>
+    </dgm:linClrLst>
+    <dgm:effectClrLst/>
+    <dgm:txLinClrLst/>
+    <dgm:txFillClrLst meth="repeat">
+      <a:schemeClr val="dk1"/>
+    </dgm:txFillClrLst>
+    <dgm:txEffectClrLst/>
+  </dgm:styleLbl>
+  <dgm:styleLbl name="solidBgAcc1">
+    <dgm:fillClrLst meth="repeat">
+      <a:schemeClr val="lt1"/>
+    </dgm:fillClrLst>
+    <dgm:linClrLst meth="repeat">
+      <a:schemeClr val="accent1"/>
+    </dgm:linClrLst>
+    <dgm:effectClrLst/>
+    <dgm:txLinClrLst/>
+    <dgm:txFillClrLst meth="repeat">
+      <a:schemeClr val="dk1"/>
+    </dgm:txFillClrLst>
+    <dgm:txEffectClrLst/>
+  </dgm:styleLbl>
+  <dgm:styleLbl name="fgAccFollowNode1">
+    <dgm:fillClrLst meth="repeat">
+      <a:schemeClr val="accent1">
+        <a:alpha val="90000"/>
+        <a:tint val="40000"/>
+      </a:schemeClr>
+    </dgm:fillClrLst>
+    <dgm:linClrLst meth="repeat">
+      <a:schemeClr val="accent1">
+        <a:alpha val="90000"/>
+        <a:tint val="40000"/>
+      </a:schemeClr>
+    </dgm:linClrLst>
+    <dgm:effectClrLst/>
+    <dgm:txLinClrLst/>
+    <dgm:txFillClrLst meth="repeat">
+      <a:schemeClr val="dk1"/>
+    </dgm:txFillClrLst>
+    <dgm:txEffectClrLst/>
+  </dgm:styleLbl>
+  <dgm:styleLbl name="alignAccFollowNode1">
+    <dgm:fillClrLst meth="repeat">
+      <a:schemeClr val="accent1">
+        <a:alpha val="90000"/>
+        <a:tint val="40000"/>
+      </a:schemeClr>
+    </dgm:fillClrLst>
+    <dgm:linClrLst meth="repeat">
+      <a:schemeClr val="accent1">
+        <a:alpha val="90000"/>
+        <a:tint val="40000"/>
+      </a:schemeClr>
+    </dgm:linClrLst>
+    <dgm:effectClrLst/>
+    <dgm:txLinClrLst/>
+    <dgm:txFillClrLst meth="repeat">
+      <a:schemeClr val="dk1"/>
+    </dgm:txFillClrLst>
+    <dgm:txEffectClrLst/>
+  </dgm:styleLbl>
+  <dgm:styleLbl name="bgAccFollowNode1">
+    <dgm:fillClrLst meth="repeat">
+      <a:schemeClr val="accent1">
+        <a:alpha val="90000"/>
+        <a:tint val="40000"/>
+      </a:schemeClr>
+    </dgm:fillClrLst>
+    <dgm:linClrLst meth="repeat">
+      <a:schemeClr val="accent1">
+        <a:alpha val="90000"/>
+        <a:tint val="40000"/>
+      </a:schemeClr>
+    </dgm:linClrLst>
+    <dgm:effectClrLst/>
+    <dgm:txLinClrLst/>
+    <dgm:txFillClrLst meth="repeat">
+      <a:schemeClr val="dk1"/>
+    </dgm:txFillClrLst>
+    <dgm:txEffectClrLst/>
+  </dgm:styleLbl>
+  <dgm:styleLbl name="fgAcc0">
+    <dgm:fillClrLst meth="repeat">
+      <a:schemeClr val="lt1">
+        <a:alpha val="90000"/>
+      </a:schemeClr>
+    </dgm:fillClrLst>
+    <dgm:linClrLst meth="repeat">
+      <a:schemeClr val="accent1"/>
+    </dgm:linClrLst>
+    <dgm:effectClrLst/>
+    <dgm:txLinClrLst/>
+    <dgm:txFillClrLst meth="repeat">
+      <a:schemeClr val="dk1"/>
+    </dgm:txFillClrLst>
+    <dgm:txEffectClrLst/>
+  </dgm:styleLbl>
+  <dgm:styleLbl name="fgAcc2">
+    <dgm:fillClrLst meth="repeat">
+      <a:schemeClr val="lt1">
+        <a:alpha val="90000"/>
+      </a:schemeClr>
+    </dgm:fillClrLst>
+    <dgm:linClrLst meth="repeat">
+      <a:schemeClr val="accent1"/>
+    </dgm:linClrLst>
+    <dgm:effectClrLst/>
+    <dgm:txLinClrLst/>
+    <dgm:txFillClrLst meth="repeat">
+      <a:schemeClr val="dk1"/>
+    </dgm:txFillClrLst>
+    <dgm:txEffectClrLst/>
+  </dgm:styleLbl>
+  <dgm:styleLbl name="fgAcc3">
+    <dgm:fillClrLst meth="repeat">
+      <a:schemeClr val="lt1">
+        <a:alpha val="90000"/>
+      </a:schemeClr>
+    </dgm:fillClrLst>
+    <dgm:linClrLst meth="repeat">
+      <a:schemeClr val="accent1"/>
+    </dgm:linClrLst>
+    <dgm:effectClrLst/>
+    <dgm:txLinClrLst/>
+    <dgm:txFillClrLst meth="repeat">
+      <a:schemeClr val="dk1"/>
+    </dgm:txFillClrLst>
+    <dgm:txEffectClrLst/>
+  </dgm:styleLbl>
+  <dgm:styleLbl name="fgAcc4">
+    <dgm:fillClrLst meth="repeat">
+      <a:schemeClr val="lt1">
+        <a:alpha val="90000"/>
+      </a:schemeClr>
+    </dgm:fillClrLst>
+    <dgm:linClrLst meth="repeat">
+      <a:schemeClr val="accent1"/>
+    </dgm:linClrLst>
+    <dgm:effectClrLst/>
+    <dgm:txLinClrLst/>
+    <dgm:txFillClrLst meth="repeat">
+      <a:schemeClr val="dk1"/>
+    </dgm:txFillClrLst>
+    <dgm:txEffectClrLst/>
+  </dgm:styleLbl>
+  <dgm:styleLbl name="bgShp">
+    <dgm:fillClrLst meth="repeat">
+      <a:schemeClr val="accent1">
+        <a:tint val="40000"/>
+      </a:schemeClr>
+    </dgm:fillClrLst>
+    <dgm:linClrLst meth="repeat">
+      <a:schemeClr val="accent1"/>
+    </dgm:linClrLst>
+    <dgm:effectClrLst/>
+    <dgm:txLinClrLst/>
+    <dgm:txFillClrLst meth="repeat">
+      <a:schemeClr val="dk1"/>
+    </dgm:txFillClrLst>
+    <dgm:txEffectClrLst/>
+  </dgm:styleLbl>
+  <dgm:styleLbl name="dkBgShp">
+    <dgm:fillClrLst meth="repeat">
+      <a:schemeClr val="accent1">
+        <a:shade val="80000"/>
+      </a:schemeClr>
+    </dgm:fillClrLst>
+    <dgm:linClrLst meth="repeat">
+      <a:schemeClr val="accent1"/>
+    </dgm:linClrLst>
+    <dgm:effectClrLst/>
+    <dgm:txLinClrLst/>
+    <dgm:txFillClrLst meth="repeat">
+      <a:schemeClr val="lt1"/>
+    </dgm:txFillClrLst>
+    <dgm:txEffectClrLst/>
+  </dgm:styleLbl>
+  <dgm:styleLbl name="trBgShp">
+    <dgm:fillClrLst meth="repeat">
+      <a:schemeClr val="accent1">
+        <a:tint val="50000"/>
+        <a:alpha val="40000"/>
+      </a:schemeClr>
+    </dgm:fillClrLst>
+    <dgm:linClrLst meth="repeat">
+      <a:schemeClr val="accent1"/>
+    </dgm:linClrLst>
+    <dgm:effectClrLst/>
+    <dgm:txLinClrLst/>
+    <dgm:txFillClrLst meth="repeat">
+      <a:schemeClr val="lt1"/>
+    </dgm:txFillClrLst>
+    <dgm:txEffectClrLst/>
+  </dgm:styleLbl>
+  <dgm:styleLbl name="fgShp">
+    <dgm:fillClrLst meth="repeat">
+      <a:schemeClr val="accent1">
+        <a:tint val="60000"/>
+      </a:schemeClr>
+    </dgm:fillClrLst>
+    <dgm:linClrLst meth="repeat">
+      <a:schemeClr val="lt1"/>
+    </dgm:linClrLst>
+    <dgm:effectClrLst/>
+    <dgm:txLinClrLst/>
+    <dgm:txFillClrLst meth="repeat">
+      <a:schemeClr val="dk1"/>
+    </dgm:txFillClrLst>
+    <dgm:txEffectClrLst/>
+  </dgm:styleLbl>
+  <dgm:styleLbl name="revTx">
+    <dgm:fillClrLst meth="repeat">
+      <a:schemeClr val="lt1">
+        <a:alpha val="0"/>
+      </a:schemeClr>
+    </dgm:fillClrLst>
+    <dgm:linClrLst meth="repeat">
+      <a:schemeClr val="dk1">
+        <a:alpha val="0"/>
+      </a:schemeClr>
+    </dgm:linClrLst>
+    <dgm:effectClrLst/>
+    <dgm:txLinClrLst/>
+    <dgm:txFillClrLst meth="repeat">
+      <a:schemeClr val="tx1"/>
+    </dgm:txFillClrLst>
+    <dgm:txEffectClrLst/>
+  </dgm:styleLbl>
+</dgm:colorsDef>
+</file>
+
+<file path=ppt/diagrams/colors2.xml><?xml version="1.0" encoding="utf-8"?>
 <dgm:colorsDef xmlns:dgm="http://schemas.openxmlformats.org/drawingml/2006/diagram" xmlns:a="http://schemas.openxmlformats.org/drawingml/2006/main" uniqueId="urn:microsoft.com/office/officeart/2005/8/colors/colorful5">
   <dgm:title val=""/>
   <dgm:desc val=""/>
@@ -915,7 +1662,7 @@
 </dgm:colorsDef>
 </file>
 
-<file path=ppt/diagrams/colors2.xml><?xml version="1.0" encoding="utf-8"?>
+<file path=ppt/diagrams/colors3.xml><?xml version="1.0" encoding="utf-8"?>
 <dgm:colorsDef xmlns:dgm="http://schemas.openxmlformats.org/drawingml/2006/diagram" xmlns:a="http://schemas.openxmlformats.org/drawingml/2006/main" uniqueId="urn:microsoft.com/office/officeart/2018/5/colors/Iconchunking_neutralicon_colorful1">
   <dgm:title val=""/>
   <dgm:desc val=""/>
@@ -1837,6 +2584,372 @@
 </file>
 
 <file path=ppt/diagrams/data1.xml><?xml version="1.0" encoding="utf-8"?>
+<dgm:dataModel xmlns:dgm="http://schemas.openxmlformats.org/drawingml/2006/diagram" xmlns:a="http://schemas.openxmlformats.org/drawingml/2006/main">
+  <dgm:ptLst>
+    <dgm:pt modelId="{DE9474DF-E984-448A-99E8-BF264829305A}" type="doc">
+      <dgm:prSet loTypeId="urn:microsoft.com/office/officeart/2005/8/layout/hierarchy2" loCatId="hierarchy" qsTypeId="urn:microsoft.com/office/officeart/2005/8/quickstyle/simple1" qsCatId="simple" csTypeId="urn:microsoft.com/office/officeart/2005/8/colors/accent1_2" csCatId="accent1" phldr="1"/>
+      <dgm:spPr/>
+      <dgm:t>
+        <a:bodyPr/>
+        <a:lstStyle/>
+        <a:p>
+          <a:endParaRPr lang="en-US"/>
+        </a:p>
+      </dgm:t>
+    </dgm:pt>
+    <dgm:pt modelId="{9E352015-E9B5-41AE-A70F-4E531EFDA563}">
+      <dgm:prSet/>
+      <dgm:spPr/>
+      <dgm:t>
+        <a:bodyPr/>
+        <a:lstStyle/>
+        <a:p>
+          <a:r>
+            <a:rPr lang="en-US" b="0" i="0"/>
+            <a:t>Content Pipeline</a:t>
+          </a:r>
+          <a:endParaRPr lang="en-US"/>
+        </a:p>
+      </dgm:t>
+    </dgm:pt>
+    <dgm:pt modelId="{E7DC953F-7F3B-42D1-8880-ED683FF49CF5}" type="parTrans" cxnId="{8F6C82D8-5A53-423A-A55F-96F2448AF22F}">
+      <dgm:prSet/>
+      <dgm:spPr/>
+      <dgm:t>
+        <a:bodyPr/>
+        <a:lstStyle/>
+        <a:p>
+          <a:endParaRPr lang="en-US"/>
+        </a:p>
+      </dgm:t>
+    </dgm:pt>
+    <dgm:pt modelId="{F2A3517F-DEC4-48F1-8044-77949EDD621A}" type="sibTrans" cxnId="{8F6C82D8-5A53-423A-A55F-96F2448AF22F}">
+      <dgm:prSet/>
+      <dgm:spPr/>
+      <dgm:t>
+        <a:bodyPr/>
+        <a:lstStyle/>
+        <a:p>
+          <a:endParaRPr lang="en-US"/>
+        </a:p>
+      </dgm:t>
+    </dgm:pt>
+    <dgm:pt modelId="{64570E6D-9173-4FD3-A361-69F38F745EEF}">
+      <dgm:prSet/>
+      <dgm:spPr/>
+      <dgm:t>
+        <a:bodyPr/>
+        <a:lstStyle/>
+        <a:p>
+          <a:r>
+            <a:rPr lang="en-US" b="0" i="0"/>
+            <a:t>Game Class</a:t>
+          </a:r>
+          <a:endParaRPr lang="en-US"/>
+        </a:p>
+      </dgm:t>
+    </dgm:pt>
+    <dgm:pt modelId="{503B5401-CAF9-4CDC-9D2A-A4CB59B1F21C}" type="parTrans" cxnId="{EDBCE337-CCEE-4FA8-8BE9-AF1F587453E4}">
+      <dgm:prSet/>
+      <dgm:spPr/>
+      <dgm:t>
+        <a:bodyPr/>
+        <a:lstStyle/>
+        <a:p>
+          <a:endParaRPr lang="en-US"/>
+        </a:p>
+      </dgm:t>
+    </dgm:pt>
+    <dgm:pt modelId="{814BAB94-DECA-4DB6-A6E5-629A6BC35395}" type="sibTrans" cxnId="{EDBCE337-CCEE-4FA8-8BE9-AF1F587453E4}">
+      <dgm:prSet/>
+      <dgm:spPr/>
+      <dgm:t>
+        <a:bodyPr/>
+        <a:lstStyle/>
+        <a:p>
+          <a:endParaRPr lang="en-US"/>
+        </a:p>
+      </dgm:t>
+    </dgm:pt>
+    <dgm:pt modelId="{11C77B14-DAD5-4F0B-B275-FC06B0EF33AA}">
+      <dgm:prSet/>
+      <dgm:spPr/>
+      <dgm:t>
+        <a:bodyPr/>
+        <a:lstStyle/>
+        <a:p>
+          <a:r>
+            <a:rPr lang="en-US" b="0" i="0"/>
+            <a:t>Rendering</a:t>
+          </a:r>
+          <a:endParaRPr lang="en-US"/>
+        </a:p>
+      </dgm:t>
+    </dgm:pt>
+    <dgm:pt modelId="{E8B3395B-97A0-4C4E-AE5E-6CB8E48FD840}" type="parTrans" cxnId="{F3AA975C-AC68-44A7-8878-DB0C7188227D}">
+      <dgm:prSet/>
+      <dgm:spPr/>
+      <dgm:t>
+        <a:bodyPr/>
+        <a:lstStyle/>
+        <a:p>
+          <a:endParaRPr lang="en-US"/>
+        </a:p>
+      </dgm:t>
+    </dgm:pt>
+    <dgm:pt modelId="{48AD7FC4-4568-446C-8878-70716AEB224C}" type="sibTrans" cxnId="{F3AA975C-AC68-44A7-8878-DB0C7188227D}">
+      <dgm:prSet/>
+      <dgm:spPr/>
+      <dgm:t>
+        <a:bodyPr/>
+        <a:lstStyle/>
+        <a:p>
+          <a:endParaRPr lang="en-US"/>
+        </a:p>
+      </dgm:t>
+    </dgm:pt>
+    <dgm:pt modelId="{97F3E40D-7612-4A5B-BFAB-A5C7550A6815}">
+      <dgm:prSet/>
+      <dgm:spPr/>
+      <dgm:t>
+        <a:bodyPr/>
+        <a:lstStyle/>
+        <a:p>
+          <a:r>
+            <a:rPr lang="en-US" b="0" i="0"/>
+            <a:t>Input</a:t>
+          </a:r>
+          <a:endParaRPr lang="en-US"/>
+        </a:p>
+      </dgm:t>
+    </dgm:pt>
+    <dgm:pt modelId="{BF80A21F-4D81-423E-B8EA-572A4365A0CD}" type="parTrans" cxnId="{A3E8F486-CDC9-433C-B4C6-5727030F82A3}">
+      <dgm:prSet/>
+      <dgm:spPr/>
+      <dgm:t>
+        <a:bodyPr/>
+        <a:lstStyle/>
+        <a:p>
+          <a:endParaRPr lang="en-US"/>
+        </a:p>
+      </dgm:t>
+    </dgm:pt>
+    <dgm:pt modelId="{525A6C67-68AA-4087-AA26-04E5D971709A}" type="sibTrans" cxnId="{A3E8F486-CDC9-433C-B4C6-5727030F82A3}">
+      <dgm:prSet/>
+      <dgm:spPr/>
+      <dgm:t>
+        <a:bodyPr/>
+        <a:lstStyle/>
+        <a:p>
+          <a:endParaRPr lang="en-US"/>
+        </a:p>
+      </dgm:t>
+    </dgm:pt>
+    <dgm:pt modelId="{6393772F-FBED-4E9C-AEC1-2EB6BE6D68CA}">
+      <dgm:prSet/>
+      <dgm:spPr/>
+      <dgm:t>
+        <a:bodyPr/>
+        <a:lstStyle/>
+        <a:p>
+          <a:r>
+            <a:rPr lang="en-US" b="0" i="0" dirty="0"/>
+            <a:t>Updates</a:t>
+          </a:r>
+          <a:endParaRPr lang="en-US" dirty="0"/>
+        </a:p>
+      </dgm:t>
+    </dgm:pt>
+    <dgm:pt modelId="{B127EFC0-2193-4FEC-A300-6FA305A6783A}" type="parTrans" cxnId="{E570E1AB-53DD-4C71-BA36-7E79AFF89D90}">
+      <dgm:prSet/>
+      <dgm:spPr/>
+      <dgm:t>
+        <a:bodyPr/>
+        <a:lstStyle/>
+        <a:p>
+          <a:endParaRPr lang="en-US"/>
+        </a:p>
+      </dgm:t>
+    </dgm:pt>
+    <dgm:pt modelId="{9AE438A6-0B44-4EF3-B745-E61A4F426E0D}" type="sibTrans" cxnId="{E570E1AB-53DD-4C71-BA36-7E79AFF89D90}">
+      <dgm:prSet/>
+      <dgm:spPr/>
+      <dgm:t>
+        <a:bodyPr/>
+        <a:lstStyle/>
+        <a:p>
+          <a:endParaRPr lang="en-US"/>
+        </a:p>
+      </dgm:t>
+    </dgm:pt>
+    <dgm:pt modelId="{73F54CE1-E078-419F-B5AC-BF1B7908700C}" type="pres">
+      <dgm:prSet presAssocID="{DE9474DF-E984-448A-99E8-BF264829305A}" presName="diagram" presStyleCnt="0">
+        <dgm:presLayoutVars>
+          <dgm:chPref val="1"/>
+          <dgm:dir/>
+          <dgm:animOne val="branch"/>
+          <dgm:animLvl val="lvl"/>
+          <dgm:resizeHandles val="exact"/>
+        </dgm:presLayoutVars>
+      </dgm:prSet>
+      <dgm:spPr/>
+    </dgm:pt>
+    <dgm:pt modelId="{2EE3C8A9-55AC-4B03-8D4F-EB445309DBA3}" type="pres">
+      <dgm:prSet presAssocID="{9E352015-E9B5-41AE-A70F-4E531EFDA563}" presName="root1" presStyleCnt="0"/>
+      <dgm:spPr/>
+    </dgm:pt>
+    <dgm:pt modelId="{19125295-3578-4126-B603-72F37824A4DF}" type="pres">
+      <dgm:prSet presAssocID="{9E352015-E9B5-41AE-A70F-4E531EFDA563}" presName="LevelOneTextNode" presStyleLbl="node0" presStyleIdx="0" presStyleCnt="2" custLinFactNeighborY="-23486">
+        <dgm:presLayoutVars>
+          <dgm:chPref val="3"/>
+        </dgm:presLayoutVars>
+      </dgm:prSet>
+      <dgm:spPr/>
+    </dgm:pt>
+    <dgm:pt modelId="{7666A50A-1720-4766-B8D3-07D648DE9197}" type="pres">
+      <dgm:prSet presAssocID="{9E352015-E9B5-41AE-A70F-4E531EFDA563}" presName="level2hierChild" presStyleCnt="0"/>
+      <dgm:spPr/>
+    </dgm:pt>
+    <dgm:pt modelId="{EA5B54CD-576C-48B5-9848-444B7B97F530}" type="pres">
+      <dgm:prSet presAssocID="{64570E6D-9173-4FD3-A361-69F38F745EEF}" presName="root1" presStyleCnt="0"/>
+      <dgm:spPr/>
+    </dgm:pt>
+    <dgm:pt modelId="{5BA3CBF6-9D94-4800-BD93-83B0AEED2695}" type="pres">
+      <dgm:prSet presAssocID="{64570E6D-9173-4FD3-A361-69F38F745EEF}" presName="LevelOneTextNode" presStyleLbl="node0" presStyleIdx="1" presStyleCnt="2">
+        <dgm:presLayoutVars>
+          <dgm:chPref val="3"/>
+        </dgm:presLayoutVars>
+      </dgm:prSet>
+      <dgm:spPr/>
+    </dgm:pt>
+    <dgm:pt modelId="{E873C55C-2715-4452-8C51-0E3F961650BB}" type="pres">
+      <dgm:prSet presAssocID="{64570E6D-9173-4FD3-A361-69F38F745EEF}" presName="level2hierChild" presStyleCnt="0"/>
+      <dgm:spPr/>
+    </dgm:pt>
+    <dgm:pt modelId="{8AA75BAA-4C25-4249-9431-DCCEF356585B}" type="pres">
+      <dgm:prSet presAssocID="{E8B3395B-97A0-4C4E-AE5E-6CB8E48FD840}" presName="conn2-1" presStyleLbl="parChTrans1D2" presStyleIdx="0" presStyleCnt="3"/>
+      <dgm:spPr/>
+    </dgm:pt>
+    <dgm:pt modelId="{43D60C0C-E220-4E91-8615-1B1AE3127848}" type="pres">
+      <dgm:prSet presAssocID="{E8B3395B-97A0-4C4E-AE5E-6CB8E48FD840}" presName="connTx" presStyleLbl="parChTrans1D2" presStyleIdx="0" presStyleCnt="3"/>
+      <dgm:spPr/>
+    </dgm:pt>
+    <dgm:pt modelId="{E0F4C4CC-33EC-4854-8DDC-28F1E58A393B}" type="pres">
+      <dgm:prSet presAssocID="{11C77B14-DAD5-4F0B-B275-FC06B0EF33AA}" presName="root2" presStyleCnt="0"/>
+      <dgm:spPr/>
+    </dgm:pt>
+    <dgm:pt modelId="{E9E9B362-30B0-40AA-A5FB-BAB06F1799D1}" type="pres">
+      <dgm:prSet presAssocID="{11C77B14-DAD5-4F0B-B275-FC06B0EF33AA}" presName="LevelTwoTextNode" presStyleLbl="node2" presStyleIdx="0" presStyleCnt="3">
+        <dgm:presLayoutVars>
+          <dgm:chPref val="3"/>
+        </dgm:presLayoutVars>
+      </dgm:prSet>
+      <dgm:spPr/>
+    </dgm:pt>
+    <dgm:pt modelId="{B911FB92-3AF1-4533-AC58-EC2A282478DB}" type="pres">
+      <dgm:prSet presAssocID="{11C77B14-DAD5-4F0B-B275-FC06B0EF33AA}" presName="level3hierChild" presStyleCnt="0"/>
+      <dgm:spPr/>
+    </dgm:pt>
+    <dgm:pt modelId="{1B9DAC37-196E-4FF0-9745-0630E3044358}" type="pres">
+      <dgm:prSet presAssocID="{BF80A21F-4D81-423E-B8EA-572A4365A0CD}" presName="conn2-1" presStyleLbl="parChTrans1D2" presStyleIdx="1" presStyleCnt="3"/>
+      <dgm:spPr/>
+    </dgm:pt>
+    <dgm:pt modelId="{1B55F0C6-AA21-43F9-838C-F50B7FB9EFAF}" type="pres">
+      <dgm:prSet presAssocID="{BF80A21F-4D81-423E-B8EA-572A4365A0CD}" presName="connTx" presStyleLbl="parChTrans1D2" presStyleIdx="1" presStyleCnt="3"/>
+      <dgm:spPr/>
+    </dgm:pt>
+    <dgm:pt modelId="{B8DFEBF4-C6CF-4E25-ABBE-4A6B7E6AD0AF}" type="pres">
+      <dgm:prSet presAssocID="{97F3E40D-7612-4A5B-BFAB-A5C7550A6815}" presName="root2" presStyleCnt="0"/>
+      <dgm:spPr/>
+    </dgm:pt>
+    <dgm:pt modelId="{0546488A-B45B-48C1-94C8-26437444F6EF}" type="pres">
+      <dgm:prSet presAssocID="{97F3E40D-7612-4A5B-BFAB-A5C7550A6815}" presName="LevelTwoTextNode" presStyleLbl="node2" presStyleIdx="1" presStyleCnt="3">
+        <dgm:presLayoutVars>
+          <dgm:chPref val="3"/>
+        </dgm:presLayoutVars>
+      </dgm:prSet>
+      <dgm:spPr/>
+    </dgm:pt>
+    <dgm:pt modelId="{CDE18DD0-7608-4785-97DD-EC1E2D3E458E}" type="pres">
+      <dgm:prSet presAssocID="{97F3E40D-7612-4A5B-BFAB-A5C7550A6815}" presName="level3hierChild" presStyleCnt="0"/>
+      <dgm:spPr/>
+    </dgm:pt>
+    <dgm:pt modelId="{269B79DB-F793-4ECC-A8F6-5EDC1BD3DD3C}" type="pres">
+      <dgm:prSet presAssocID="{B127EFC0-2193-4FEC-A300-6FA305A6783A}" presName="conn2-1" presStyleLbl="parChTrans1D2" presStyleIdx="2" presStyleCnt="3"/>
+      <dgm:spPr/>
+    </dgm:pt>
+    <dgm:pt modelId="{50733C94-AE66-4FFF-8179-01BA90F0110E}" type="pres">
+      <dgm:prSet presAssocID="{B127EFC0-2193-4FEC-A300-6FA305A6783A}" presName="connTx" presStyleLbl="parChTrans1D2" presStyleIdx="2" presStyleCnt="3"/>
+      <dgm:spPr/>
+    </dgm:pt>
+    <dgm:pt modelId="{EBB1A893-60A8-4680-BBB6-B14C857E4482}" type="pres">
+      <dgm:prSet presAssocID="{6393772F-FBED-4E9C-AEC1-2EB6BE6D68CA}" presName="root2" presStyleCnt="0"/>
+      <dgm:spPr/>
+    </dgm:pt>
+    <dgm:pt modelId="{2C9B625A-85E2-432D-A710-95988DADD9AA}" type="pres">
+      <dgm:prSet presAssocID="{6393772F-FBED-4E9C-AEC1-2EB6BE6D68CA}" presName="LevelTwoTextNode" presStyleLbl="node2" presStyleIdx="2" presStyleCnt="3">
+        <dgm:presLayoutVars>
+          <dgm:chPref val="3"/>
+        </dgm:presLayoutVars>
+      </dgm:prSet>
+      <dgm:spPr/>
+    </dgm:pt>
+    <dgm:pt modelId="{A444466E-1767-468E-8DAF-793194BDDD10}" type="pres">
+      <dgm:prSet presAssocID="{6393772F-FBED-4E9C-AEC1-2EB6BE6D68CA}" presName="level3hierChild" presStyleCnt="0"/>
+      <dgm:spPr/>
+    </dgm:pt>
+  </dgm:ptLst>
+  <dgm:cxnLst>
+    <dgm:cxn modelId="{923C2E0B-0568-49E2-9AEC-67B6AA285B14}" type="presOf" srcId="{E8B3395B-97A0-4C4E-AE5E-6CB8E48FD840}" destId="{43D60C0C-E220-4E91-8615-1B1AE3127848}" srcOrd="1" destOrd="0" presId="urn:microsoft.com/office/officeart/2005/8/layout/hierarchy2"/>
+    <dgm:cxn modelId="{BF7FD81D-C8B5-492A-80E4-D73CCF87746C}" type="presOf" srcId="{BF80A21F-4D81-423E-B8EA-572A4365A0CD}" destId="{1B9DAC37-196E-4FF0-9745-0630E3044358}" srcOrd="0" destOrd="0" presId="urn:microsoft.com/office/officeart/2005/8/layout/hierarchy2"/>
+    <dgm:cxn modelId="{2B7D842E-AE12-4769-9A9B-CE465704422E}" type="presOf" srcId="{B127EFC0-2193-4FEC-A300-6FA305A6783A}" destId="{50733C94-AE66-4FFF-8179-01BA90F0110E}" srcOrd="1" destOrd="0" presId="urn:microsoft.com/office/officeart/2005/8/layout/hierarchy2"/>
+    <dgm:cxn modelId="{EDBCE337-CCEE-4FA8-8BE9-AF1F587453E4}" srcId="{DE9474DF-E984-448A-99E8-BF264829305A}" destId="{64570E6D-9173-4FD3-A361-69F38F745EEF}" srcOrd="1" destOrd="0" parTransId="{503B5401-CAF9-4CDC-9D2A-A4CB59B1F21C}" sibTransId="{814BAB94-DECA-4DB6-A6E5-629A6BC35395}"/>
+    <dgm:cxn modelId="{43CDFD3D-91BF-4487-9E73-B289398971C8}" type="presOf" srcId="{DE9474DF-E984-448A-99E8-BF264829305A}" destId="{73F54CE1-E078-419F-B5AC-BF1B7908700C}" srcOrd="0" destOrd="0" presId="urn:microsoft.com/office/officeart/2005/8/layout/hierarchy2"/>
+    <dgm:cxn modelId="{CFC78B5C-E5AF-44A1-A9C2-324ABC5B6F26}" type="presOf" srcId="{B127EFC0-2193-4FEC-A300-6FA305A6783A}" destId="{269B79DB-F793-4ECC-A8F6-5EDC1BD3DD3C}" srcOrd="0" destOrd="0" presId="urn:microsoft.com/office/officeart/2005/8/layout/hierarchy2"/>
+    <dgm:cxn modelId="{F3AA975C-AC68-44A7-8878-DB0C7188227D}" srcId="{64570E6D-9173-4FD3-A361-69F38F745EEF}" destId="{11C77B14-DAD5-4F0B-B275-FC06B0EF33AA}" srcOrd="0" destOrd="0" parTransId="{E8B3395B-97A0-4C4E-AE5E-6CB8E48FD840}" sibTransId="{48AD7FC4-4568-446C-8878-70716AEB224C}"/>
+    <dgm:cxn modelId="{7F21A551-B46A-4952-93A1-882C544E95DE}" type="presOf" srcId="{BF80A21F-4D81-423E-B8EA-572A4365A0CD}" destId="{1B55F0C6-AA21-43F9-838C-F50B7FB9EFAF}" srcOrd="1" destOrd="0" presId="urn:microsoft.com/office/officeart/2005/8/layout/hierarchy2"/>
+    <dgm:cxn modelId="{EB820F59-D06E-43AF-920E-5ACC3F431815}" type="presOf" srcId="{9E352015-E9B5-41AE-A70F-4E531EFDA563}" destId="{19125295-3578-4126-B603-72F37824A4DF}" srcOrd="0" destOrd="0" presId="urn:microsoft.com/office/officeart/2005/8/layout/hierarchy2"/>
+    <dgm:cxn modelId="{B3F66D59-A011-4E46-9063-0B0E1C59D522}" type="presOf" srcId="{97F3E40D-7612-4A5B-BFAB-A5C7550A6815}" destId="{0546488A-B45B-48C1-94C8-26437444F6EF}" srcOrd="0" destOrd="0" presId="urn:microsoft.com/office/officeart/2005/8/layout/hierarchy2"/>
+    <dgm:cxn modelId="{8ACD037C-7F71-482A-AFA8-922FCFE72ECD}" type="presOf" srcId="{E8B3395B-97A0-4C4E-AE5E-6CB8E48FD840}" destId="{8AA75BAA-4C25-4249-9431-DCCEF356585B}" srcOrd="0" destOrd="0" presId="urn:microsoft.com/office/officeart/2005/8/layout/hierarchy2"/>
+    <dgm:cxn modelId="{A3E8F486-CDC9-433C-B4C6-5727030F82A3}" srcId="{64570E6D-9173-4FD3-A361-69F38F745EEF}" destId="{97F3E40D-7612-4A5B-BFAB-A5C7550A6815}" srcOrd="1" destOrd="0" parTransId="{BF80A21F-4D81-423E-B8EA-572A4365A0CD}" sibTransId="{525A6C67-68AA-4087-AA26-04E5D971709A}"/>
+    <dgm:cxn modelId="{E570E1AB-53DD-4C71-BA36-7E79AFF89D90}" srcId="{64570E6D-9173-4FD3-A361-69F38F745EEF}" destId="{6393772F-FBED-4E9C-AEC1-2EB6BE6D68CA}" srcOrd="2" destOrd="0" parTransId="{B127EFC0-2193-4FEC-A300-6FA305A6783A}" sibTransId="{9AE438A6-0B44-4EF3-B745-E61A4F426E0D}"/>
+    <dgm:cxn modelId="{644760AF-95F5-463D-9810-6DEABE6C335D}" type="presOf" srcId="{6393772F-FBED-4E9C-AEC1-2EB6BE6D68CA}" destId="{2C9B625A-85E2-432D-A710-95988DADD9AA}" srcOrd="0" destOrd="0" presId="urn:microsoft.com/office/officeart/2005/8/layout/hierarchy2"/>
+    <dgm:cxn modelId="{8F6C82D8-5A53-423A-A55F-96F2448AF22F}" srcId="{DE9474DF-E984-448A-99E8-BF264829305A}" destId="{9E352015-E9B5-41AE-A70F-4E531EFDA563}" srcOrd="0" destOrd="0" parTransId="{E7DC953F-7F3B-42D1-8880-ED683FF49CF5}" sibTransId="{F2A3517F-DEC4-48F1-8044-77949EDD621A}"/>
+    <dgm:cxn modelId="{914B30DF-E488-4677-85DC-79F1DA15582C}" type="presOf" srcId="{64570E6D-9173-4FD3-A361-69F38F745EEF}" destId="{5BA3CBF6-9D94-4800-BD93-83B0AEED2695}" srcOrd="0" destOrd="0" presId="urn:microsoft.com/office/officeart/2005/8/layout/hierarchy2"/>
+    <dgm:cxn modelId="{B02B5BFD-1F5E-47AB-A0E3-313BC2D1D6A2}" type="presOf" srcId="{11C77B14-DAD5-4F0B-B275-FC06B0EF33AA}" destId="{E9E9B362-30B0-40AA-A5FB-BAB06F1799D1}" srcOrd="0" destOrd="0" presId="urn:microsoft.com/office/officeart/2005/8/layout/hierarchy2"/>
+    <dgm:cxn modelId="{4DB02545-E9B6-4E70-A387-6256B52E9B6B}" type="presParOf" srcId="{73F54CE1-E078-419F-B5AC-BF1B7908700C}" destId="{2EE3C8A9-55AC-4B03-8D4F-EB445309DBA3}" srcOrd="0" destOrd="0" presId="urn:microsoft.com/office/officeart/2005/8/layout/hierarchy2"/>
+    <dgm:cxn modelId="{30AFF11F-3FD4-4CDE-B57F-4109506CEA4D}" type="presParOf" srcId="{2EE3C8A9-55AC-4B03-8D4F-EB445309DBA3}" destId="{19125295-3578-4126-B603-72F37824A4DF}" srcOrd="0" destOrd="0" presId="urn:microsoft.com/office/officeart/2005/8/layout/hierarchy2"/>
+    <dgm:cxn modelId="{060A96F4-BF30-42B6-8E61-6AE280B22732}" type="presParOf" srcId="{2EE3C8A9-55AC-4B03-8D4F-EB445309DBA3}" destId="{7666A50A-1720-4766-B8D3-07D648DE9197}" srcOrd="1" destOrd="0" presId="urn:microsoft.com/office/officeart/2005/8/layout/hierarchy2"/>
+    <dgm:cxn modelId="{8DEF2783-BEC0-435A-A631-5A11C5531E63}" type="presParOf" srcId="{73F54CE1-E078-419F-B5AC-BF1B7908700C}" destId="{EA5B54CD-576C-48B5-9848-444B7B97F530}" srcOrd="1" destOrd="0" presId="urn:microsoft.com/office/officeart/2005/8/layout/hierarchy2"/>
+    <dgm:cxn modelId="{BDBB8925-933B-4CDA-93C0-60052420F3C7}" type="presParOf" srcId="{EA5B54CD-576C-48B5-9848-444B7B97F530}" destId="{5BA3CBF6-9D94-4800-BD93-83B0AEED2695}" srcOrd="0" destOrd="0" presId="urn:microsoft.com/office/officeart/2005/8/layout/hierarchy2"/>
+    <dgm:cxn modelId="{246FF4DE-9094-4220-BEEE-64E7CEDA6608}" type="presParOf" srcId="{EA5B54CD-576C-48B5-9848-444B7B97F530}" destId="{E873C55C-2715-4452-8C51-0E3F961650BB}" srcOrd="1" destOrd="0" presId="urn:microsoft.com/office/officeart/2005/8/layout/hierarchy2"/>
+    <dgm:cxn modelId="{01AC2EF4-7457-45B1-8039-E667BF28CF8C}" type="presParOf" srcId="{E873C55C-2715-4452-8C51-0E3F961650BB}" destId="{8AA75BAA-4C25-4249-9431-DCCEF356585B}" srcOrd="0" destOrd="0" presId="urn:microsoft.com/office/officeart/2005/8/layout/hierarchy2"/>
+    <dgm:cxn modelId="{F4A791BE-495D-4D22-BBF4-0BF84AF85B04}" type="presParOf" srcId="{8AA75BAA-4C25-4249-9431-DCCEF356585B}" destId="{43D60C0C-E220-4E91-8615-1B1AE3127848}" srcOrd="0" destOrd="0" presId="urn:microsoft.com/office/officeart/2005/8/layout/hierarchy2"/>
+    <dgm:cxn modelId="{6F758F47-72D6-43E2-B205-0DF76C658BCE}" type="presParOf" srcId="{E873C55C-2715-4452-8C51-0E3F961650BB}" destId="{E0F4C4CC-33EC-4854-8DDC-28F1E58A393B}" srcOrd="1" destOrd="0" presId="urn:microsoft.com/office/officeart/2005/8/layout/hierarchy2"/>
+    <dgm:cxn modelId="{241D3423-B8AF-4E95-B5FC-46360AFA1F8E}" type="presParOf" srcId="{E0F4C4CC-33EC-4854-8DDC-28F1E58A393B}" destId="{E9E9B362-30B0-40AA-A5FB-BAB06F1799D1}" srcOrd="0" destOrd="0" presId="urn:microsoft.com/office/officeart/2005/8/layout/hierarchy2"/>
+    <dgm:cxn modelId="{58B48725-636B-45D6-B93E-F68FDCA98CCA}" type="presParOf" srcId="{E0F4C4CC-33EC-4854-8DDC-28F1E58A393B}" destId="{B911FB92-3AF1-4533-AC58-EC2A282478DB}" srcOrd="1" destOrd="0" presId="urn:microsoft.com/office/officeart/2005/8/layout/hierarchy2"/>
+    <dgm:cxn modelId="{D256713A-B12B-4BE6-A41E-9C9AD2333970}" type="presParOf" srcId="{E873C55C-2715-4452-8C51-0E3F961650BB}" destId="{1B9DAC37-196E-4FF0-9745-0630E3044358}" srcOrd="2" destOrd="0" presId="urn:microsoft.com/office/officeart/2005/8/layout/hierarchy2"/>
+    <dgm:cxn modelId="{0679D2BD-5632-4AC2-8301-69B800EA7FFF}" type="presParOf" srcId="{1B9DAC37-196E-4FF0-9745-0630E3044358}" destId="{1B55F0C6-AA21-43F9-838C-F50B7FB9EFAF}" srcOrd="0" destOrd="0" presId="urn:microsoft.com/office/officeart/2005/8/layout/hierarchy2"/>
+    <dgm:cxn modelId="{9274C8CF-A934-4E2D-8E4B-C2F14FA515FF}" type="presParOf" srcId="{E873C55C-2715-4452-8C51-0E3F961650BB}" destId="{B8DFEBF4-C6CF-4E25-ABBE-4A6B7E6AD0AF}" srcOrd="3" destOrd="0" presId="urn:microsoft.com/office/officeart/2005/8/layout/hierarchy2"/>
+    <dgm:cxn modelId="{85874B62-17DA-4A24-972D-CC9FF33A268B}" type="presParOf" srcId="{B8DFEBF4-C6CF-4E25-ABBE-4A6B7E6AD0AF}" destId="{0546488A-B45B-48C1-94C8-26437444F6EF}" srcOrd="0" destOrd="0" presId="urn:microsoft.com/office/officeart/2005/8/layout/hierarchy2"/>
+    <dgm:cxn modelId="{424B4024-D868-4827-B69D-07B9BA208B1B}" type="presParOf" srcId="{B8DFEBF4-C6CF-4E25-ABBE-4A6B7E6AD0AF}" destId="{CDE18DD0-7608-4785-97DD-EC1E2D3E458E}" srcOrd="1" destOrd="0" presId="urn:microsoft.com/office/officeart/2005/8/layout/hierarchy2"/>
+    <dgm:cxn modelId="{A08BFE19-7FFA-44D5-92ED-1889A7E18F53}" type="presParOf" srcId="{E873C55C-2715-4452-8C51-0E3F961650BB}" destId="{269B79DB-F793-4ECC-A8F6-5EDC1BD3DD3C}" srcOrd="4" destOrd="0" presId="urn:microsoft.com/office/officeart/2005/8/layout/hierarchy2"/>
+    <dgm:cxn modelId="{10C73675-6BF1-4446-9587-E44236D680B0}" type="presParOf" srcId="{269B79DB-F793-4ECC-A8F6-5EDC1BD3DD3C}" destId="{50733C94-AE66-4FFF-8179-01BA90F0110E}" srcOrd="0" destOrd="0" presId="urn:microsoft.com/office/officeart/2005/8/layout/hierarchy2"/>
+    <dgm:cxn modelId="{636A6AE9-6D4F-4CA8-9EA0-35E4E6BF2494}" type="presParOf" srcId="{E873C55C-2715-4452-8C51-0E3F961650BB}" destId="{EBB1A893-60A8-4680-BBB6-B14C857E4482}" srcOrd="5" destOrd="0" presId="urn:microsoft.com/office/officeart/2005/8/layout/hierarchy2"/>
+    <dgm:cxn modelId="{CA769020-09E1-4C10-B03E-F6AD9B8A0890}" type="presParOf" srcId="{EBB1A893-60A8-4680-BBB6-B14C857E4482}" destId="{2C9B625A-85E2-432D-A710-95988DADD9AA}" srcOrd="0" destOrd="0" presId="urn:microsoft.com/office/officeart/2005/8/layout/hierarchy2"/>
+    <dgm:cxn modelId="{84EA43CD-B98B-4996-AD7E-A6A38A1F02AF}" type="presParOf" srcId="{EBB1A893-60A8-4680-BBB6-B14C857E4482}" destId="{A444466E-1767-468E-8DAF-793194BDDD10}" srcOrd="1" destOrd="0" presId="urn:microsoft.com/office/officeart/2005/8/layout/hierarchy2"/>
+  </dgm:cxnLst>
+  <dgm:bg/>
+  <dgm:whole/>
+  <dgm:extLst>
+    <a:ext uri="http://schemas.microsoft.com/office/drawing/2008/diagram">
+      <dsp:dataModelExt xmlns:dsp="http://schemas.microsoft.com/office/drawing/2008/diagram" relId="rId6" minVer="http://schemas.openxmlformats.org/drawingml/2006/diagram"/>
+    </a:ext>
+  </dgm:extLst>
+</dgm:dataModel>
+</file>
+
+<file path=ppt/diagrams/data2.xml><?xml version="1.0" encoding="utf-8"?>
 <dgm:dataModel xmlns:dgm="http://schemas.openxmlformats.org/drawingml/2006/diagram" xmlns:a="http://schemas.openxmlformats.org/drawingml/2006/main">
   <dgm:ptLst>
     <dgm:pt modelId="{6A63BAE1-A644-4895-A106-298DBB32FA4F}" type="doc">
@@ -2388,7 +3501,7 @@
 </dgm:dataModel>
 </file>
 
-<file path=ppt/diagrams/data2.xml><?xml version="1.0" encoding="utf-8"?>
+<file path=ppt/diagrams/data3.xml><?xml version="1.0" encoding="utf-8"?>
 <dgm:dataModel xmlns:dgm="http://schemas.openxmlformats.org/drawingml/2006/diagram" xmlns:a="http://schemas.openxmlformats.org/drawingml/2006/main">
   <dgm:ptLst>
     <dgm:pt modelId="{1957FE18-6447-4E7C-BDFB-2C73AA8F90CA}" type="doc">
@@ -2641,6 +3754,658 @@
 </file>
 
 <file path=ppt/diagrams/drawing1.xml><?xml version="1.0" encoding="utf-8"?>
+<dsp:drawing xmlns:dgm="http://schemas.openxmlformats.org/drawingml/2006/diagram" xmlns:dsp="http://schemas.microsoft.com/office/drawing/2008/diagram" xmlns:a="http://schemas.openxmlformats.org/drawingml/2006/main">
+  <dsp:spTree>
+    <dsp:nvGrpSpPr>
+      <dsp:cNvPr id="0" name=""/>
+      <dsp:cNvGrpSpPr/>
+    </dsp:nvGrpSpPr>
+    <dsp:grpSpPr/>
+    <dsp:sp modelId="{19125295-3578-4126-B603-72F37824A4DF}">
+      <dsp:nvSpPr>
+        <dsp:cNvPr id="0" name=""/>
+        <dsp:cNvSpPr/>
+      </dsp:nvSpPr>
+      <dsp:spPr>
+        <a:xfrm>
+          <a:off x="2974264" y="0"/>
+          <a:ext cx="2061183" cy="1030591"/>
+        </a:xfrm>
+        <a:prstGeom prst="roundRect">
+          <a:avLst>
+            <a:gd name="adj" fmla="val 10000"/>
+          </a:avLst>
+        </a:prstGeom>
+        <a:solidFill>
+          <a:schemeClr val="accent1">
+            <a:hueOff val="0"/>
+            <a:satOff val="0"/>
+            <a:lumOff val="0"/>
+            <a:alphaOff val="0"/>
+          </a:schemeClr>
+        </a:solidFill>
+        <a:ln w="19050" cap="rnd" cmpd="sng" algn="ctr">
+          <a:solidFill>
+            <a:schemeClr val="lt1">
+              <a:hueOff val="0"/>
+              <a:satOff val="0"/>
+              <a:lumOff val="0"/>
+              <a:alphaOff val="0"/>
+            </a:schemeClr>
+          </a:solidFill>
+          <a:prstDash val="solid"/>
+        </a:ln>
+        <a:effectLst/>
+      </dsp:spPr>
+      <dsp:style>
+        <a:lnRef idx="2">
+          <a:scrgbClr r="0" g="0" b="0"/>
+        </a:lnRef>
+        <a:fillRef idx="1">
+          <a:scrgbClr r="0" g="0" b="0"/>
+        </a:fillRef>
+        <a:effectRef idx="0">
+          <a:scrgbClr r="0" g="0" b="0"/>
+        </a:effectRef>
+        <a:fontRef idx="minor">
+          <a:schemeClr val="lt1"/>
+        </a:fontRef>
+      </dsp:style>
+      <dsp:txBody>
+        <a:bodyPr spcFirstLastPara="0" vert="horz" wrap="square" lIns="19050" tIns="19050" rIns="19050" bIns="19050" numCol="1" spcCol="1270" anchor="ctr" anchorCtr="0">
+          <a:noAutofit/>
+        </a:bodyPr>
+        <a:lstStyle/>
+        <a:p>
+          <a:pPr marL="0" lvl="0" indent="0" algn="ctr" defTabSz="1333500">
+            <a:lnSpc>
+              <a:spcPct val="90000"/>
+            </a:lnSpc>
+            <a:spcBef>
+              <a:spcPct val="0"/>
+            </a:spcBef>
+            <a:spcAft>
+              <a:spcPct val="35000"/>
+            </a:spcAft>
+            <a:buNone/>
+          </a:pPr>
+          <a:r>
+            <a:rPr lang="en-US" sz="3000" b="0" i="0" kern="1200"/>
+            <a:t>Content Pipeline</a:t>
+          </a:r>
+          <a:endParaRPr lang="en-US" sz="3000" kern="1200"/>
+        </a:p>
+      </dsp:txBody>
+      <dsp:txXfrm>
+        <a:off x="3004449" y="30185"/>
+        <a:ext cx="2000813" cy="970221"/>
+      </dsp:txXfrm>
+    </dsp:sp>
+    <dsp:sp modelId="{5BA3CBF6-9D94-4800-BD93-83B0AEED2695}">
+      <dsp:nvSpPr>
+        <dsp:cNvPr id="0" name=""/>
+        <dsp:cNvSpPr/>
+      </dsp:nvSpPr>
+      <dsp:spPr>
+        <a:xfrm>
+          <a:off x="2974264" y="1186842"/>
+          <a:ext cx="2061183" cy="1030591"/>
+        </a:xfrm>
+        <a:prstGeom prst="roundRect">
+          <a:avLst>
+            <a:gd name="adj" fmla="val 10000"/>
+          </a:avLst>
+        </a:prstGeom>
+        <a:solidFill>
+          <a:schemeClr val="accent1">
+            <a:hueOff val="0"/>
+            <a:satOff val="0"/>
+            <a:lumOff val="0"/>
+            <a:alphaOff val="0"/>
+          </a:schemeClr>
+        </a:solidFill>
+        <a:ln w="19050" cap="rnd" cmpd="sng" algn="ctr">
+          <a:solidFill>
+            <a:schemeClr val="lt1">
+              <a:hueOff val="0"/>
+              <a:satOff val="0"/>
+              <a:lumOff val="0"/>
+              <a:alphaOff val="0"/>
+            </a:schemeClr>
+          </a:solidFill>
+          <a:prstDash val="solid"/>
+        </a:ln>
+        <a:effectLst/>
+      </dsp:spPr>
+      <dsp:style>
+        <a:lnRef idx="2">
+          <a:scrgbClr r="0" g="0" b="0"/>
+        </a:lnRef>
+        <a:fillRef idx="1">
+          <a:scrgbClr r="0" g="0" b="0"/>
+        </a:fillRef>
+        <a:effectRef idx="0">
+          <a:scrgbClr r="0" g="0" b="0"/>
+        </a:effectRef>
+        <a:fontRef idx="minor">
+          <a:schemeClr val="lt1"/>
+        </a:fontRef>
+      </dsp:style>
+      <dsp:txBody>
+        <a:bodyPr spcFirstLastPara="0" vert="horz" wrap="square" lIns="19050" tIns="19050" rIns="19050" bIns="19050" numCol="1" spcCol="1270" anchor="ctr" anchorCtr="0">
+          <a:noAutofit/>
+        </a:bodyPr>
+        <a:lstStyle/>
+        <a:p>
+          <a:pPr marL="0" lvl="0" indent="0" algn="ctr" defTabSz="1333500">
+            <a:lnSpc>
+              <a:spcPct val="90000"/>
+            </a:lnSpc>
+            <a:spcBef>
+              <a:spcPct val="0"/>
+            </a:spcBef>
+            <a:spcAft>
+              <a:spcPct val="35000"/>
+            </a:spcAft>
+            <a:buNone/>
+          </a:pPr>
+          <a:r>
+            <a:rPr lang="en-US" sz="3000" b="0" i="0" kern="1200"/>
+            <a:t>Game Class</a:t>
+          </a:r>
+          <a:endParaRPr lang="en-US" sz="3000" kern="1200"/>
+        </a:p>
+      </dsp:txBody>
+      <dsp:txXfrm>
+        <a:off x="3004449" y="1217027"/>
+        <a:ext cx="2000813" cy="970221"/>
+      </dsp:txXfrm>
+    </dsp:sp>
+    <dsp:sp modelId="{8AA75BAA-4C25-4249-9431-DCCEF356585B}">
+      <dsp:nvSpPr>
+        <dsp:cNvPr id="0" name=""/>
+        <dsp:cNvSpPr/>
+      </dsp:nvSpPr>
+      <dsp:spPr>
+        <a:xfrm rot="18289469">
+          <a:off x="4725810" y="1082302"/>
+          <a:ext cx="1443748" cy="54492"/>
+        </a:xfrm>
+        <a:custGeom>
+          <a:avLst/>
+          <a:gdLst/>
+          <a:ahLst/>
+          <a:cxnLst/>
+          <a:rect l="0" t="0" r="0" b="0"/>
+          <a:pathLst>
+            <a:path>
+              <a:moveTo>
+                <a:pt x="0" y="27246"/>
+              </a:moveTo>
+              <a:lnTo>
+                <a:pt x="1443748" y="27246"/>
+              </a:lnTo>
+            </a:path>
+          </a:pathLst>
+        </a:custGeom>
+        <a:noFill/>
+        <a:ln w="19050" cap="rnd" cmpd="sng" algn="ctr">
+          <a:solidFill>
+            <a:schemeClr val="accent1">
+              <a:shade val="60000"/>
+              <a:hueOff val="0"/>
+              <a:satOff val="0"/>
+              <a:lumOff val="0"/>
+              <a:alphaOff val="0"/>
+            </a:schemeClr>
+          </a:solidFill>
+          <a:prstDash val="solid"/>
+        </a:ln>
+        <a:effectLst/>
+      </dsp:spPr>
+      <dsp:style>
+        <a:lnRef idx="2">
+          <a:scrgbClr r="0" g="0" b="0"/>
+        </a:lnRef>
+        <a:fillRef idx="0">
+          <a:scrgbClr r="0" g="0" b="0"/>
+        </a:fillRef>
+        <a:effectRef idx="0">
+          <a:scrgbClr r="0" g="0" b="0"/>
+        </a:effectRef>
+        <a:fontRef idx="minor"/>
+      </dsp:style>
+      <dsp:txBody>
+        <a:bodyPr spcFirstLastPara="0" vert="horz" wrap="square" lIns="12700" tIns="0" rIns="12700" bIns="0" numCol="1" spcCol="1270" anchor="ctr" anchorCtr="0">
+          <a:noAutofit/>
+        </a:bodyPr>
+        <a:lstStyle/>
+        <a:p>
+          <a:pPr marL="0" lvl="0" indent="0" algn="ctr" defTabSz="222250">
+            <a:lnSpc>
+              <a:spcPct val="90000"/>
+            </a:lnSpc>
+            <a:spcBef>
+              <a:spcPct val="0"/>
+            </a:spcBef>
+            <a:spcAft>
+              <a:spcPct val="35000"/>
+            </a:spcAft>
+            <a:buNone/>
+          </a:pPr>
+          <a:endParaRPr lang="en-US" sz="500" kern="1200"/>
+        </a:p>
+      </dsp:txBody>
+      <dsp:txXfrm>
+        <a:off x="5411591" y="1073454"/>
+        <a:ext cx="72187" cy="72187"/>
+      </dsp:txXfrm>
+    </dsp:sp>
+    <dsp:sp modelId="{E9E9B362-30B0-40AA-A5FB-BAB06F1799D1}">
+      <dsp:nvSpPr>
+        <dsp:cNvPr id="0" name=""/>
+        <dsp:cNvSpPr/>
+      </dsp:nvSpPr>
+      <dsp:spPr>
+        <a:xfrm>
+          <a:off x="5859921" y="1662"/>
+          <a:ext cx="2061183" cy="1030591"/>
+        </a:xfrm>
+        <a:prstGeom prst="roundRect">
+          <a:avLst>
+            <a:gd name="adj" fmla="val 10000"/>
+          </a:avLst>
+        </a:prstGeom>
+        <a:solidFill>
+          <a:schemeClr val="accent1">
+            <a:hueOff val="0"/>
+            <a:satOff val="0"/>
+            <a:lumOff val="0"/>
+            <a:alphaOff val="0"/>
+          </a:schemeClr>
+        </a:solidFill>
+        <a:ln w="19050" cap="rnd" cmpd="sng" algn="ctr">
+          <a:solidFill>
+            <a:schemeClr val="lt1">
+              <a:hueOff val="0"/>
+              <a:satOff val="0"/>
+              <a:lumOff val="0"/>
+              <a:alphaOff val="0"/>
+            </a:schemeClr>
+          </a:solidFill>
+          <a:prstDash val="solid"/>
+        </a:ln>
+        <a:effectLst/>
+      </dsp:spPr>
+      <dsp:style>
+        <a:lnRef idx="2">
+          <a:scrgbClr r="0" g="0" b="0"/>
+        </a:lnRef>
+        <a:fillRef idx="1">
+          <a:scrgbClr r="0" g="0" b="0"/>
+        </a:fillRef>
+        <a:effectRef idx="0">
+          <a:scrgbClr r="0" g="0" b="0"/>
+        </a:effectRef>
+        <a:fontRef idx="minor">
+          <a:schemeClr val="lt1"/>
+        </a:fontRef>
+      </dsp:style>
+      <dsp:txBody>
+        <a:bodyPr spcFirstLastPara="0" vert="horz" wrap="square" lIns="19050" tIns="19050" rIns="19050" bIns="19050" numCol="1" spcCol="1270" anchor="ctr" anchorCtr="0">
+          <a:noAutofit/>
+        </a:bodyPr>
+        <a:lstStyle/>
+        <a:p>
+          <a:pPr marL="0" lvl="0" indent="0" algn="ctr" defTabSz="1333500">
+            <a:lnSpc>
+              <a:spcPct val="90000"/>
+            </a:lnSpc>
+            <a:spcBef>
+              <a:spcPct val="0"/>
+            </a:spcBef>
+            <a:spcAft>
+              <a:spcPct val="35000"/>
+            </a:spcAft>
+            <a:buNone/>
+          </a:pPr>
+          <a:r>
+            <a:rPr lang="en-US" sz="3000" b="0" i="0" kern="1200"/>
+            <a:t>Rendering</a:t>
+          </a:r>
+          <a:endParaRPr lang="en-US" sz="3000" kern="1200"/>
+        </a:p>
+      </dsp:txBody>
+      <dsp:txXfrm>
+        <a:off x="5890106" y="31847"/>
+        <a:ext cx="2000813" cy="970221"/>
+      </dsp:txXfrm>
+    </dsp:sp>
+    <dsp:sp modelId="{1B9DAC37-196E-4FF0-9745-0630E3044358}">
+      <dsp:nvSpPr>
+        <dsp:cNvPr id="0" name=""/>
+        <dsp:cNvSpPr/>
+      </dsp:nvSpPr>
+      <dsp:spPr>
+        <a:xfrm>
+          <a:off x="5035448" y="1674892"/>
+          <a:ext cx="824473" cy="54492"/>
+        </a:xfrm>
+        <a:custGeom>
+          <a:avLst/>
+          <a:gdLst/>
+          <a:ahLst/>
+          <a:cxnLst/>
+          <a:rect l="0" t="0" r="0" b="0"/>
+          <a:pathLst>
+            <a:path>
+              <a:moveTo>
+                <a:pt x="0" y="27246"/>
+              </a:moveTo>
+              <a:lnTo>
+                <a:pt x="824473" y="27246"/>
+              </a:lnTo>
+            </a:path>
+          </a:pathLst>
+        </a:custGeom>
+        <a:noFill/>
+        <a:ln w="19050" cap="rnd" cmpd="sng" algn="ctr">
+          <a:solidFill>
+            <a:schemeClr val="accent1">
+              <a:shade val="60000"/>
+              <a:hueOff val="0"/>
+              <a:satOff val="0"/>
+              <a:lumOff val="0"/>
+              <a:alphaOff val="0"/>
+            </a:schemeClr>
+          </a:solidFill>
+          <a:prstDash val="solid"/>
+        </a:ln>
+        <a:effectLst/>
+      </dsp:spPr>
+      <dsp:style>
+        <a:lnRef idx="2">
+          <a:scrgbClr r="0" g="0" b="0"/>
+        </a:lnRef>
+        <a:fillRef idx="0">
+          <a:scrgbClr r="0" g="0" b="0"/>
+        </a:fillRef>
+        <a:effectRef idx="0">
+          <a:scrgbClr r="0" g="0" b="0"/>
+        </a:effectRef>
+        <a:fontRef idx="minor"/>
+      </dsp:style>
+      <dsp:txBody>
+        <a:bodyPr spcFirstLastPara="0" vert="horz" wrap="square" lIns="12700" tIns="0" rIns="12700" bIns="0" numCol="1" spcCol="1270" anchor="ctr" anchorCtr="0">
+          <a:noAutofit/>
+        </a:bodyPr>
+        <a:lstStyle/>
+        <a:p>
+          <a:pPr marL="0" lvl="0" indent="0" algn="ctr" defTabSz="222250">
+            <a:lnSpc>
+              <a:spcPct val="90000"/>
+            </a:lnSpc>
+            <a:spcBef>
+              <a:spcPct val="0"/>
+            </a:spcBef>
+            <a:spcAft>
+              <a:spcPct val="35000"/>
+            </a:spcAft>
+            <a:buNone/>
+          </a:pPr>
+          <a:endParaRPr lang="en-US" sz="500" kern="1200"/>
+        </a:p>
+      </dsp:txBody>
+      <dsp:txXfrm>
+        <a:off x="5427073" y="1681526"/>
+        <a:ext cx="41223" cy="41223"/>
+      </dsp:txXfrm>
+    </dsp:sp>
+    <dsp:sp modelId="{0546488A-B45B-48C1-94C8-26437444F6EF}">
+      <dsp:nvSpPr>
+        <dsp:cNvPr id="0" name=""/>
+        <dsp:cNvSpPr/>
+      </dsp:nvSpPr>
+      <dsp:spPr>
+        <a:xfrm>
+          <a:off x="5859921" y="1186842"/>
+          <a:ext cx="2061183" cy="1030591"/>
+        </a:xfrm>
+        <a:prstGeom prst="roundRect">
+          <a:avLst>
+            <a:gd name="adj" fmla="val 10000"/>
+          </a:avLst>
+        </a:prstGeom>
+        <a:solidFill>
+          <a:schemeClr val="accent1">
+            <a:hueOff val="0"/>
+            <a:satOff val="0"/>
+            <a:lumOff val="0"/>
+            <a:alphaOff val="0"/>
+          </a:schemeClr>
+        </a:solidFill>
+        <a:ln w="19050" cap="rnd" cmpd="sng" algn="ctr">
+          <a:solidFill>
+            <a:schemeClr val="lt1">
+              <a:hueOff val="0"/>
+              <a:satOff val="0"/>
+              <a:lumOff val="0"/>
+              <a:alphaOff val="0"/>
+            </a:schemeClr>
+          </a:solidFill>
+          <a:prstDash val="solid"/>
+        </a:ln>
+        <a:effectLst/>
+      </dsp:spPr>
+      <dsp:style>
+        <a:lnRef idx="2">
+          <a:scrgbClr r="0" g="0" b="0"/>
+        </a:lnRef>
+        <a:fillRef idx="1">
+          <a:scrgbClr r="0" g="0" b="0"/>
+        </a:fillRef>
+        <a:effectRef idx="0">
+          <a:scrgbClr r="0" g="0" b="0"/>
+        </a:effectRef>
+        <a:fontRef idx="minor">
+          <a:schemeClr val="lt1"/>
+        </a:fontRef>
+      </dsp:style>
+      <dsp:txBody>
+        <a:bodyPr spcFirstLastPara="0" vert="horz" wrap="square" lIns="19050" tIns="19050" rIns="19050" bIns="19050" numCol="1" spcCol="1270" anchor="ctr" anchorCtr="0">
+          <a:noAutofit/>
+        </a:bodyPr>
+        <a:lstStyle/>
+        <a:p>
+          <a:pPr marL="0" lvl="0" indent="0" algn="ctr" defTabSz="1333500">
+            <a:lnSpc>
+              <a:spcPct val="90000"/>
+            </a:lnSpc>
+            <a:spcBef>
+              <a:spcPct val="0"/>
+            </a:spcBef>
+            <a:spcAft>
+              <a:spcPct val="35000"/>
+            </a:spcAft>
+            <a:buNone/>
+          </a:pPr>
+          <a:r>
+            <a:rPr lang="en-US" sz="3000" b="0" i="0" kern="1200"/>
+            <a:t>Input</a:t>
+          </a:r>
+          <a:endParaRPr lang="en-US" sz="3000" kern="1200"/>
+        </a:p>
+      </dsp:txBody>
+      <dsp:txXfrm>
+        <a:off x="5890106" y="1217027"/>
+        <a:ext cx="2000813" cy="970221"/>
+      </dsp:txXfrm>
+    </dsp:sp>
+    <dsp:sp modelId="{269B79DB-F793-4ECC-A8F6-5EDC1BD3DD3C}">
+      <dsp:nvSpPr>
+        <dsp:cNvPr id="0" name=""/>
+        <dsp:cNvSpPr/>
+      </dsp:nvSpPr>
+      <dsp:spPr>
+        <a:xfrm rot="3310531">
+          <a:off x="4725810" y="2267482"/>
+          <a:ext cx="1443748" cy="54492"/>
+        </a:xfrm>
+        <a:custGeom>
+          <a:avLst/>
+          <a:gdLst/>
+          <a:ahLst/>
+          <a:cxnLst/>
+          <a:rect l="0" t="0" r="0" b="0"/>
+          <a:pathLst>
+            <a:path>
+              <a:moveTo>
+                <a:pt x="0" y="27246"/>
+              </a:moveTo>
+              <a:lnTo>
+                <a:pt x="1443748" y="27246"/>
+              </a:lnTo>
+            </a:path>
+          </a:pathLst>
+        </a:custGeom>
+        <a:noFill/>
+        <a:ln w="19050" cap="rnd" cmpd="sng" algn="ctr">
+          <a:solidFill>
+            <a:schemeClr val="accent1">
+              <a:shade val="60000"/>
+              <a:hueOff val="0"/>
+              <a:satOff val="0"/>
+              <a:lumOff val="0"/>
+              <a:alphaOff val="0"/>
+            </a:schemeClr>
+          </a:solidFill>
+          <a:prstDash val="solid"/>
+        </a:ln>
+        <a:effectLst/>
+      </dsp:spPr>
+      <dsp:style>
+        <a:lnRef idx="2">
+          <a:scrgbClr r="0" g="0" b="0"/>
+        </a:lnRef>
+        <a:fillRef idx="0">
+          <a:scrgbClr r="0" g="0" b="0"/>
+        </a:fillRef>
+        <a:effectRef idx="0">
+          <a:scrgbClr r="0" g="0" b="0"/>
+        </a:effectRef>
+        <a:fontRef idx="minor"/>
+      </dsp:style>
+      <dsp:txBody>
+        <a:bodyPr spcFirstLastPara="0" vert="horz" wrap="square" lIns="12700" tIns="0" rIns="12700" bIns="0" numCol="1" spcCol="1270" anchor="ctr" anchorCtr="0">
+          <a:noAutofit/>
+        </a:bodyPr>
+        <a:lstStyle/>
+        <a:p>
+          <a:pPr marL="0" lvl="0" indent="0" algn="ctr" defTabSz="222250">
+            <a:lnSpc>
+              <a:spcPct val="90000"/>
+            </a:lnSpc>
+            <a:spcBef>
+              <a:spcPct val="0"/>
+            </a:spcBef>
+            <a:spcAft>
+              <a:spcPct val="35000"/>
+            </a:spcAft>
+            <a:buNone/>
+          </a:pPr>
+          <a:endParaRPr lang="en-US" sz="500" kern="1200"/>
+        </a:p>
+      </dsp:txBody>
+      <dsp:txXfrm>
+        <a:off x="5411591" y="2258635"/>
+        <a:ext cx="72187" cy="72187"/>
+      </dsp:txXfrm>
+    </dsp:sp>
+    <dsp:sp modelId="{2C9B625A-85E2-432D-A710-95988DADD9AA}">
+      <dsp:nvSpPr>
+        <dsp:cNvPr id="0" name=""/>
+        <dsp:cNvSpPr/>
+      </dsp:nvSpPr>
+      <dsp:spPr>
+        <a:xfrm>
+          <a:off x="5859921" y="2372023"/>
+          <a:ext cx="2061183" cy="1030591"/>
+        </a:xfrm>
+        <a:prstGeom prst="roundRect">
+          <a:avLst>
+            <a:gd name="adj" fmla="val 10000"/>
+          </a:avLst>
+        </a:prstGeom>
+        <a:solidFill>
+          <a:schemeClr val="accent1">
+            <a:hueOff val="0"/>
+            <a:satOff val="0"/>
+            <a:lumOff val="0"/>
+            <a:alphaOff val="0"/>
+          </a:schemeClr>
+        </a:solidFill>
+        <a:ln w="19050" cap="rnd" cmpd="sng" algn="ctr">
+          <a:solidFill>
+            <a:schemeClr val="lt1">
+              <a:hueOff val="0"/>
+              <a:satOff val="0"/>
+              <a:lumOff val="0"/>
+              <a:alphaOff val="0"/>
+            </a:schemeClr>
+          </a:solidFill>
+          <a:prstDash val="solid"/>
+        </a:ln>
+        <a:effectLst/>
+      </dsp:spPr>
+      <dsp:style>
+        <a:lnRef idx="2">
+          <a:scrgbClr r="0" g="0" b="0"/>
+        </a:lnRef>
+        <a:fillRef idx="1">
+          <a:scrgbClr r="0" g="0" b="0"/>
+        </a:fillRef>
+        <a:effectRef idx="0">
+          <a:scrgbClr r="0" g="0" b="0"/>
+        </a:effectRef>
+        <a:fontRef idx="minor">
+          <a:schemeClr val="lt1"/>
+        </a:fontRef>
+      </dsp:style>
+      <dsp:txBody>
+        <a:bodyPr spcFirstLastPara="0" vert="horz" wrap="square" lIns="19050" tIns="19050" rIns="19050" bIns="19050" numCol="1" spcCol="1270" anchor="ctr" anchorCtr="0">
+          <a:noAutofit/>
+        </a:bodyPr>
+        <a:lstStyle/>
+        <a:p>
+          <a:pPr marL="0" lvl="0" indent="0" algn="ctr" defTabSz="1333500">
+            <a:lnSpc>
+              <a:spcPct val="90000"/>
+            </a:lnSpc>
+            <a:spcBef>
+              <a:spcPct val="0"/>
+            </a:spcBef>
+            <a:spcAft>
+              <a:spcPct val="35000"/>
+            </a:spcAft>
+            <a:buNone/>
+          </a:pPr>
+          <a:r>
+            <a:rPr lang="en-US" sz="3000" b="0" i="0" kern="1200" dirty="0"/>
+            <a:t>Updates</a:t>
+          </a:r>
+          <a:endParaRPr lang="en-US" sz="3000" kern="1200" dirty="0"/>
+        </a:p>
+      </dsp:txBody>
+      <dsp:txXfrm>
+        <a:off x="5890106" y="2402208"/>
+        <a:ext cx="2000813" cy="970221"/>
+      </dsp:txXfrm>
+    </dsp:sp>
+  </dsp:spTree>
+</dsp:drawing>
+</file>
+
+<file path=ppt/diagrams/drawing2.xml><?xml version="1.0" encoding="utf-8"?>
 <dsp:drawing xmlns:dgm="http://schemas.openxmlformats.org/drawingml/2006/diagram" xmlns:dsp="http://schemas.microsoft.com/office/drawing/2008/diagram" xmlns:a="http://schemas.openxmlformats.org/drawingml/2006/main">
   <dsp:spTree>
     <dsp:nvGrpSpPr>
@@ -3221,7 +4986,7 @@
 </dsp:drawing>
 </file>
 
-<file path=ppt/diagrams/drawing2.xml><?xml version="1.0" encoding="utf-8"?>
+<file path=ppt/diagrams/drawing3.xml><?xml version="1.0" encoding="utf-8"?>
 <dsp:drawing xmlns:dgm="http://schemas.openxmlformats.org/drawingml/2006/diagram" xmlns:dsp="http://schemas.microsoft.com/office/drawing/2008/diagram" xmlns:a="http://schemas.openxmlformats.org/drawingml/2006/main">
   <dsp:spTree>
     <dsp:nvGrpSpPr>
@@ -3562,6 +5327,326 @@
 </file>
 
 <file path=ppt/diagrams/layout1.xml><?xml version="1.0" encoding="utf-8"?>
+<dgm:layoutDef xmlns:dgm="http://schemas.openxmlformats.org/drawingml/2006/diagram" xmlns:a="http://schemas.openxmlformats.org/drawingml/2006/main" uniqueId="urn:microsoft.com/office/officeart/2005/8/layout/hierarchy2">
+  <dgm:title val=""/>
+  <dgm:desc val=""/>
+  <dgm:catLst>
+    <dgm:cat type="hierarchy" pri="5000"/>
+  </dgm:catLst>
+  <dgm:sampData>
+    <dgm:dataModel>
+      <dgm:ptLst>
+        <dgm:pt modelId="0" type="doc"/>
+        <dgm:pt modelId="1">
+          <dgm:prSet phldr="1"/>
+        </dgm:pt>
+        <dgm:pt modelId="2">
+          <dgm:prSet phldr="1"/>
+        </dgm:pt>
+        <dgm:pt modelId="21">
+          <dgm:prSet phldr="1"/>
+        </dgm:pt>
+        <dgm:pt modelId="22">
+          <dgm:prSet phldr="1"/>
+        </dgm:pt>
+        <dgm:pt modelId="3">
+          <dgm:prSet phldr="1"/>
+        </dgm:pt>
+        <dgm:pt modelId="31">
+          <dgm:prSet phldr="1"/>
+        </dgm:pt>
+      </dgm:ptLst>
+      <dgm:cxnLst>
+        <dgm:cxn modelId="4" srcId="0" destId="1" srcOrd="0" destOrd="0"/>
+        <dgm:cxn modelId="5" srcId="1" destId="2" srcOrd="0" destOrd="0"/>
+        <dgm:cxn modelId="6" srcId="1" destId="3" srcOrd="1" destOrd="0"/>
+        <dgm:cxn modelId="23" srcId="2" destId="21" srcOrd="0" destOrd="0"/>
+        <dgm:cxn modelId="24" srcId="2" destId="22" srcOrd="1" destOrd="0"/>
+        <dgm:cxn modelId="33" srcId="3" destId="31" srcOrd="0" destOrd="0"/>
+      </dgm:cxnLst>
+      <dgm:bg/>
+      <dgm:whole/>
+    </dgm:dataModel>
+  </dgm:sampData>
+  <dgm:styleData>
+    <dgm:dataModel>
+      <dgm:ptLst>
+        <dgm:pt modelId="0" type="doc"/>
+        <dgm:pt modelId="1"/>
+        <dgm:pt modelId="11"/>
+        <dgm:pt modelId="12"/>
+      </dgm:ptLst>
+      <dgm:cxnLst>
+        <dgm:cxn modelId="2" srcId="0" destId="1" srcOrd="0" destOrd="0"/>
+        <dgm:cxn modelId="13" srcId="1" destId="11" srcOrd="0" destOrd="0"/>
+        <dgm:cxn modelId="14" srcId="1" destId="12" srcOrd="1" destOrd="0"/>
+      </dgm:cxnLst>
+      <dgm:bg/>
+      <dgm:whole/>
+    </dgm:dataModel>
+  </dgm:styleData>
+  <dgm:clrData>
+    <dgm:dataModel>
+      <dgm:ptLst>
+        <dgm:pt modelId="0" type="doc"/>
+        <dgm:pt modelId="1"/>
+        <dgm:pt modelId="2"/>
+        <dgm:pt modelId="21"/>
+        <dgm:pt modelId="211"/>
+        <dgm:pt modelId="3"/>
+        <dgm:pt modelId="31"/>
+        <dgm:pt modelId="311"/>
+      </dgm:ptLst>
+      <dgm:cxnLst>
+        <dgm:cxn modelId="4" srcId="0" destId="1" srcOrd="0" destOrd="0"/>
+        <dgm:cxn modelId="5" srcId="1" destId="2" srcOrd="0" destOrd="0"/>
+        <dgm:cxn modelId="6" srcId="1" destId="3" srcOrd="1" destOrd="0"/>
+        <dgm:cxn modelId="23" srcId="2" destId="21" srcOrd="0" destOrd="0"/>
+        <dgm:cxn modelId="24" srcId="21" destId="211" srcOrd="0" destOrd="0"/>
+        <dgm:cxn modelId="33" srcId="3" destId="31" srcOrd="0" destOrd="0"/>
+        <dgm:cxn modelId="34" srcId="31" destId="311" srcOrd="0" destOrd="0"/>
+      </dgm:cxnLst>
+      <dgm:bg/>
+      <dgm:whole/>
+    </dgm:dataModel>
+  </dgm:clrData>
+  <dgm:layoutNode name="diagram">
+    <dgm:varLst>
+      <dgm:chPref val="1"/>
+      <dgm:dir/>
+      <dgm:animOne val="branch"/>
+      <dgm:animLvl val="lvl"/>
+      <dgm:resizeHandles val="exact"/>
+    </dgm:varLst>
+    <dgm:choose name="Name0">
+      <dgm:if name="Name1" func="var" arg="dir" op="equ" val="norm">
+        <dgm:alg type="hierChild">
+          <dgm:param type="linDir" val="fromT"/>
+          <dgm:param type="chAlign" val="l"/>
+        </dgm:alg>
+      </dgm:if>
+      <dgm:else name="Name2">
+        <dgm:alg type="hierChild">
+          <dgm:param type="linDir" val="fromT"/>
+          <dgm:param type="chAlign" val="r"/>
+        </dgm:alg>
+      </dgm:else>
+    </dgm:choose>
+    <dgm:shape xmlns:r="http://schemas.openxmlformats.org/officeDocument/2006/relationships" r:blip="">
+      <dgm:adjLst/>
+    </dgm:shape>
+    <dgm:presOf/>
+    <dgm:constrLst>
+      <dgm:constr type="h" for="des" ptType="node" refType="h"/>
+      <dgm:constr type="w" for="des" ptType="node" refType="h" refFor="des" refPtType="node" fact="2"/>
+      <dgm:constr type="sibSp" refType="h" refFor="des" refPtType="node" op="equ" fact="0.15"/>
+      <dgm:constr type="sibSp" for="des" forName="level2hierChild" refType="h" refFor="des" refPtType="node" op="equ" fact="0.15"/>
+      <dgm:constr type="sibSp" for="des" forName="level3hierChild" refType="h" refFor="des" refPtType="node" op="equ" fact="0.15"/>
+      <dgm:constr type="sp" for="des" forName="root1" refType="w" refFor="des" refPtType="node" fact="0.4"/>
+      <dgm:constr type="sp" for="des" forName="root2" refType="sp" refFor="des" refForName="root1" op="equ"/>
+      <dgm:constr type="primFontSz" for="des" ptType="node" op="equ" val="65"/>
+      <dgm:constr type="primFontSz" for="des" forName="connTx" op="equ" val="55"/>
+      <dgm:constr type="primFontSz" for="des" forName="connTx" refType="primFontSz" refFor="des" refPtType="node" op="lte" fact="0.8"/>
+    </dgm:constrLst>
+    <dgm:ruleLst/>
+    <dgm:forEach name="Name3" axis="ch">
+      <dgm:forEach name="Name4" axis="self" ptType="node">
+        <dgm:layoutNode name="root1">
+          <dgm:choose name="Name5">
+            <dgm:if name="Name6" func="var" arg="dir" op="equ" val="norm">
+              <dgm:alg type="hierRoot">
+                <dgm:param type="hierAlign" val="lCtrCh"/>
+              </dgm:alg>
+            </dgm:if>
+            <dgm:else name="Name7">
+              <dgm:alg type="hierRoot">
+                <dgm:param type="hierAlign" val="rCtrCh"/>
+              </dgm:alg>
+            </dgm:else>
+          </dgm:choose>
+          <dgm:shape xmlns:r="http://schemas.openxmlformats.org/officeDocument/2006/relationships" r:blip="">
+            <dgm:adjLst/>
+          </dgm:shape>
+          <dgm:presOf/>
+          <dgm:constrLst/>
+          <dgm:ruleLst/>
+          <dgm:layoutNode name="LevelOneTextNode" styleLbl="node0">
+            <dgm:varLst>
+              <dgm:chPref val="3"/>
+            </dgm:varLst>
+            <dgm:alg type="tx"/>
+            <dgm:shape xmlns:r="http://schemas.openxmlformats.org/officeDocument/2006/relationships" type="roundRect" r:blip="">
+              <dgm:adjLst>
+                <dgm:adj idx="1" val="0.1"/>
+              </dgm:adjLst>
+            </dgm:shape>
+            <dgm:presOf axis="self"/>
+            <dgm:constrLst>
+              <dgm:constr type="tMarg" refType="primFontSz" fact="0.05"/>
+              <dgm:constr type="bMarg" refType="primFontSz" fact="0.05"/>
+              <dgm:constr type="lMarg" refType="primFontSz" fact="0.05"/>
+              <dgm:constr type="rMarg" refType="primFontSz" fact="0.05"/>
+            </dgm:constrLst>
+            <dgm:ruleLst>
+              <dgm:rule type="primFontSz" val="5" fact="NaN" max="NaN"/>
+            </dgm:ruleLst>
+          </dgm:layoutNode>
+          <dgm:layoutNode name="level2hierChild">
+            <dgm:choose name="Name8">
+              <dgm:if name="Name9" func="var" arg="dir" op="equ" val="norm">
+                <dgm:alg type="hierChild">
+                  <dgm:param type="linDir" val="fromT"/>
+                  <dgm:param type="chAlign" val="l"/>
+                </dgm:alg>
+              </dgm:if>
+              <dgm:else name="Name10">
+                <dgm:alg type="hierChild">
+                  <dgm:param type="linDir" val="fromT"/>
+                  <dgm:param type="chAlign" val="r"/>
+                </dgm:alg>
+              </dgm:else>
+            </dgm:choose>
+            <dgm:shape xmlns:r="http://schemas.openxmlformats.org/officeDocument/2006/relationships" r:blip="">
+              <dgm:adjLst/>
+            </dgm:shape>
+            <dgm:presOf/>
+            <dgm:constrLst/>
+            <dgm:ruleLst/>
+            <dgm:forEach name="repeat" axis="ch">
+              <dgm:forEach name="Name11" axis="self" ptType="parTrans" cnt="1">
+                <dgm:layoutNode name="conn2-1">
+                  <dgm:choose name="Name12">
+                    <dgm:if name="Name13" func="var" arg="dir" op="equ" val="norm">
+                      <dgm:alg type="conn">
+                        <dgm:param type="dim" val="1D"/>
+                        <dgm:param type="begPts" val="midR"/>
+                        <dgm:param type="endPts" val="midL"/>
+                        <dgm:param type="endSty" val="noArr"/>
+                      </dgm:alg>
+                    </dgm:if>
+                    <dgm:else name="Name14">
+                      <dgm:alg type="conn">
+                        <dgm:param type="dim" val="1D"/>
+                        <dgm:param type="begPts" val="midL"/>
+                        <dgm:param type="endPts" val="midR"/>
+                        <dgm:param type="endSty" val="noArr"/>
+                      </dgm:alg>
+                    </dgm:else>
+                  </dgm:choose>
+                  <dgm:shape xmlns:r="http://schemas.openxmlformats.org/officeDocument/2006/relationships" type="conn" r:blip="">
+                    <dgm:adjLst/>
+                  </dgm:shape>
+                  <dgm:presOf axis="self"/>
+                  <dgm:constrLst>
+                    <dgm:constr type="w" val="1"/>
+                    <dgm:constr type="h" val="5"/>
+                    <dgm:constr type="connDist"/>
+                    <dgm:constr type="begPad"/>
+                    <dgm:constr type="endPad"/>
+                    <dgm:constr type="userA" for="ch" refType="connDist"/>
+                  </dgm:constrLst>
+                  <dgm:ruleLst/>
+                  <dgm:layoutNode name="connTx">
+                    <dgm:alg type="tx">
+                      <dgm:param type="autoTxRot" val="grav"/>
+                    </dgm:alg>
+                    <dgm:shape xmlns:r="http://schemas.openxmlformats.org/officeDocument/2006/relationships" type="rect" r:blip="" hideGeom="1">
+                      <dgm:adjLst/>
+                    </dgm:shape>
+                    <dgm:presOf axis="self"/>
+                    <dgm:constrLst>
+                      <dgm:constr type="userA"/>
+                      <dgm:constr type="w" refType="userA" fact="0.05"/>
+                      <dgm:constr type="h" refType="userA" fact="0.05"/>
+                      <dgm:constr type="lMarg" val="1"/>
+                      <dgm:constr type="rMarg" val="1"/>
+                      <dgm:constr type="tMarg"/>
+                      <dgm:constr type="bMarg"/>
+                    </dgm:constrLst>
+                    <dgm:ruleLst>
+                      <dgm:rule type="h" val="NaN" fact="0.25" max="NaN"/>
+                      <dgm:rule type="w" val="NaN" fact="0.8" max="NaN"/>
+                      <dgm:rule type="primFontSz" val="5" fact="NaN" max="NaN"/>
+                    </dgm:ruleLst>
+                  </dgm:layoutNode>
+                </dgm:layoutNode>
+              </dgm:forEach>
+              <dgm:forEach name="Name15" axis="self" ptType="node">
+                <dgm:layoutNode name="root2">
+                  <dgm:choose name="Name16">
+                    <dgm:if name="Name17" func="var" arg="dir" op="equ" val="norm">
+                      <dgm:alg type="hierRoot">
+                        <dgm:param type="hierAlign" val="lCtrCh"/>
+                      </dgm:alg>
+                    </dgm:if>
+                    <dgm:else name="Name18">
+                      <dgm:alg type="hierRoot">
+                        <dgm:param type="hierAlign" val="rCtrCh"/>
+                      </dgm:alg>
+                    </dgm:else>
+                  </dgm:choose>
+                  <dgm:shape xmlns:r="http://schemas.openxmlformats.org/officeDocument/2006/relationships" r:blip="">
+                    <dgm:adjLst/>
+                  </dgm:shape>
+                  <dgm:presOf/>
+                  <dgm:constrLst/>
+                  <dgm:ruleLst/>
+                  <dgm:layoutNode name="LevelTwoTextNode">
+                    <dgm:varLst>
+                      <dgm:chPref val="3"/>
+                    </dgm:varLst>
+                    <dgm:alg type="tx"/>
+                    <dgm:shape xmlns:r="http://schemas.openxmlformats.org/officeDocument/2006/relationships" type="roundRect" r:blip="">
+                      <dgm:adjLst>
+                        <dgm:adj idx="1" val="0.1"/>
+                      </dgm:adjLst>
+                    </dgm:shape>
+                    <dgm:presOf axis="self"/>
+                    <dgm:constrLst>
+                      <dgm:constr type="tMarg" refType="primFontSz" fact="0.05"/>
+                      <dgm:constr type="bMarg" refType="primFontSz" fact="0.05"/>
+                      <dgm:constr type="lMarg" refType="primFontSz" fact="0.05"/>
+                      <dgm:constr type="rMarg" refType="primFontSz" fact="0.05"/>
+                    </dgm:constrLst>
+                    <dgm:ruleLst>
+                      <dgm:rule type="primFontSz" val="5" fact="NaN" max="NaN"/>
+                    </dgm:ruleLst>
+                  </dgm:layoutNode>
+                  <dgm:layoutNode name="level3hierChild">
+                    <dgm:choose name="Name19">
+                      <dgm:if name="Name20" func="var" arg="dir" op="equ" val="norm">
+                        <dgm:alg type="hierChild">
+                          <dgm:param type="linDir" val="fromT"/>
+                          <dgm:param type="chAlign" val="l"/>
+                        </dgm:alg>
+                      </dgm:if>
+                      <dgm:else name="Name21">
+                        <dgm:alg type="hierChild">
+                          <dgm:param type="linDir" val="fromT"/>
+                          <dgm:param type="chAlign" val="r"/>
+                        </dgm:alg>
+                      </dgm:else>
+                    </dgm:choose>
+                    <dgm:shape xmlns:r="http://schemas.openxmlformats.org/officeDocument/2006/relationships" r:blip="">
+                      <dgm:adjLst/>
+                    </dgm:shape>
+                    <dgm:presOf/>
+                    <dgm:constrLst/>
+                    <dgm:ruleLst/>
+                    <dgm:forEach name="Name22" ref="repeat"/>
+                  </dgm:layoutNode>
+                </dgm:layoutNode>
+              </dgm:forEach>
+            </dgm:forEach>
+          </dgm:layoutNode>
+        </dgm:layoutNode>
+      </dgm:forEach>
+    </dgm:forEach>
+  </dgm:layoutNode>
+</dgm:layoutDef>
+</file>
+
+<file path=ppt/diagrams/layout2.xml><?xml version="1.0" encoding="utf-8"?>
 <dgm:layoutDef xmlns:dgm="http://schemas.openxmlformats.org/drawingml/2006/diagram" xmlns:a="http://schemas.openxmlformats.org/drawingml/2006/main" uniqueId="urn:microsoft.com/office/officeart/2005/8/layout/hList1">
   <dgm:title val=""/>
   <dgm:desc val=""/>
@@ -3778,7 +5863,7 @@
 </dgm:layoutDef>
 </file>
 
-<file path=ppt/diagrams/layout2.xml><?xml version="1.0" encoding="utf-8"?>
+<file path=ppt/diagrams/layout3.xml><?xml version="1.0" encoding="utf-8"?>
 <dgm:layoutDef xmlns:dgm="http://schemas.openxmlformats.org/drawingml/2006/diagram" xmlns:a="http://schemas.openxmlformats.org/drawingml/2006/main" uniqueId="urn:microsoft.com/office/officeart/2018/5/layout/IconCircleLabelList">
   <dgm:title val="Icon Circle Label List"/>
   <dgm:desc val="Use to show non-sequential or grouped chunks of information accompanied by a related visuals. Works best with icons or small pictures with short text captions."/>
@@ -5028,6 +7113,1040 @@
 </file>
 
 <file path=ppt/diagrams/quickStyle2.xml><?xml version="1.0" encoding="utf-8"?>
+<dgm:styleDef xmlns:dgm="http://schemas.openxmlformats.org/drawingml/2006/diagram" xmlns:a="http://schemas.openxmlformats.org/drawingml/2006/main" uniqueId="urn:microsoft.com/office/officeart/2005/8/quickstyle/simple1">
+  <dgm:title val=""/>
+  <dgm:desc val=""/>
+  <dgm:catLst>
+    <dgm:cat type="simple" pri="10100"/>
+  </dgm:catLst>
+  <dgm:scene3d>
+    <a:camera prst="orthographicFront"/>
+    <a:lightRig rig="threePt" dir="t"/>
+  </dgm:scene3d>
+  <dgm:styleLbl name="node0">
+    <dgm:scene3d>
+      <a:camera prst="orthographicFront"/>
+      <a:lightRig rig="threePt" dir="t"/>
+    </dgm:scene3d>
+    <dgm:sp3d/>
+    <dgm:txPr/>
+    <dgm:style>
+      <a:lnRef idx="2">
+        <a:scrgbClr r="0" g="0" b="0"/>
+      </a:lnRef>
+      <a:fillRef idx="1">
+        <a:scrgbClr r="0" g="0" b="0"/>
+      </a:fillRef>
+      <a:effectRef idx="0">
+        <a:scrgbClr r="0" g="0" b="0"/>
+      </a:effectRef>
+      <a:fontRef idx="minor">
+        <a:schemeClr val="lt1"/>
+      </a:fontRef>
+    </dgm:style>
+  </dgm:styleLbl>
+  <dgm:styleLbl name="lnNode1">
+    <dgm:scene3d>
+      <a:camera prst="orthographicFront"/>
+      <a:lightRig rig="threePt" dir="t"/>
+    </dgm:scene3d>
+    <dgm:sp3d/>
+    <dgm:txPr/>
+    <dgm:style>
+      <a:lnRef idx="2">
+        <a:scrgbClr r="0" g="0" b="0"/>
+      </a:lnRef>
+      <a:fillRef idx="1">
+        <a:scrgbClr r="0" g="0" b="0"/>
+      </a:fillRef>
+      <a:effectRef idx="0">
+        <a:scrgbClr r="0" g="0" b="0"/>
+      </a:effectRef>
+      <a:fontRef idx="minor">
+        <a:schemeClr val="lt1"/>
+      </a:fontRef>
+    </dgm:style>
+  </dgm:styleLbl>
+  <dgm:styleLbl name="vennNode1">
+    <dgm:scene3d>
+      <a:camera prst="orthographicFront"/>
+      <a:lightRig rig="threePt" dir="t"/>
+    </dgm:scene3d>
+    <dgm:sp3d/>
+    <dgm:txPr/>
+    <dgm:style>
+      <a:lnRef idx="2">
+        <a:scrgbClr r="0" g="0" b="0"/>
+      </a:lnRef>
+      <a:fillRef idx="1">
+        <a:scrgbClr r="0" g="0" b="0"/>
+      </a:fillRef>
+      <a:effectRef idx="0">
+        <a:scrgbClr r="0" g="0" b="0"/>
+      </a:effectRef>
+      <a:fontRef idx="minor">
+        <a:schemeClr val="tx1"/>
+      </a:fontRef>
+    </dgm:style>
+  </dgm:styleLbl>
+  <dgm:styleLbl name="alignNode1">
+    <dgm:scene3d>
+      <a:camera prst="orthographicFront"/>
+      <a:lightRig rig="threePt" dir="t"/>
+    </dgm:scene3d>
+    <dgm:sp3d/>
+    <dgm:txPr/>
+    <dgm:style>
+      <a:lnRef idx="2">
+        <a:scrgbClr r="0" g="0" b="0"/>
+      </a:lnRef>
+      <a:fillRef idx="1">
+        <a:scrgbClr r="0" g="0" b="0"/>
+      </a:fillRef>
+      <a:effectRef idx="0">
+        <a:scrgbClr r="0" g="0" b="0"/>
+      </a:effectRef>
+      <a:fontRef idx="minor">
+        <a:schemeClr val="lt1"/>
+      </a:fontRef>
+    </dgm:style>
+  </dgm:styleLbl>
+  <dgm:styleLbl name="node1">
+    <dgm:scene3d>
+      <a:camera prst="orthographicFront"/>
+      <a:lightRig rig="threePt" dir="t"/>
+    </dgm:scene3d>
+    <dgm:sp3d/>
+    <dgm:txPr/>
+    <dgm:style>
+      <a:lnRef idx="2">
+        <a:scrgbClr r="0" g="0" b="0"/>
+      </a:lnRef>
+      <a:fillRef idx="1">
+        <a:scrgbClr r="0" g="0" b="0"/>
+      </a:fillRef>
+      <a:effectRef idx="0">
+        <a:scrgbClr r="0" g="0" b="0"/>
+      </a:effectRef>
+      <a:fontRef idx="minor">
+        <a:schemeClr val="lt1"/>
+      </a:fontRef>
+    </dgm:style>
+  </dgm:styleLbl>
+  <dgm:styleLbl name="node2">
+    <dgm:scene3d>
+      <a:camera prst="orthographicFront"/>
+      <a:lightRig rig="threePt" dir="t"/>
+    </dgm:scene3d>
+    <dgm:sp3d/>
+    <dgm:txPr/>
+    <dgm:style>
+      <a:lnRef idx="2">
+        <a:scrgbClr r="0" g="0" b="0"/>
+      </a:lnRef>
+      <a:fillRef idx="1">
+        <a:scrgbClr r="0" g="0" b="0"/>
+      </a:fillRef>
+      <a:effectRef idx="0">
+        <a:scrgbClr r="0" g="0" b="0"/>
+      </a:effectRef>
+      <a:fontRef idx="minor">
+        <a:schemeClr val="lt1"/>
+      </a:fontRef>
+    </dgm:style>
+  </dgm:styleLbl>
+  <dgm:styleLbl name="node3">
+    <dgm:scene3d>
+      <a:camera prst="orthographicFront"/>
+      <a:lightRig rig="threePt" dir="t"/>
+    </dgm:scene3d>
+    <dgm:sp3d/>
+    <dgm:txPr/>
+    <dgm:style>
+      <a:lnRef idx="2">
+        <a:scrgbClr r="0" g="0" b="0"/>
+      </a:lnRef>
+      <a:fillRef idx="1">
+        <a:scrgbClr r="0" g="0" b="0"/>
+      </a:fillRef>
+      <a:effectRef idx="0">
+        <a:scrgbClr r="0" g="0" b="0"/>
+      </a:effectRef>
+      <a:fontRef idx="minor">
+        <a:schemeClr val="lt1"/>
+      </a:fontRef>
+    </dgm:style>
+  </dgm:styleLbl>
+  <dgm:styleLbl name="node4">
+    <dgm:scene3d>
+      <a:camera prst="orthographicFront"/>
+      <a:lightRig rig="threePt" dir="t"/>
+    </dgm:scene3d>
+    <dgm:sp3d/>
+    <dgm:txPr/>
+    <dgm:style>
+      <a:lnRef idx="2">
+        <a:scrgbClr r="0" g="0" b="0"/>
+      </a:lnRef>
+      <a:fillRef idx="1">
+        <a:scrgbClr r="0" g="0" b="0"/>
+      </a:fillRef>
+      <a:effectRef idx="0">
+        <a:scrgbClr r="0" g="0" b="0"/>
+      </a:effectRef>
+      <a:fontRef idx="minor">
+        <a:schemeClr val="lt1"/>
+      </a:fontRef>
+    </dgm:style>
+  </dgm:styleLbl>
+  <dgm:styleLbl name="fgImgPlace1">
+    <dgm:scene3d>
+      <a:camera prst="orthographicFront"/>
+      <a:lightRig rig="threePt" dir="t"/>
+    </dgm:scene3d>
+    <dgm:sp3d/>
+    <dgm:txPr/>
+    <dgm:style>
+      <a:lnRef idx="2">
+        <a:scrgbClr r="0" g="0" b="0"/>
+      </a:lnRef>
+      <a:fillRef idx="1">
+        <a:scrgbClr r="0" g="0" b="0"/>
+      </a:fillRef>
+      <a:effectRef idx="0">
+        <a:scrgbClr r="0" g="0" b="0"/>
+      </a:effectRef>
+      <a:fontRef idx="minor"/>
+    </dgm:style>
+  </dgm:styleLbl>
+  <dgm:styleLbl name="alignImgPlace1">
+    <dgm:scene3d>
+      <a:camera prst="orthographicFront"/>
+      <a:lightRig rig="threePt" dir="t"/>
+    </dgm:scene3d>
+    <dgm:sp3d/>
+    <dgm:txPr/>
+    <dgm:style>
+      <a:lnRef idx="2">
+        <a:scrgbClr r="0" g="0" b="0"/>
+      </a:lnRef>
+      <a:fillRef idx="1">
+        <a:scrgbClr r="0" g="0" b="0"/>
+      </a:fillRef>
+      <a:effectRef idx="0">
+        <a:scrgbClr r="0" g="0" b="0"/>
+      </a:effectRef>
+      <a:fontRef idx="minor"/>
+    </dgm:style>
+  </dgm:styleLbl>
+  <dgm:styleLbl name="bgImgPlace1">
+    <dgm:scene3d>
+      <a:camera prst="orthographicFront"/>
+      <a:lightRig rig="threePt" dir="t"/>
+    </dgm:scene3d>
+    <dgm:sp3d/>
+    <dgm:txPr/>
+    <dgm:style>
+      <a:lnRef idx="2">
+        <a:scrgbClr r="0" g="0" b="0"/>
+      </a:lnRef>
+      <a:fillRef idx="1">
+        <a:scrgbClr r="0" g="0" b="0"/>
+      </a:fillRef>
+      <a:effectRef idx="0">
+        <a:scrgbClr r="0" g="0" b="0"/>
+      </a:effectRef>
+      <a:fontRef idx="minor"/>
+    </dgm:style>
+  </dgm:styleLbl>
+  <dgm:styleLbl name="sibTrans2D1">
+    <dgm:scene3d>
+      <a:camera prst="orthographicFront"/>
+      <a:lightRig rig="threePt" dir="t"/>
+    </dgm:scene3d>
+    <dgm:sp3d/>
+    <dgm:txPr/>
+    <dgm:style>
+      <a:lnRef idx="0">
+        <a:scrgbClr r="0" g="0" b="0"/>
+      </a:lnRef>
+      <a:fillRef idx="1">
+        <a:scrgbClr r="0" g="0" b="0"/>
+      </a:fillRef>
+      <a:effectRef idx="0">
+        <a:scrgbClr r="0" g="0" b="0"/>
+      </a:effectRef>
+      <a:fontRef idx="minor">
+        <a:schemeClr val="lt1"/>
+      </a:fontRef>
+    </dgm:style>
+  </dgm:styleLbl>
+  <dgm:styleLbl name="fgSibTrans2D1">
+    <dgm:scene3d>
+      <a:camera prst="orthographicFront"/>
+      <a:lightRig rig="threePt" dir="t"/>
+    </dgm:scene3d>
+    <dgm:sp3d/>
+    <dgm:txPr/>
+    <dgm:style>
+      <a:lnRef idx="0">
+        <a:scrgbClr r="0" g="0" b="0"/>
+      </a:lnRef>
+      <a:fillRef idx="1">
+        <a:scrgbClr r="0" g="0" b="0"/>
+      </a:fillRef>
+      <a:effectRef idx="0">
+        <a:scrgbClr r="0" g="0" b="0"/>
+      </a:effectRef>
+      <a:fontRef idx="minor">
+        <a:schemeClr val="lt1"/>
+      </a:fontRef>
+    </dgm:style>
+  </dgm:styleLbl>
+  <dgm:styleLbl name="bgSibTrans2D1">
+    <dgm:scene3d>
+      <a:camera prst="orthographicFront"/>
+      <a:lightRig rig="threePt" dir="t"/>
+    </dgm:scene3d>
+    <dgm:sp3d/>
+    <dgm:txPr/>
+    <dgm:style>
+      <a:lnRef idx="0">
+        <a:scrgbClr r="0" g="0" b="0"/>
+      </a:lnRef>
+      <a:fillRef idx="1">
+        <a:scrgbClr r="0" g="0" b="0"/>
+      </a:fillRef>
+      <a:effectRef idx="0">
+        <a:scrgbClr r="0" g="0" b="0"/>
+      </a:effectRef>
+      <a:fontRef idx="minor">
+        <a:schemeClr val="lt1"/>
+      </a:fontRef>
+    </dgm:style>
+  </dgm:styleLbl>
+  <dgm:styleLbl name="sibTrans1D1">
+    <dgm:scene3d>
+      <a:camera prst="orthographicFront"/>
+      <a:lightRig rig="threePt" dir="t"/>
+    </dgm:scene3d>
+    <dgm:sp3d/>
+    <dgm:txPr/>
+    <dgm:style>
+      <a:lnRef idx="1">
+        <a:scrgbClr r="0" g="0" b="0"/>
+      </a:lnRef>
+      <a:fillRef idx="0">
+        <a:scrgbClr r="0" g="0" b="0"/>
+      </a:fillRef>
+      <a:effectRef idx="0">
+        <a:scrgbClr r="0" g="0" b="0"/>
+      </a:effectRef>
+      <a:fontRef idx="minor"/>
+    </dgm:style>
+  </dgm:styleLbl>
+  <dgm:styleLbl name="callout">
+    <dgm:scene3d>
+      <a:camera prst="orthographicFront"/>
+      <a:lightRig rig="threePt" dir="t"/>
+    </dgm:scene3d>
+    <dgm:sp3d/>
+    <dgm:txPr/>
+    <dgm:style>
+      <a:lnRef idx="2">
+        <a:scrgbClr r="0" g="0" b="0"/>
+      </a:lnRef>
+      <a:fillRef idx="1">
+        <a:scrgbClr r="0" g="0" b="0"/>
+      </a:fillRef>
+      <a:effectRef idx="0">
+        <a:scrgbClr r="0" g="0" b="0"/>
+      </a:effectRef>
+      <a:fontRef idx="minor"/>
+    </dgm:style>
+  </dgm:styleLbl>
+  <dgm:styleLbl name="asst0">
+    <dgm:scene3d>
+      <a:camera prst="orthographicFront"/>
+      <a:lightRig rig="threePt" dir="t"/>
+    </dgm:scene3d>
+    <dgm:sp3d/>
+    <dgm:txPr/>
+    <dgm:style>
+      <a:lnRef idx="2">
+        <a:scrgbClr r="0" g="0" b="0"/>
+      </a:lnRef>
+      <a:fillRef idx="1">
+        <a:scrgbClr r="0" g="0" b="0"/>
+      </a:fillRef>
+      <a:effectRef idx="0">
+        <a:scrgbClr r="0" g="0" b="0"/>
+      </a:effectRef>
+      <a:fontRef idx="minor">
+        <a:schemeClr val="lt1"/>
+      </a:fontRef>
+    </dgm:style>
+  </dgm:styleLbl>
+  <dgm:styleLbl name="asst1">
+    <dgm:scene3d>
+      <a:camera prst="orthographicFront"/>
+      <a:lightRig rig="threePt" dir="t"/>
+    </dgm:scene3d>
+    <dgm:sp3d/>
+    <dgm:txPr/>
+    <dgm:style>
+      <a:lnRef idx="2">
+        <a:scrgbClr r="0" g="0" b="0"/>
+      </a:lnRef>
+      <a:fillRef idx="1">
+        <a:scrgbClr r="0" g="0" b="0"/>
+      </a:fillRef>
+      <a:effectRef idx="0">
+        <a:scrgbClr r="0" g="0" b="0"/>
+      </a:effectRef>
+      <a:fontRef idx="minor">
+        <a:schemeClr val="lt1"/>
+      </a:fontRef>
+    </dgm:style>
+  </dgm:styleLbl>
+  <dgm:styleLbl name="asst2">
+    <dgm:scene3d>
+      <a:camera prst="orthographicFront"/>
+      <a:lightRig rig="threePt" dir="t"/>
+    </dgm:scene3d>
+    <dgm:sp3d/>
+    <dgm:txPr/>
+    <dgm:style>
+      <a:lnRef idx="2">
+        <a:scrgbClr r="0" g="0" b="0"/>
+      </a:lnRef>
+      <a:fillRef idx="1">
+        <a:scrgbClr r="0" g="0" b="0"/>
+      </a:fillRef>
+      <a:effectRef idx="0">
+        <a:scrgbClr r="0" g="0" b="0"/>
+      </a:effectRef>
+      <a:fontRef idx="minor">
+        <a:schemeClr val="lt1"/>
+      </a:fontRef>
+    </dgm:style>
+  </dgm:styleLbl>
+  <dgm:styleLbl name="asst3">
+    <dgm:scene3d>
+      <a:camera prst="orthographicFront"/>
+      <a:lightRig rig="threePt" dir="t"/>
+    </dgm:scene3d>
+    <dgm:sp3d/>
+    <dgm:txPr/>
+    <dgm:style>
+      <a:lnRef idx="2">
+        <a:scrgbClr r="0" g="0" b="0"/>
+      </a:lnRef>
+      <a:fillRef idx="1">
+        <a:scrgbClr r="0" g="0" b="0"/>
+      </a:fillRef>
+      <a:effectRef idx="0">
+        <a:scrgbClr r="0" g="0" b="0"/>
+      </a:effectRef>
+      <a:fontRef idx="minor">
+        <a:schemeClr val="lt1"/>
+      </a:fontRef>
+    </dgm:style>
+  </dgm:styleLbl>
+  <dgm:styleLbl name="asst4">
+    <dgm:scene3d>
+      <a:camera prst="orthographicFront"/>
+      <a:lightRig rig="threePt" dir="t"/>
+    </dgm:scene3d>
+    <dgm:sp3d/>
+    <dgm:txPr/>
+    <dgm:style>
+      <a:lnRef idx="2">
+        <a:scrgbClr r="0" g="0" b="0"/>
+      </a:lnRef>
+      <a:fillRef idx="1">
+        <a:scrgbClr r="0" g="0" b="0"/>
+      </a:fillRef>
+      <a:effectRef idx="0">
+        <a:scrgbClr r="0" g="0" b="0"/>
+      </a:effectRef>
+      <a:fontRef idx="minor">
+        <a:schemeClr val="lt1"/>
+      </a:fontRef>
+    </dgm:style>
+  </dgm:styleLbl>
+  <dgm:styleLbl name="parChTrans2D1">
+    <dgm:scene3d>
+      <a:camera prst="orthographicFront"/>
+      <a:lightRig rig="threePt" dir="t"/>
+    </dgm:scene3d>
+    <dgm:sp3d/>
+    <dgm:txPr/>
+    <dgm:style>
+      <a:lnRef idx="2">
+        <a:scrgbClr r="0" g="0" b="0"/>
+      </a:lnRef>
+      <a:fillRef idx="1">
+        <a:scrgbClr r="0" g="0" b="0"/>
+      </a:fillRef>
+      <a:effectRef idx="0">
+        <a:scrgbClr r="0" g="0" b="0"/>
+      </a:effectRef>
+      <a:fontRef idx="minor">
+        <a:schemeClr val="lt1"/>
+      </a:fontRef>
+    </dgm:style>
+  </dgm:styleLbl>
+  <dgm:styleLbl name="parChTrans2D2">
+    <dgm:scene3d>
+      <a:camera prst="orthographicFront"/>
+      <a:lightRig rig="threePt" dir="t"/>
+    </dgm:scene3d>
+    <dgm:sp3d/>
+    <dgm:txPr/>
+    <dgm:style>
+      <a:lnRef idx="2">
+        <a:scrgbClr r="0" g="0" b="0"/>
+      </a:lnRef>
+      <a:fillRef idx="1">
+        <a:scrgbClr r="0" g="0" b="0"/>
+      </a:fillRef>
+      <a:effectRef idx="0">
+        <a:scrgbClr r="0" g="0" b="0"/>
+      </a:effectRef>
+      <a:fontRef idx="minor">
+        <a:schemeClr val="lt1"/>
+      </a:fontRef>
+    </dgm:style>
+  </dgm:styleLbl>
+  <dgm:styleLbl name="parChTrans2D3">
+    <dgm:scene3d>
+      <a:camera prst="orthographicFront"/>
+      <a:lightRig rig="threePt" dir="t"/>
+    </dgm:scene3d>
+    <dgm:sp3d/>
+    <dgm:txPr/>
+    <dgm:style>
+      <a:lnRef idx="2">
+        <a:scrgbClr r="0" g="0" b="0"/>
+      </a:lnRef>
+      <a:fillRef idx="1">
+        <a:scrgbClr r="0" g="0" b="0"/>
+      </a:fillRef>
+      <a:effectRef idx="0">
+        <a:scrgbClr r="0" g="0" b="0"/>
+      </a:effectRef>
+      <a:fontRef idx="minor">
+        <a:schemeClr val="lt1"/>
+      </a:fontRef>
+    </dgm:style>
+  </dgm:styleLbl>
+  <dgm:styleLbl name="parChTrans2D4">
+    <dgm:scene3d>
+      <a:camera prst="orthographicFront"/>
+      <a:lightRig rig="threePt" dir="t"/>
+    </dgm:scene3d>
+    <dgm:sp3d/>
+    <dgm:txPr/>
+    <dgm:style>
+      <a:lnRef idx="2">
+        <a:scrgbClr r="0" g="0" b="0"/>
+      </a:lnRef>
+      <a:fillRef idx="1">
+        <a:scrgbClr r="0" g="0" b="0"/>
+      </a:fillRef>
+      <a:effectRef idx="0">
+        <a:scrgbClr r="0" g="0" b="0"/>
+      </a:effectRef>
+      <a:fontRef idx="minor">
+        <a:schemeClr val="lt1"/>
+      </a:fontRef>
+    </dgm:style>
+  </dgm:styleLbl>
+  <dgm:styleLbl name="parChTrans1D1">
+    <dgm:scene3d>
+      <a:camera prst="orthographicFront"/>
+      <a:lightRig rig="threePt" dir="t"/>
+    </dgm:scene3d>
+    <dgm:sp3d/>
+    <dgm:txPr/>
+    <dgm:style>
+      <a:lnRef idx="2">
+        <a:scrgbClr r="0" g="0" b="0"/>
+      </a:lnRef>
+      <a:fillRef idx="0">
+        <a:scrgbClr r="0" g="0" b="0"/>
+      </a:fillRef>
+      <a:effectRef idx="0">
+        <a:scrgbClr r="0" g="0" b="0"/>
+      </a:effectRef>
+      <a:fontRef idx="minor"/>
+    </dgm:style>
+  </dgm:styleLbl>
+  <dgm:styleLbl name="parChTrans1D2">
+    <dgm:scene3d>
+      <a:camera prst="orthographicFront"/>
+      <a:lightRig rig="threePt" dir="t"/>
+    </dgm:scene3d>
+    <dgm:sp3d/>
+    <dgm:txPr/>
+    <dgm:style>
+      <a:lnRef idx="2">
+        <a:scrgbClr r="0" g="0" b="0"/>
+      </a:lnRef>
+      <a:fillRef idx="0">
+        <a:scrgbClr r="0" g="0" b="0"/>
+      </a:fillRef>
+      <a:effectRef idx="0">
+        <a:scrgbClr r="0" g="0" b="0"/>
+      </a:effectRef>
+      <a:fontRef idx="minor"/>
+    </dgm:style>
+  </dgm:styleLbl>
+  <dgm:styleLbl name="parChTrans1D3">
+    <dgm:scene3d>
+      <a:camera prst="orthographicFront"/>
+      <a:lightRig rig="threePt" dir="t"/>
+    </dgm:scene3d>
+    <dgm:sp3d/>
+    <dgm:txPr/>
+    <dgm:style>
+      <a:lnRef idx="2">
+        <a:scrgbClr r="0" g="0" b="0"/>
+      </a:lnRef>
+      <a:fillRef idx="0">
+        <a:scrgbClr r="0" g="0" b="0"/>
+      </a:fillRef>
+      <a:effectRef idx="0">
+        <a:scrgbClr r="0" g="0" b="0"/>
+      </a:effectRef>
+      <a:fontRef idx="minor"/>
+    </dgm:style>
+  </dgm:styleLbl>
+  <dgm:styleLbl name="parChTrans1D4">
+    <dgm:scene3d>
+      <a:camera prst="orthographicFront"/>
+      <a:lightRig rig="threePt" dir="t"/>
+    </dgm:scene3d>
+    <dgm:sp3d/>
+    <dgm:txPr/>
+    <dgm:style>
+      <a:lnRef idx="2">
+        <a:scrgbClr r="0" g="0" b="0"/>
+      </a:lnRef>
+      <a:fillRef idx="0">
+        <a:scrgbClr r="0" g="0" b="0"/>
+      </a:fillRef>
+      <a:effectRef idx="0">
+        <a:scrgbClr r="0" g="0" b="0"/>
+      </a:effectRef>
+      <a:fontRef idx="minor"/>
+    </dgm:style>
+  </dgm:styleLbl>
+  <dgm:styleLbl name="fgAcc1">
+    <dgm:scene3d>
+      <a:camera prst="orthographicFront"/>
+      <a:lightRig rig="threePt" dir="t"/>
+    </dgm:scene3d>
+    <dgm:sp3d/>
+    <dgm:txPr/>
+    <dgm:style>
+      <a:lnRef idx="2">
+        <a:scrgbClr r="0" g="0" b="0"/>
+      </a:lnRef>
+      <a:fillRef idx="1">
+        <a:scrgbClr r="0" g="0" b="0"/>
+      </a:fillRef>
+      <a:effectRef idx="0">
+        <a:scrgbClr r="0" g="0" b="0"/>
+      </a:effectRef>
+      <a:fontRef idx="minor"/>
+    </dgm:style>
+  </dgm:styleLbl>
+  <dgm:styleLbl name="conFgAcc1">
+    <dgm:scene3d>
+      <a:camera prst="orthographicFront"/>
+      <a:lightRig rig="threePt" dir="t"/>
+    </dgm:scene3d>
+    <dgm:sp3d/>
+    <dgm:txPr/>
+    <dgm:style>
+      <a:lnRef idx="2">
+        <a:scrgbClr r="0" g="0" b="0"/>
+      </a:lnRef>
+      <a:fillRef idx="1">
+        <a:scrgbClr r="0" g="0" b="0"/>
+      </a:fillRef>
+      <a:effectRef idx="0">
+        <a:scrgbClr r="0" g="0" b="0"/>
+      </a:effectRef>
+      <a:fontRef idx="minor"/>
+    </dgm:style>
+  </dgm:styleLbl>
+  <dgm:styleLbl name="alignAcc1">
+    <dgm:scene3d>
+      <a:camera prst="orthographicFront"/>
+      <a:lightRig rig="threePt" dir="t"/>
+    </dgm:scene3d>
+    <dgm:sp3d/>
+    <dgm:txPr/>
+    <dgm:style>
+      <a:lnRef idx="2">
+        <a:scrgbClr r="0" g="0" b="0"/>
+      </a:lnRef>
+      <a:fillRef idx="1">
+        <a:scrgbClr r="0" g="0" b="0"/>
+      </a:fillRef>
+      <a:effectRef idx="0">
+        <a:scrgbClr r="0" g="0" b="0"/>
+      </a:effectRef>
+      <a:fontRef idx="minor"/>
+    </dgm:style>
+  </dgm:styleLbl>
+  <dgm:styleLbl name="trAlignAcc1">
+    <dgm:scene3d>
+      <a:camera prst="orthographicFront"/>
+      <a:lightRig rig="threePt" dir="t"/>
+    </dgm:scene3d>
+    <dgm:sp3d/>
+    <dgm:txPr/>
+    <dgm:style>
+      <a:lnRef idx="1">
+        <a:scrgbClr r="0" g="0" b="0"/>
+      </a:lnRef>
+      <a:fillRef idx="1">
+        <a:scrgbClr r="0" g="0" b="0"/>
+      </a:fillRef>
+      <a:effectRef idx="0">
+        <a:scrgbClr r="0" g="0" b="0"/>
+      </a:effectRef>
+      <a:fontRef idx="minor"/>
+    </dgm:style>
+  </dgm:styleLbl>
+  <dgm:styleLbl name="bgAcc1">
+    <dgm:scene3d>
+      <a:camera prst="orthographicFront"/>
+      <a:lightRig rig="threePt" dir="t"/>
+    </dgm:scene3d>
+    <dgm:sp3d/>
+    <dgm:txPr/>
+    <dgm:style>
+      <a:lnRef idx="2">
+        <a:scrgbClr r="0" g="0" b="0"/>
+      </a:lnRef>
+      <a:fillRef idx="1">
+        <a:scrgbClr r="0" g="0" b="0"/>
+      </a:fillRef>
+      <a:effectRef idx="0">
+        <a:scrgbClr r="0" g="0" b="0"/>
+      </a:effectRef>
+      <a:fontRef idx="minor"/>
+    </dgm:style>
+  </dgm:styleLbl>
+  <dgm:styleLbl name="solidFgAcc1">
+    <dgm:scene3d>
+      <a:camera prst="orthographicFront"/>
+      <a:lightRig rig="threePt" dir="t"/>
+    </dgm:scene3d>
+    <dgm:sp3d/>
+    <dgm:txPr/>
+    <dgm:style>
+      <a:lnRef idx="2">
+        <a:scrgbClr r="0" g="0" b="0"/>
+      </a:lnRef>
+      <a:fillRef idx="1">
+        <a:scrgbClr r="0" g="0" b="0"/>
+      </a:fillRef>
+      <a:effectRef idx="0">
+        <a:scrgbClr r="0" g="0" b="0"/>
+      </a:effectRef>
+      <a:fontRef idx="minor"/>
+    </dgm:style>
+  </dgm:styleLbl>
+  <dgm:styleLbl name="solidAlignAcc1">
+    <dgm:scene3d>
+      <a:camera prst="orthographicFront"/>
+      <a:lightRig rig="threePt" dir="t"/>
+    </dgm:scene3d>
+    <dgm:sp3d/>
+    <dgm:txPr/>
+    <dgm:style>
+      <a:lnRef idx="2">
+        <a:scrgbClr r="0" g="0" b="0"/>
+      </a:lnRef>
+      <a:fillRef idx="1">
+        <a:scrgbClr r="0" g="0" b="0"/>
+      </a:fillRef>
+      <a:effectRef idx="0">
+        <a:scrgbClr r="0" g="0" b="0"/>
+      </a:effectRef>
+      <a:fontRef idx="minor"/>
+    </dgm:style>
+  </dgm:styleLbl>
+  <dgm:styleLbl name="solidBgAcc1">
+    <dgm:scene3d>
+      <a:camera prst="orthographicFront"/>
+      <a:lightRig rig="threePt" dir="t"/>
+    </dgm:scene3d>
+    <dgm:sp3d/>
+    <dgm:txPr/>
+    <dgm:style>
+      <a:lnRef idx="2">
+        <a:scrgbClr r="0" g="0" b="0"/>
+      </a:lnRef>
+      <a:fillRef idx="1">
+        <a:scrgbClr r="0" g="0" b="0"/>
+      </a:fillRef>
+      <a:effectRef idx="0">
+        <a:scrgbClr r="0" g="0" b="0"/>
+      </a:effectRef>
+      <a:fontRef idx="minor"/>
+    </dgm:style>
+  </dgm:styleLbl>
+  <dgm:styleLbl name="fgAccFollowNode1">
+    <dgm:scene3d>
+      <a:camera prst="orthographicFront"/>
+      <a:lightRig rig="threePt" dir="t"/>
+    </dgm:scene3d>
+    <dgm:sp3d/>
+    <dgm:txPr/>
+    <dgm:style>
+      <a:lnRef idx="2">
+        <a:scrgbClr r="0" g="0" b="0"/>
+      </a:lnRef>
+      <a:fillRef idx="1">
+        <a:scrgbClr r="0" g="0" b="0"/>
+      </a:fillRef>
+      <a:effectRef idx="0">
+        <a:scrgbClr r="0" g="0" b="0"/>
+      </a:effectRef>
+      <a:fontRef idx="minor"/>
+    </dgm:style>
+  </dgm:styleLbl>
+  <dgm:styleLbl name="alignAccFollowNode1">
+    <dgm:scene3d>
+      <a:camera prst="orthographicFront"/>
+      <a:lightRig rig="threePt" dir="t"/>
+    </dgm:scene3d>
+    <dgm:sp3d/>
+    <dgm:txPr/>
+    <dgm:style>
+      <a:lnRef idx="2">
+        <a:scrgbClr r="0" g="0" b="0"/>
+      </a:lnRef>
+      <a:fillRef idx="1">
+        <a:scrgbClr r="0" g="0" b="0"/>
+      </a:fillRef>
+      <a:effectRef idx="0">
+        <a:scrgbClr r="0" g="0" b="0"/>
+      </a:effectRef>
+      <a:fontRef idx="minor"/>
+    </dgm:style>
+  </dgm:styleLbl>
+  <dgm:styleLbl name="bgAccFollowNode1">
+    <dgm:scene3d>
+      <a:camera prst="orthographicFront"/>
+      <a:lightRig rig="threePt" dir="t"/>
+    </dgm:scene3d>
+    <dgm:sp3d/>
+    <dgm:txPr/>
+    <dgm:style>
+      <a:lnRef idx="2">
+        <a:scrgbClr r="0" g="0" b="0"/>
+      </a:lnRef>
+      <a:fillRef idx="1">
+        <a:scrgbClr r="0" g="0" b="0"/>
+      </a:fillRef>
+      <a:effectRef idx="0">
+        <a:scrgbClr r="0" g="0" b="0"/>
+      </a:effectRef>
+      <a:fontRef idx="minor"/>
+    </dgm:style>
+  </dgm:styleLbl>
+  <dgm:styleLbl name="fgAcc0">
+    <dgm:scene3d>
+      <a:camera prst="orthographicFront"/>
+      <a:lightRig rig="threePt" dir="t"/>
+    </dgm:scene3d>
+    <dgm:sp3d/>
+    <dgm:txPr/>
+    <dgm:style>
+      <a:lnRef idx="2">
+        <a:scrgbClr r="0" g="0" b="0"/>
+      </a:lnRef>
+      <a:fillRef idx="1">
+        <a:scrgbClr r="0" g="0" b="0"/>
+      </a:fillRef>
+      <a:effectRef idx="0">
+        <a:scrgbClr r="0" g="0" b="0"/>
+      </a:effectRef>
+      <a:fontRef idx="minor"/>
+    </dgm:style>
+  </dgm:styleLbl>
+  <dgm:styleLbl name="fgAcc2">
+    <dgm:scene3d>
+      <a:camera prst="orthographicFront"/>
+      <a:lightRig rig="threePt" dir="t"/>
+    </dgm:scene3d>
+    <dgm:sp3d/>
+    <dgm:txPr/>
+    <dgm:style>
+      <a:lnRef idx="2">
+        <a:scrgbClr r="0" g="0" b="0"/>
+      </a:lnRef>
+      <a:fillRef idx="1">
+        <a:scrgbClr r="0" g="0" b="0"/>
+      </a:fillRef>
+      <a:effectRef idx="0">
+        <a:scrgbClr r="0" g="0" b="0"/>
+      </a:effectRef>
+      <a:fontRef idx="minor"/>
+    </dgm:style>
+  </dgm:styleLbl>
+  <dgm:styleLbl name="fgAcc3">
+    <dgm:scene3d>
+      <a:camera prst="orthographicFront"/>
+      <a:lightRig rig="threePt" dir="t"/>
+    </dgm:scene3d>
+    <dgm:sp3d/>
+    <dgm:txPr/>
+    <dgm:style>
+      <a:lnRef idx="2">
+        <a:scrgbClr r="0" g="0" b="0"/>
+      </a:lnRef>
+      <a:fillRef idx="1">
+        <a:scrgbClr r="0" g="0" b="0"/>
+      </a:fillRef>
+      <a:effectRef idx="0">
+        <a:scrgbClr r="0" g="0" b="0"/>
+      </a:effectRef>
+      <a:fontRef idx="minor"/>
+    </dgm:style>
+  </dgm:styleLbl>
+  <dgm:styleLbl name="fgAcc4">
+    <dgm:scene3d>
+      <a:camera prst="orthographicFront"/>
+      <a:lightRig rig="threePt" dir="t"/>
+    </dgm:scene3d>
+    <dgm:sp3d/>
+    <dgm:txPr/>
+    <dgm:style>
+      <a:lnRef idx="2">
+        <a:scrgbClr r="0" g="0" b="0"/>
+      </a:lnRef>
+      <a:fillRef idx="1">
+        <a:scrgbClr r="0" g="0" b="0"/>
+      </a:fillRef>
+      <a:effectRef idx="0">
+        <a:scrgbClr r="0" g="0" b="0"/>
+      </a:effectRef>
+      <a:fontRef idx="minor"/>
+    </dgm:style>
+  </dgm:styleLbl>
+  <dgm:styleLbl name="bgShp">
+    <dgm:scene3d>
+      <a:camera prst="orthographicFront"/>
+      <a:lightRig rig="threePt" dir="t"/>
+    </dgm:scene3d>
+    <dgm:sp3d/>
+    <dgm:txPr/>
+    <dgm:style>
+      <a:lnRef idx="0">
+        <a:scrgbClr r="0" g="0" b="0"/>
+      </a:lnRef>
+      <a:fillRef idx="1">
+        <a:scrgbClr r="0" g="0" b="0"/>
+      </a:fillRef>
+      <a:effectRef idx="0">
+        <a:scrgbClr r="0" g="0" b="0"/>
+      </a:effectRef>
+      <a:fontRef idx="minor"/>
+    </dgm:style>
+  </dgm:styleLbl>
+  <dgm:styleLbl name="dkBgShp">
+    <dgm:scene3d>
+      <a:camera prst="orthographicFront"/>
+      <a:lightRig rig="threePt" dir="t"/>
+    </dgm:scene3d>
+    <dgm:sp3d/>
+    <dgm:txPr/>
+    <dgm:style>
+      <a:lnRef idx="0">
+        <a:scrgbClr r="0" g="0" b="0"/>
+      </a:lnRef>
+      <a:fillRef idx="1">
+        <a:scrgbClr r="0" g="0" b="0"/>
+      </a:fillRef>
+      <a:effectRef idx="0">
+        <a:scrgbClr r="0" g="0" b="0"/>
+      </a:effectRef>
+      <a:fontRef idx="minor"/>
+    </dgm:style>
+  </dgm:styleLbl>
+  <dgm:styleLbl name="trBgShp">
+    <dgm:scene3d>
+      <a:camera prst="orthographicFront"/>
+      <a:lightRig rig="threePt" dir="t"/>
+    </dgm:scene3d>
+    <dgm:sp3d/>
+    <dgm:txPr/>
+    <dgm:style>
+      <a:lnRef idx="0">
+        <a:scrgbClr r="0" g="0" b="0"/>
+      </a:lnRef>
+      <a:fillRef idx="1">
+        <a:scrgbClr r="0" g="0" b="0"/>
+      </a:fillRef>
+      <a:effectRef idx="0">
+        <a:scrgbClr r="0" g="0" b="0"/>
+      </a:effectRef>
+      <a:fontRef idx="minor"/>
+    </dgm:style>
+  </dgm:styleLbl>
+  <dgm:styleLbl name="fgShp">
+    <dgm:scene3d>
+      <a:camera prst="orthographicFront"/>
+      <a:lightRig rig="threePt" dir="t"/>
+    </dgm:scene3d>
+    <dgm:sp3d/>
+    <dgm:txPr/>
+    <dgm:style>
+      <a:lnRef idx="2">
+        <a:scrgbClr r="0" g="0" b="0"/>
+      </a:lnRef>
+      <a:fillRef idx="1">
+        <a:scrgbClr r="0" g="0" b="0"/>
+      </a:fillRef>
+      <a:effectRef idx="0">
+        <a:scrgbClr r="0" g="0" b="0"/>
+      </a:effectRef>
+      <a:fontRef idx="minor"/>
+    </dgm:style>
+  </dgm:styleLbl>
+  <dgm:styleLbl name="revTx">
+    <dgm:scene3d>
+      <a:camera prst="orthographicFront"/>
+      <a:lightRig rig="threePt" dir="t"/>
+    </dgm:scene3d>
+    <dgm:sp3d/>
+    <dgm:txPr/>
+    <dgm:style>
+      <a:lnRef idx="0">
+        <a:scrgbClr r="0" g="0" b="0"/>
+      </a:lnRef>
+      <a:fillRef idx="0">
+        <a:scrgbClr r="0" g="0" b="0"/>
+      </a:fillRef>
+      <a:effectRef idx="0">
+        <a:scrgbClr r="0" g="0" b="0"/>
+      </a:effectRef>
+      <a:fontRef idx="minor"/>
+    </dgm:style>
+  </dgm:styleLbl>
+</dgm:styleDef>
+</file>
+
+<file path=ppt/diagrams/quickStyle3.xml><?xml version="1.0" encoding="utf-8"?>
 <dgm:styleDef xmlns:dgm="http://schemas.openxmlformats.org/drawingml/2006/diagram" xmlns:a="http://schemas.openxmlformats.org/drawingml/2006/main" uniqueId="urn:microsoft.com/office/officeart/2005/8/quickstyle/simple1">
   <dgm:title val=""/>
   <dgm:desc val=""/>
@@ -15850,6 +18969,14 @@
 <file path=ppt/slides/slide5.xml><?xml version="1.0" encoding="utf-8"?>
 <p:sld xmlns:a="http://schemas.openxmlformats.org/drawingml/2006/main" xmlns:r="http://schemas.openxmlformats.org/officeDocument/2006/relationships" xmlns:p="http://schemas.openxmlformats.org/presentationml/2006/main">
   <p:cSld>
+    <p:bg>
+      <p:bgPr>
+        <a:solidFill>
+          <a:schemeClr val="bg1"/>
+        </a:solidFill>
+        <a:effectLst/>
+      </p:bgPr>
+    </p:bg>
     <p:spTree>
       <p:nvGrpSpPr>
         <p:cNvPr id="1" name=""/>
@@ -15866,6 +18993,430 @@
       </p:grpSpPr>
       <p:sp>
         <p:nvSpPr>
+          <p:cNvPr id="10" name="Rectangle 9">
+            <a:extLst>
+              <a:ext uri="{FF2B5EF4-FFF2-40B4-BE49-F238E27FC236}">
+                <a16:creationId xmlns:a16="http://schemas.microsoft.com/office/drawing/2014/main" id="{47AEA421-5F29-4BA7-9360-2501B5987921}"/>
+              </a:ext>
+              <a:ext uri="{C183D7F6-B498-43B3-948B-1728B52AA6E4}">
+                <adec:decorative xmlns:adec="http://schemas.microsoft.com/office/drawing/2017/decorative" val="1"/>
+              </a:ext>
+            </a:extLst>
+          </p:cNvPr>
+          <p:cNvSpPr>
+            <a:spLocks noGrp="1" noRot="1" noChangeAspect="1" noMove="1" noResize="1" noEditPoints="1" noAdjustHandles="1" noChangeArrowheads="1" noChangeShapeType="1" noTextEdit="1"/>
+          </p:cNvSpPr>
+          <p:nvPr>
+            <p:extLst>
+              <p:ext uri="{386F3935-93C4-4BCD-93E2-E3B085C9AB24}">
+                <p16:designElem xmlns:p16="http://schemas.microsoft.com/office/powerpoint/2015/main" val="1"/>
+              </p:ext>
+            </p:extLst>
+          </p:nvPr>
+        </p:nvSpPr>
+        <p:spPr>
+          <a:xfrm>
+            <a:off x="0" y="0"/>
+            <a:ext cx="12191999" cy="6858000"/>
+          </a:xfrm>
+          <a:prstGeom prst="rect">
+            <a:avLst/>
+          </a:prstGeom>
+          <a:ln>
+            <a:noFill/>
+          </a:ln>
+        </p:spPr>
+        <p:style>
+          <a:lnRef idx="2">
+            <a:schemeClr val="accent1">
+              <a:shade val="50000"/>
+            </a:schemeClr>
+          </a:lnRef>
+          <a:fillRef idx="1003">
+            <a:schemeClr val="dk2"/>
+          </a:fillRef>
+          <a:effectRef idx="0">
+            <a:schemeClr val="accent1"/>
+          </a:effectRef>
+          <a:fontRef idx="minor">
+            <a:schemeClr val="lt1"/>
+          </a:fontRef>
+        </p:style>
+        <p:txBody>
+          <a:bodyPr rtlCol="0" anchor="ctr"/>
+          <a:lstStyle/>
+          <a:p>
+            <a:pPr algn="ctr"/>
+            <a:endParaRPr lang="en-US"/>
+          </a:p>
+        </p:txBody>
+      </p:sp>
+      <p:sp>
+        <p:nvSpPr>
+          <p:cNvPr id="12" name="Freeform 7">
+            <a:extLst>
+              <a:ext uri="{FF2B5EF4-FFF2-40B4-BE49-F238E27FC236}">
+                <a16:creationId xmlns:a16="http://schemas.microsoft.com/office/drawing/2014/main" id="{9348F0CB-4904-4DEF-BDD4-ADEC2DCCCBD7}"/>
+              </a:ext>
+              <a:ext uri="{C183D7F6-B498-43B3-948B-1728B52AA6E4}">
+                <adec:decorative xmlns:adec="http://schemas.microsoft.com/office/drawing/2017/decorative" val="1"/>
+              </a:ext>
+            </a:extLst>
+          </p:cNvPr>
+          <p:cNvSpPr>
+            <a:spLocks noGrp="1" noRot="1" noChangeAspect="1" noMove="1" noResize="1" noEditPoints="1" noAdjustHandles="1" noChangeArrowheads="1" noChangeShapeType="1" noTextEdit="1"/>
+          </p:cNvSpPr>
+          <p:nvPr>
+            <p:extLst>
+              <p:ext uri="{386F3935-93C4-4BCD-93E2-E3B085C9AB24}">
+                <p16:designElem xmlns:p16="http://schemas.microsoft.com/office/powerpoint/2015/main" val="1"/>
+              </p:ext>
+            </p:extLst>
+          </p:nvPr>
+        </p:nvSpPr>
+        <p:spPr>
+          <a:xfrm>
+            <a:off x="8719939" y="1460230"/>
+            <a:ext cx="3472060" cy="825932"/>
+          </a:xfrm>
+          <a:custGeom>
+            <a:avLst/>
+            <a:gdLst>
+              <a:gd name="connsiteX0" fmla="*/ 3470310 w 3472060"/>
+              <a:gd name="connsiteY0" fmla="*/ 0 h 825932"/>
+              <a:gd name="connsiteX1" fmla="*/ 3472060 w 3472060"/>
+              <a:gd name="connsiteY1" fmla="*/ 12850 h 825932"/>
+              <a:gd name="connsiteX2" fmla="*/ 3472060 w 3472060"/>
+              <a:gd name="connsiteY2" fmla="*/ 480529 h 825932"/>
+              <a:gd name="connsiteX3" fmla="*/ 3363699 w 3472060"/>
+              <a:gd name="connsiteY3" fmla="*/ 498471 h 825932"/>
+              <a:gd name="connsiteX4" fmla="*/ 42060 w 3472060"/>
+              <a:gd name="connsiteY4" fmla="*/ 824486 h 825932"/>
+              <a:gd name="connsiteX5" fmla="*/ 0 w 3472060"/>
+              <a:gd name="connsiteY5" fmla="*/ 758452 h 825932"/>
+              <a:gd name="connsiteX6" fmla="*/ 188014 w 3472060"/>
+              <a:gd name="connsiteY6" fmla="*/ 735602 h 825932"/>
+              <a:gd name="connsiteX7" fmla="*/ 284087 w 3472060"/>
+              <a:gd name="connsiteY7" fmla="*/ 722590 h 825932"/>
+              <a:gd name="connsiteX8" fmla="*/ 382288 w 3472060"/>
+              <a:gd name="connsiteY8" fmla="*/ 709392 h 825932"/>
+              <a:gd name="connsiteX9" fmla="*/ 481858 w 3472060"/>
+              <a:gd name="connsiteY9" fmla="*/ 695774 h 825932"/>
+              <a:gd name="connsiteX10" fmla="*/ 581897 w 3472060"/>
+              <a:gd name="connsiteY10" fmla="*/ 680711 h 825932"/>
+              <a:gd name="connsiteX11" fmla="*/ 683670 w 3472060"/>
+              <a:gd name="connsiteY11" fmla="*/ 665256 h 825932"/>
+              <a:gd name="connsiteX12" fmla="*/ 787206 w 3472060"/>
+              <a:gd name="connsiteY12" fmla="*/ 649587 h 825932"/>
+              <a:gd name="connsiteX13" fmla="*/ 892019 w 3472060"/>
+              <a:gd name="connsiteY13" fmla="*/ 632968 h 825932"/>
+              <a:gd name="connsiteX14" fmla="*/ 997620 w 3472060"/>
+              <a:gd name="connsiteY14" fmla="*/ 614667 h 825932"/>
+              <a:gd name="connsiteX15" fmla="*/ 1104727 w 3472060"/>
+              <a:gd name="connsiteY15" fmla="*/ 596741 h 825932"/>
+              <a:gd name="connsiteX16" fmla="*/ 1212669 w 3472060"/>
+              <a:gd name="connsiteY16" fmla="*/ 577397 h 825932"/>
+              <a:gd name="connsiteX17" fmla="*/ 1321506 w 3472060"/>
+              <a:gd name="connsiteY17" fmla="*/ 556988 h 825932"/>
+              <a:gd name="connsiteX18" fmla="*/ 1430709 w 3472060"/>
+              <a:gd name="connsiteY18" fmla="*/ 536607 h 825932"/>
+              <a:gd name="connsiteX19" fmla="*/ 1541050 w 3472060"/>
+              <a:gd name="connsiteY19" fmla="*/ 514481 h 825932"/>
+              <a:gd name="connsiteX20" fmla="*/ 1652805 w 3472060"/>
+              <a:gd name="connsiteY20" fmla="*/ 492202 h 825932"/>
+              <a:gd name="connsiteX21" fmla="*/ 1763708 w 3472060"/>
+              <a:gd name="connsiteY21" fmla="*/ 469161 h 825932"/>
+              <a:gd name="connsiteX22" fmla="*/ 1875795 w 3472060"/>
+              <a:gd name="connsiteY22" fmla="*/ 444641 h 825932"/>
+              <a:gd name="connsiteX23" fmla="*/ 1989128 w 3472060"/>
+              <a:gd name="connsiteY23" fmla="*/ 418995 h 825932"/>
+              <a:gd name="connsiteX24" fmla="*/ 2102476 w 3472060"/>
+              <a:gd name="connsiteY24" fmla="*/ 393438 h 825932"/>
+              <a:gd name="connsiteX25" fmla="*/ 2215549 w 3472060"/>
+              <a:gd name="connsiteY25" fmla="*/ 366291 h 825932"/>
+              <a:gd name="connsiteX26" fmla="*/ 2330490 w 3472060"/>
+              <a:gd name="connsiteY26" fmla="*/ 337455 h 825932"/>
+              <a:gd name="connsiteX27" fmla="*/ 2443333 w 3472060"/>
+              <a:gd name="connsiteY27" fmla="*/ 308983 h 825932"/>
+              <a:gd name="connsiteX28" fmla="*/ 2558014 w 3472060"/>
+              <a:gd name="connsiteY28" fmla="*/ 278646 h 825932"/>
+              <a:gd name="connsiteX29" fmla="*/ 2673621 w 3472060"/>
+              <a:gd name="connsiteY29" fmla="*/ 247421 h 825932"/>
+              <a:gd name="connsiteX30" fmla="*/ 2787008 w 3472060"/>
+              <a:gd name="connsiteY30" fmla="*/ 215853 h 825932"/>
+              <a:gd name="connsiteX31" fmla="*/ 2901442 w 3472060"/>
+              <a:gd name="connsiteY31" fmla="*/ 182011 h 825932"/>
+              <a:gd name="connsiteX32" fmla="*/ 3015722 w 3472060"/>
+              <a:gd name="connsiteY32" fmla="*/ 147286 h 825932"/>
+              <a:gd name="connsiteX33" fmla="*/ 3130018 w 3472060"/>
+              <a:gd name="connsiteY33" fmla="*/ 112649 h 825932"/>
+              <a:gd name="connsiteX34" fmla="*/ 3243551 w 3472060"/>
+              <a:gd name="connsiteY34" fmla="*/ 75688 h 825932"/>
+              <a:gd name="connsiteX35" fmla="*/ 3356992 w 3472060"/>
+              <a:gd name="connsiteY35" fmla="*/ 38197 h 825932"/>
+              <a:gd name="connsiteX36" fmla="*/ 3470310 w 3472060"/>
+              <a:gd name="connsiteY36" fmla="*/ 0 h 825932"/>
+            </a:gdLst>
+            <a:ahLst/>
+            <a:cxnLst>
+              <a:cxn ang="0">
+                <a:pos x="connsiteX0" y="connsiteY0"/>
+              </a:cxn>
+              <a:cxn ang="0">
+                <a:pos x="connsiteX1" y="connsiteY1"/>
+              </a:cxn>
+              <a:cxn ang="0">
+                <a:pos x="connsiteX2" y="connsiteY2"/>
+              </a:cxn>
+              <a:cxn ang="0">
+                <a:pos x="connsiteX3" y="connsiteY3"/>
+              </a:cxn>
+              <a:cxn ang="0">
+                <a:pos x="connsiteX4" y="connsiteY4"/>
+              </a:cxn>
+              <a:cxn ang="0">
+                <a:pos x="connsiteX5" y="connsiteY5"/>
+              </a:cxn>
+              <a:cxn ang="0">
+                <a:pos x="connsiteX6" y="connsiteY6"/>
+              </a:cxn>
+              <a:cxn ang="0">
+                <a:pos x="connsiteX7" y="connsiteY7"/>
+              </a:cxn>
+              <a:cxn ang="0">
+                <a:pos x="connsiteX8" y="connsiteY8"/>
+              </a:cxn>
+              <a:cxn ang="0">
+                <a:pos x="connsiteX9" y="connsiteY9"/>
+              </a:cxn>
+              <a:cxn ang="0">
+                <a:pos x="connsiteX10" y="connsiteY10"/>
+              </a:cxn>
+              <a:cxn ang="0">
+                <a:pos x="connsiteX11" y="connsiteY11"/>
+              </a:cxn>
+              <a:cxn ang="0">
+                <a:pos x="connsiteX12" y="connsiteY12"/>
+              </a:cxn>
+              <a:cxn ang="0">
+                <a:pos x="connsiteX13" y="connsiteY13"/>
+              </a:cxn>
+              <a:cxn ang="0">
+                <a:pos x="connsiteX14" y="connsiteY14"/>
+              </a:cxn>
+              <a:cxn ang="0">
+                <a:pos x="connsiteX15" y="connsiteY15"/>
+              </a:cxn>
+              <a:cxn ang="0">
+                <a:pos x="connsiteX16" y="connsiteY16"/>
+              </a:cxn>
+              <a:cxn ang="0">
+                <a:pos x="connsiteX17" y="connsiteY17"/>
+              </a:cxn>
+              <a:cxn ang="0">
+                <a:pos x="connsiteX18" y="connsiteY18"/>
+              </a:cxn>
+              <a:cxn ang="0">
+                <a:pos x="connsiteX19" y="connsiteY19"/>
+              </a:cxn>
+              <a:cxn ang="0">
+                <a:pos x="connsiteX20" y="connsiteY20"/>
+              </a:cxn>
+              <a:cxn ang="0">
+                <a:pos x="connsiteX21" y="connsiteY21"/>
+              </a:cxn>
+              <a:cxn ang="0">
+                <a:pos x="connsiteX22" y="connsiteY22"/>
+              </a:cxn>
+              <a:cxn ang="0">
+                <a:pos x="connsiteX23" y="connsiteY23"/>
+              </a:cxn>
+              <a:cxn ang="0">
+                <a:pos x="connsiteX24" y="connsiteY24"/>
+              </a:cxn>
+              <a:cxn ang="0">
+                <a:pos x="connsiteX25" y="connsiteY25"/>
+              </a:cxn>
+              <a:cxn ang="0">
+                <a:pos x="connsiteX26" y="connsiteY26"/>
+              </a:cxn>
+              <a:cxn ang="0">
+                <a:pos x="connsiteX27" y="connsiteY27"/>
+              </a:cxn>
+              <a:cxn ang="0">
+                <a:pos x="connsiteX28" y="connsiteY28"/>
+              </a:cxn>
+              <a:cxn ang="0">
+                <a:pos x="connsiteX29" y="connsiteY29"/>
+              </a:cxn>
+              <a:cxn ang="0">
+                <a:pos x="connsiteX30" y="connsiteY30"/>
+              </a:cxn>
+              <a:cxn ang="0">
+                <a:pos x="connsiteX31" y="connsiteY31"/>
+              </a:cxn>
+              <a:cxn ang="0">
+                <a:pos x="connsiteX32" y="connsiteY32"/>
+              </a:cxn>
+              <a:cxn ang="0">
+                <a:pos x="connsiteX33" y="connsiteY33"/>
+              </a:cxn>
+              <a:cxn ang="0">
+                <a:pos x="connsiteX34" y="connsiteY34"/>
+              </a:cxn>
+              <a:cxn ang="0">
+                <a:pos x="connsiteX35" y="connsiteY35"/>
+              </a:cxn>
+              <a:cxn ang="0">
+                <a:pos x="connsiteX36" y="connsiteY36"/>
+              </a:cxn>
+            </a:cxnLst>
+            <a:rect l="l" t="t" r="r" b="b"/>
+            <a:pathLst>
+              <a:path w="3472060" h="825932">
+                <a:moveTo>
+                  <a:pt x="3470310" y="0"/>
+                </a:moveTo>
+                <a:lnTo>
+                  <a:pt x="3472060" y="12850"/>
+                </a:lnTo>
+                <a:lnTo>
+                  <a:pt x="3472060" y="480529"/>
+                </a:lnTo>
+                <a:lnTo>
+                  <a:pt x="3363699" y="498471"/>
+                </a:lnTo>
+                <a:cubicBezTo>
+                  <a:pt x="2435623" y="645518"/>
+                  <a:pt x="603076" y="844866"/>
+                  <a:pt x="42060" y="824486"/>
+                </a:cubicBezTo>
+                <a:cubicBezTo>
+                  <a:pt x="28151" y="802425"/>
+                  <a:pt x="13909" y="780513"/>
+                  <a:pt x="0" y="758452"/>
+                </a:cubicBezTo>
+                <a:lnTo>
+                  <a:pt x="188014" y="735602"/>
+                </a:lnTo>
+                <a:lnTo>
+                  <a:pt x="284087" y="722590"/>
+                </a:lnTo>
+                <a:lnTo>
+                  <a:pt x="382288" y="709392"/>
+                </a:lnTo>
+                <a:lnTo>
+                  <a:pt x="481858" y="695774"/>
+                </a:lnTo>
+                <a:lnTo>
+                  <a:pt x="581897" y="680711"/>
+                </a:lnTo>
+                <a:lnTo>
+                  <a:pt x="683670" y="665256"/>
+                </a:lnTo>
+                <a:lnTo>
+                  <a:pt x="787206" y="649587"/>
+                </a:lnTo>
+                <a:lnTo>
+                  <a:pt x="892019" y="632968"/>
+                </a:lnTo>
+                <a:lnTo>
+                  <a:pt x="997620" y="614667"/>
+                </a:lnTo>
+                <a:lnTo>
+                  <a:pt x="1104727" y="596741"/>
+                </a:lnTo>
+                <a:lnTo>
+                  <a:pt x="1212669" y="577397"/>
+                </a:lnTo>
+                <a:lnTo>
+                  <a:pt x="1321506" y="556988"/>
+                </a:lnTo>
+                <a:lnTo>
+                  <a:pt x="1430709" y="536607"/>
+                </a:lnTo>
+                <a:lnTo>
+                  <a:pt x="1541050" y="514481"/>
+                </a:lnTo>
+                <a:lnTo>
+                  <a:pt x="1652805" y="492202"/>
+                </a:lnTo>
+                <a:lnTo>
+                  <a:pt x="1763708" y="469161"/>
+                </a:lnTo>
+                <a:lnTo>
+                  <a:pt x="1875795" y="444641"/>
+                </a:lnTo>
+                <a:lnTo>
+                  <a:pt x="1989128" y="418995"/>
+                </a:lnTo>
+                <a:lnTo>
+                  <a:pt x="2102476" y="393438"/>
+                </a:lnTo>
+                <a:lnTo>
+                  <a:pt x="2215549" y="366291"/>
+                </a:lnTo>
+                <a:lnTo>
+                  <a:pt x="2330490" y="337455"/>
+                </a:lnTo>
+                <a:lnTo>
+                  <a:pt x="2443333" y="308983"/>
+                </a:lnTo>
+                <a:lnTo>
+                  <a:pt x="2558014" y="278646"/>
+                </a:lnTo>
+                <a:lnTo>
+                  <a:pt x="2673621" y="247421"/>
+                </a:lnTo>
+                <a:lnTo>
+                  <a:pt x="2787008" y="215853"/>
+                </a:lnTo>
+                <a:lnTo>
+                  <a:pt x="2901442" y="182011"/>
+                </a:lnTo>
+                <a:lnTo>
+                  <a:pt x="3015722" y="147286"/>
+                </a:lnTo>
+                <a:lnTo>
+                  <a:pt x="3130018" y="112649"/>
+                </a:lnTo>
+                <a:lnTo>
+                  <a:pt x="3243551" y="75688"/>
+                </a:lnTo>
+                <a:lnTo>
+                  <a:pt x="3356992" y="38197"/>
+                </a:lnTo>
+                <a:lnTo>
+                  <a:pt x="3470310" y="0"/>
+                </a:lnTo>
+                <a:close/>
+              </a:path>
+            </a:pathLst>
+          </a:custGeom>
+          <a:solidFill>
+            <a:schemeClr val="bg1">
+              <a:alpha val="20000"/>
+            </a:schemeClr>
+          </a:solidFill>
+          <a:ln>
+            <a:noFill/>
+          </a:ln>
+        </p:spPr>
+        <p:txBody>
+          <a:bodyPr rtlCol="0" anchor="ctr"/>
+          <a:lstStyle/>
+          <a:p>
+            <a:pPr algn="ctr"/>
+            <a:endParaRPr lang="en-US">
+              <a:solidFill>
+                <a:schemeClr val="tx1"/>
+              </a:solidFill>
+            </a:endParaRPr>
+          </a:p>
+        </p:txBody>
+      </p:sp>
+      <p:sp>
+        <p:nvSpPr>
           <p:cNvPr id="2" name="Title 1">
             <a:extLst>
               <a:ext uri="{FF2B5EF4-FFF2-40B4-BE49-F238E27FC236}">
@@ -15880,62 +19431,611 @@
             <p:ph type="title"/>
           </p:nvPr>
         </p:nvSpPr>
-        <p:spPr/>
+        <p:spPr>
+          <a:xfrm>
+            <a:off x="648930" y="629267"/>
+            <a:ext cx="9252154" cy="1016654"/>
+          </a:xfrm>
+        </p:spPr>
         <p:txBody>
-          <a:bodyPr/>
+          <a:bodyPr>
+            <a:normAutofit/>
+          </a:bodyPr>
           <a:lstStyle/>
           <a:p>
             <a:r>
-              <a:rPr lang="en-US" dirty="0" err="1"/>
-              <a:t>MonoGame</a:t>
-            </a:r>
-            <a:r>
-              <a:rPr lang="en-US" dirty="0"/>
-              <a:t> Structure</a:t>
+              <a:rPr lang="en-US">
+                <a:solidFill>
+                  <a:srgbClr val="EBEBEB"/>
+                </a:solidFill>
+              </a:rPr>
+              <a:t>MonoGame Structure</a:t>
             </a:r>
           </a:p>
         </p:txBody>
       </p:sp>
       <p:sp>
         <p:nvSpPr>
-          <p:cNvPr id="3" name="Content Placeholder 2">
+          <p:cNvPr id="14" name="Rectangle 13">
             <a:extLst>
               <a:ext uri="{FF2B5EF4-FFF2-40B4-BE49-F238E27FC236}">
-                <a16:creationId xmlns:a16="http://schemas.microsoft.com/office/drawing/2014/main" id="{C674D606-8C4B-48DF-B41E-7659EC0CC90D}"/>
+                <a16:creationId xmlns:a16="http://schemas.microsoft.com/office/drawing/2014/main" id="{1583E1B8-79B3-49BB-8704-58E4AB1AF213}"/>
+              </a:ext>
+              <a:ext uri="{C183D7F6-B498-43B3-948B-1728B52AA6E4}">
+                <adec:decorative xmlns:adec="http://schemas.microsoft.com/office/drawing/2017/decorative" val="1"/>
               </a:ext>
             </a:extLst>
           </p:cNvPr>
           <p:cNvSpPr>
-            <a:spLocks noGrp="1"/>
+            <a:spLocks noGrp="1" noRot="1" noChangeAspect="1" noMove="1" noResize="1" noEditPoints="1" noAdjustHandles="1" noChangeArrowheads="1" noChangeShapeType="1" noTextEdit="1"/>
           </p:cNvSpPr>
           <p:nvPr>
-            <p:ph idx="1"/>
+            <p:extLst>
+              <p:ext uri="{386F3935-93C4-4BCD-93E2-E3B085C9AB24}">
+                <p16:designElem xmlns:p16="http://schemas.microsoft.com/office/powerpoint/2015/main" val="1"/>
+              </p:ext>
+            </p:extLst>
           </p:nvPr>
         </p:nvSpPr>
-        <p:spPr/>
-        <p:txBody>
-          <a:bodyPr/>
-          <a:lstStyle/>
-          <a:p>
-            <a:r>
-              <a:rPr lang="en-US" dirty="0"/>
-              <a:t>Review Game base class</a:t>
-            </a:r>
-          </a:p>
-          <a:p>
-            <a:r>
-              <a:rPr lang="en-US" dirty="0"/>
-              <a:t>Content Pipeline</a:t>
-            </a:r>
-          </a:p>
-          <a:p>
-            <a:r>
-              <a:rPr lang="en-US" dirty="0"/>
-              <a:t>Game Loop</a:t>
-            </a:r>
-          </a:p>
-        </p:txBody>
+        <p:spPr>
+          <a:xfrm>
+            <a:off x="10437812" y="0"/>
+            <a:ext cx="685800" cy="1143000"/>
+          </a:xfrm>
+          <a:prstGeom prst="rect">
+            <a:avLst/>
+          </a:prstGeom>
+          <a:solidFill>
+            <a:schemeClr val="accent1"/>
+          </a:solidFill>
+          <a:ln>
+            <a:noFill/>
+          </a:ln>
+        </p:spPr>
+        <p:style>
+          <a:lnRef idx="1">
+            <a:schemeClr val="accent1"/>
+          </a:lnRef>
+          <a:fillRef idx="3">
+            <a:schemeClr val="accent1"/>
+          </a:fillRef>
+          <a:effectRef idx="2">
+            <a:schemeClr val="accent1"/>
+          </a:effectRef>
+          <a:fontRef idx="minor">
+            <a:schemeClr val="lt1"/>
+          </a:fontRef>
+        </p:style>
       </p:sp>
+      <p:sp>
+        <p:nvSpPr>
+          <p:cNvPr id="16" name="Freeform: Shape 15">
+            <a:extLst>
+              <a:ext uri="{FF2B5EF4-FFF2-40B4-BE49-F238E27FC236}">
+                <a16:creationId xmlns:a16="http://schemas.microsoft.com/office/drawing/2014/main" id="{7BB34D5F-2B87-438E-8236-69C6068D47A4}"/>
+              </a:ext>
+              <a:ext uri="{C183D7F6-B498-43B3-948B-1728B52AA6E4}">
+                <adec:decorative xmlns:adec="http://schemas.microsoft.com/office/drawing/2017/decorative" val="1"/>
+              </a:ext>
+            </a:extLst>
+          </p:cNvPr>
+          <p:cNvSpPr>
+            <a:spLocks noGrp="1" noRot="1" noChangeAspect="1" noMove="1" noResize="1" noEditPoints="1" noAdjustHandles="1" noChangeArrowheads="1" noChangeShapeType="1" noTextEdit="1"/>
+          </p:cNvSpPr>
+          <p:nvPr>
+            <p:extLst>
+              <p:ext uri="{386F3935-93C4-4BCD-93E2-E3B085C9AB24}">
+                <p16:designElem xmlns:p16="http://schemas.microsoft.com/office/powerpoint/2015/main" val="1"/>
+              </p:ext>
+            </p:extLst>
+          </p:nvPr>
+        </p:nvSpPr>
+        <p:spPr bwMode="gray">
+          <a:xfrm>
+            <a:off x="-1" y="1762067"/>
+            <a:ext cx="12192418" cy="5095933"/>
+          </a:xfrm>
+          <a:custGeom>
+            <a:avLst/>
+            <a:gdLst>
+              <a:gd name="connsiteX0" fmla="*/ 1 w 12192418"/>
+              <a:gd name="connsiteY0" fmla="*/ 0 h 5095933"/>
+              <a:gd name="connsiteX1" fmla="*/ 71932 w 12192418"/>
+              <a:gd name="connsiteY1" fmla="*/ 12261 h 5095933"/>
+              <a:gd name="connsiteX2" fmla="*/ 282849 w 12192418"/>
+              <a:gd name="connsiteY2" fmla="*/ 48343 h 5095933"/>
+              <a:gd name="connsiteX3" fmla="*/ 436464 w 12192418"/>
+              <a:gd name="connsiteY3" fmla="*/ 73565 h 5095933"/>
+              <a:gd name="connsiteX4" fmla="*/ 619339 w 12192418"/>
+              <a:gd name="connsiteY4" fmla="*/ 100188 h 5095933"/>
+              <a:gd name="connsiteX5" fmla="*/ 836351 w 12192418"/>
+              <a:gd name="connsiteY5" fmla="*/ 132066 h 5095933"/>
+              <a:gd name="connsiteX6" fmla="*/ 1076528 w 12192418"/>
+              <a:gd name="connsiteY6" fmla="*/ 165696 h 5095933"/>
+              <a:gd name="connsiteX7" fmla="*/ 1347184 w 12192418"/>
+              <a:gd name="connsiteY7" fmla="*/ 201077 h 5095933"/>
+              <a:gd name="connsiteX8" fmla="*/ 1642223 w 12192418"/>
+              <a:gd name="connsiteY8" fmla="*/ 238560 h 5095933"/>
+              <a:gd name="connsiteX9" fmla="*/ 1962864 w 12192418"/>
+              <a:gd name="connsiteY9" fmla="*/ 276043 h 5095933"/>
+              <a:gd name="connsiteX10" fmla="*/ 2304232 w 12192418"/>
+              <a:gd name="connsiteY10" fmla="*/ 314227 h 5095933"/>
+              <a:gd name="connsiteX11" fmla="*/ 2672421 w 12192418"/>
+              <a:gd name="connsiteY11" fmla="*/ 349608 h 5095933"/>
+              <a:gd name="connsiteX12" fmla="*/ 3057678 w 12192418"/>
+              <a:gd name="connsiteY12" fmla="*/ 383588 h 5095933"/>
+              <a:gd name="connsiteX13" fmla="*/ 3464881 w 12192418"/>
+              <a:gd name="connsiteY13" fmla="*/ 414415 h 5095933"/>
+              <a:gd name="connsiteX14" fmla="*/ 3889152 w 12192418"/>
+              <a:gd name="connsiteY14" fmla="*/ 443841 h 5095933"/>
+              <a:gd name="connsiteX15" fmla="*/ 4331710 w 12192418"/>
+              <a:gd name="connsiteY15" fmla="*/ 471515 h 5095933"/>
+              <a:gd name="connsiteX16" fmla="*/ 4558476 w 12192418"/>
+              <a:gd name="connsiteY16" fmla="*/ 481324 h 5095933"/>
+              <a:gd name="connsiteX17" fmla="*/ 4790118 w 12192418"/>
+              <a:gd name="connsiteY17" fmla="*/ 492183 h 5095933"/>
+              <a:gd name="connsiteX18" fmla="*/ 5025418 w 12192418"/>
+              <a:gd name="connsiteY18" fmla="*/ 502342 h 5095933"/>
+              <a:gd name="connsiteX19" fmla="*/ 5261937 w 12192418"/>
+              <a:gd name="connsiteY19" fmla="*/ 508998 h 5095933"/>
+              <a:gd name="connsiteX20" fmla="*/ 5503332 w 12192418"/>
+              <a:gd name="connsiteY20" fmla="*/ 514953 h 5095933"/>
+              <a:gd name="connsiteX21" fmla="*/ 5747167 w 12192418"/>
+              <a:gd name="connsiteY21" fmla="*/ 521259 h 5095933"/>
+              <a:gd name="connsiteX22" fmla="*/ 5995877 w 12192418"/>
+              <a:gd name="connsiteY22" fmla="*/ 525463 h 5095933"/>
+              <a:gd name="connsiteX23" fmla="*/ 6247026 w 12192418"/>
+              <a:gd name="connsiteY23" fmla="*/ 525463 h 5095933"/>
+              <a:gd name="connsiteX24" fmla="*/ 6500613 w 12192418"/>
+              <a:gd name="connsiteY24" fmla="*/ 527565 h 5095933"/>
+              <a:gd name="connsiteX25" fmla="*/ 6756639 w 12192418"/>
+              <a:gd name="connsiteY25" fmla="*/ 525463 h 5095933"/>
+              <a:gd name="connsiteX26" fmla="*/ 7016322 w 12192418"/>
+              <a:gd name="connsiteY26" fmla="*/ 521259 h 5095933"/>
+              <a:gd name="connsiteX27" fmla="*/ 7276005 w 12192418"/>
+              <a:gd name="connsiteY27" fmla="*/ 517406 h 5095933"/>
+              <a:gd name="connsiteX28" fmla="*/ 7539345 w 12192418"/>
+              <a:gd name="connsiteY28" fmla="*/ 508998 h 5095933"/>
+              <a:gd name="connsiteX29" fmla="*/ 7805124 w 12192418"/>
+              <a:gd name="connsiteY29" fmla="*/ 500241 h 5095933"/>
+              <a:gd name="connsiteX30" fmla="*/ 8070903 w 12192418"/>
+              <a:gd name="connsiteY30" fmla="*/ 490082 h 5095933"/>
+              <a:gd name="connsiteX31" fmla="*/ 8339121 w 12192418"/>
+              <a:gd name="connsiteY31" fmla="*/ 475719 h 5095933"/>
+              <a:gd name="connsiteX32" fmla="*/ 8609776 w 12192418"/>
+              <a:gd name="connsiteY32" fmla="*/ 458554 h 5095933"/>
+              <a:gd name="connsiteX33" fmla="*/ 8881651 w 12192418"/>
+              <a:gd name="connsiteY33" fmla="*/ 442089 h 5095933"/>
+              <a:gd name="connsiteX34" fmla="*/ 9153526 w 12192418"/>
+              <a:gd name="connsiteY34" fmla="*/ 421071 h 5095933"/>
+              <a:gd name="connsiteX35" fmla="*/ 9429058 w 12192418"/>
+              <a:gd name="connsiteY35" fmla="*/ 395849 h 5095933"/>
+              <a:gd name="connsiteX36" fmla="*/ 9700933 w 12192418"/>
+              <a:gd name="connsiteY36" fmla="*/ 370626 h 5095933"/>
+              <a:gd name="connsiteX37" fmla="*/ 9977684 w 12192418"/>
+              <a:gd name="connsiteY37" fmla="*/ 341551 h 5095933"/>
+              <a:gd name="connsiteX38" fmla="*/ 10255655 w 12192418"/>
+              <a:gd name="connsiteY38" fmla="*/ 309673 h 5095933"/>
+              <a:gd name="connsiteX39" fmla="*/ 10529968 w 12192418"/>
+              <a:gd name="connsiteY39" fmla="*/ 276043 h 5095933"/>
+              <a:gd name="connsiteX40" fmla="*/ 10807939 w 12192418"/>
+              <a:gd name="connsiteY40" fmla="*/ 236809 h 5095933"/>
+              <a:gd name="connsiteX41" fmla="*/ 11084690 w 12192418"/>
+              <a:gd name="connsiteY41" fmla="*/ 194772 h 5095933"/>
+              <a:gd name="connsiteX42" fmla="*/ 11362661 w 12192418"/>
+              <a:gd name="connsiteY42" fmla="*/ 153085 h 5095933"/>
+              <a:gd name="connsiteX43" fmla="*/ 11639412 w 12192418"/>
+              <a:gd name="connsiteY43" fmla="*/ 104392 h 5095933"/>
+              <a:gd name="connsiteX44" fmla="*/ 11914945 w 12192418"/>
+              <a:gd name="connsiteY44" fmla="*/ 54648 h 5095933"/>
+              <a:gd name="connsiteX45" fmla="*/ 12191696 w 12192418"/>
+              <a:gd name="connsiteY45" fmla="*/ 2452 h 5095933"/>
+              <a:gd name="connsiteX46" fmla="*/ 12191696 w 12192418"/>
+              <a:gd name="connsiteY46" fmla="*/ 2109542 h 5095933"/>
+              <a:gd name="connsiteX47" fmla="*/ 12191999 w 12192418"/>
+              <a:gd name="connsiteY47" fmla="*/ 2109542 h 5095933"/>
+              <a:gd name="connsiteX48" fmla="*/ 12191999 w 12192418"/>
+              <a:gd name="connsiteY48" fmla="*/ 2802467 h 5095933"/>
+              <a:gd name="connsiteX49" fmla="*/ 12192418 w 12192418"/>
+              <a:gd name="connsiteY49" fmla="*/ 2802467 h 5095933"/>
+              <a:gd name="connsiteX50" fmla="*/ 12192418 w 12192418"/>
+              <a:gd name="connsiteY50" fmla="*/ 5095933 h 5095933"/>
+              <a:gd name="connsiteX51" fmla="*/ 1 w 12192418"/>
+              <a:gd name="connsiteY51" fmla="*/ 5095933 h 5095933"/>
+              <a:gd name="connsiteX52" fmla="*/ 1 w 12192418"/>
+              <a:gd name="connsiteY52" fmla="*/ 4074529 h 5095933"/>
+              <a:gd name="connsiteX53" fmla="*/ 0 w 12192418"/>
+              <a:gd name="connsiteY53" fmla="*/ 4074529 h 5095933"/>
+              <a:gd name="connsiteX54" fmla="*/ 0 w 12192418"/>
+              <a:gd name="connsiteY54" fmla="*/ 2109542 h 5095933"/>
+              <a:gd name="connsiteX55" fmla="*/ 1 w 12192418"/>
+              <a:gd name="connsiteY55" fmla="*/ 2109542 h 5095933"/>
+            </a:gdLst>
+            <a:ahLst/>
+            <a:cxnLst>
+              <a:cxn ang="0">
+                <a:pos x="connsiteX0" y="connsiteY0"/>
+              </a:cxn>
+              <a:cxn ang="0">
+                <a:pos x="connsiteX1" y="connsiteY1"/>
+              </a:cxn>
+              <a:cxn ang="0">
+                <a:pos x="connsiteX2" y="connsiteY2"/>
+              </a:cxn>
+              <a:cxn ang="0">
+                <a:pos x="connsiteX3" y="connsiteY3"/>
+              </a:cxn>
+              <a:cxn ang="0">
+                <a:pos x="connsiteX4" y="connsiteY4"/>
+              </a:cxn>
+              <a:cxn ang="0">
+                <a:pos x="connsiteX5" y="connsiteY5"/>
+              </a:cxn>
+              <a:cxn ang="0">
+                <a:pos x="connsiteX6" y="connsiteY6"/>
+              </a:cxn>
+              <a:cxn ang="0">
+                <a:pos x="connsiteX7" y="connsiteY7"/>
+              </a:cxn>
+              <a:cxn ang="0">
+                <a:pos x="connsiteX8" y="connsiteY8"/>
+              </a:cxn>
+              <a:cxn ang="0">
+                <a:pos x="connsiteX9" y="connsiteY9"/>
+              </a:cxn>
+              <a:cxn ang="0">
+                <a:pos x="connsiteX10" y="connsiteY10"/>
+              </a:cxn>
+              <a:cxn ang="0">
+                <a:pos x="connsiteX11" y="connsiteY11"/>
+              </a:cxn>
+              <a:cxn ang="0">
+                <a:pos x="connsiteX12" y="connsiteY12"/>
+              </a:cxn>
+              <a:cxn ang="0">
+                <a:pos x="connsiteX13" y="connsiteY13"/>
+              </a:cxn>
+              <a:cxn ang="0">
+                <a:pos x="connsiteX14" y="connsiteY14"/>
+              </a:cxn>
+              <a:cxn ang="0">
+                <a:pos x="connsiteX15" y="connsiteY15"/>
+              </a:cxn>
+              <a:cxn ang="0">
+                <a:pos x="connsiteX16" y="connsiteY16"/>
+              </a:cxn>
+              <a:cxn ang="0">
+                <a:pos x="connsiteX17" y="connsiteY17"/>
+              </a:cxn>
+              <a:cxn ang="0">
+                <a:pos x="connsiteX18" y="connsiteY18"/>
+              </a:cxn>
+              <a:cxn ang="0">
+                <a:pos x="connsiteX19" y="connsiteY19"/>
+              </a:cxn>
+              <a:cxn ang="0">
+                <a:pos x="connsiteX20" y="connsiteY20"/>
+              </a:cxn>
+              <a:cxn ang="0">
+                <a:pos x="connsiteX21" y="connsiteY21"/>
+              </a:cxn>
+              <a:cxn ang="0">
+                <a:pos x="connsiteX22" y="connsiteY22"/>
+              </a:cxn>
+              <a:cxn ang="0">
+                <a:pos x="connsiteX23" y="connsiteY23"/>
+              </a:cxn>
+              <a:cxn ang="0">
+                <a:pos x="connsiteX24" y="connsiteY24"/>
+              </a:cxn>
+              <a:cxn ang="0">
+                <a:pos x="connsiteX25" y="connsiteY25"/>
+              </a:cxn>
+              <a:cxn ang="0">
+                <a:pos x="connsiteX26" y="connsiteY26"/>
+              </a:cxn>
+              <a:cxn ang="0">
+                <a:pos x="connsiteX27" y="connsiteY27"/>
+              </a:cxn>
+              <a:cxn ang="0">
+                <a:pos x="connsiteX28" y="connsiteY28"/>
+              </a:cxn>
+              <a:cxn ang="0">
+                <a:pos x="connsiteX29" y="connsiteY29"/>
+              </a:cxn>
+              <a:cxn ang="0">
+                <a:pos x="connsiteX30" y="connsiteY30"/>
+              </a:cxn>
+              <a:cxn ang="0">
+                <a:pos x="connsiteX31" y="connsiteY31"/>
+              </a:cxn>
+              <a:cxn ang="0">
+                <a:pos x="connsiteX32" y="connsiteY32"/>
+              </a:cxn>
+              <a:cxn ang="0">
+                <a:pos x="connsiteX33" y="connsiteY33"/>
+              </a:cxn>
+              <a:cxn ang="0">
+                <a:pos x="connsiteX34" y="connsiteY34"/>
+              </a:cxn>
+              <a:cxn ang="0">
+                <a:pos x="connsiteX35" y="connsiteY35"/>
+              </a:cxn>
+              <a:cxn ang="0">
+                <a:pos x="connsiteX36" y="connsiteY36"/>
+              </a:cxn>
+              <a:cxn ang="0">
+                <a:pos x="connsiteX37" y="connsiteY37"/>
+              </a:cxn>
+              <a:cxn ang="0">
+                <a:pos x="connsiteX38" y="connsiteY38"/>
+              </a:cxn>
+              <a:cxn ang="0">
+                <a:pos x="connsiteX39" y="connsiteY39"/>
+              </a:cxn>
+              <a:cxn ang="0">
+                <a:pos x="connsiteX40" y="connsiteY40"/>
+              </a:cxn>
+              <a:cxn ang="0">
+                <a:pos x="connsiteX41" y="connsiteY41"/>
+              </a:cxn>
+              <a:cxn ang="0">
+                <a:pos x="connsiteX42" y="connsiteY42"/>
+              </a:cxn>
+              <a:cxn ang="0">
+                <a:pos x="connsiteX43" y="connsiteY43"/>
+              </a:cxn>
+              <a:cxn ang="0">
+                <a:pos x="connsiteX44" y="connsiteY44"/>
+              </a:cxn>
+              <a:cxn ang="0">
+                <a:pos x="connsiteX45" y="connsiteY45"/>
+              </a:cxn>
+              <a:cxn ang="0">
+                <a:pos x="connsiteX46" y="connsiteY46"/>
+              </a:cxn>
+              <a:cxn ang="0">
+                <a:pos x="connsiteX47" y="connsiteY47"/>
+              </a:cxn>
+              <a:cxn ang="0">
+                <a:pos x="connsiteX48" y="connsiteY48"/>
+              </a:cxn>
+              <a:cxn ang="0">
+                <a:pos x="connsiteX49" y="connsiteY49"/>
+              </a:cxn>
+              <a:cxn ang="0">
+                <a:pos x="connsiteX50" y="connsiteY50"/>
+              </a:cxn>
+              <a:cxn ang="0">
+                <a:pos x="connsiteX51" y="connsiteY51"/>
+              </a:cxn>
+              <a:cxn ang="0">
+                <a:pos x="connsiteX52" y="connsiteY52"/>
+              </a:cxn>
+              <a:cxn ang="0">
+                <a:pos x="connsiteX53" y="connsiteY53"/>
+              </a:cxn>
+              <a:cxn ang="0">
+                <a:pos x="connsiteX54" y="connsiteY54"/>
+              </a:cxn>
+              <a:cxn ang="0">
+                <a:pos x="connsiteX55" y="connsiteY55"/>
+              </a:cxn>
+            </a:cxnLst>
+            <a:rect l="l" t="t" r="r" b="b"/>
+            <a:pathLst>
+              <a:path w="12192418" h="5095933">
+                <a:moveTo>
+                  <a:pt x="1" y="0"/>
+                </a:moveTo>
+                <a:lnTo>
+                  <a:pt x="71932" y="12261"/>
+                </a:lnTo>
+                <a:lnTo>
+                  <a:pt x="282849" y="48343"/>
+                </a:lnTo>
+                <a:lnTo>
+                  <a:pt x="436464" y="73565"/>
+                </a:lnTo>
+                <a:lnTo>
+                  <a:pt x="619339" y="100188"/>
+                </a:lnTo>
+                <a:lnTo>
+                  <a:pt x="836351" y="132066"/>
+                </a:lnTo>
+                <a:lnTo>
+                  <a:pt x="1076528" y="165696"/>
+                </a:lnTo>
+                <a:lnTo>
+                  <a:pt x="1347184" y="201077"/>
+                </a:lnTo>
+                <a:lnTo>
+                  <a:pt x="1642223" y="238560"/>
+                </a:lnTo>
+                <a:lnTo>
+                  <a:pt x="1962864" y="276043"/>
+                </a:lnTo>
+                <a:lnTo>
+                  <a:pt x="2304232" y="314227"/>
+                </a:lnTo>
+                <a:lnTo>
+                  <a:pt x="2672421" y="349608"/>
+                </a:lnTo>
+                <a:lnTo>
+                  <a:pt x="3057678" y="383588"/>
+                </a:lnTo>
+                <a:lnTo>
+                  <a:pt x="3464881" y="414415"/>
+                </a:lnTo>
+                <a:lnTo>
+                  <a:pt x="3889152" y="443841"/>
+                </a:lnTo>
+                <a:lnTo>
+                  <a:pt x="4331710" y="471515"/>
+                </a:lnTo>
+                <a:lnTo>
+                  <a:pt x="4558476" y="481324"/>
+                </a:lnTo>
+                <a:lnTo>
+                  <a:pt x="4790118" y="492183"/>
+                </a:lnTo>
+                <a:lnTo>
+                  <a:pt x="5025418" y="502342"/>
+                </a:lnTo>
+                <a:lnTo>
+                  <a:pt x="5261937" y="508998"/>
+                </a:lnTo>
+                <a:lnTo>
+                  <a:pt x="5503332" y="514953"/>
+                </a:lnTo>
+                <a:lnTo>
+                  <a:pt x="5747167" y="521259"/>
+                </a:lnTo>
+                <a:lnTo>
+                  <a:pt x="5995877" y="525463"/>
+                </a:lnTo>
+                <a:lnTo>
+                  <a:pt x="6247026" y="525463"/>
+                </a:lnTo>
+                <a:lnTo>
+                  <a:pt x="6500613" y="527565"/>
+                </a:lnTo>
+                <a:lnTo>
+                  <a:pt x="6756639" y="525463"/>
+                </a:lnTo>
+                <a:lnTo>
+                  <a:pt x="7016322" y="521259"/>
+                </a:lnTo>
+                <a:lnTo>
+                  <a:pt x="7276005" y="517406"/>
+                </a:lnTo>
+                <a:lnTo>
+                  <a:pt x="7539345" y="508998"/>
+                </a:lnTo>
+                <a:lnTo>
+                  <a:pt x="7805124" y="500241"/>
+                </a:lnTo>
+                <a:lnTo>
+                  <a:pt x="8070903" y="490082"/>
+                </a:lnTo>
+                <a:lnTo>
+                  <a:pt x="8339121" y="475719"/>
+                </a:lnTo>
+                <a:lnTo>
+                  <a:pt x="8609776" y="458554"/>
+                </a:lnTo>
+                <a:lnTo>
+                  <a:pt x="8881651" y="442089"/>
+                </a:lnTo>
+                <a:lnTo>
+                  <a:pt x="9153526" y="421071"/>
+                </a:lnTo>
+                <a:lnTo>
+                  <a:pt x="9429058" y="395849"/>
+                </a:lnTo>
+                <a:lnTo>
+                  <a:pt x="9700933" y="370626"/>
+                </a:lnTo>
+                <a:lnTo>
+                  <a:pt x="9977684" y="341551"/>
+                </a:lnTo>
+                <a:lnTo>
+                  <a:pt x="10255655" y="309673"/>
+                </a:lnTo>
+                <a:lnTo>
+                  <a:pt x="10529968" y="276043"/>
+                </a:lnTo>
+                <a:lnTo>
+                  <a:pt x="10807939" y="236809"/>
+                </a:lnTo>
+                <a:lnTo>
+                  <a:pt x="11084690" y="194772"/>
+                </a:lnTo>
+                <a:lnTo>
+                  <a:pt x="11362661" y="153085"/>
+                </a:lnTo>
+                <a:lnTo>
+                  <a:pt x="11639412" y="104392"/>
+                </a:lnTo>
+                <a:lnTo>
+                  <a:pt x="11914945" y="54648"/>
+                </a:lnTo>
+                <a:lnTo>
+                  <a:pt x="12191696" y="2452"/>
+                </a:lnTo>
+                <a:lnTo>
+                  <a:pt x="12191696" y="2109542"/>
+                </a:lnTo>
+                <a:lnTo>
+                  <a:pt x="12191999" y="2109542"/>
+                </a:lnTo>
+                <a:lnTo>
+                  <a:pt x="12191999" y="2802467"/>
+                </a:lnTo>
+                <a:lnTo>
+                  <a:pt x="12192418" y="2802467"/>
+                </a:lnTo>
+                <a:lnTo>
+                  <a:pt x="12192418" y="5095933"/>
+                </a:lnTo>
+                <a:lnTo>
+                  <a:pt x="1" y="5095933"/>
+                </a:lnTo>
+                <a:lnTo>
+                  <a:pt x="1" y="4074529"/>
+                </a:lnTo>
+                <a:lnTo>
+                  <a:pt x="0" y="4074529"/>
+                </a:lnTo>
+                <a:lnTo>
+                  <a:pt x="0" y="2109542"/>
+                </a:lnTo>
+                <a:lnTo>
+                  <a:pt x="1" y="2109542"/>
+                </a:lnTo>
+                <a:close/>
+              </a:path>
+            </a:pathLst>
+          </a:custGeom>
+          <a:solidFill>
+            <a:schemeClr val="bg1"/>
+          </a:solidFill>
+          <a:ln>
+            <a:noFill/>
+          </a:ln>
+        </p:spPr>
+      </p:sp>
+      <p:graphicFrame>
+        <p:nvGraphicFramePr>
+          <p:cNvPr id="5" name="Content Placeholder 2">
+            <a:extLst>
+              <a:ext uri="{FF2B5EF4-FFF2-40B4-BE49-F238E27FC236}">
+                <a16:creationId xmlns:a16="http://schemas.microsoft.com/office/drawing/2014/main" id="{08F2E572-8C69-4AA4-B5D5-E1E01D31759B}"/>
+              </a:ext>
+            </a:extLst>
+          </p:cNvPr>
+          <p:cNvGraphicFramePr>
+            <a:graphicFrameLocks noGrp="1"/>
+          </p:cNvGraphicFramePr>
+          <p:nvPr>
+            <p:ph idx="1"/>
+            <p:extLst>
+              <p:ext uri="{D42A27DB-BD31-4B8C-83A1-F6EECF244321}">
+                <p14:modId xmlns:p14="http://schemas.microsoft.com/office/powerpoint/2010/main" val="191243896"/>
+              </p:ext>
+            </p:extLst>
+          </p:nvPr>
+        </p:nvGraphicFramePr>
+        <p:xfrm>
+          <a:off x="648930" y="2810256"/>
+          <a:ext cx="10895370" cy="3404277"/>
+        </p:xfrm>
+        <a:graphic>
+          <a:graphicData uri="http://schemas.openxmlformats.org/drawingml/2006/diagram">
+            <dgm:relIds xmlns:dgm="http://schemas.openxmlformats.org/drawingml/2006/diagram" xmlns:r="http://schemas.openxmlformats.org/officeDocument/2006/relationships" r:dm="rId2" r:lo="rId3" r:qs="rId4" r:cs="rId5"/>
+          </a:graphicData>
+        </a:graphic>
+      </p:graphicFrame>
     </p:spTree>
     <p:extLst>
       <p:ext uri="{BB962C8B-B14F-4D97-AF65-F5344CB8AC3E}">
@@ -15944,7 +20044,7 @@
     </p:extLst>
   </p:cSld>
   <p:clrMapOvr>
-    <a:masterClrMapping/>
+    <a:overrideClrMapping bg1="lt1" tx1="dk1" bg2="lt2" tx2="dk2" accent1="accent1" accent2="accent2" accent3="accent3" accent4="accent4" accent5="accent5" accent6="accent6" hlink="hlink" folHlink="folHlink"/>
   </p:clrMapOvr>
 </p:sld>
 </file>

</xml_diff>

<commit_message>
Added: Unity vs MonoGame slide
</commit_message>
<xml_diff>
--- a/MonoGame - 4.19.2019/Presentation.pptx
+++ b/MonoGame - 4.19.2019/Presentation.pptx
@@ -7,14 +7,15 @@
   <p:sldIdLst>
     <p:sldId id="256" r:id="rId2"/>
     <p:sldId id="257" r:id="rId3"/>
-    <p:sldId id="260" r:id="rId4"/>
-    <p:sldId id="258" r:id="rId5"/>
-    <p:sldId id="265" r:id="rId6"/>
-    <p:sldId id="266" r:id="rId7"/>
-    <p:sldId id="261" r:id="rId8"/>
-    <p:sldId id="262" r:id="rId9"/>
-    <p:sldId id="263" r:id="rId10"/>
-    <p:sldId id="264" r:id="rId11"/>
+    <p:sldId id="267" r:id="rId4"/>
+    <p:sldId id="260" r:id="rId5"/>
+    <p:sldId id="258" r:id="rId6"/>
+    <p:sldId id="265" r:id="rId7"/>
+    <p:sldId id="266" r:id="rId8"/>
+    <p:sldId id="261" r:id="rId9"/>
+    <p:sldId id="262" r:id="rId10"/>
+    <p:sldId id="263" r:id="rId11"/>
+    <p:sldId id="264" r:id="rId12"/>
   </p:sldIdLst>
   <p:sldSz cx="12192000" cy="6858000"/>
   <p:notesSz cx="6858000" cy="9144000"/>
@@ -3526,17 +3527,17 @@
             <a:defRPr cap="all"/>
           </a:pPr>
           <a:r>
-            <a:rPr lang="en-US" b="0" i="0"/>
+            <a:rPr lang="en-US" b="0" i="0" dirty="0"/>
             <a:t>A new book coming later this year </a:t>
           </a:r>
           <a:br>
-            <a:rPr lang="en-US" b="0" i="0"/>
+            <a:rPr lang="en-US" b="0" i="0" dirty="0"/>
           </a:br>
           <a:r>
-            <a:rPr lang="en-US" b="0" i="0"/>
+            <a:rPr lang="en-US" b="0" i="0" dirty="0"/>
             <a:t>(From beginner to advanced)</a:t>
           </a:r>
-          <a:endParaRPr lang="en-US"/>
+          <a:endParaRPr lang="en-US" dirty="0"/>
         </a:p>
       </dgm:t>
     </dgm:pt>
@@ -3716,7 +3717,7 @@
       <dgm:spPr/>
     </dgm:pt>
     <dgm:pt modelId="{8977D7A9-5433-4C10-8998-167B09C41222}" type="pres">
-      <dgm:prSet presAssocID="{E940B647-0AF5-4AD6-8483-9636F7BC2A16}" presName="textRect" presStyleLbl="revTx" presStyleIdx="1" presStyleCnt="2" custLinFactNeighborY="4005">
+      <dgm:prSet presAssocID="{E940B647-0AF5-4AD6-8483-9636F7BC2A16}" presName="textRect" presStyleLbl="revTx" presStyleIdx="1" presStyleCnt="2" custLinFactNeighborX="67" custLinFactNeighborY="-9861">
         <dgm:presLayoutVars>
           <dgm:chMax val="1"/>
           <dgm:chPref val="1"/>
@@ -5133,17 +5134,17 @@
             <a:defRPr cap="all"/>
           </a:pPr>
           <a:r>
-            <a:rPr lang="en-US" sz="1100" b="0" i="0" kern="1200"/>
+            <a:rPr lang="en-US" sz="1100" b="0" i="0" kern="1200" dirty="0"/>
             <a:t>A new book coming later this year </a:t>
           </a:r>
           <a:br>
-            <a:rPr lang="en-US" sz="1100" b="0" i="0" kern="1200"/>
+            <a:rPr lang="en-US" sz="1100" b="0" i="0" kern="1200" dirty="0"/>
           </a:br>
           <a:r>
-            <a:rPr lang="en-US" sz="1100" b="0" i="0" kern="1200"/>
+            <a:rPr lang="en-US" sz="1100" b="0" i="0" kern="1200" dirty="0"/>
             <a:t>(From beginner to advanced)</a:t>
           </a:r>
-          <a:endParaRPr lang="en-US" sz="1100" kern="1200"/>
+          <a:endParaRPr lang="en-US" sz="1100" kern="1200" dirty="0"/>
         </a:p>
       </dsp:txBody>
       <dsp:txXfrm>
@@ -5246,7 +5247,7 @@
       </dsp:nvSpPr>
       <dsp:spPr>
         <a:xfrm>
-          <a:off x="5738075" y="2684277"/>
+          <a:off x="5740299" y="2598639"/>
           <a:ext cx="3318750" cy="720000"/>
         </a:xfrm>
         <a:prstGeom prst="rect">
@@ -5318,7 +5319,7 @@
         </a:p>
       </dsp:txBody>
       <dsp:txXfrm>
-        <a:off x="5738075" y="2684277"/>
+        <a:off x="5740299" y="2598639"/>
         <a:ext cx="3318750" cy="720000"/>
       </dsp:txXfrm>
     </dsp:sp>
@@ -9366,7 +9367,7 @@
           <a:p>
             <a:fld id="{48A87A34-81AB-432B-8DAE-1953F412C126}" type="datetimeFigureOut">
               <a:rPr lang="en-US" smtClean="0"/>
-              <a:t>4/13/2019</a:t>
+              <a:t>4/15/2019</a:t>
             </a:fld>
             <a:endParaRPr lang="en-US" dirty="0"/>
           </a:p>
@@ -9641,7 +9642,7 @@
           <a:p>
             <a:fld id="{48A87A34-81AB-432B-8DAE-1953F412C126}" type="datetimeFigureOut">
               <a:rPr lang="en-US" smtClean="0"/>
-              <a:t>4/13/2019</a:t>
+              <a:t>4/15/2019</a:t>
             </a:fld>
             <a:endParaRPr lang="en-US" dirty="0"/>
           </a:p>
@@ -9835,7 +9836,7 @@
           <a:p>
             <a:fld id="{48A87A34-81AB-432B-8DAE-1953F412C126}" type="datetimeFigureOut">
               <a:rPr lang="en-US" smtClean="0"/>
-              <a:t>4/13/2019</a:t>
+              <a:t>4/15/2019</a:t>
             </a:fld>
             <a:endParaRPr lang="en-US" dirty="0"/>
           </a:p>
@@ -10109,7 +10110,7 @@
             <a:fld id="{48A87A34-81AB-432B-8DAE-1953F412C126}" type="datetimeFigureOut">
               <a:rPr lang="en-US" smtClean="0"/>
               <a:pPr/>
-              <a:t>4/13/2019</a:t>
+              <a:t>4/15/2019</a:t>
             </a:fld>
             <a:endParaRPr lang="en-US" dirty="0"/>
           </a:p>
@@ -10452,7 +10453,7 @@
             <a:fld id="{48A87A34-81AB-432B-8DAE-1953F412C126}" type="datetimeFigureOut">
               <a:rPr lang="en-US" smtClean="0"/>
               <a:pPr/>
-              <a:t>4/13/2019</a:t>
+              <a:t>4/15/2019</a:t>
             </a:fld>
             <a:endParaRPr lang="en-US" dirty="0"/>
           </a:p>
@@ -11076,7 +11077,7 @@
           <a:p>
             <a:fld id="{48A87A34-81AB-432B-8DAE-1953F412C126}" type="datetimeFigureOut">
               <a:rPr lang="en-US" smtClean="0"/>
-              <a:t>4/13/2019</a:t>
+              <a:t>4/15/2019</a:t>
             </a:fld>
             <a:endParaRPr lang="en-US" dirty="0"/>
           </a:p>
@@ -11936,7 +11937,7 @@
           <a:p>
             <a:fld id="{48A87A34-81AB-432B-8DAE-1953F412C126}" type="datetimeFigureOut">
               <a:rPr lang="en-US" smtClean="0"/>
-              <a:t>4/13/2019</a:t>
+              <a:t>4/15/2019</a:t>
             </a:fld>
             <a:endParaRPr lang="en-US" dirty="0"/>
           </a:p>
@@ -12106,7 +12107,7 @@
           <a:p>
             <a:fld id="{48A87A34-81AB-432B-8DAE-1953F412C126}" type="datetimeFigureOut">
               <a:rPr lang="en-US" smtClean="0"/>
-              <a:t>4/13/2019</a:t>
+              <a:t>4/15/2019</a:t>
             </a:fld>
             <a:endParaRPr lang="en-US" dirty="0"/>
           </a:p>
@@ -12286,7 +12287,7 @@
           <a:p>
             <a:fld id="{48A87A34-81AB-432B-8DAE-1953F412C126}" type="datetimeFigureOut">
               <a:rPr lang="en-US" smtClean="0"/>
-              <a:t>4/13/2019</a:t>
+              <a:t>4/15/2019</a:t>
             </a:fld>
             <a:endParaRPr lang="en-US" dirty="0"/>
           </a:p>
@@ -12456,7 +12457,7 @@
           <a:p>
             <a:fld id="{48A87A34-81AB-432B-8DAE-1953F412C126}" type="datetimeFigureOut">
               <a:rPr lang="en-US" smtClean="0"/>
-              <a:t>4/13/2019</a:t>
+              <a:t>4/15/2019</a:t>
             </a:fld>
             <a:endParaRPr lang="en-US" dirty="0"/>
           </a:p>
@@ -12703,7 +12704,7 @@
           <a:p>
             <a:fld id="{48A87A34-81AB-432B-8DAE-1953F412C126}" type="datetimeFigureOut">
               <a:rPr lang="en-US" smtClean="0"/>
-              <a:t>4/13/2019</a:t>
+              <a:t>4/15/2019</a:t>
             </a:fld>
             <a:endParaRPr lang="en-US" dirty="0"/>
           </a:p>
@@ -12995,7 +12996,7 @@
           <a:p>
             <a:fld id="{48A87A34-81AB-432B-8DAE-1953F412C126}" type="datetimeFigureOut">
               <a:rPr lang="en-US" smtClean="0"/>
-              <a:t>4/13/2019</a:t>
+              <a:t>4/15/2019</a:t>
             </a:fld>
             <a:endParaRPr lang="en-US" dirty="0"/>
           </a:p>
@@ -13439,7 +13440,7 @@
           <a:p>
             <a:fld id="{48A87A34-81AB-432B-8DAE-1953F412C126}" type="datetimeFigureOut">
               <a:rPr lang="en-US" smtClean="0"/>
-              <a:t>4/13/2019</a:t>
+              <a:t>4/15/2019</a:t>
             </a:fld>
             <a:endParaRPr lang="en-US" dirty="0"/>
           </a:p>
@@ -13557,7 +13558,7 @@
           <a:p>
             <a:fld id="{48A87A34-81AB-432B-8DAE-1953F412C126}" type="datetimeFigureOut">
               <a:rPr lang="en-US" smtClean="0"/>
-              <a:t>4/13/2019</a:t>
+              <a:t>4/15/2019</a:t>
             </a:fld>
             <a:endParaRPr lang="en-US" dirty="0"/>
           </a:p>
@@ -13652,7 +13653,7 @@
           <a:p>
             <a:fld id="{48A87A34-81AB-432B-8DAE-1953F412C126}" type="datetimeFigureOut">
               <a:rPr lang="en-US" smtClean="0"/>
-              <a:t>4/13/2019</a:t>
+              <a:t>4/15/2019</a:t>
             </a:fld>
             <a:endParaRPr lang="en-US" dirty="0"/>
           </a:p>
@@ -13931,7 +13932,7 @@
           <a:p>
             <a:fld id="{48A87A34-81AB-432B-8DAE-1953F412C126}" type="datetimeFigureOut">
               <a:rPr lang="en-US" smtClean="0"/>
-              <a:t>4/13/2019</a:t>
+              <a:t>4/15/2019</a:t>
             </a:fld>
             <a:endParaRPr lang="en-US" dirty="0"/>
           </a:p>
@@ -14206,7 +14207,7 @@
           <a:p>
             <a:fld id="{48A87A34-81AB-432B-8DAE-1953F412C126}" type="datetimeFigureOut">
               <a:rPr lang="en-US" smtClean="0"/>
-              <a:t>4/13/2019</a:t>
+              <a:t>4/15/2019</a:t>
             </a:fld>
             <a:endParaRPr lang="en-US" dirty="0"/>
           </a:p>
@@ -14636,7 +14637,7 @@
             <a:fld id="{48A87A34-81AB-432B-8DAE-1953F412C126}" type="datetimeFigureOut">
               <a:rPr lang="en-US" smtClean="0"/>
               <a:pPr/>
-              <a:t>4/13/2019</a:t>
+              <a:t>4/15/2019</a:t>
             </a:fld>
             <a:endParaRPr lang="en-US" dirty="0"/>
           </a:p>
@@ -16254,6 +16255,1388 @@
           <a:chExt cx="0" cy="0"/>
         </a:xfrm>
       </p:grpSpPr>
+      <p:pic>
+        <p:nvPicPr>
+          <p:cNvPr id="32" name="Picture 31">
+            <a:extLst>
+              <a:ext uri="{FF2B5EF4-FFF2-40B4-BE49-F238E27FC236}">
+                <a16:creationId xmlns:a16="http://schemas.microsoft.com/office/drawing/2014/main" id="{41B68C77-138E-4BF7-A276-BD0C78A4219F}"/>
+              </a:ext>
+              <a:ext uri="{C183D7F6-B498-43B3-948B-1728B52AA6E4}">
+                <adec:decorative xmlns:adec="http://schemas.microsoft.com/office/drawing/2017/decorative" val="1"/>
+              </a:ext>
+            </a:extLst>
+          </p:cNvPr>
+          <p:cNvPicPr>
+            <a:picLocks noGrp="1" noRot="1" noChangeAspect="1" noMove="1" noResize="1" noEditPoints="1" noAdjustHandles="1" noChangeArrowheads="1" noChangeShapeType="1" noCrop="1"/>
+          </p:cNvPicPr>
+          <p:nvPr>
+            <p:extLst>
+              <p:ext uri="{386F3935-93C4-4BCD-93E2-E3B085C9AB24}">
+                <p16:designElem xmlns:p16="http://schemas.microsoft.com/office/powerpoint/2015/main" val="1"/>
+              </p:ext>
+            </p:extLst>
+          </p:nvPr>
+        </p:nvPicPr>
+        <p:blipFill rotWithShape="1">
+          <a:blip r:embed="rId2">
+            <a:extLst>
+              <a:ext uri="{28A0092B-C50C-407E-A947-70E740481C1C}">
+                <a14:useLocalDpi xmlns:a14="http://schemas.microsoft.com/office/drawing/2010/main" val="0"/>
+              </a:ext>
+            </a:extLst>
+          </a:blip>
+          <a:srcRect l="3613"/>
+          <a:stretch/>
+        </p:blipFill>
+        <p:spPr>
+          <a:xfrm>
+            <a:off x="0" y="2669685"/>
+            <a:ext cx="4037012" cy="4188315"/>
+          </a:xfrm>
+          <a:prstGeom prst="rect">
+            <a:avLst/>
+          </a:prstGeom>
+        </p:spPr>
+      </p:pic>
+      <p:pic>
+        <p:nvPicPr>
+          <p:cNvPr id="34" name="Picture 33">
+            <a:extLst>
+              <a:ext uri="{FF2B5EF4-FFF2-40B4-BE49-F238E27FC236}">
+                <a16:creationId xmlns:a16="http://schemas.microsoft.com/office/drawing/2014/main" id="{7C268552-D473-46ED-B1B8-422042C4DEF1}"/>
+              </a:ext>
+              <a:ext uri="{C183D7F6-B498-43B3-948B-1728B52AA6E4}">
+                <adec:decorative xmlns:adec="http://schemas.microsoft.com/office/drawing/2017/decorative" val="1"/>
+              </a:ext>
+            </a:extLst>
+          </p:cNvPr>
+          <p:cNvPicPr>
+            <a:picLocks noGrp="1" noRot="1" noChangeAspect="1" noMove="1" noResize="1" noEditPoints="1" noAdjustHandles="1" noChangeArrowheads="1" noChangeShapeType="1" noCrop="1"/>
+          </p:cNvPicPr>
+          <p:nvPr>
+            <p:extLst>
+              <p:ext uri="{386F3935-93C4-4BCD-93E2-E3B085C9AB24}">
+                <p16:designElem xmlns:p16="http://schemas.microsoft.com/office/powerpoint/2015/main" val="1"/>
+              </p:ext>
+            </p:extLst>
+          </p:nvPr>
+        </p:nvPicPr>
+        <p:blipFill rotWithShape="1">
+          <a:blip r:embed="rId3">
+            <a:extLst>
+              <a:ext uri="{28A0092B-C50C-407E-A947-70E740481C1C}">
+                <a14:useLocalDpi xmlns:a14="http://schemas.microsoft.com/office/drawing/2010/main" val="0"/>
+              </a:ext>
+            </a:extLst>
+          </a:blip>
+          <a:srcRect l="35640"/>
+          <a:stretch/>
+        </p:blipFill>
+        <p:spPr>
+          <a:xfrm>
+            <a:off x="0" y="2892347"/>
+            <a:ext cx="1522412" cy="2365453"/>
+          </a:xfrm>
+          <a:prstGeom prst="rect">
+            <a:avLst/>
+          </a:prstGeom>
+        </p:spPr>
+      </p:pic>
+      <p:sp>
+        <p:nvSpPr>
+          <p:cNvPr id="36" name="Oval 35">
+            <a:extLst>
+              <a:ext uri="{FF2B5EF4-FFF2-40B4-BE49-F238E27FC236}">
+                <a16:creationId xmlns:a16="http://schemas.microsoft.com/office/drawing/2014/main" id="{4AC0CD9D-7610-4620-93B4-798CCD9AB581}"/>
+              </a:ext>
+              <a:ext uri="{C183D7F6-B498-43B3-948B-1728B52AA6E4}">
+                <adec:decorative xmlns:adec="http://schemas.microsoft.com/office/drawing/2017/decorative" val="1"/>
+              </a:ext>
+            </a:extLst>
+          </p:cNvPr>
+          <p:cNvSpPr>
+            <a:spLocks noGrp="1" noRot="1" noChangeAspect="1" noMove="1" noResize="1" noEditPoints="1" noAdjustHandles="1" noChangeArrowheads="1" noChangeShapeType="1" noTextEdit="1"/>
+          </p:cNvSpPr>
+          <p:nvPr>
+            <p:extLst>
+              <p:ext uri="{386F3935-93C4-4BCD-93E2-E3B085C9AB24}">
+                <p16:designElem xmlns:p16="http://schemas.microsoft.com/office/powerpoint/2015/main" val="1"/>
+              </p:ext>
+            </p:extLst>
+          </p:nvPr>
+        </p:nvSpPr>
+        <p:spPr>
+          <a:xfrm>
+            <a:off x="8609012" y="1676400"/>
+            <a:ext cx="2819400" cy="2819400"/>
+          </a:xfrm>
+          <a:prstGeom prst="ellipse">
+            <a:avLst/>
+          </a:prstGeom>
+          <a:gradFill flip="none" rotWithShape="1">
+            <a:gsLst>
+              <a:gs pos="0">
+                <a:schemeClr val="bg2">
+                  <a:lumMod val="60000"/>
+                  <a:lumOff val="40000"/>
+                  <a:alpha val="7000"/>
+                </a:schemeClr>
+              </a:gs>
+              <a:gs pos="69000">
+                <a:schemeClr val="bg2">
+                  <a:lumMod val="60000"/>
+                  <a:lumOff val="40000"/>
+                  <a:alpha val="0"/>
+                </a:schemeClr>
+              </a:gs>
+              <a:gs pos="36000">
+                <a:schemeClr val="bg2">
+                  <a:lumMod val="60000"/>
+                  <a:lumOff val="40000"/>
+                  <a:alpha val="6000"/>
+                </a:schemeClr>
+              </a:gs>
+            </a:gsLst>
+            <a:path path="circle">
+              <a:fillToRect l="50000" t="50000" r="50000" b="50000"/>
+            </a:path>
+            <a:tileRect/>
+          </a:gradFill>
+          <a:ln>
+            <a:noFill/>
+          </a:ln>
+          <a:effectLst/>
+        </p:spPr>
+        <p:style>
+          <a:lnRef idx="1">
+            <a:schemeClr val="accent1"/>
+          </a:lnRef>
+          <a:fillRef idx="3">
+            <a:schemeClr val="accent1"/>
+          </a:fillRef>
+          <a:effectRef idx="2">
+            <a:schemeClr val="accent1"/>
+          </a:effectRef>
+          <a:fontRef idx="minor">
+            <a:schemeClr val="lt1"/>
+          </a:fontRef>
+        </p:style>
+      </p:sp>
+      <p:pic>
+        <p:nvPicPr>
+          <p:cNvPr id="38" name="Picture 37">
+            <a:extLst>
+              <a:ext uri="{FF2B5EF4-FFF2-40B4-BE49-F238E27FC236}">
+                <a16:creationId xmlns:a16="http://schemas.microsoft.com/office/drawing/2014/main" id="{B9238B3E-24AA-439A-B527-6C5DF6D72145}"/>
+              </a:ext>
+              <a:ext uri="{C183D7F6-B498-43B3-948B-1728B52AA6E4}">
+                <adec:decorative xmlns:adec="http://schemas.microsoft.com/office/drawing/2017/decorative" val="1"/>
+              </a:ext>
+            </a:extLst>
+          </p:cNvPr>
+          <p:cNvPicPr>
+            <a:picLocks noGrp="1" noRot="1" noChangeAspect="1" noMove="1" noResize="1" noEditPoints="1" noAdjustHandles="1" noChangeArrowheads="1" noChangeShapeType="1" noCrop="1"/>
+          </p:cNvPicPr>
+          <p:nvPr>
+            <p:extLst>
+              <p:ext uri="{386F3935-93C4-4BCD-93E2-E3B085C9AB24}">
+                <p16:designElem xmlns:p16="http://schemas.microsoft.com/office/powerpoint/2015/main" val="1"/>
+              </p:ext>
+            </p:extLst>
+          </p:nvPr>
+        </p:nvPicPr>
+        <p:blipFill rotWithShape="1">
+          <a:blip r:embed="rId4">
+            <a:extLst>
+              <a:ext uri="{28A0092B-C50C-407E-A947-70E740481C1C}">
+                <a14:useLocalDpi xmlns:a14="http://schemas.microsoft.com/office/drawing/2010/main" val="0"/>
+              </a:ext>
+            </a:extLst>
+          </a:blip>
+          <a:srcRect t="28813"/>
+          <a:stretch/>
+        </p:blipFill>
+        <p:spPr>
+          <a:xfrm>
+            <a:off x="7999412" y="0"/>
+            <a:ext cx="1603387" cy="1141407"/>
+          </a:xfrm>
+          <a:prstGeom prst="rect">
+            <a:avLst/>
+          </a:prstGeom>
+        </p:spPr>
+      </p:pic>
+      <p:pic>
+        <p:nvPicPr>
+          <p:cNvPr id="40" name="Picture 39">
+            <a:extLst>
+              <a:ext uri="{FF2B5EF4-FFF2-40B4-BE49-F238E27FC236}">
+                <a16:creationId xmlns:a16="http://schemas.microsoft.com/office/drawing/2014/main" id="{69F01145-BEA3-4CBF-AA21-10077B948CA8}"/>
+              </a:ext>
+              <a:ext uri="{C183D7F6-B498-43B3-948B-1728B52AA6E4}">
+                <adec:decorative xmlns:adec="http://schemas.microsoft.com/office/drawing/2017/decorative" val="1"/>
+              </a:ext>
+            </a:extLst>
+          </p:cNvPr>
+          <p:cNvPicPr>
+            <a:picLocks noGrp="1" noRot="1" noChangeAspect="1" noMove="1" noResize="1" noEditPoints="1" noAdjustHandles="1" noChangeArrowheads="1" noChangeShapeType="1" noCrop="1"/>
+          </p:cNvPicPr>
+          <p:nvPr>
+            <p:extLst>
+              <p:ext uri="{386F3935-93C4-4BCD-93E2-E3B085C9AB24}">
+                <p16:designElem xmlns:p16="http://schemas.microsoft.com/office/powerpoint/2015/main" val="1"/>
+              </p:ext>
+            </p:extLst>
+          </p:nvPr>
+        </p:nvPicPr>
+        <p:blipFill rotWithShape="1">
+          <a:blip r:embed="rId5">
+            <a:extLst>
+              <a:ext uri="{28A0092B-C50C-407E-A947-70E740481C1C}">
+                <a14:useLocalDpi xmlns:a14="http://schemas.microsoft.com/office/drawing/2010/main" val="0"/>
+              </a:ext>
+            </a:extLst>
+          </a:blip>
+          <a:srcRect b="23320"/>
+          <a:stretch/>
+        </p:blipFill>
+        <p:spPr>
+          <a:xfrm>
+            <a:off x="8605878" y="6096000"/>
+            <a:ext cx="993734" cy="762000"/>
+          </a:xfrm>
+          <a:prstGeom prst="rect">
+            <a:avLst/>
+          </a:prstGeom>
+        </p:spPr>
+      </p:pic>
+      <p:sp>
+        <p:nvSpPr>
+          <p:cNvPr id="42" name="Rectangle 41">
+            <a:extLst>
+              <a:ext uri="{FF2B5EF4-FFF2-40B4-BE49-F238E27FC236}">
+                <a16:creationId xmlns:a16="http://schemas.microsoft.com/office/drawing/2014/main" id="{DE4D62F9-188E-4530-84C2-24BDEE4BEB82}"/>
+              </a:ext>
+              <a:ext uri="{C183D7F6-B498-43B3-948B-1728B52AA6E4}">
+                <adec:decorative xmlns:adec="http://schemas.microsoft.com/office/drawing/2017/decorative" val="1"/>
+              </a:ext>
+            </a:extLst>
+          </p:cNvPr>
+          <p:cNvSpPr>
+            <a:spLocks noGrp="1" noRot="1" noChangeAspect="1" noMove="1" noResize="1" noEditPoints="1" noAdjustHandles="1" noChangeArrowheads="1" noChangeShapeType="1" noTextEdit="1"/>
+          </p:cNvSpPr>
+          <p:nvPr>
+            <p:extLst>
+              <p:ext uri="{386F3935-93C4-4BCD-93E2-E3B085C9AB24}">
+                <p16:designElem xmlns:p16="http://schemas.microsoft.com/office/powerpoint/2015/main" val="1"/>
+              </p:ext>
+            </p:extLst>
+          </p:nvPr>
+        </p:nvSpPr>
+        <p:spPr>
+          <a:xfrm>
+            <a:off x="10437812" y="0"/>
+            <a:ext cx="685800" cy="1143000"/>
+          </a:xfrm>
+          <a:prstGeom prst="rect">
+            <a:avLst/>
+          </a:prstGeom>
+          <a:solidFill>
+            <a:schemeClr val="accent1"/>
+          </a:solidFill>
+          <a:ln>
+            <a:noFill/>
+          </a:ln>
+        </p:spPr>
+        <p:style>
+          <a:lnRef idx="1">
+            <a:schemeClr val="accent1"/>
+          </a:lnRef>
+          <a:fillRef idx="3">
+            <a:schemeClr val="accent1"/>
+          </a:fillRef>
+          <a:effectRef idx="2">
+            <a:schemeClr val="accent1"/>
+          </a:effectRef>
+          <a:fontRef idx="minor">
+            <a:schemeClr val="lt1"/>
+          </a:fontRef>
+        </p:style>
+      </p:sp>
+      <p:sp>
+        <p:nvSpPr>
+          <p:cNvPr id="44" name="Rectangle 43">
+            <a:extLst>
+              <a:ext uri="{FF2B5EF4-FFF2-40B4-BE49-F238E27FC236}">
+                <a16:creationId xmlns:a16="http://schemas.microsoft.com/office/drawing/2014/main" id="{C6A81905-F480-46A4-BC10-215D24EA1AE6}"/>
+              </a:ext>
+              <a:ext uri="{C183D7F6-B498-43B3-948B-1728B52AA6E4}">
+                <adec:decorative xmlns:adec="http://schemas.microsoft.com/office/drawing/2017/decorative" val="1"/>
+              </a:ext>
+            </a:extLst>
+          </p:cNvPr>
+          <p:cNvSpPr>
+            <a:spLocks noGrp="1" noRot="1" noChangeAspect="1" noMove="1" noResize="1" noEditPoints="1" noAdjustHandles="1" noChangeArrowheads="1" noChangeShapeType="1" noTextEdit="1"/>
+          </p:cNvSpPr>
+          <p:nvPr>
+            <p:extLst>
+              <p:ext uri="{386F3935-93C4-4BCD-93E2-E3B085C9AB24}">
+                <p16:designElem xmlns:p16="http://schemas.microsoft.com/office/powerpoint/2015/main" val="1"/>
+              </p:ext>
+            </p:extLst>
+          </p:nvPr>
+        </p:nvSpPr>
+        <p:spPr>
+          <a:xfrm>
+            <a:off x="0" y="0"/>
+            <a:ext cx="12192000" cy="6858000"/>
+          </a:xfrm>
+          <a:prstGeom prst="rect">
+            <a:avLst/>
+          </a:prstGeom>
+          <a:ln>
+            <a:noFill/>
+          </a:ln>
+        </p:spPr>
+        <p:style>
+          <a:lnRef idx="2">
+            <a:schemeClr val="accent1">
+              <a:shade val="50000"/>
+            </a:schemeClr>
+          </a:lnRef>
+          <a:fillRef idx="1003">
+            <a:schemeClr val="dk2"/>
+          </a:fillRef>
+          <a:effectRef idx="0">
+            <a:schemeClr val="accent1"/>
+          </a:effectRef>
+          <a:fontRef idx="minor">
+            <a:schemeClr val="lt1"/>
+          </a:fontRef>
+        </p:style>
+        <p:txBody>
+          <a:bodyPr rtlCol="0" anchor="ctr"/>
+          <a:lstStyle/>
+          <a:p>
+            <a:pPr algn="ctr"/>
+            <a:endParaRPr lang="en-US"/>
+          </a:p>
+        </p:txBody>
+      </p:sp>
+      <p:sp>
+        <p:nvSpPr>
+          <p:cNvPr id="2" name="Title 1">
+            <a:extLst>
+              <a:ext uri="{FF2B5EF4-FFF2-40B4-BE49-F238E27FC236}">
+                <a16:creationId xmlns:a16="http://schemas.microsoft.com/office/drawing/2014/main" id="{4B60FF66-C136-4D64-865D-C696E1B299CE}"/>
+              </a:ext>
+            </a:extLst>
+          </p:cNvPr>
+          <p:cNvSpPr>
+            <a:spLocks noGrp="1"/>
+          </p:cNvSpPr>
+          <p:nvPr>
+            <p:ph type="title"/>
+          </p:nvPr>
+        </p:nvSpPr>
+        <p:spPr>
+          <a:xfrm>
+            <a:off x="4415428" y="2858296"/>
+            <a:ext cx="7655859" cy="1141407"/>
+          </a:xfrm>
+        </p:spPr>
+        <p:txBody>
+          <a:bodyPr vert="horz" lIns="91440" tIns="45720" rIns="91440" bIns="45720" rtlCol="0" anchor="b">
+            <a:noAutofit/>
+          </a:bodyPr>
+          <a:lstStyle/>
+          <a:p>
+            <a:r>
+              <a:rPr lang="en-US" sz="4800" dirty="0">
+                <a:solidFill>
+                  <a:srgbClr val="EBEBEB"/>
+                </a:solidFill>
+              </a:rPr>
+              <a:t>demo | code </a:t>
+            </a:r>
+            <a:r>
+              <a:rPr lang="en-US" sz="4800" b="0" i="0" kern="1200" dirty="0">
+                <a:solidFill>
+                  <a:srgbClr val="EBEBEB"/>
+                </a:solidFill>
+                <a:latin typeface="+mj-lt"/>
+                <a:ea typeface="+mj-ea"/>
+                <a:cs typeface="+mj-cs"/>
+              </a:rPr>
+              <a:t>deep dive</a:t>
+            </a:r>
+          </a:p>
+        </p:txBody>
+      </p:sp>
+      <p:sp>
+        <p:nvSpPr>
+          <p:cNvPr id="46" name="Freeform 8">
+            <a:extLst>
+              <a:ext uri="{FF2B5EF4-FFF2-40B4-BE49-F238E27FC236}">
+                <a16:creationId xmlns:a16="http://schemas.microsoft.com/office/drawing/2014/main" id="{36FD4D9D-3784-41E8-8405-A42B72F51331}"/>
+              </a:ext>
+              <a:ext uri="{C183D7F6-B498-43B3-948B-1728B52AA6E4}">
+                <adec:decorative xmlns:adec="http://schemas.microsoft.com/office/drawing/2017/decorative" val="1"/>
+              </a:ext>
+            </a:extLst>
+          </p:cNvPr>
+          <p:cNvSpPr>
+            <a:spLocks noGrp="1" noRot="1" noChangeAspect="1" noMove="1" noResize="1" noEditPoints="1" noAdjustHandles="1" noChangeArrowheads="1" noChangeShapeType="1" noTextEdit="1"/>
+          </p:cNvSpPr>
+          <p:nvPr>
+            <p:extLst>
+              <p:ext uri="{386F3935-93C4-4BCD-93E2-E3B085C9AB24}">
+                <p16:designElem xmlns:p16="http://schemas.microsoft.com/office/powerpoint/2015/main" val="1"/>
+              </p:ext>
+            </p:extLst>
+          </p:nvPr>
+        </p:nvSpPr>
+        <p:spPr>
+          <a:xfrm flipH="1">
+            <a:off x="4135692" y="-1"/>
+            <a:ext cx="559472" cy="3709642"/>
+          </a:xfrm>
+          <a:custGeom>
+            <a:avLst/>
+            <a:gdLst>
+              <a:gd name="connsiteX0" fmla="*/ 0 w 559472"/>
+              <a:gd name="connsiteY0" fmla="*/ 0 h 3709642"/>
+              <a:gd name="connsiteX1" fmla="*/ 473952 w 559472"/>
+              <a:gd name="connsiteY1" fmla="*/ 0 h 3709642"/>
+              <a:gd name="connsiteX2" fmla="*/ 485840 w 559472"/>
+              <a:gd name="connsiteY2" fmla="*/ 161194 h 3709642"/>
+              <a:gd name="connsiteX3" fmla="*/ 523949 w 559472"/>
+              <a:gd name="connsiteY3" fmla="*/ 3672197 h 3709642"/>
+              <a:gd name="connsiteX4" fmla="*/ 454748 w 559472"/>
+              <a:gd name="connsiteY4" fmla="*/ 3709642 h 3709642"/>
+              <a:gd name="connsiteX5" fmla="*/ 448224 w 559472"/>
+              <a:gd name="connsiteY5" fmla="*/ 3510471 h 3709642"/>
+              <a:gd name="connsiteX6" fmla="*/ 443564 w 559472"/>
+              <a:gd name="connsiteY6" fmla="*/ 3408563 h 3709642"/>
+              <a:gd name="connsiteX7" fmla="*/ 438902 w 559472"/>
+              <a:gd name="connsiteY7" fmla="*/ 3304407 h 3709642"/>
+              <a:gd name="connsiteX8" fmla="*/ 433941 w 559472"/>
+              <a:gd name="connsiteY8" fmla="*/ 3198777 h 3709642"/>
+              <a:gd name="connsiteX9" fmla="*/ 427584 w 559472"/>
+              <a:gd name="connsiteY9" fmla="*/ 3092510 h 3709642"/>
+              <a:gd name="connsiteX10" fmla="*/ 420988 w 559472"/>
+              <a:gd name="connsiteY10" fmla="*/ 2984390 h 3709642"/>
+              <a:gd name="connsiteX11" fmla="*/ 414330 w 559472"/>
+              <a:gd name="connsiteY11" fmla="*/ 2874401 h 3709642"/>
+              <a:gd name="connsiteX12" fmla="*/ 406840 w 559472"/>
+              <a:gd name="connsiteY12" fmla="*/ 2762980 h 3709642"/>
+              <a:gd name="connsiteX13" fmla="*/ 397745 w 559472"/>
+              <a:gd name="connsiteY13" fmla="*/ 2650566 h 3709642"/>
+              <a:gd name="connsiteX14" fmla="*/ 389154 w 559472"/>
+              <a:gd name="connsiteY14" fmla="*/ 2536612 h 3709642"/>
+              <a:gd name="connsiteX15" fmla="*/ 379225 w 559472"/>
+              <a:gd name="connsiteY15" fmla="*/ 2421642 h 3709642"/>
+              <a:gd name="connsiteX16" fmla="*/ 368316 w 559472"/>
+              <a:gd name="connsiteY16" fmla="*/ 2305627 h 3709642"/>
+              <a:gd name="connsiteX17" fmla="*/ 357466 w 559472"/>
+              <a:gd name="connsiteY17" fmla="*/ 2189233 h 3709642"/>
+              <a:gd name="connsiteX18" fmla="*/ 344982 w 559472"/>
+              <a:gd name="connsiteY18" fmla="*/ 2071473 h 3709642"/>
+              <a:gd name="connsiteX19" fmla="*/ 332466 w 559472"/>
+              <a:gd name="connsiteY19" fmla="*/ 1952216 h 3709642"/>
+              <a:gd name="connsiteX20" fmla="*/ 319121 w 559472"/>
+              <a:gd name="connsiteY20" fmla="*/ 1833776 h 3709642"/>
+              <a:gd name="connsiteX21" fmla="*/ 304408 w 559472"/>
+              <a:gd name="connsiteY21" fmla="*/ 1713948 h 3709642"/>
+              <a:gd name="connsiteX22" fmla="*/ 288685 w 559472"/>
+              <a:gd name="connsiteY22" fmla="*/ 1592703 h 3709642"/>
+              <a:gd name="connsiteX23" fmla="*/ 273050 w 559472"/>
+              <a:gd name="connsiteY23" fmla="*/ 1471451 h 3709642"/>
+              <a:gd name="connsiteX24" fmla="*/ 255813 w 559472"/>
+              <a:gd name="connsiteY24" fmla="*/ 1350328 h 3709642"/>
+              <a:gd name="connsiteX25" fmla="*/ 237060 w 559472"/>
+              <a:gd name="connsiteY25" fmla="*/ 1227080 h 3709642"/>
+              <a:gd name="connsiteX26" fmla="*/ 218488 w 559472"/>
+              <a:gd name="connsiteY26" fmla="*/ 1106065 h 3709642"/>
+              <a:gd name="connsiteX27" fmla="*/ 198221 w 559472"/>
+              <a:gd name="connsiteY27" fmla="*/ 982940 h 3709642"/>
+              <a:gd name="connsiteX28" fmla="*/ 177152 w 559472"/>
+              <a:gd name="connsiteY28" fmla="*/ 858755 h 3709642"/>
+              <a:gd name="connsiteX29" fmla="*/ 155551 w 559472"/>
+              <a:gd name="connsiteY29" fmla="*/ 736861 h 3709642"/>
+              <a:gd name="connsiteX30" fmla="*/ 131782 w 559472"/>
+              <a:gd name="connsiteY30" fmla="*/ 613645 h 3709642"/>
+              <a:gd name="connsiteX31" fmla="*/ 107123 w 559472"/>
+              <a:gd name="connsiteY31" fmla="*/ 490500 h 3709642"/>
+              <a:gd name="connsiteX32" fmla="*/ 82552 w 559472"/>
+              <a:gd name="connsiteY32" fmla="*/ 367348 h 3709642"/>
+              <a:gd name="connsiteX33" fmla="*/ 55608 w 559472"/>
+              <a:gd name="connsiteY33" fmla="*/ 244762 h 3709642"/>
+              <a:gd name="connsiteX34" fmla="*/ 28130 w 559472"/>
+              <a:gd name="connsiteY34" fmla="*/ 122220 h 3709642"/>
+              <a:gd name="connsiteX35" fmla="*/ 0 w 559472"/>
+              <a:gd name="connsiteY35" fmla="*/ 0 h 3709642"/>
+            </a:gdLst>
+            <a:ahLst/>
+            <a:cxnLst>
+              <a:cxn ang="0">
+                <a:pos x="connsiteX0" y="connsiteY0"/>
+              </a:cxn>
+              <a:cxn ang="0">
+                <a:pos x="connsiteX1" y="connsiteY1"/>
+              </a:cxn>
+              <a:cxn ang="0">
+                <a:pos x="connsiteX2" y="connsiteY2"/>
+              </a:cxn>
+              <a:cxn ang="0">
+                <a:pos x="connsiteX3" y="connsiteY3"/>
+              </a:cxn>
+              <a:cxn ang="0">
+                <a:pos x="connsiteX4" y="connsiteY4"/>
+              </a:cxn>
+              <a:cxn ang="0">
+                <a:pos x="connsiteX5" y="connsiteY5"/>
+              </a:cxn>
+              <a:cxn ang="0">
+                <a:pos x="connsiteX6" y="connsiteY6"/>
+              </a:cxn>
+              <a:cxn ang="0">
+                <a:pos x="connsiteX7" y="connsiteY7"/>
+              </a:cxn>
+              <a:cxn ang="0">
+                <a:pos x="connsiteX8" y="connsiteY8"/>
+              </a:cxn>
+              <a:cxn ang="0">
+                <a:pos x="connsiteX9" y="connsiteY9"/>
+              </a:cxn>
+              <a:cxn ang="0">
+                <a:pos x="connsiteX10" y="connsiteY10"/>
+              </a:cxn>
+              <a:cxn ang="0">
+                <a:pos x="connsiteX11" y="connsiteY11"/>
+              </a:cxn>
+              <a:cxn ang="0">
+                <a:pos x="connsiteX12" y="connsiteY12"/>
+              </a:cxn>
+              <a:cxn ang="0">
+                <a:pos x="connsiteX13" y="connsiteY13"/>
+              </a:cxn>
+              <a:cxn ang="0">
+                <a:pos x="connsiteX14" y="connsiteY14"/>
+              </a:cxn>
+              <a:cxn ang="0">
+                <a:pos x="connsiteX15" y="connsiteY15"/>
+              </a:cxn>
+              <a:cxn ang="0">
+                <a:pos x="connsiteX16" y="connsiteY16"/>
+              </a:cxn>
+              <a:cxn ang="0">
+                <a:pos x="connsiteX17" y="connsiteY17"/>
+              </a:cxn>
+              <a:cxn ang="0">
+                <a:pos x="connsiteX18" y="connsiteY18"/>
+              </a:cxn>
+              <a:cxn ang="0">
+                <a:pos x="connsiteX19" y="connsiteY19"/>
+              </a:cxn>
+              <a:cxn ang="0">
+                <a:pos x="connsiteX20" y="connsiteY20"/>
+              </a:cxn>
+              <a:cxn ang="0">
+                <a:pos x="connsiteX21" y="connsiteY21"/>
+              </a:cxn>
+              <a:cxn ang="0">
+                <a:pos x="connsiteX22" y="connsiteY22"/>
+              </a:cxn>
+              <a:cxn ang="0">
+                <a:pos x="connsiteX23" y="connsiteY23"/>
+              </a:cxn>
+              <a:cxn ang="0">
+                <a:pos x="connsiteX24" y="connsiteY24"/>
+              </a:cxn>
+              <a:cxn ang="0">
+                <a:pos x="connsiteX25" y="connsiteY25"/>
+              </a:cxn>
+              <a:cxn ang="0">
+                <a:pos x="connsiteX26" y="connsiteY26"/>
+              </a:cxn>
+              <a:cxn ang="0">
+                <a:pos x="connsiteX27" y="connsiteY27"/>
+              </a:cxn>
+              <a:cxn ang="0">
+                <a:pos x="connsiteX28" y="connsiteY28"/>
+              </a:cxn>
+              <a:cxn ang="0">
+                <a:pos x="connsiteX29" y="connsiteY29"/>
+              </a:cxn>
+              <a:cxn ang="0">
+                <a:pos x="connsiteX30" y="connsiteY30"/>
+              </a:cxn>
+              <a:cxn ang="0">
+                <a:pos x="connsiteX31" y="connsiteY31"/>
+              </a:cxn>
+              <a:cxn ang="0">
+                <a:pos x="connsiteX32" y="connsiteY32"/>
+              </a:cxn>
+              <a:cxn ang="0">
+                <a:pos x="connsiteX33" y="connsiteY33"/>
+              </a:cxn>
+              <a:cxn ang="0">
+                <a:pos x="connsiteX34" y="connsiteY34"/>
+              </a:cxn>
+              <a:cxn ang="0">
+                <a:pos x="connsiteX35" y="connsiteY35"/>
+              </a:cxn>
+            </a:cxnLst>
+            <a:rect l="l" t="t" r="r" b="b"/>
+            <a:pathLst>
+              <a:path w="559472" h="3709642">
+                <a:moveTo>
+                  <a:pt x="0" y="0"/>
+                </a:moveTo>
+                <a:lnTo>
+                  <a:pt x="473952" y="0"/>
+                </a:lnTo>
+                <a:lnTo>
+                  <a:pt x="485840" y="161194"/>
+                </a:lnTo>
+                <a:cubicBezTo>
+                  <a:pt x="552063" y="1147770"/>
+                  <a:pt x="592441" y="3086737"/>
+                  <a:pt x="523949" y="3672197"/>
+                </a:cubicBezTo>
+                <a:cubicBezTo>
+                  <a:pt x="500842" y="3684557"/>
+                  <a:pt x="477855" y="3697282"/>
+                  <a:pt x="454748" y="3709642"/>
+                </a:cubicBezTo>
+                <a:lnTo>
+                  <a:pt x="448224" y="3510471"/>
+                </a:lnTo>
+                <a:lnTo>
+                  <a:pt x="443564" y="3408563"/>
+                </a:lnTo>
+                <a:lnTo>
+                  <a:pt x="438902" y="3304407"/>
+                </a:lnTo>
+                <a:lnTo>
+                  <a:pt x="433941" y="3198777"/>
+                </a:lnTo>
+                <a:lnTo>
+                  <a:pt x="427584" y="3092510"/>
+                </a:lnTo>
+                <a:lnTo>
+                  <a:pt x="420988" y="2984390"/>
+                </a:lnTo>
+                <a:lnTo>
+                  <a:pt x="414330" y="2874401"/>
+                </a:lnTo>
+                <a:lnTo>
+                  <a:pt x="406840" y="2762980"/>
+                </a:lnTo>
+                <a:lnTo>
+                  <a:pt x="397745" y="2650566"/>
+                </a:lnTo>
+                <a:lnTo>
+                  <a:pt x="389154" y="2536612"/>
+                </a:lnTo>
+                <a:lnTo>
+                  <a:pt x="379225" y="2421642"/>
+                </a:lnTo>
+                <a:lnTo>
+                  <a:pt x="368316" y="2305627"/>
+                </a:lnTo>
+                <a:lnTo>
+                  <a:pt x="357466" y="2189233"/>
+                </a:lnTo>
+                <a:lnTo>
+                  <a:pt x="344982" y="2071473"/>
+                </a:lnTo>
+                <a:lnTo>
+                  <a:pt x="332466" y="1952216"/>
+                </a:lnTo>
+                <a:lnTo>
+                  <a:pt x="319121" y="1833776"/>
+                </a:lnTo>
+                <a:lnTo>
+                  <a:pt x="304408" y="1713948"/>
+                </a:lnTo>
+                <a:lnTo>
+                  <a:pt x="288685" y="1592703"/>
+                </a:lnTo>
+                <a:lnTo>
+                  <a:pt x="273050" y="1471451"/>
+                </a:lnTo>
+                <a:lnTo>
+                  <a:pt x="255813" y="1350328"/>
+                </a:lnTo>
+                <a:lnTo>
+                  <a:pt x="237060" y="1227080"/>
+                </a:lnTo>
+                <a:lnTo>
+                  <a:pt x="218488" y="1106065"/>
+                </a:lnTo>
+                <a:lnTo>
+                  <a:pt x="198221" y="982940"/>
+                </a:lnTo>
+                <a:lnTo>
+                  <a:pt x="177152" y="858755"/>
+                </a:lnTo>
+                <a:lnTo>
+                  <a:pt x="155551" y="736861"/>
+                </a:lnTo>
+                <a:lnTo>
+                  <a:pt x="131782" y="613645"/>
+                </a:lnTo>
+                <a:lnTo>
+                  <a:pt x="107123" y="490500"/>
+                </a:lnTo>
+                <a:lnTo>
+                  <a:pt x="82552" y="367348"/>
+                </a:lnTo>
+                <a:lnTo>
+                  <a:pt x="55608" y="244762"/>
+                </a:lnTo>
+                <a:lnTo>
+                  <a:pt x="28130" y="122220"/>
+                </a:lnTo>
+                <a:lnTo>
+                  <a:pt x="0" y="0"/>
+                </a:lnTo>
+                <a:close/>
+              </a:path>
+            </a:pathLst>
+          </a:custGeom>
+          <a:solidFill>
+            <a:schemeClr val="bg1">
+              <a:alpha val="20000"/>
+            </a:schemeClr>
+          </a:solidFill>
+          <a:ln>
+            <a:noFill/>
+          </a:ln>
+        </p:spPr>
+        <p:txBody>
+          <a:bodyPr rtlCol="0" anchor="ctr"/>
+          <a:lstStyle/>
+          <a:p>
+            <a:pPr algn="ctr"/>
+            <a:endParaRPr lang="en-US"/>
+          </a:p>
+        </p:txBody>
+      </p:sp>
+      <p:sp useBgFill="1">
+        <p:nvSpPr>
+          <p:cNvPr id="48" name="Freeform: Shape 47">
+            <a:extLst>
+              <a:ext uri="{FF2B5EF4-FFF2-40B4-BE49-F238E27FC236}">
+                <a16:creationId xmlns:a16="http://schemas.microsoft.com/office/drawing/2014/main" id="{09811DF6-66E4-43D5-B564-3151796531ED}"/>
+              </a:ext>
+              <a:ext uri="{C183D7F6-B498-43B3-948B-1728B52AA6E4}">
+                <adec:decorative xmlns:adec="http://schemas.microsoft.com/office/drawing/2017/decorative" val="1"/>
+              </a:ext>
+            </a:extLst>
+          </p:cNvPr>
+          <p:cNvSpPr>
+            <a:spLocks noGrp="1" noRot="1" noChangeAspect="1" noMove="1" noResize="1" noEditPoints="1" noAdjustHandles="1" noChangeArrowheads="1" noChangeShapeType="1" noTextEdit="1"/>
+          </p:cNvSpPr>
+          <p:nvPr>
+            <p:extLst>
+              <p:ext uri="{386F3935-93C4-4BCD-93E2-E3B085C9AB24}">
+                <p16:designElem xmlns:p16="http://schemas.microsoft.com/office/powerpoint/2015/main" val="1"/>
+              </p:ext>
+            </p:extLst>
+          </p:nvPr>
+        </p:nvSpPr>
+        <p:spPr>
+          <a:xfrm>
+            <a:off x="0" y="0"/>
+            <a:ext cx="4481964" cy="6858000"/>
+          </a:xfrm>
+          <a:custGeom>
+            <a:avLst/>
+            <a:gdLst>
+              <a:gd name="connsiteX0" fmla="*/ 3137249 w 4481964"/>
+              <a:gd name="connsiteY0" fmla="*/ 0 h 6858000"/>
+              <a:gd name="connsiteX1" fmla="*/ 4480787 w 4481964"/>
+              <a:gd name="connsiteY1" fmla="*/ 0 h 6858000"/>
+              <a:gd name="connsiteX2" fmla="*/ 4455742 w 4481964"/>
+              <a:gd name="connsiteY2" fmla="*/ 155676 h 6858000"/>
+              <a:gd name="connsiteX3" fmla="*/ 4431873 w 4481964"/>
+              <a:gd name="connsiteY3" fmla="*/ 310667 h 6858000"/>
+              <a:gd name="connsiteX4" fmla="*/ 4408509 w 4481964"/>
+              <a:gd name="connsiteY4" fmla="*/ 466344 h 6858000"/>
+              <a:gd name="connsiteX5" fmla="*/ 4388506 w 4481964"/>
+              <a:gd name="connsiteY5" fmla="*/ 622706 h 6858000"/>
+              <a:gd name="connsiteX6" fmla="*/ 4368335 w 4481964"/>
+              <a:gd name="connsiteY6" fmla="*/ 778383 h 6858000"/>
+              <a:gd name="connsiteX7" fmla="*/ 4349509 w 4481964"/>
+              <a:gd name="connsiteY7" fmla="*/ 934745 h 6858000"/>
+              <a:gd name="connsiteX8" fmla="*/ 4333373 w 4481964"/>
+              <a:gd name="connsiteY8" fmla="*/ 1089050 h 6858000"/>
+              <a:gd name="connsiteX9" fmla="*/ 4318077 w 4481964"/>
+              <a:gd name="connsiteY9" fmla="*/ 1245413 h 6858000"/>
+              <a:gd name="connsiteX10" fmla="*/ 4304125 w 4481964"/>
+              <a:gd name="connsiteY10" fmla="*/ 1401089 h 6858000"/>
+              <a:gd name="connsiteX11" fmla="*/ 4292023 w 4481964"/>
+              <a:gd name="connsiteY11" fmla="*/ 1554023 h 6858000"/>
+              <a:gd name="connsiteX12" fmla="*/ 4279920 w 4481964"/>
+              <a:gd name="connsiteY12" fmla="*/ 1709013 h 6858000"/>
+              <a:gd name="connsiteX13" fmla="*/ 4269835 w 4481964"/>
+              <a:gd name="connsiteY13" fmla="*/ 1861947 h 6858000"/>
+              <a:gd name="connsiteX14" fmla="*/ 4261935 w 4481964"/>
+              <a:gd name="connsiteY14" fmla="*/ 2014880 h 6858000"/>
+              <a:gd name="connsiteX15" fmla="*/ 4253698 w 4481964"/>
+              <a:gd name="connsiteY15" fmla="*/ 2167128 h 6858000"/>
+              <a:gd name="connsiteX16" fmla="*/ 4246807 w 4481964"/>
+              <a:gd name="connsiteY16" fmla="*/ 2318004 h 6858000"/>
+              <a:gd name="connsiteX17" fmla="*/ 4241932 w 4481964"/>
+              <a:gd name="connsiteY17" fmla="*/ 2467508 h 6858000"/>
+              <a:gd name="connsiteX18" fmla="*/ 4237730 w 4481964"/>
+              <a:gd name="connsiteY18" fmla="*/ 2617013 h 6858000"/>
+              <a:gd name="connsiteX19" fmla="*/ 4233696 w 4481964"/>
+              <a:gd name="connsiteY19" fmla="*/ 2765145 h 6858000"/>
+              <a:gd name="connsiteX20" fmla="*/ 4231847 w 4481964"/>
+              <a:gd name="connsiteY20" fmla="*/ 2911221 h 6858000"/>
+              <a:gd name="connsiteX21" fmla="*/ 4229830 w 4481964"/>
+              <a:gd name="connsiteY21" fmla="*/ 3057296 h 6858000"/>
+              <a:gd name="connsiteX22" fmla="*/ 4228821 w 4481964"/>
+              <a:gd name="connsiteY22" fmla="*/ 3201314 h 6858000"/>
+              <a:gd name="connsiteX23" fmla="*/ 4229830 w 4481964"/>
+              <a:gd name="connsiteY23" fmla="*/ 3343960 h 6858000"/>
+              <a:gd name="connsiteX24" fmla="*/ 4229830 w 4481964"/>
+              <a:gd name="connsiteY24" fmla="*/ 3485235 h 6858000"/>
+              <a:gd name="connsiteX25" fmla="*/ 4231847 w 4481964"/>
+              <a:gd name="connsiteY25" fmla="*/ 3625138 h 6858000"/>
+              <a:gd name="connsiteX26" fmla="*/ 4234872 w 4481964"/>
+              <a:gd name="connsiteY26" fmla="*/ 3762298 h 6858000"/>
+              <a:gd name="connsiteX27" fmla="*/ 4237730 w 4481964"/>
+              <a:gd name="connsiteY27" fmla="*/ 3898087 h 6858000"/>
+              <a:gd name="connsiteX28" fmla="*/ 4240924 w 4481964"/>
+              <a:gd name="connsiteY28" fmla="*/ 4031132 h 6858000"/>
+              <a:gd name="connsiteX29" fmla="*/ 4245798 w 4481964"/>
+              <a:gd name="connsiteY29" fmla="*/ 4163491 h 6858000"/>
+              <a:gd name="connsiteX30" fmla="*/ 4251009 w 4481964"/>
+              <a:gd name="connsiteY30" fmla="*/ 4293793 h 6858000"/>
+              <a:gd name="connsiteX31" fmla="*/ 4255715 w 4481964"/>
+              <a:gd name="connsiteY31" fmla="*/ 4421352 h 6858000"/>
+              <a:gd name="connsiteX32" fmla="*/ 4268995 w 4481964"/>
+              <a:gd name="connsiteY32" fmla="*/ 4670298 h 6858000"/>
+              <a:gd name="connsiteX33" fmla="*/ 4283114 w 4481964"/>
+              <a:gd name="connsiteY33" fmla="*/ 4908956 h 6858000"/>
+              <a:gd name="connsiteX34" fmla="*/ 4297906 w 4481964"/>
+              <a:gd name="connsiteY34" fmla="*/ 5138013 h 6858000"/>
+              <a:gd name="connsiteX35" fmla="*/ 4314211 w 4481964"/>
+              <a:gd name="connsiteY35" fmla="*/ 5354726 h 6858000"/>
+              <a:gd name="connsiteX36" fmla="*/ 4331188 w 4481964"/>
+              <a:gd name="connsiteY36" fmla="*/ 5561838 h 6858000"/>
+              <a:gd name="connsiteX37" fmla="*/ 4349509 w 4481964"/>
+              <a:gd name="connsiteY37" fmla="*/ 5753862 h 6858000"/>
+              <a:gd name="connsiteX38" fmla="*/ 4367495 w 4481964"/>
+              <a:gd name="connsiteY38" fmla="*/ 5934227 h 6858000"/>
+              <a:gd name="connsiteX39" fmla="*/ 4385480 w 4481964"/>
+              <a:gd name="connsiteY39" fmla="*/ 6100191 h 6858000"/>
+              <a:gd name="connsiteX40" fmla="*/ 4402457 w 4481964"/>
+              <a:gd name="connsiteY40" fmla="*/ 6252438 h 6858000"/>
+              <a:gd name="connsiteX41" fmla="*/ 4418594 w 4481964"/>
+              <a:gd name="connsiteY41" fmla="*/ 6387541 h 6858000"/>
+              <a:gd name="connsiteX42" fmla="*/ 4433890 w 4481964"/>
+              <a:gd name="connsiteY42" fmla="*/ 6509613 h 6858000"/>
+              <a:gd name="connsiteX43" fmla="*/ 4446665 w 4481964"/>
+              <a:gd name="connsiteY43" fmla="*/ 6612483 h 6858000"/>
+              <a:gd name="connsiteX44" fmla="*/ 4458767 w 4481964"/>
+              <a:gd name="connsiteY44" fmla="*/ 6698894 h 6858000"/>
+              <a:gd name="connsiteX45" fmla="*/ 4476081 w 4481964"/>
+              <a:gd name="connsiteY45" fmla="*/ 6817538 h 6858000"/>
+              <a:gd name="connsiteX46" fmla="*/ 4481964 w 4481964"/>
+              <a:gd name="connsiteY46" fmla="*/ 6858000 h 6858000"/>
+              <a:gd name="connsiteX47" fmla="*/ 3577807 w 4481964"/>
+              <a:gd name="connsiteY47" fmla="*/ 6858000 h 6858000"/>
+              <a:gd name="connsiteX48" fmla="*/ 3577807 w 4481964"/>
+              <a:gd name="connsiteY48" fmla="*/ 6858000 h 6858000"/>
+              <a:gd name="connsiteX49" fmla="*/ 0 w 4481964"/>
+              <a:gd name="connsiteY49" fmla="*/ 6858000 h 6858000"/>
+              <a:gd name="connsiteX50" fmla="*/ 0 w 4481964"/>
+              <a:gd name="connsiteY50" fmla="*/ 0 h 6858000"/>
+              <a:gd name="connsiteX51" fmla="*/ 3137249 w 4481964"/>
+              <a:gd name="connsiteY51" fmla="*/ 0 h 6858000"/>
+            </a:gdLst>
+            <a:ahLst/>
+            <a:cxnLst>
+              <a:cxn ang="0">
+                <a:pos x="connsiteX0" y="connsiteY0"/>
+              </a:cxn>
+              <a:cxn ang="0">
+                <a:pos x="connsiteX1" y="connsiteY1"/>
+              </a:cxn>
+              <a:cxn ang="0">
+                <a:pos x="connsiteX2" y="connsiteY2"/>
+              </a:cxn>
+              <a:cxn ang="0">
+                <a:pos x="connsiteX3" y="connsiteY3"/>
+              </a:cxn>
+              <a:cxn ang="0">
+                <a:pos x="connsiteX4" y="connsiteY4"/>
+              </a:cxn>
+              <a:cxn ang="0">
+                <a:pos x="connsiteX5" y="connsiteY5"/>
+              </a:cxn>
+              <a:cxn ang="0">
+                <a:pos x="connsiteX6" y="connsiteY6"/>
+              </a:cxn>
+              <a:cxn ang="0">
+                <a:pos x="connsiteX7" y="connsiteY7"/>
+              </a:cxn>
+              <a:cxn ang="0">
+                <a:pos x="connsiteX8" y="connsiteY8"/>
+              </a:cxn>
+              <a:cxn ang="0">
+                <a:pos x="connsiteX9" y="connsiteY9"/>
+              </a:cxn>
+              <a:cxn ang="0">
+                <a:pos x="connsiteX10" y="connsiteY10"/>
+              </a:cxn>
+              <a:cxn ang="0">
+                <a:pos x="connsiteX11" y="connsiteY11"/>
+              </a:cxn>
+              <a:cxn ang="0">
+                <a:pos x="connsiteX12" y="connsiteY12"/>
+              </a:cxn>
+              <a:cxn ang="0">
+                <a:pos x="connsiteX13" y="connsiteY13"/>
+              </a:cxn>
+              <a:cxn ang="0">
+                <a:pos x="connsiteX14" y="connsiteY14"/>
+              </a:cxn>
+              <a:cxn ang="0">
+                <a:pos x="connsiteX15" y="connsiteY15"/>
+              </a:cxn>
+              <a:cxn ang="0">
+                <a:pos x="connsiteX16" y="connsiteY16"/>
+              </a:cxn>
+              <a:cxn ang="0">
+                <a:pos x="connsiteX17" y="connsiteY17"/>
+              </a:cxn>
+              <a:cxn ang="0">
+                <a:pos x="connsiteX18" y="connsiteY18"/>
+              </a:cxn>
+              <a:cxn ang="0">
+                <a:pos x="connsiteX19" y="connsiteY19"/>
+              </a:cxn>
+              <a:cxn ang="0">
+                <a:pos x="connsiteX20" y="connsiteY20"/>
+              </a:cxn>
+              <a:cxn ang="0">
+                <a:pos x="connsiteX21" y="connsiteY21"/>
+              </a:cxn>
+              <a:cxn ang="0">
+                <a:pos x="connsiteX22" y="connsiteY22"/>
+              </a:cxn>
+              <a:cxn ang="0">
+                <a:pos x="connsiteX23" y="connsiteY23"/>
+              </a:cxn>
+              <a:cxn ang="0">
+                <a:pos x="connsiteX24" y="connsiteY24"/>
+              </a:cxn>
+              <a:cxn ang="0">
+                <a:pos x="connsiteX25" y="connsiteY25"/>
+              </a:cxn>
+              <a:cxn ang="0">
+                <a:pos x="connsiteX26" y="connsiteY26"/>
+              </a:cxn>
+              <a:cxn ang="0">
+                <a:pos x="connsiteX27" y="connsiteY27"/>
+              </a:cxn>
+              <a:cxn ang="0">
+                <a:pos x="connsiteX28" y="connsiteY28"/>
+              </a:cxn>
+              <a:cxn ang="0">
+                <a:pos x="connsiteX29" y="connsiteY29"/>
+              </a:cxn>
+              <a:cxn ang="0">
+                <a:pos x="connsiteX30" y="connsiteY30"/>
+              </a:cxn>
+              <a:cxn ang="0">
+                <a:pos x="connsiteX31" y="connsiteY31"/>
+              </a:cxn>
+              <a:cxn ang="0">
+                <a:pos x="connsiteX32" y="connsiteY32"/>
+              </a:cxn>
+              <a:cxn ang="0">
+                <a:pos x="connsiteX33" y="connsiteY33"/>
+              </a:cxn>
+              <a:cxn ang="0">
+                <a:pos x="connsiteX34" y="connsiteY34"/>
+              </a:cxn>
+              <a:cxn ang="0">
+                <a:pos x="connsiteX35" y="connsiteY35"/>
+              </a:cxn>
+              <a:cxn ang="0">
+                <a:pos x="connsiteX36" y="connsiteY36"/>
+              </a:cxn>
+              <a:cxn ang="0">
+                <a:pos x="connsiteX37" y="connsiteY37"/>
+              </a:cxn>
+              <a:cxn ang="0">
+                <a:pos x="connsiteX38" y="connsiteY38"/>
+              </a:cxn>
+              <a:cxn ang="0">
+                <a:pos x="connsiteX39" y="connsiteY39"/>
+              </a:cxn>
+              <a:cxn ang="0">
+                <a:pos x="connsiteX40" y="connsiteY40"/>
+              </a:cxn>
+              <a:cxn ang="0">
+                <a:pos x="connsiteX41" y="connsiteY41"/>
+              </a:cxn>
+              <a:cxn ang="0">
+                <a:pos x="connsiteX42" y="connsiteY42"/>
+              </a:cxn>
+              <a:cxn ang="0">
+                <a:pos x="connsiteX43" y="connsiteY43"/>
+              </a:cxn>
+              <a:cxn ang="0">
+                <a:pos x="connsiteX44" y="connsiteY44"/>
+              </a:cxn>
+              <a:cxn ang="0">
+                <a:pos x="connsiteX45" y="connsiteY45"/>
+              </a:cxn>
+              <a:cxn ang="0">
+                <a:pos x="connsiteX46" y="connsiteY46"/>
+              </a:cxn>
+              <a:cxn ang="0">
+                <a:pos x="connsiteX47" y="connsiteY47"/>
+              </a:cxn>
+              <a:cxn ang="0">
+                <a:pos x="connsiteX48" y="connsiteY48"/>
+              </a:cxn>
+              <a:cxn ang="0">
+                <a:pos x="connsiteX49" y="connsiteY49"/>
+              </a:cxn>
+              <a:cxn ang="0">
+                <a:pos x="connsiteX50" y="connsiteY50"/>
+              </a:cxn>
+              <a:cxn ang="0">
+                <a:pos x="connsiteX51" y="connsiteY51"/>
+              </a:cxn>
+            </a:cxnLst>
+            <a:rect l="l" t="t" r="r" b="b"/>
+            <a:pathLst>
+              <a:path w="4481964" h="6858000">
+                <a:moveTo>
+                  <a:pt x="3137249" y="0"/>
+                </a:moveTo>
+                <a:lnTo>
+                  <a:pt x="4480787" y="0"/>
+                </a:lnTo>
+                <a:lnTo>
+                  <a:pt x="4455742" y="155676"/>
+                </a:lnTo>
+                <a:lnTo>
+                  <a:pt x="4431873" y="310667"/>
+                </a:lnTo>
+                <a:lnTo>
+                  <a:pt x="4408509" y="466344"/>
+                </a:lnTo>
+                <a:lnTo>
+                  <a:pt x="4388506" y="622706"/>
+                </a:lnTo>
+                <a:lnTo>
+                  <a:pt x="4368335" y="778383"/>
+                </a:lnTo>
+                <a:lnTo>
+                  <a:pt x="4349509" y="934745"/>
+                </a:lnTo>
+                <a:lnTo>
+                  <a:pt x="4333373" y="1089050"/>
+                </a:lnTo>
+                <a:lnTo>
+                  <a:pt x="4318077" y="1245413"/>
+                </a:lnTo>
+                <a:lnTo>
+                  <a:pt x="4304125" y="1401089"/>
+                </a:lnTo>
+                <a:lnTo>
+                  <a:pt x="4292023" y="1554023"/>
+                </a:lnTo>
+                <a:lnTo>
+                  <a:pt x="4279920" y="1709013"/>
+                </a:lnTo>
+                <a:lnTo>
+                  <a:pt x="4269835" y="1861947"/>
+                </a:lnTo>
+                <a:lnTo>
+                  <a:pt x="4261935" y="2014880"/>
+                </a:lnTo>
+                <a:lnTo>
+                  <a:pt x="4253698" y="2167128"/>
+                </a:lnTo>
+                <a:lnTo>
+                  <a:pt x="4246807" y="2318004"/>
+                </a:lnTo>
+                <a:lnTo>
+                  <a:pt x="4241932" y="2467508"/>
+                </a:lnTo>
+                <a:lnTo>
+                  <a:pt x="4237730" y="2617013"/>
+                </a:lnTo>
+                <a:lnTo>
+                  <a:pt x="4233696" y="2765145"/>
+                </a:lnTo>
+                <a:lnTo>
+                  <a:pt x="4231847" y="2911221"/>
+                </a:lnTo>
+                <a:lnTo>
+                  <a:pt x="4229830" y="3057296"/>
+                </a:lnTo>
+                <a:lnTo>
+                  <a:pt x="4228821" y="3201314"/>
+                </a:lnTo>
+                <a:lnTo>
+                  <a:pt x="4229830" y="3343960"/>
+                </a:lnTo>
+                <a:lnTo>
+                  <a:pt x="4229830" y="3485235"/>
+                </a:lnTo>
+                <a:lnTo>
+                  <a:pt x="4231847" y="3625138"/>
+                </a:lnTo>
+                <a:lnTo>
+                  <a:pt x="4234872" y="3762298"/>
+                </a:lnTo>
+                <a:lnTo>
+                  <a:pt x="4237730" y="3898087"/>
+                </a:lnTo>
+                <a:lnTo>
+                  <a:pt x="4240924" y="4031132"/>
+                </a:lnTo>
+                <a:lnTo>
+                  <a:pt x="4245798" y="4163491"/>
+                </a:lnTo>
+                <a:lnTo>
+                  <a:pt x="4251009" y="4293793"/>
+                </a:lnTo>
+                <a:lnTo>
+                  <a:pt x="4255715" y="4421352"/>
+                </a:lnTo>
+                <a:lnTo>
+                  <a:pt x="4268995" y="4670298"/>
+                </a:lnTo>
+                <a:lnTo>
+                  <a:pt x="4283114" y="4908956"/>
+                </a:lnTo>
+                <a:lnTo>
+                  <a:pt x="4297906" y="5138013"/>
+                </a:lnTo>
+                <a:lnTo>
+                  <a:pt x="4314211" y="5354726"/>
+                </a:lnTo>
+                <a:lnTo>
+                  <a:pt x="4331188" y="5561838"/>
+                </a:lnTo>
+                <a:lnTo>
+                  <a:pt x="4349509" y="5753862"/>
+                </a:lnTo>
+                <a:lnTo>
+                  <a:pt x="4367495" y="5934227"/>
+                </a:lnTo>
+                <a:lnTo>
+                  <a:pt x="4385480" y="6100191"/>
+                </a:lnTo>
+                <a:lnTo>
+                  <a:pt x="4402457" y="6252438"/>
+                </a:lnTo>
+                <a:lnTo>
+                  <a:pt x="4418594" y="6387541"/>
+                </a:lnTo>
+                <a:lnTo>
+                  <a:pt x="4433890" y="6509613"/>
+                </a:lnTo>
+                <a:lnTo>
+                  <a:pt x="4446665" y="6612483"/>
+                </a:lnTo>
+                <a:lnTo>
+                  <a:pt x="4458767" y="6698894"/>
+                </a:lnTo>
+                <a:lnTo>
+                  <a:pt x="4476081" y="6817538"/>
+                </a:lnTo>
+                <a:lnTo>
+                  <a:pt x="4481964" y="6858000"/>
+                </a:lnTo>
+                <a:lnTo>
+                  <a:pt x="3577807" y="6858000"/>
+                </a:lnTo>
+                <a:lnTo>
+                  <a:pt x="3577807" y="6858000"/>
+                </a:lnTo>
+                <a:lnTo>
+                  <a:pt x="0" y="6858000"/>
+                </a:lnTo>
+                <a:lnTo>
+                  <a:pt x="0" y="0"/>
+                </a:lnTo>
+                <a:lnTo>
+                  <a:pt x="3137249" y="0"/>
+                </a:lnTo>
+                <a:close/>
+              </a:path>
+            </a:pathLst>
+          </a:custGeom>
+          <a:ln>
+            <a:noFill/>
+          </a:ln>
+        </p:spPr>
+        <p:style>
+          <a:lnRef idx="2">
+            <a:schemeClr val="accent1">
+              <a:shade val="50000"/>
+            </a:schemeClr>
+          </a:lnRef>
+          <a:fillRef idx="1">
+            <a:schemeClr val="accent1"/>
+          </a:fillRef>
+          <a:effectRef idx="0">
+            <a:schemeClr val="accent1"/>
+          </a:effectRef>
+          <a:fontRef idx="minor">
+            <a:schemeClr val="lt1"/>
+          </a:fontRef>
+        </p:style>
+        <p:txBody>
+          <a:bodyPr wrap="square" rtlCol="0" anchor="ctr">
+            <a:noAutofit/>
+          </a:bodyPr>
+          <a:lstStyle/>
+          <a:p>
+            <a:pPr algn="ctr"/>
+            <a:endParaRPr lang="en-US"/>
+          </a:p>
+        </p:txBody>
+      </p:sp>
+      <p:sp>
+        <p:nvSpPr>
+          <p:cNvPr id="50" name="Rectangle 49">
+            <a:extLst>
+              <a:ext uri="{FF2B5EF4-FFF2-40B4-BE49-F238E27FC236}">
+                <a16:creationId xmlns:a16="http://schemas.microsoft.com/office/drawing/2014/main" id="{60817A52-B891-4228-A61E-0C0A57632DDA}"/>
+              </a:ext>
+              <a:ext uri="{C183D7F6-B498-43B3-948B-1728B52AA6E4}">
+                <adec:decorative xmlns:adec="http://schemas.microsoft.com/office/drawing/2017/decorative" val="1"/>
+              </a:ext>
+            </a:extLst>
+          </p:cNvPr>
+          <p:cNvSpPr>
+            <a:spLocks noGrp="1" noRot="1" noChangeAspect="1" noMove="1" noResize="1" noEditPoints="1" noAdjustHandles="1" noChangeArrowheads="1" noChangeShapeType="1" noTextEdit="1"/>
+          </p:cNvSpPr>
+          <p:nvPr>
+            <p:extLst>
+              <p:ext uri="{386F3935-93C4-4BCD-93E2-E3B085C9AB24}">
+                <p16:designElem xmlns:p16="http://schemas.microsoft.com/office/powerpoint/2015/main" val="1"/>
+              </p:ext>
+            </p:extLst>
+          </p:nvPr>
+        </p:nvSpPr>
+        <p:spPr>
+          <a:xfrm>
+            <a:off x="10437812" y="0"/>
+            <a:ext cx="685800" cy="1143000"/>
+          </a:xfrm>
+          <a:prstGeom prst="rect">
+            <a:avLst/>
+          </a:prstGeom>
+          <a:solidFill>
+            <a:schemeClr val="accent1"/>
+          </a:solidFill>
+          <a:ln>
+            <a:noFill/>
+          </a:ln>
+        </p:spPr>
+        <p:style>
+          <a:lnRef idx="1">
+            <a:schemeClr val="accent1"/>
+          </a:lnRef>
+          <a:fillRef idx="3">
+            <a:schemeClr val="accent1"/>
+          </a:fillRef>
+          <a:effectRef idx="2">
+            <a:schemeClr val="accent1"/>
+          </a:effectRef>
+          <a:fontRef idx="minor">
+            <a:schemeClr val="lt1"/>
+          </a:fontRef>
+        </p:style>
+      </p:sp>
+      <p:pic>
+        <p:nvPicPr>
+          <p:cNvPr id="3" name="Picture 2">
+            <a:extLst>
+              <a:ext uri="{FF2B5EF4-FFF2-40B4-BE49-F238E27FC236}">
+                <a16:creationId xmlns:a16="http://schemas.microsoft.com/office/drawing/2014/main" id="{D462212E-4436-46EB-B72C-92DBBDE7BDBA}"/>
+              </a:ext>
+            </a:extLst>
+          </p:cNvPr>
+          <p:cNvPicPr>
+            <a:picLocks noChangeAspect="1"/>
+          </p:cNvPicPr>
+          <p:nvPr/>
+        </p:nvPicPr>
+        <p:blipFill>
+          <a:blip r:embed="rId6"/>
+          <a:stretch>
+            <a:fillRect/>
+          </a:stretch>
+        </p:blipFill>
+        <p:spPr>
+          <a:xfrm>
+            <a:off x="647240" y="2394263"/>
+            <a:ext cx="2936836" cy="2298073"/>
+          </a:xfrm>
+          <a:prstGeom prst="rect">
+            <a:avLst/>
+          </a:prstGeom>
+          <a:effectLst/>
+        </p:spPr>
+      </p:pic>
+    </p:spTree>
+    <p:extLst>
+      <p:ext uri="{BB962C8B-B14F-4D97-AF65-F5344CB8AC3E}">
+        <p14:creationId xmlns:p14="http://schemas.microsoft.com/office/powerpoint/2010/main" val="141069696"/>
+      </p:ext>
+    </p:extLst>
+  </p:cSld>
+  <p:clrMapOvr>
+    <a:overrideClrMapping bg1="lt1" tx1="dk1" bg2="lt2" tx2="dk2" accent1="accent1" accent2="accent2" accent3="accent3" accent4="accent4" accent5="accent5" accent6="accent6" hlink="hlink" folHlink="folHlink"/>
+  </p:clrMapOvr>
+</p:sld>
+</file>
+
+<file path=ppt/slides/slide11.xml><?xml version="1.0" encoding="utf-8"?>
+<p:sld xmlns:a="http://schemas.openxmlformats.org/drawingml/2006/main" xmlns:r="http://schemas.openxmlformats.org/officeDocument/2006/relationships" xmlns:p="http://schemas.openxmlformats.org/presentationml/2006/main">
+  <p:cSld>
+    <p:bg>
+      <p:bgPr>
+        <a:solidFill>
+          <a:schemeClr val="bg1"/>
+        </a:solidFill>
+        <a:effectLst/>
+      </p:bgPr>
+    </p:bg>
+    <p:spTree>
+      <p:nvGrpSpPr>
+        <p:cNvPr id="1" name=""/>
+        <p:cNvGrpSpPr/>
+        <p:nvPr/>
+      </p:nvGrpSpPr>
+      <p:grpSpPr>
+        <a:xfrm>
+          <a:off x="0" y="0"/>
+          <a:ext cx="0" cy="0"/>
+          <a:chOff x="0" y="0"/>
+          <a:chExt cx="0" cy="0"/>
+        </a:xfrm>
+      </p:grpSpPr>
       <p:sp>
         <p:nvSpPr>
           <p:cNvPr id="10" name="Rectangle 9">
@@ -17284,7 +18667,7 @@
             <p:ph idx="1"/>
             <p:extLst>
               <p:ext uri="{D42A27DB-BD31-4B8C-83A1-F6EECF244321}">
-                <p14:modId xmlns:p14="http://schemas.microsoft.com/office/powerpoint/2010/main" val="455970718"/>
+                <p14:modId xmlns:p14="http://schemas.microsoft.com/office/powerpoint/2010/main" val="1623340874"/>
               </p:ext>
             </p:extLst>
           </p:nvPr>
@@ -17692,8 +19075,16 @@
           <a:lstStyle/>
           <a:p>
             <a:r>
-              <a:rPr lang="en-US" sz="5400"/>
-              <a:t>What is MonoGame?</a:t>
+              <a:rPr lang="en-US" sz="5400" dirty="0"/>
+              <a:t>What is </a:t>
+            </a:r>
+            <a:r>
+              <a:rPr lang="en-US" sz="5400" dirty="0" err="1"/>
+              <a:t>MonoGame</a:t>
+            </a:r>
+            <a:r>
+              <a:rPr lang="en-US" sz="5400" dirty="0"/>
+              <a:t>?</a:t>
             </a:r>
           </a:p>
         </p:txBody>
@@ -17992,6 +19383,1064 @@
 </file>
 
 <file path=ppt/slides/slide3.xml><?xml version="1.0" encoding="utf-8"?>
+<p:sld xmlns:a="http://schemas.openxmlformats.org/drawingml/2006/main" xmlns:r="http://schemas.openxmlformats.org/officeDocument/2006/relationships" xmlns:p="http://schemas.openxmlformats.org/presentationml/2006/main">
+  <p:cSld>
+    <p:bg>
+      <p:bgPr>
+        <a:solidFill>
+          <a:schemeClr val="bg1"/>
+        </a:solidFill>
+        <a:effectLst/>
+      </p:bgPr>
+    </p:bg>
+    <p:spTree>
+      <p:nvGrpSpPr>
+        <p:cNvPr id="1" name=""/>
+        <p:cNvGrpSpPr/>
+        <p:nvPr/>
+      </p:nvGrpSpPr>
+      <p:grpSpPr>
+        <a:xfrm>
+          <a:off x="0" y="0"/>
+          <a:ext cx="0" cy="0"/>
+          <a:chOff x="0" y="0"/>
+          <a:chExt cx="0" cy="0"/>
+        </a:xfrm>
+      </p:grpSpPr>
+      <p:sp>
+        <p:nvSpPr>
+          <p:cNvPr id="71" name="Rectangle 70">
+            <a:extLst>
+              <a:ext uri="{FF2B5EF4-FFF2-40B4-BE49-F238E27FC236}">
+                <a16:creationId xmlns:a16="http://schemas.microsoft.com/office/drawing/2014/main" id="{B4AAD3FD-83A5-4B89-9F8F-01B8870865BE}"/>
+              </a:ext>
+              <a:ext uri="{C183D7F6-B498-43B3-948B-1728B52AA6E4}">
+                <adec:decorative xmlns:adec="http://schemas.microsoft.com/office/drawing/2017/decorative" val="1"/>
+              </a:ext>
+            </a:extLst>
+          </p:cNvPr>
+          <p:cNvSpPr>
+            <a:spLocks noGrp="1" noRot="1" noChangeAspect="1" noMove="1" noResize="1" noEditPoints="1" noAdjustHandles="1" noChangeArrowheads="1" noChangeShapeType="1" noTextEdit="1"/>
+          </p:cNvSpPr>
+          <p:nvPr>
+            <p:extLst>
+              <p:ext uri="{386F3935-93C4-4BCD-93E2-E3B085C9AB24}">
+                <p16:designElem xmlns:p16="http://schemas.microsoft.com/office/powerpoint/2015/main" val="1"/>
+              </p:ext>
+            </p:extLst>
+          </p:nvPr>
+        </p:nvSpPr>
+        <p:spPr>
+          <a:xfrm>
+            <a:off x="0" y="0"/>
+            <a:ext cx="12192000" cy="6858000"/>
+          </a:xfrm>
+          <a:prstGeom prst="rect">
+            <a:avLst/>
+          </a:prstGeom>
+          <a:ln>
+            <a:noFill/>
+          </a:ln>
+        </p:spPr>
+        <p:style>
+          <a:lnRef idx="2">
+            <a:schemeClr val="accent1">
+              <a:shade val="50000"/>
+            </a:schemeClr>
+          </a:lnRef>
+          <a:fillRef idx="1003">
+            <a:schemeClr val="dk2"/>
+          </a:fillRef>
+          <a:effectRef idx="0">
+            <a:schemeClr val="accent1"/>
+          </a:effectRef>
+          <a:fontRef idx="minor">
+            <a:schemeClr val="lt1"/>
+          </a:fontRef>
+        </p:style>
+        <p:txBody>
+          <a:bodyPr rtlCol="0" anchor="ctr"/>
+          <a:lstStyle/>
+          <a:p>
+            <a:pPr algn="ctr"/>
+            <a:endParaRPr lang="en-US"/>
+          </a:p>
+        </p:txBody>
+      </p:sp>
+      <p:sp>
+        <p:nvSpPr>
+          <p:cNvPr id="8" name="Title 1">
+            <a:extLst>
+              <a:ext uri="{FF2B5EF4-FFF2-40B4-BE49-F238E27FC236}">
+                <a16:creationId xmlns:a16="http://schemas.microsoft.com/office/drawing/2014/main" id="{D1EB2081-2D87-48C5-8616-854BEAFEC1F4}"/>
+              </a:ext>
+            </a:extLst>
+          </p:cNvPr>
+          <p:cNvSpPr>
+            <a:spLocks noGrp="1"/>
+          </p:cNvSpPr>
+          <p:nvPr>
+            <p:ph type="title"/>
+          </p:nvPr>
+        </p:nvSpPr>
+        <p:spPr>
+          <a:xfrm>
+            <a:off x="648931" y="629266"/>
+            <a:ext cx="4166510" cy="1622321"/>
+          </a:xfrm>
+        </p:spPr>
+        <p:txBody>
+          <a:bodyPr vert="horz" lIns="91440" tIns="45720" rIns="91440" bIns="45720" rtlCol="0" anchor="t">
+            <a:normAutofit/>
+          </a:bodyPr>
+          <a:lstStyle/>
+          <a:p>
+            <a:r>
+              <a:rPr lang="en-US" b="0" i="0" kern="1200">
+                <a:solidFill>
+                  <a:srgbClr val="EBEBEB"/>
+                </a:solidFill>
+                <a:latin typeface="+mj-lt"/>
+                <a:ea typeface="+mj-ea"/>
+                <a:cs typeface="+mj-cs"/>
+              </a:rPr>
+              <a:t>How does Unity compare?</a:t>
+            </a:r>
+          </a:p>
+        </p:txBody>
+      </p:sp>
+      <p:sp>
+        <p:nvSpPr>
+          <p:cNvPr id="7" name="TextBox 6">
+            <a:extLst>
+              <a:ext uri="{FF2B5EF4-FFF2-40B4-BE49-F238E27FC236}">
+                <a16:creationId xmlns:a16="http://schemas.microsoft.com/office/drawing/2014/main" id="{E85AF6B9-BC58-498D-81BE-127E9A142CF0}"/>
+              </a:ext>
+            </a:extLst>
+          </p:cNvPr>
+          <p:cNvSpPr txBox="1"/>
+          <p:nvPr/>
+        </p:nvSpPr>
+        <p:spPr>
+          <a:xfrm>
+            <a:off x="648931" y="2438400"/>
+            <a:ext cx="4166509" cy="3785419"/>
+          </a:xfrm>
+          <a:prstGeom prst="rect">
+            <a:avLst/>
+          </a:prstGeom>
+        </p:spPr>
+        <p:txBody>
+          <a:bodyPr vert="horz" lIns="91440" tIns="45720" rIns="91440" bIns="45720" rtlCol="0">
+            <a:normAutofit/>
+          </a:bodyPr>
+          <a:lstStyle/>
+          <a:p>
+            <a:pPr marL="285750" indent="-285750">
+              <a:lnSpc>
+                <a:spcPct val="90000"/>
+              </a:lnSpc>
+              <a:spcBef>
+                <a:spcPts val="1000"/>
+              </a:spcBef>
+              <a:buClr>
+                <a:schemeClr val="bg2">
+                  <a:lumMod val="40000"/>
+                  <a:lumOff val="60000"/>
+                </a:schemeClr>
+              </a:buClr>
+              <a:buSzPct val="80000"/>
+              <a:buFont typeface="Wingdings 3" charset="2"/>
+              <a:buChar char=""/>
+            </a:pPr>
+            <a:r>
+              <a:rPr lang="en-US">
+                <a:solidFill>
+                  <a:srgbClr val="EBEBEB"/>
+                </a:solidFill>
+                <a:latin typeface="+mj-lt"/>
+                <a:ea typeface="+mj-ea"/>
+                <a:cs typeface="+mj-cs"/>
+              </a:rPr>
+              <a:t>Unity offers a ready to go engine for 2D or 3D</a:t>
+            </a:r>
+          </a:p>
+          <a:p>
+            <a:pPr marL="742950" lvl="1" indent="-285750">
+              <a:lnSpc>
+                <a:spcPct val="90000"/>
+              </a:lnSpc>
+              <a:spcBef>
+                <a:spcPts val="1000"/>
+              </a:spcBef>
+              <a:buClr>
+                <a:schemeClr val="bg2">
+                  <a:lumMod val="40000"/>
+                  <a:lumOff val="60000"/>
+                </a:schemeClr>
+              </a:buClr>
+              <a:buSzPct val="80000"/>
+              <a:buFont typeface="Wingdings 3" charset="2"/>
+              <a:buChar char=""/>
+            </a:pPr>
+            <a:r>
+              <a:rPr lang="en-US">
+                <a:solidFill>
+                  <a:srgbClr val="EBEBEB"/>
+                </a:solidFill>
+                <a:latin typeface="+mj-lt"/>
+                <a:ea typeface="+mj-ea"/>
+                <a:cs typeface="+mj-cs"/>
+              </a:rPr>
+              <a:t>Complexities of 2D might supersede MonoGame depending on the game</a:t>
+            </a:r>
+          </a:p>
+          <a:p>
+            <a:pPr marL="285750" indent="-285750">
+              <a:lnSpc>
+                <a:spcPct val="90000"/>
+              </a:lnSpc>
+              <a:spcBef>
+                <a:spcPts val="1000"/>
+              </a:spcBef>
+              <a:buClr>
+                <a:schemeClr val="bg2">
+                  <a:lumMod val="40000"/>
+                  <a:lumOff val="60000"/>
+                </a:schemeClr>
+              </a:buClr>
+              <a:buSzPct val="80000"/>
+              <a:buFont typeface="Wingdings 3" charset="2"/>
+              <a:buChar char=""/>
+            </a:pPr>
+            <a:r>
+              <a:rPr lang="en-US">
+                <a:solidFill>
+                  <a:srgbClr val="EBEBEB"/>
+                </a:solidFill>
+                <a:latin typeface="+mj-lt"/>
+                <a:ea typeface="+mj-ea"/>
+                <a:cs typeface="+mj-cs"/>
+              </a:rPr>
+              <a:t>Documentation, Examples and Assets are plentiful</a:t>
+            </a:r>
+          </a:p>
+          <a:p>
+            <a:pPr marL="742950" lvl="1" indent="-285750">
+              <a:lnSpc>
+                <a:spcPct val="90000"/>
+              </a:lnSpc>
+              <a:spcBef>
+                <a:spcPts val="1000"/>
+              </a:spcBef>
+              <a:buClr>
+                <a:schemeClr val="bg2">
+                  <a:lumMod val="40000"/>
+                  <a:lumOff val="60000"/>
+                </a:schemeClr>
+              </a:buClr>
+              <a:buSzPct val="80000"/>
+              <a:buFont typeface="Wingdings 3" charset="2"/>
+              <a:buChar char=""/>
+            </a:pPr>
+            <a:r>
+              <a:rPr lang="en-US">
+                <a:solidFill>
+                  <a:srgbClr val="EBEBEB"/>
+                </a:solidFill>
+                <a:latin typeface="+mj-lt"/>
+                <a:ea typeface="+mj-ea"/>
+                <a:cs typeface="+mj-cs"/>
+              </a:rPr>
+              <a:t>MonoGame is lacking in this regard</a:t>
+            </a:r>
+          </a:p>
+          <a:p>
+            <a:pPr marL="285750" indent="-285750">
+              <a:lnSpc>
+                <a:spcPct val="90000"/>
+              </a:lnSpc>
+              <a:spcBef>
+                <a:spcPts val="1000"/>
+              </a:spcBef>
+              <a:buClr>
+                <a:schemeClr val="bg2">
+                  <a:lumMod val="40000"/>
+                  <a:lumOff val="60000"/>
+                </a:schemeClr>
+              </a:buClr>
+              <a:buSzPct val="80000"/>
+              <a:buFont typeface="Wingdings 3" charset="2"/>
+              <a:buChar char=""/>
+            </a:pPr>
+            <a:r>
+              <a:rPr lang="en-US">
+                <a:solidFill>
+                  <a:srgbClr val="EBEBEB"/>
+                </a:solidFill>
+                <a:latin typeface="+mj-lt"/>
+                <a:ea typeface="+mj-ea"/>
+                <a:cs typeface="+mj-cs"/>
+              </a:rPr>
+              <a:t>Licensing Model is Free up to 100k</a:t>
+            </a:r>
+          </a:p>
+          <a:p>
+            <a:pPr marL="742950" lvl="1" indent="-285750">
+              <a:lnSpc>
+                <a:spcPct val="90000"/>
+              </a:lnSpc>
+              <a:spcBef>
+                <a:spcPts val="1000"/>
+              </a:spcBef>
+              <a:buClr>
+                <a:schemeClr val="bg2">
+                  <a:lumMod val="40000"/>
+                  <a:lumOff val="60000"/>
+                </a:schemeClr>
+              </a:buClr>
+              <a:buSzPct val="80000"/>
+              <a:buFont typeface="Wingdings 3" charset="2"/>
+              <a:buChar char=""/>
+            </a:pPr>
+            <a:r>
+              <a:rPr lang="en-US">
+                <a:solidFill>
+                  <a:srgbClr val="EBEBEB"/>
+                </a:solidFill>
+                <a:latin typeface="+mj-lt"/>
+                <a:ea typeface="+mj-ea"/>
+                <a:cs typeface="+mj-cs"/>
+              </a:rPr>
+              <a:t>MonoGame is MIT License</a:t>
+            </a:r>
+          </a:p>
+        </p:txBody>
+      </p:sp>
+      <p:sp>
+        <p:nvSpPr>
+          <p:cNvPr id="73" name="Freeform 31">
+            <a:extLst>
+              <a:ext uri="{FF2B5EF4-FFF2-40B4-BE49-F238E27FC236}">
+                <a16:creationId xmlns:a16="http://schemas.microsoft.com/office/drawing/2014/main" id="{61752F1D-FC0F-4103-9584-630E643CCDA6}"/>
+              </a:ext>
+              <a:ext uri="{C183D7F6-B498-43B3-948B-1728B52AA6E4}">
+                <adec:decorative xmlns:adec="http://schemas.microsoft.com/office/drawing/2017/decorative" val="1"/>
+              </a:ext>
+            </a:extLst>
+          </p:cNvPr>
+          <p:cNvSpPr>
+            <a:spLocks noGrp="1" noRot="1" noChangeAspect="1" noMove="1" noResize="1" noEditPoints="1" noAdjustHandles="1" noChangeArrowheads="1" noChangeShapeType="1" noTextEdit="1"/>
+          </p:cNvSpPr>
+          <p:nvPr>
+            <p:extLst>
+              <p:ext uri="{386F3935-93C4-4BCD-93E2-E3B085C9AB24}">
+                <p16:designElem xmlns:p16="http://schemas.microsoft.com/office/powerpoint/2015/main" val="1"/>
+              </p:ext>
+            </p:extLst>
+          </p:nvPr>
+        </p:nvSpPr>
+        <p:spPr>
+          <a:xfrm>
+            <a:off x="4994020" y="-1"/>
+            <a:ext cx="559472" cy="3709642"/>
+          </a:xfrm>
+          <a:custGeom>
+            <a:avLst/>
+            <a:gdLst>
+              <a:gd name="connsiteX0" fmla="*/ 0 w 559472"/>
+              <a:gd name="connsiteY0" fmla="*/ 0 h 3709642"/>
+              <a:gd name="connsiteX1" fmla="*/ 473952 w 559472"/>
+              <a:gd name="connsiteY1" fmla="*/ 0 h 3709642"/>
+              <a:gd name="connsiteX2" fmla="*/ 485840 w 559472"/>
+              <a:gd name="connsiteY2" fmla="*/ 161194 h 3709642"/>
+              <a:gd name="connsiteX3" fmla="*/ 523949 w 559472"/>
+              <a:gd name="connsiteY3" fmla="*/ 3672197 h 3709642"/>
+              <a:gd name="connsiteX4" fmla="*/ 454748 w 559472"/>
+              <a:gd name="connsiteY4" fmla="*/ 3709642 h 3709642"/>
+              <a:gd name="connsiteX5" fmla="*/ 448224 w 559472"/>
+              <a:gd name="connsiteY5" fmla="*/ 3510471 h 3709642"/>
+              <a:gd name="connsiteX6" fmla="*/ 443564 w 559472"/>
+              <a:gd name="connsiteY6" fmla="*/ 3408563 h 3709642"/>
+              <a:gd name="connsiteX7" fmla="*/ 438902 w 559472"/>
+              <a:gd name="connsiteY7" fmla="*/ 3304407 h 3709642"/>
+              <a:gd name="connsiteX8" fmla="*/ 433941 w 559472"/>
+              <a:gd name="connsiteY8" fmla="*/ 3198777 h 3709642"/>
+              <a:gd name="connsiteX9" fmla="*/ 427584 w 559472"/>
+              <a:gd name="connsiteY9" fmla="*/ 3092510 h 3709642"/>
+              <a:gd name="connsiteX10" fmla="*/ 420988 w 559472"/>
+              <a:gd name="connsiteY10" fmla="*/ 2984390 h 3709642"/>
+              <a:gd name="connsiteX11" fmla="*/ 414330 w 559472"/>
+              <a:gd name="connsiteY11" fmla="*/ 2874401 h 3709642"/>
+              <a:gd name="connsiteX12" fmla="*/ 406840 w 559472"/>
+              <a:gd name="connsiteY12" fmla="*/ 2762980 h 3709642"/>
+              <a:gd name="connsiteX13" fmla="*/ 397745 w 559472"/>
+              <a:gd name="connsiteY13" fmla="*/ 2650566 h 3709642"/>
+              <a:gd name="connsiteX14" fmla="*/ 389154 w 559472"/>
+              <a:gd name="connsiteY14" fmla="*/ 2536612 h 3709642"/>
+              <a:gd name="connsiteX15" fmla="*/ 379225 w 559472"/>
+              <a:gd name="connsiteY15" fmla="*/ 2421642 h 3709642"/>
+              <a:gd name="connsiteX16" fmla="*/ 368316 w 559472"/>
+              <a:gd name="connsiteY16" fmla="*/ 2305627 h 3709642"/>
+              <a:gd name="connsiteX17" fmla="*/ 357466 w 559472"/>
+              <a:gd name="connsiteY17" fmla="*/ 2189233 h 3709642"/>
+              <a:gd name="connsiteX18" fmla="*/ 344982 w 559472"/>
+              <a:gd name="connsiteY18" fmla="*/ 2071473 h 3709642"/>
+              <a:gd name="connsiteX19" fmla="*/ 332466 w 559472"/>
+              <a:gd name="connsiteY19" fmla="*/ 1952216 h 3709642"/>
+              <a:gd name="connsiteX20" fmla="*/ 319121 w 559472"/>
+              <a:gd name="connsiteY20" fmla="*/ 1833776 h 3709642"/>
+              <a:gd name="connsiteX21" fmla="*/ 304408 w 559472"/>
+              <a:gd name="connsiteY21" fmla="*/ 1713948 h 3709642"/>
+              <a:gd name="connsiteX22" fmla="*/ 288685 w 559472"/>
+              <a:gd name="connsiteY22" fmla="*/ 1592703 h 3709642"/>
+              <a:gd name="connsiteX23" fmla="*/ 273050 w 559472"/>
+              <a:gd name="connsiteY23" fmla="*/ 1471451 h 3709642"/>
+              <a:gd name="connsiteX24" fmla="*/ 255813 w 559472"/>
+              <a:gd name="connsiteY24" fmla="*/ 1350328 h 3709642"/>
+              <a:gd name="connsiteX25" fmla="*/ 237060 w 559472"/>
+              <a:gd name="connsiteY25" fmla="*/ 1227080 h 3709642"/>
+              <a:gd name="connsiteX26" fmla="*/ 218488 w 559472"/>
+              <a:gd name="connsiteY26" fmla="*/ 1106065 h 3709642"/>
+              <a:gd name="connsiteX27" fmla="*/ 198221 w 559472"/>
+              <a:gd name="connsiteY27" fmla="*/ 982940 h 3709642"/>
+              <a:gd name="connsiteX28" fmla="*/ 177152 w 559472"/>
+              <a:gd name="connsiteY28" fmla="*/ 858755 h 3709642"/>
+              <a:gd name="connsiteX29" fmla="*/ 155551 w 559472"/>
+              <a:gd name="connsiteY29" fmla="*/ 736861 h 3709642"/>
+              <a:gd name="connsiteX30" fmla="*/ 131782 w 559472"/>
+              <a:gd name="connsiteY30" fmla="*/ 613645 h 3709642"/>
+              <a:gd name="connsiteX31" fmla="*/ 107123 w 559472"/>
+              <a:gd name="connsiteY31" fmla="*/ 490500 h 3709642"/>
+              <a:gd name="connsiteX32" fmla="*/ 82552 w 559472"/>
+              <a:gd name="connsiteY32" fmla="*/ 367348 h 3709642"/>
+              <a:gd name="connsiteX33" fmla="*/ 55608 w 559472"/>
+              <a:gd name="connsiteY33" fmla="*/ 244762 h 3709642"/>
+              <a:gd name="connsiteX34" fmla="*/ 28130 w 559472"/>
+              <a:gd name="connsiteY34" fmla="*/ 122220 h 3709642"/>
+              <a:gd name="connsiteX35" fmla="*/ 0 w 559472"/>
+              <a:gd name="connsiteY35" fmla="*/ 0 h 3709642"/>
+            </a:gdLst>
+            <a:ahLst/>
+            <a:cxnLst>
+              <a:cxn ang="0">
+                <a:pos x="connsiteX0" y="connsiteY0"/>
+              </a:cxn>
+              <a:cxn ang="0">
+                <a:pos x="connsiteX1" y="connsiteY1"/>
+              </a:cxn>
+              <a:cxn ang="0">
+                <a:pos x="connsiteX2" y="connsiteY2"/>
+              </a:cxn>
+              <a:cxn ang="0">
+                <a:pos x="connsiteX3" y="connsiteY3"/>
+              </a:cxn>
+              <a:cxn ang="0">
+                <a:pos x="connsiteX4" y="connsiteY4"/>
+              </a:cxn>
+              <a:cxn ang="0">
+                <a:pos x="connsiteX5" y="connsiteY5"/>
+              </a:cxn>
+              <a:cxn ang="0">
+                <a:pos x="connsiteX6" y="connsiteY6"/>
+              </a:cxn>
+              <a:cxn ang="0">
+                <a:pos x="connsiteX7" y="connsiteY7"/>
+              </a:cxn>
+              <a:cxn ang="0">
+                <a:pos x="connsiteX8" y="connsiteY8"/>
+              </a:cxn>
+              <a:cxn ang="0">
+                <a:pos x="connsiteX9" y="connsiteY9"/>
+              </a:cxn>
+              <a:cxn ang="0">
+                <a:pos x="connsiteX10" y="connsiteY10"/>
+              </a:cxn>
+              <a:cxn ang="0">
+                <a:pos x="connsiteX11" y="connsiteY11"/>
+              </a:cxn>
+              <a:cxn ang="0">
+                <a:pos x="connsiteX12" y="connsiteY12"/>
+              </a:cxn>
+              <a:cxn ang="0">
+                <a:pos x="connsiteX13" y="connsiteY13"/>
+              </a:cxn>
+              <a:cxn ang="0">
+                <a:pos x="connsiteX14" y="connsiteY14"/>
+              </a:cxn>
+              <a:cxn ang="0">
+                <a:pos x="connsiteX15" y="connsiteY15"/>
+              </a:cxn>
+              <a:cxn ang="0">
+                <a:pos x="connsiteX16" y="connsiteY16"/>
+              </a:cxn>
+              <a:cxn ang="0">
+                <a:pos x="connsiteX17" y="connsiteY17"/>
+              </a:cxn>
+              <a:cxn ang="0">
+                <a:pos x="connsiteX18" y="connsiteY18"/>
+              </a:cxn>
+              <a:cxn ang="0">
+                <a:pos x="connsiteX19" y="connsiteY19"/>
+              </a:cxn>
+              <a:cxn ang="0">
+                <a:pos x="connsiteX20" y="connsiteY20"/>
+              </a:cxn>
+              <a:cxn ang="0">
+                <a:pos x="connsiteX21" y="connsiteY21"/>
+              </a:cxn>
+              <a:cxn ang="0">
+                <a:pos x="connsiteX22" y="connsiteY22"/>
+              </a:cxn>
+              <a:cxn ang="0">
+                <a:pos x="connsiteX23" y="connsiteY23"/>
+              </a:cxn>
+              <a:cxn ang="0">
+                <a:pos x="connsiteX24" y="connsiteY24"/>
+              </a:cxn>
+              <a:cxn ang="0">
+                <a:pos x="connsiteX25" y="connsiteY25"/>
+              </a:cxn>
+              <a:cxn ang="0">
+                <a:pos x="connsiteX26" y="connsiteY26"/>
+              </a:cxn>
+              <a:cxn ang="0">
+                <a:pos x="connsiteX27" y="connsiteY27"/>
+              </a:cxn>
+              <a:cxn ang="0">
+                <a:pos x="connsiteX28" y="connsiteY28"/>
+              </a:cxn>
+              <a:cxn ang="0">
+                <a:pos x="connsiteX29" y="connsiteY29"/>
+              </a:cxn>
+              <a:cxn ang="0">
+                <a:pos x="connsiteX30" y="connsiteY30"/>
+              </a:cxn>
+              <a:cxn ang="0">
+                <a:pos x="connsiteX31" y="connsiteY31"/>
+              </a:cxn>
+              <a:cxn ang="0">
+                <a:pos x="connsiteX32" y="connsiteY32"/>
+              </a:cxn>
+              <a:cxn ang="0">
+                <a:pos x="connsiteX33" y="connsiteY33"/>
+              </a:cxn>
+              <a:cxn ang="0">
+                <a:pos x="connsiteX34" y="connsiteY34"/>
+              </a:cxn>
+              <a:cxn ang="0">
+                <a:pos x="connsiteX35" y="connsiteY35"/>
+              </a:cxn>
+            </a:cxnLst>
+            <a:rect l="l" t="t" r="r" b="b"/>
+            <a:pathLst>
+              <a:path w="559472" h="3709642">
+                <a:moveTo>
+                  <a:pt x="0" y="0"/>
+                </a:moveTo>
+                <a:lnTo>
+                  <a:pt x="473952" y="0"/>
+                </a:lnTo>
+                <a:lnTo>
+                  <a:pt x="485840" y="161194"/>
+                </a:lnTo>
+                <a:cubicBezTo>
+                  <a:pt x="552063" y="1147770"/>
+                  <a:pt x="592441" y="3086737"/>
+                  <a:pt x="523949" y="3672197"/>
+                </a:cubicBezTo>
+                <a:cubicBezTo>
+                  <a:pt x="500842" y="3684557"/>
+                  <a:pt x="477855" y="3697282"/>
+                  <a:pt x="454748" y="3709642"/>
+                </a:cubicBezTo>
+                <a:lnTo>
+                  <a:pt x="448224" y="3510471"/>
+                </a:lnTo>
+                <a:lnTo>
+                  <a:pt x="443564" y="3408563"/>
+                </a:lnTo>
+                <a:lnTo>
+                  <a:pt x="438902" y="3304407"/>
+                </a:lnTo>
+                <a:lnTo>
+                  <a:pt x="433941" y="3198777"/>
+                </a:lnTo>
+                <a:lnTo>
+                  <a:pt x="427584" y="3092510"/>
+                </a:lnTo>
+                <a:lnTo>
+                  <a:pt x="420988" y="2984390"/>
+                </a:lnTo>
+                <a:lnTo>
+                  <a:pt x="414330" y="2874401"/>
+                </a:lnTo>
+                <a:lnTo>
+                  <a:pt x="406840" y="2762980"/>
+                </a:lnTo>
+                <a:lnTo>
+                  <a:pt x="397745" y="2650566"/>
+                </a:lnTo>
+                <a:lnTo>
+                  <a:pt x="389154" y="2536612"/>
+                </a:lnTo>
+                <a:lnTo>
+                  <a:pt x="379225" y="2421642"/>
+                </a:lnTo>
+                <a:lnTo>
+                  <a:pt x="368316" y="2305627"/>
+                </a:lnTo>
+                <a:lnTo>
+                  <a:pt x="357466" y="2189233"/>
+                </a:lnTo>
+                <a:lnTo>
+                  <a:pt x="344982" y="2071473"/>
+                </a:lnTo>
+                <a:lnTo>
+                  <a:pt x="332466" y="1952216"/>
+                </a:lnTo>
+                <a:lnTo>
+                  <a:pt x="319121" y="1833776"/>
+                </a:lnTo>
+                <a:lnTo>
+                  <a:pt x="304408" y="1713948"/>
+                </a:lnTo>
+                <a:lnTo>
+                  <a:pt x="288685" y="1592703"/>
+                </a:lnTo>
+                <a:lnTo>
+                  <a:pt x="273050" y="1471451"/>
+                </a:lnTo>
+                <a:lnTo>
+                  <a:pt x="255813" y="1350328"/>
+                </a:lnTo>
+                <a:lnTo>
+                  <a:pt x="237060" y="1227080"/>
+                </a:lnTo>
+                <a:lnTo>
+                  <a:pt x="218488" y="1106065"/>
+                </a:lnTo>
+                <a:lnTo>
+                  <a:pt x="198221" y="982940"/>
+                </a:lnTo>
+                <a:lnTo>
+                  <a:pt x="177152" y="858755"/>
+                </a:lnTo>
+                <a:lnTo>
+                  <a:pt x="155551" y="736861"/>
+                </a:lnTo>
+                <a:lnTo>
+                  <a:pt x="131782" y="613645"/>
+                </a:lnTo>
+                <a:lnTo>
+                  <a:pt x="107123" y="490500"/>
+                </a:lnTo>
+                <a:lnTo>
+                  <a:pt x="82552" y="367348"/>
+                </a:lnTo>
+                <a:lnTo>
+                  <a:pt x="55608" y="244762"/>
+                </a:lnTo>
+                <a:lnTo>
+                  <a:pt x="28130" y="122220"/>
+                </a:lnTo>
+                <a:lnTo>
+                  <a:pt x="0" y="0"/>
+                </a:lnTo>
+                <a:close/>
+              </a:path>
+            </a:pathLst>
+          </a:custGeom>
+          <a:solidFill>
+            <a:schemeClr val="bg1">
+              <a:alpha val="20000"/>
+            </a:schemeClr>
+          </a:solidFill>
+          <a:ln>
+            <a:noFill/>
+          </a:ln>
+        </p:spPr>
+        <p:txBody>
+          <a:bodyPr rtlCol="0" anchor="ctr"/>
+          <a:lstStyle/>
+          <a:p>
+            <a:pPr algn="ctr"/>
+            <a:endParaRPr lang="en-US"/>
+          </a:p>
+        </p:txBody>
+      </p:sp>
+      <p:sp useBgFill="1">
+        <p:nvSpPr>
+          <p:cNvPr id="75" name="Rectangle 74">
+            <a:extLst>
+              <a:ext uri="{FF2B5EF4-FFF2-40B4-BE49-F238E27FC236}">
+                <a16:creationId xmlns:a16="http://schemas.microsoft.com/office/drawing/2014/main" id="{126C04EF-6428-472D-B316-74A19385B08F}"/>
+              </a:ext>
+              <a:ext uri="{C183D7F6-B498-43B3-948B-1728B52AA6E4}">
+                <adec:decorative xmlns:adec="http://schemas.microsoft.com/office/drawing/2017/decorative" val="1"/>
+              </a:ext>
+            </a:extLst>
+          </p:cNvPr>
+          <p:cNvSpPr>
+            <a:spLocks noGrp="1" noRot="1" noChangeAspect="1" noMove="1" noResize="1" noEditPoints="1" noAdjustHandles="1" noChangeArrowheads="1" noChangeShapeType="1" noTextEdit="1"/>
+          </p:cNvSpPr>
+          <p:nvPr>
+            <p:extLst>
+              <p:ext uri="{386F3935-93C4-4BCD-93E2-E3B085C9AB24}">
+                <p16:designElem xmlns:p16="http://schemas.microsoft.com/office/powerpoint/2015/main" val="1"/>
+              </p:ext>
+            </p:extLst>
+          </p:nvPr>
+        </p:nvSpPr>
+        <p:spPr>
+          <a:xfrm>
+            <a:off x="6093992" y="0"/>
+            <a:ext cx="6098427" cy="6858000"/>
+          </a:xfrm>
+          <a:prstGeom prst="rect">
+            <a:avLst/>
+          </a:prstGeom>
+          <a:ln>
+            <a:noFill/>
+          </a:ln>
+        </p:spPr>
+        <p:style>
+          <a:lnRef idx="2">
+            <a:schemeClr val="accent1">
+              <a:shade val="50000"/>
+            </a:schemeClr>
+          </a:lnRef>
+          <a:fillRef idx="1">
+            <a:schemeClr val="accent1"/>
+          </a:fillRef>
+          <a:effectRef idx="0">
+            <a:schemeClr val="accent1"/>
+          </a:effectRef>
+          <a:fontRef idx="minor">
+            <a:schemeClr val="lt1"/>
+          </a:fontRef>
+        </p:style>
+        <p:txBody>
+          <a:bodyPr rtlCol="0" anchor="ctr"/>
+          <a:lstStyle/>
+          <a:p>
+            <a:pPr algn="ctr"/>
+            <a:endParaRPr lang="en-US"/>
+          </a:p>
+        </p:txBody>
+      </p:sp>
+      <p:sp useBgFill="1">
+        <p:nvSpPr>
+          <p:cNvPr id="77" name="Freeform 5">
+            <a:extLst>
+              <a:ext uri="{FF2B5EF4-FFF2-40B4-BE49-F238E27FC236}">
+                <a16:creationId xmlns:a16="http://schemas.microsoft.com/office/drawing/2014/main" id="{AE50896D-AACB-4C0A-855D-ECEFB4A0DA9A}"/>
+              </a:ext>
+              <a:ext uri="{C183D7F6-B498-43B3-948B-1728B52AA6E4}">
+                <adec:decorative xmlns:adec="http://schemas.microsoft.com/office/drawing/2017/decorative" val="1"/>
+              </a:ext>
+            </a:extLst>
+          </p:cNvPr>
+          <p:cNvSpPr>
+            <a:spLocks noGrp="1" noRot="1" noChangeAspect="1" noMove="1" noResize="1" noEditPoints="1" noAdjustHandles="1" noChangeArrowheads="1" noChangeShapeType="1" noTextEdit="1"/>
+          </p:cNvSpPr>
+          <p:nvPr>
+            <p:extLst>
+              <p:ext uri="{386F3935-93C4-4BCD-93E2-E3B085C9AB24}">
+                <p16:designElem xmlns:p16="http://schemas.microsoft.com/office/powerpoint/2015/main" val="1"/>
+              </p:ext>
+            </p:extLst>
+          </p:nvPr>
+        </p:nvSpPr>
+        <p:spPr bwMode="gray">
+          <a:xfrm rot="16200000">
+            <a:off x="2450577" y="2756642"/>
+            <a:ext cx="6858000" cy="1344715"/>
+          </a:xfrm>
+          <a:custGeom>
+            <a:avLst/>
+            <a:gdLst/>
+            <a:ahLst/>
+            <a:cxnLst/>
+            <a:rect l="l" t="t" r="r" b="b"/>
+            <a:pathLst>
+              <a:path w="10000" h="8000">
+                <a:moveTo>
+                  <a:pt x="0" y="0"/>
+                </a:moveTo>
+                <a:lnTo>
+                  <a:pt x="0" y="7970"/>
+                </a:lnTo>
+                <a:lnTo>
+                  <a:pt x="10000" y="8000"/>
+                </a:lnTo>
+                <a:lnTo>
+                  <a:pt x="10000" y="7"/>
+                </a:lnTo>
+                <a:lnTo>
+                  <a:pt x="10000" y="7"/>
+                </a:lnTo>
+                <a:lnTo>
+                  <a:pt x="9773" y="156"/>
+                </a:lnTo>
+                <a:lnTo>
+                  <a:pt x="9547" y="298"/>
+                </a:lnTo>
+                <a:lnTo>
+                  <a:pt x="9320" y="437"/>
+                </a:lnTo>
+                <a:lnTo>
+                  <a:pt x="9092" y="556"/>
+                </a:lnTo>
+                <a:lnTo>
+                  <a:pt x="8865" y="676"/>
+                </a:lnTo>
+                <a:lnTo>
+                  <a:pt x="8637" y="788"/>
+                </a:lnTo>
+                <a:lnTo>
+                  <a:pt x="8412" y="884"/>
+                </a:lnTo>
+                <a:lnTo>
+                  <a:pt x="8184" y="975"/>
+                </a:lnTo>
+                <a:lnTo>
+                  <a:pt x="7957" y="1058"/>
+                </a:lnTo>
+                <a:lnTo>
+                  <a:pt x="7734" y="1130"/>
+                </a:lnTo>
+                <a:lnTo>
+                  <a:pt x="7508" y="1202"/>
+                </a:lnTo>
+                <a:lnTo>
+                  <a:pt x="7285" y="1262"/>
+                </a:lnTo>
+                <a:lnTo>
+                  <a:pt x="7062" y="1309"/>
+                </a:lnTo>
+                <a:lnTo>
+                  <a:pt x="6840" y="1358"/>
+                </a:lnTo>
+                <a:lnTo>
+                  <a:pt x="6620" y="1399"/>
+                </a:lnTo>
+                <a:lnTo>
+                  <a:pt x="6402" y="1428"/>
+                </a:lnTo>
+                <a:lnTo>
+                  <a:pt x="6184" y="1453"/>
+                </a:lnTo>
+                <a:lnTo>
+                  <a:pt x="5968" y="1477"/>
+                </a:lnTo>
+                <a:lnTo>
+                  <a:pt x="5755" y="1488"/>
+                </a:lnTo>
+                <a:lnTo>
+                  <a:pt x="5542" y="1500"/>
+                </a:lnTo>
+                <a:lnTo>
+                  <a:pt x="5332" y="1506"/>
+                </a:lnTo>
+                <a:lnTo>
+                  <a:pt x="5124" y="1500"/>
+                </a:lnTo>
+                <a:lnTo>
+                  <a:pt x="4918" y="1500"/>
+                </a:lnTo>
+                <a:lnTo>
+                  <a:pt x="4714" y="1488"/>
+                </a:lnTo>
+                <a:lnTo>
+                  <a:pt x="4514" y="1470"/>
+                </a:lnTo>
+                <a:lnTo>
+                  <a:pt x="4316" y="1453"/>
+                </a:lnTo>
+                <a:lnTo>
+                  <a:pt x="4122" y="1434"/>
+                </a:lnTo>
+                <a:lnTo>
+                  <a:pt x="3929" y="1405"/>
+                </a:lnTo>
+                <a:lnTo>
+                  <a:pt x="3739" y="1374"/>
+                </a:lnTo>
+                <a:lnTo>
+                  <a:pt x="3553" y="1346"/>
+                </a:lnTo>
+                <a:lnTo>
+                  <a:pt x="3190" y="1267"/>
+                </a:lnTo>
+                <a:lnTo>
+                  <a:pt x="2842" y="1183"/>
+                </a:lnTo>
+                <a:lnTo>
+                  <a:pt x="2508" y="1095"/>
+                </a:lnTo>
+                <a:lnTo>
+                  <a:pt x="2192" y="998"/>
+                </a:lnTo>
+                <a:lnTo>
+                  <a:pt x="1890" y="897"/>
+                </a:lnTo>
+                <a:lnTo>
+                  <a:pt x="1610" y="788"/>
+                </a:lnTo>
+                <a:lnTo>
+                  <a:pt x="1347" y="681"/>
+                </a:lnTo>
+                <a:lnTo>
+                  <a:pt x="1105" y="574"/>
+                </a:lnTo>
+                <a:lnTo>
+                  <a:pt x="883" y="473"/>
+                </a:lnTo>
+                <a:lnTo>
+                  <a:pt x="686" y="377"/>
+                </a:lnTo>
+                <a:lnTo>
+                  <a:pt x="508" y="286"/>
+                </a:lnTo>
+                <a:lnTo>
+                  <a:pt x="358" y="210"/>
+                </a:lnTo>
+                <a:lnTo>
+                  <a:pt x="232" y="138"/>
+                </a:lnTo>
+                <a:lnTo>
+                  <a:pt x="59" y="35"/>
+                </a:lnTo>
+                <a:lnTo>
+                  <a:pt x="0" y="0"/>
+                </a:lnTo>
+                <a:lnTo>
+                  <a:pt x="0" y="0"/>
+                </a:lnTo>
+                <a:close/>
+              </a:path>
+            </a:pathLst>
+          </a:custGeom>
+          <a:ln>
+            <a:noFill/>
+          </a:ln>
+        </p:spPr>
+      </p:sp>
+      <p:pic>
+        <p:nvPicPr>
+          <p:cNvPr id="1026" name="Picture 2" descr="See the source image">
+            <a:extLst>
+              <a:ext uri="{FF2B5EF4-FFF2-40B4-BE49-F238E27FC236}">
+                <a16:creationId xmlns:a16="http://schemas.microsoft.com/office/drawing/2014/main" id="{85A793D7-8D88-45CA-94F3-F725F3D4395F}"/>
+              </a:ext>
+            </a:extLst>
+          </p:cNvPr>
+          <p:cNvPicPr>
+            <a:picLocks noChangeAspect="1" noChangeArrowheads="1"/>
+          </p:cNvPicPr>
+          <p:nvPr/>
+        </p:nvPicPr>
+        <p:blipFill>
+          <a:blip r:embed="rId2">
+            <a:extLst>
+              <a:ext uri="{28A0092B-C50C-407E-A947-70E740481C1C}">
+                <a14:useLocalDpi xmlns:a14="http://schemas.microsoft.com/office/drawing/2010/main" val="0"/>
+              </a:ext>
+            </a:extLst>
+          </a:blip>
+          <a:stretch>
+            <a:fillRect/>
+          </a:stretch>
+        </p:blipFill>
+        <p:spPr bwMode="auto">
+          <a:xfrm>
+            <a:off x="6093992" y="2441206"/>
+            <a:ext cx="5449889" cy="1975584"/>
+          </a:xfrm>
+          <a:prstGeom prst="rect">
+            <a:avLst/>
+          </a:prstGeom>
+          <a:noFill/>
+          <a:effectLst/>
+          <a:extLst>
+            <a:ext uri="{909E8E84-426E-40DD-AFC4-6F175D3DCCD1}">
+              <a14:hiddenFill xmlns:a14="http://schemas.microsoft.com/office/drawing/2010/main">
+                <a:solidFill>
+                  <a:srgbClr val="FFFFFF"/>
+                </a:solidFill>
+              </a14:hiddenFill>
+            </a:ext>
+          </a:extLst>
+        </p:spPr>
+      </p:pic>
+      <p:sp>
+        <p:nvSpPr>
+          <p:cNvPr id="79" name="Rectangle 78">
+            <a:extLst>
+              <a:ext uri="{FF2B5EF4-FFF2-40B4-BE49-F238E27FC236}">
+                <a16:creationId xmlns:a16="http://schemas.microsoft.com/office/drawing/2014/main" id="{A92A1116-1C84-41DF-B803-1F7B0883EC82}"/>
+              </a:ext>
+              <a:ext uri="{C183D7F6-B498-43B3-948B-1728B52AA6E4}">
+                <adec:decorative xmlns:adec="http://schemas.microsoft.com/office/drawing/2017/decorative" val="1"/>
+              </a:ext>
+            </a:extLst>
+          </p:cNvPr>
+          <p:cNvSpPr>
+            <a:spLocks noGrp="1" noRot="1" noChangeAspect="1" noMove="1" noResize="1" noEditPoints="1" noAdjustHandles="1" noChangeArrowheads="1" noChangeShapeType="1" noTextEdit="1"/>
+          </p:cNvSpPr>
+          <p:nvPr>
+            <p:extLst>
+              <p:ext uri="{386F3935-93C4-4BCD-93E2-E3B085C9AB24}">
+                <p16:designElem xmlns:p16="http://schemas.microsoft.com/office/powerpoint/2015/main" val="1"/>
+              </p:ext>
+            </p:extLst>
+          </p:nvPr>
+        </p:nvSpPr>
+        <p:spPr>
+          <a:xfrm>
+            <a:off x="10442448" y="0"/>
+            <a:ext cx="685800" cy="1143000"/>
+          </a:xfrm>
+          <a:prstGeom prst="rect">
+            <a:avLst/>
+          </a:prstGeom>
+          <a:solidFill>
+            <a:schemeClr val="accent1"/>
+          </a:solidFill>
+          <a:ln>
+            <a:noFill/>
+          </a:ln>
+        </p:spPr>
+        <p:style>
+          <a:lnRef idx="1">
+            <a:schemeClr val="accent1"/>
+          </a:lnRef>
+          <a:fillRef idx="3">
+            <a:schemeClr val="accent1"/>
+          </a:fillRef>
+          <a:effectRef idx="2">
+            <a:schemeClr val="accent1"/>
+          </a:effectRef>
+          <a:fontRef idx="minor">
+            <a:schemeClr val="lt1"/>
+          </a:fontRef>
+        </p:style>
+      </p:sp>
+    </p:spTree>
+    <p:extLst>
+      <p:ext uri="{BB962C8B-B14F-4D97-AF65-F5344CB8AC3E}">
+        <p14:creationId xmlns:p14="http://schemas.microsoft.com/office/powerpoint/2010/main" val="4059203422"/>
+      </p:ext>
+    </p:extLst>
+  </p:cSld>
+  <p:clrMapOvr>
+    <a:overrideClrMapping bg1="lt1" tx1="dk1" bg2="lt2" tx2="dk2" accent1="accent1" accent2="accent2" accent3="accent3" accent4="accent4" accent5="accent5" accent6="accent6" hlink="hlink" folHlink="folHlink"/>
+  </p:clrMapOvr>
+</p:sld>
+</file>
+
+<file path=ppt/slides/slide4.xml><?xml version="1.0" encoding="utf-8"?>
 <p:sld xmlns:a="http://schemas.openxmlformats.org/drawingml/2006/main" xmlns:r="http://schemas.openxmlformats.org/officeDocument/2006/relationships" xmlns:p="http://schemas.openxmlformats.org/presentationml/2006/main">
   <p:cSld>
     <p:spTree>
@@ -18460,7 +20909,7 @@
 </p:sld>
 </file>
 
-<file path=ppt/slides/slide4.xml><?xml version="1.0" encoding="utf-8"?>
+<file path=ppt/slides/slide5.xml><?xml version="1.0" encoding="utf-8"?>
 <p:sld xmlns:a="http://schemas.openxmlformats.org/drawingml/2006/main" xmlns:r="http://schemas.openxmlformats.org/officeDocument/2006/relationships" xmlns:p="http://schemas.openxmlformats.org/presentationml/2006/main">
   <p:cSld>
     <p:bg>
@@ -18966,7 +21415,7 @@
 </p:sld>
 </file>
 
-<file path=ppt/slides/slide5.xml><?xml version="1.0" encoding="utf-8"?>
+<file path=ppt/slides/slide6.xml><?xml version="1.0" encoding="utf-8"?>
 <p:sld xmlns:a="http://schemas.openxmlformats.org/drawingml/2006/main" xmlns:r="http://schemas.openxmlformats.org/officeDocument/2006/relationships" xmlns:p="http://schemas.openxmlformats.org/presentationml/2006/main">
   <p:cSld>
     <p:bg>
@@ -20049,7 +22498,7 @@
 </p:sld>
 </file>
 
-<file path=ppt/slides/slide6.xml><?xml version="1.0" encoding="utf-8"?>
+<file path=ppt/slides/slide7.xml><?xml version="1.0" encoding="utf-8"?>
 <p:sld xmlns:a="http://schemas.openxmlformats.org/drawingml/2006/main" xmlns:r="http://schemas.openxmlformats.org/officeDocument/2006/relationships" xmlns:p="http://schemas.openxmlformats.org/presentationml/2006/main">
   <p:cSld>
     <p:bg>
@@ -20623,7 +23072,7 @@
 </p:sld>
 </file>
 
-<file path=ppt/slides/slide7.xml><?xml version="1.0" encoding="utf-8"?>
+<file path=ppt/slides/slide8.xml><?xml version="1.0" encoding="utf-8"?>
 <p:sld xmlns:a="http://schemas.openxmlformats.org/drawingml/2006/main" xmlns:r="http://schemas.openxmlformats.org/officeDocument/2006/relationships" xmlns:p="http://schemas.openxmlformats.org/presentationml/2006/main">
   <p:cSld>
     <p:bg>
@@ -21706,7 +24155,7 @@
 </p:sld>
 </file>
 
-<file path=ppt/slides/slide8.xml><?xml version="1.0" encoding="utf-8"?>
+<file path=ppt/slides/slide9.xml><?xml version="1.0" encoding="utf-8"?>
 <p:sld xmlns:a="http://schemas.openxmlformats.org/drawingml/2006/main" xmlns:r="http://schemas.openxmlformats.org/officeDocument/2006/relationships" xmlns:p="http://schemas.openxmlformats.org/presentationml/2006/main">
   <p:cSld>
     <p:bg>
@@ -22634,1388 +25083,6 @@
 </p:sld>
 </file>
 
-<file path=ppt/slides/slide9.xml><?xml version="1.0" encoding="utf-8"?>
-<p:sld xmlns:a="http://schemas.openxmlformats.org/drawingml/2006/main" xmlns:r="http://schemas.openxmlformats.org/officeDocument/2006/relationships" xmlns:p="http://schemas.openxmlformats.org/presentationml/2006/main">
-  <p:cSld>
-    <p:bg>
-      <p:bgPr>
-        <a:solidFill>
-          <a:schemeClr val="bg1"/>
-        </a:solidFill>
-        <a:effectLst/>
-      </p:bgPr>
-    </p:bg>
-    <p:spTree>
-      <p:nvGrpSpPr>
-        <p:cNvPr id="1" name=""/>
-        <p:cNvGrpSpPr/>
-        <p:nvPr/>
-      </p:nvGrpSpPr>
-      <p:grpSpPr>
-        <a:xfrm>
-          <a:off x="0" y="0"/>
-          <a:ext cx="0" cy="0"/>
-          <a:chOff x="0" y="0"/>
-          <a:chExt cx="0" cy="0"/>
-        </a:xfrm>
-      </p:grpSpPr>
-      <p:pic>
-        <p:nvPicPr>
-          <p:cNvPr id="32" name="Picture 31">
-            <a:extLst>
-              <a:ext uri="{FF2B5EF4-FFF2-40B4-BE49-F238E27FC236}">
-                <a16:creationId xmlns:a16="http://schemas.microsoft.com/office/drawing/2014/main" id="{41B68C77-138E-4BF7-A276-BD0C78A4219F}"/>
-              </a:ext>
-              <a:ext uri="{C183D7F6-B498-43B3-948B-1728B52AA6E4}">
-                <adec:decorative xmlns:adec="http://schemas.microsoft.com/office/drawing/2017/decorative" val="1"/>
-              </a:ext>
-            </a:extLst>
-          </p:cNvPr>
-          <p:cNvPicPr>
-            <a:picLocks noGrp="1" noRot="1" noChangeAspect="1" noMove="1" noResize="1" noEditPoints="1" noAdjustHandles="1" noChangeArrowheads="1" noChangeShapeType="1" noCrop="1"/>
-          </p:cNvPicPr>
-          <p:nvPr>
-            <p:extLst>
-              <p:ext uri="{386F3935-93C4-4BCD-93E2-E3B085C9AB24}">
-                <p16:designElem xmlns:p16="http://schemas.microsoft.com/office/powerpoint/2015/main" val="1"/>
-              </p:ext>
-            </p:extLst>
-          </p:nvPr>
-        </p:nvPicPr>
-        <p:blipFill rotWithShape="1">
-          <a:blip r:embed="rId2">
-            <a:extLst>
-              <a:ext uri="{28A0092B-C50C-407E-A947-70E740481C1C}">
-                <a14:useLocalDpi xmlns:a14="http://schemas.microsoft.com/office/drawing/2010/main" val="0"/>
-              </a:ext>
-            </a:extLst>
-          </a:blip>
-          <a:srcRect l="3613"/>
-          <a:stretch/>
-        </p:blipFill>
-        <p:spPr>
-          <a:xfrm>
-            <a:off x="0" y="2669685"/>
-            <a:ext cx="4037012" cy="4188315"/>
-          </a:xfrm>
-          <a:prstGeom prst="rect">
-            <a:avLst/>
-          </a:prstGeom>
-        </p:spPr>
-      </p:pic>
-      <p:pic>
-        <p:nvPicPr>
-          <p:cNvPr id="34" name="Picture 33">
-            <a:extLst>
-              <a:ext uri="{FF2B5EF4-FFF2-40B4-BE49-F238E27FC236}">
-                <a16:creationId xmlns:a16="http://schemas.microsoft.com/office/drawing/2014/main" id="{7C268552-D473-46ED-B1B8-422042C4DEF1}"/>
-              </a:ext>
-              <a:ext uri="{C183D7F6-B498-43B3-948B-1728B52AA6E4}">
-                <adec:decorative xmlns:adec="http://schemas.microsoft.com/office/drawing/2017/decorative" val="1"/>
-              </a:ext>
-            </a:extLst>
-          </p:cNvPr>
-          <p:cNvPicPr>
-            <a:picLocks noGrp="1" noRot="1" noChangeAspect="1" noMove="1" noResize="1" noEditPoints="1" noAdjustHandles="1" noChangeArrowheads="1" noChangeShapeType="1" noCrop="1"/>
-          </p:cNvPicPr>
-          <p:nvPr>
-            <p:extLst>
-              <p:ext uri="{386F3935-93C4-4BCD-93E2-E3B085C9AB24}">
-                <p16:designElem xmlns:p16="http://schemas.microsoft.com/office/powerpoint/2015/main" val="1"/>
-              </p:ext>
-            </p:extLst>
-          </p:nvPr>
-        </p:nvPicPr>
-        <p:blipFill rotWithShape="1">
-          <a:blip r:embed="rId3">
-            <a:extLst>
-              <a:ext uri="{28A0092B-C50C-407E-A947-70E740481C1C}">
-                <a14:useLocalDpi xmlns:a14="http://schemas.microsoft.com/office/drawing/2010/main" val="0"/>
-              </a:ext>
-            </a:extLst>
-          </a:blip>
-          <a:srcRect l="35640"/>
-          <a:stretch/>
-        </p:blipFill>
-        <p:spPr>
-          <a:xfrm>
-            <a:off x="0" y="2892347"/>
-            <a:ext cx="1522412" cy="2365453"/>
-          </a:xfrm>
-          <a:prstGeom prst="rect">
-            <a:avLst/>
-          </a:prstGeom>
-        </p:spPr>
-      </p:pic>
-      <p:sp>
-        <p:nvSpPr>
-          <p:cNvPr id="36" name="Oval 35">
-            <a:extLst>
-              <a:ext uri="{FF2B5EF4-FFF2-40B4-BE49-F238E27FC236}">
-                <a16:creationId xmlns:a16="http://schemas.microsoft.com/office/drawing/2014/main" id="{4AC0CD9D-7610-4620-93B4-798CCD9AB581}"/>
-              </a:ext>
-              <a:ext uri="{C183D7F6-B498-43B3-948B-1728B52AA6E4}">
-                <adec:decorative xmlns:adec="http://schemas.microsoft.com/office/drawing/2017/decorative" val="1"/>
-              </a:ext>
-            </a:extLst>
-          </p:cNvPr>
-          <p:cNvSpPr>
-            <a:spLocks noGrp="1" noRot="1" noChangeAspect="1" noMove="1" noResize="1" noEditPoints="1" noAdjustHandles="1" noChangeArrowheads="1" noChangeShapeType="1" noTextEdit="1"/>
-          </p:cNvSpPr>
-          <p:nvPr>
-            <p:extLst>
-              <p:ext uri="{386F3935-93C4-4BCD-93E2-E3B085C9AB24}">
-                <p16:designElem xmlns:p16="http://schemas.microsoft.com/office/powerpoint/2015/main" val="1"/>
-              </p:ext>
-            </p:extLst>
-          </p:nvPr>
-        </p:nvSpPr>
-        <p:spPr>
-          <a:xfrm>
-            <a:off x="8609012" y="1676400"/>
-            <a:ext cx="2819400" cy="2819400"/>
-          </a:xfrm>
-          <a:prstGeom prst="ellipse">
-            <a:avLst/>
-          </a:prstGeom>
-          <a:gradFill flip="none" rotWithShape="1">
-            <a:gsLst>
-              <a:gs pos="0">
-                <a:schemeClr val="bg2">
-                  <a:lumMod val="60000"/>
-                  <a:lumOff val="40000"/>
-                  <a:alpha val="7000"/>
-                </a:schemeClr>
-              </a:gs>
-              <a:gs pos="69000">
-                <a:schemeClr val="bg2">
-                  <a:lumMod val="60000"/>
-                  <a:lumOff val="40000"/>
-                  <a:alpha val="0"/>
-                </a:schemeClr>
-              </a:gs>
-              <a:gs pos="36000">
-                <a:schemeClr val="bg2">
-                  <a:lumMod val="60000"/>
-                  <a:lumOff val="40000"/>
-                  <a:alpha val="6000"/>
-                </a:schemeClr>
-              </a:gs>
-            </a:gsLst>
-            <a:path path="circle">
-              <a:fillToRect l="50000" t="50000" r="50000" b="50000"/>
-            </a:path>
-            <a:tileRect/>
-          </a:gradFill>
-          <a:ln>
-            <a:noFill/>
-          </a:ln>
-          <a:effectLst/>
-        </p:spPr>
-        <p:style>
-          <a:lnRef idx="1">
-            <a:schemeClr val="accent1"/>
-          </a:lnRef>
-          <a:fillRef idx="3">
-            <a:schemeClr val="accent1"/>
-          </a:fillRef>
-          <a:effectRef idx="2">
-            <a:schemeClr val="accent1"/>
-          </a:effectRef>
-          <a:fontRef idx="minor">
-            <a:schemeClr val="lt1"/>
-          </a:fontRef>
-        </p:style>
-      </p:sp>
-      <p:pic>
-        <p:nvPicPr>
-          <p:cNvPr id="38" name="Picture 37">
-            <a:extLst>
-              <a:ext uri="{FF2B5EF4-FFF2-40B4-BE49-F238E27FC236}">
-                <a16:creationId xmlns:a16="http://schemas.microsoft.com/office/drawing/2014/main" id="{B9238B3E-24AA-439A-B527-6C5DF6D72145}"/>
-              </a:ext>
-              <a:ext uri="{C183D7F6-B498-43B3-948B-1728B52AA6E4}">
-                <adec:decorative xmlns:adec="http://schemas.microsoft.com/office/drawing/2017/decorative" val="1"/>
-              </a:ext>
-            </a:extLst>
-          </p:cNvPr>
-          <p:cNvPicPr>
-            <a:picLocks noGrp="1" noRot="1" noChangeAspect="1" noMove="1" noResize="1" noEditPoints="1" noAdjustHandles="1" noChangeArrowheads="1" noChangeShapeType="1" noCrop="1"/>
-          </p:cNvPicPr>
-          <p:nvPr>
-            <p:extLst>
-              <p:ext uri="{386F3935-93C4-4BCD-93E2-E3B085C9AB24}">
-                <p16:designElem xmlns:p16="http://schemas.microsoft.com/office/powerpoint/2015/main" val="1"/>
-              </p:ext>
-            </p:extLst>
-          </p:nvPr>
-        </p:nvPicPr>
-        <p:blipFill rotWithShape="1">
-          <a:blip r:embed="rId4">
-            <a:extLst>
-              <a:ext uri="{28A0092B-C50C-407E-A947-70E740481C1C}">
-                <a14:useLocalDpi xmlns:a14="http://schemas.microsoft.com/office/drawing/2010/main" val="0"/>
-              </a:ext>
-            </a:extLst>
-          </a:blip>
-          <a:srcRect t="28813"/>
-          <a:stretch/>
-        </p:blipFill>
-        <p:spPr>
-          <a:xfrm>
-            <a:off x="7999412" y="0"/>
-            <a:ext cx="1603387" cy="1141407"/>
-          </a:xfrm>
-          <a:prstGeom prst="rect">
-            <a:avLst/>
-          </a:prstGeom>
-        </p:spPr>
-      </p:pic>
-      <p:pic>
-        <p:nvPicPr>
-          <p:cNvPr id="40" name="Picture 39">
-            <a:extLst>
-              <a:ext uri="{FF2B5EF4-FFF2-40B4-BE49-F238E27FC236}">
-                <a16:creationId xmlns:a16="http://schemas.microsoft.com/office/drawing/2014/main" id="{69F01145-BEA3-4CBF-AA21-10077B948CA8}"/>
-              </a:ext>
-              <a:ext uri="{C183D7F6-B498-43B3-948B-1728B52AA6E4}">
-                <adec:decorative xmlns:adec="http://schemas.microsoft.com/office/drawing/2017/decorative" val="1"/>
-              </a:ext>
-            </a:extLst>
-          </p:cNvPr>
-          <p:cNvPicPr>
-            <a:picLocks noGrp="1" noRot="1" noChangeAspect="1" noMove="1" noResize="1" noEditPoints="1" noAdjustHandles="1" noChangeArrowheads="1" noChangeShapeType="1" noCrop="1"/>
-          </p:cNvPicPr>
-          <p:nvPr>
-            <p:extLst>
-              <p:ext uri="{386F3935-93C4-4BCD-93E2-E3B085C9AB24}">
-                <p16:designElem xmlns:p16="http://schemas.microsoft.com/office/powerpoint/2015/main" val="1"/>
-              </p:ext>
-            </p:extLst>
-          </p:nvPr>
-        </p:nvPicPr>
-        <p:blipFill rotWithShape="1">
-          <a:blip r:embed="rId5">
-            <a:extLst>
-              <a:ext uri="{28A0092B-C50C-407E-A947-70E740481C1C}">
-                <a14:useLocalDpi xmlns:a14="http://schemas.microsoft.com/office/drawing/2010/main" val="0"/>
-              </a:ext>
-            </a:extLst>
-          </a:blip>
-          <a:srcRect b="23320"/>
-          <a:stretch/>
-        </p:blipFill>
-        <p:spPr>
-          <a:xfrm>
-            <a:off x="8605878" y="6096000"/>
-            <a:ext cx="993734" cy="762000"/>
-          </a:xfrm>
-          <a:prstGeom prst="rect">
-            <a:avLst/>
-          </a:prstGeom>
-        </p:spPr>
-      </p:pic>
-      <p:sp>
-        <p:nvSpPr>
-          <p:cNvPr id="42" name="Rectangle 41">
-            <a:extLst>
-              <a:ext uri="{FF2B5EF4-FFF2-40B4-BE49-F238E27FC236}">
-                <a16:creationId xmlns:a16="http://schemas.microsoft.com/office/drawing/2014/main" id="{DE4D62F9-188E-4530-84C2-24BDEE4BEB82}"/>
-              </a:ext>
-              <a:ext uri="{C183D7F6-B498-43B3-948B-1728B52AA6E4}">
-                <adec:decorative xmlns:adec="http://schemas.microsoft.com/office/drawing/2017/decorative" val="1"/>
-              </a:ext>
-            </a:extLst>
-          </p:cNvPr>
-          <p:cNvSpPr>
-            <a:spLocks noGrp="1" noRot="1" noChangeAspect="1" noMove="1" noResize="1" noEditPoints="1" noAdjustHandles="1" noChangeArrowheads="1" noChangeShapeType="1" noTextEdit="1"/>
-          </p:cNvSpPr>
-          <p:nvPr>
-            <p:extLst>
-              <p:ext uri="{386F3935-93C4-4BCD-93E2-E3B085C9AB24}">
-                <p16:designElem xmlns:p16="http://schemas.microsoft.com/office/powerpoint/2015/main" val="1"/>
-              </p:ext>
-            </p:extLst>
-          </p:nvPr>
-        </p:nvSpPr>
-        <p:spPr>
-          <a:xfrm>
-            <a:off x="10437812" y="0"/>
-            <a:ext cx="685800" cy="1143000"/>
-          </a:xfrm>
-          <a:prstGeom prst="rect">
-            <a:avLst/>
-          </a:prstGeom>
-          <a:solidFill>
-            <a:schemeClr val="accent1"/>
-          </a:solidFill>
-          <a:ln>
-            <a:noFill/>
-          </a:ln>
-        </p:spPr>
-        <p:style>
-          <a:lnRef idx="1">
-            <a:schemeClr val="accent1"/>
-          </a:lnRef>
-          <a:fillRef idx="3">
-            <a:schemeClr val="accent1"/>
-          </a:fillRef>
-          <a:effectRef idx="2">
-            <a:schemeClr val="accent1"/>
-          </a:effectRef>
-          <a:fontRef idx="minor">
-            <a:schemeClr val="lt1"/>
-          </a:fontRef>
-        </p:style>
-      </p:sp>
-      <p:sp>
-        <p:nvSpPr>
-          <p:cNvPr id="44" name="Rectangle 43">
-            <a:extLst>
-              <a:ext uri="{FF2B5EF4-FFF2-40B4-BE49-F238E27FC236}">
-                <a16:creationId xmlns:a16="http://schemas.microsoft.com/office/drawing/2014/main" id="{C6A81905-F480-46A4-BC10-215D24EA1AE6}"/>
-              </a:ext>
-              <a:ext uri="{C183D7F6-B498-43B3-948B-1728B52AA6E4}">
-                <adec:decorative xmlns:adec="http://schemas.microsoft.com/office/drawing/2017/decorative" val="1"/>
-              </a:ext>
-            </a:extLst>
-          </p:cNvPr>
-          <p:cNvSpPr>
-            <a:spLocks noGrp="1" noRot="1" noChangeAspect="1" noMove="1" noResize="1" noEditPoints="1" noAdjustHandles="1" noChangeArrowheads="1" noChangeShapeType="1" noTextEdit="1"/>
-          </p:cNvSpPr>
-          <p:nvPr>
-            <p:extLst>
-              <p:ext uri="{386F3935-93C4-4BCD-93E2-E3B085C9AB24}">
-                <p16:designElem xmlns:p16="http://schemas.microsoft.com/office/powerpoint/2015/main" val="1"/>
-              </p:ext>
-            </p:extLst>
-          </p:nvPr>
-        </p:nvSpPr>
-        <p:spPr>
-          <a:xfrm>
-            <a:off x="0" y="0"/>
-            <a:ext cx="12192000" cy="6858000"/>
-          </a:xfrm>
-          <a:prstGeom prst="rect">
-            <a:avLst/>
-          </a:prstGeom>
-          <a:ln>
-            <a:noFill/>
-          </a:ln>
-        </p:spPr>
-        <p:style>
-          <a:lnRef idx="2">
-            <a:schemeClr val="accent1">
-              <a:shade val="50000"/>
-            </a:schemeClr>
-          </a:lnRef>
-          <a:fillRef idx="1003">
-            <a:schemeClr val="dk2"/>
-          </a:fillRef>
-          <a:effectRef idx="0">
-            <a:schemeClr val="accent1"/>
-          </a:effectRef>
-          <a:fontRef idx="minor">
-            <a:schemeClr val="lt1"/>
-          </a:fontRef>
-        </p:style>
-        <p:txBody>
-          <a:bodyPr rtlCol="0" anchor="ctr"/>
-          <a:lstStyle/>
-          <a:p>
-            <a:pPr algn="ctr"/>
-            <a:endParaRPr lang="en-US"/>
-          </a:p>
-        </p:txBody>
-      </p:sp>
-      <p:sp>
-        <p:nvSpPr>
-          <p:cNvPr id="2" name="Title 1">
-            <a:extLst>
-              <a:ext uri="{FF2B5EF4-FFF2-40B4-BE49-F238E27FC236}">
-                <a16:creationId xmlns:a16="http://schemas.microsoft.com/office/drawing/2014/main" id="{4B60FF66-C136-4D64-865D-C696E1B299CE}"/>
-              </a:ext>
-            </a:extLst>
-          </p:cNvPr>
-          <p:cNvSpPr>
-            <a:spLocks noGrp="1"/>
-          </p:cNvSpPr>
-          <p:nvPr>
-            <p:ph type="title"/>
-          </p:nvPr>
-        </p:nvSpPr>
-        <p:spPr>
-          <a:xfrm>
-            <a:off x="4415428" y="2858296"/>
-            <a:ext cx="7655859" cy="1141407"/>
-          </a:xfrm>
-        </p:spPr>
-        <p:txBody>
-          <a:bodyPr vert="horz" lIns="91440" tIns="45720" rIns="91440" bIns="45720" rtlCol="0" anchor="b">
-            <a:noAutofit/>
-          </a:bodyPr>
-          <a:lstStyle/>
-          <a:p>
-            <a:r>
-              <a:rPr lang="en-US" sz="4800" dirty="0">
-                <a:solidFill>
-                  <a:srgbClr val="EBEBEB"/>
-                </a:solidFill>
-              </a:rPr>
-              <a:t>demo | code </a:t>
-            </a:r>
-            <a:r>
-              <a:rPr lang="en-US" sz="4800" b="0" i="0" kern="1200" dirty="0">
-                <a:solidFill>
-                  <a:srgbClr val="EBEBEB"/>
-                </a:solidFill>
-                <a:latin typeface="+mj-lt"/>
-                <a:ea typeface="+mj-ea"/>
-                <a:cs typeface="+mj-cs"/>
-              </a:rPr>
-              <a:t>deep dive</a:t>
-            </a:r>
-          </a:p>
-        </p:txBody>
-      </p:sp>
-      <p:sp>
-        <p:nvSpPr>
-          <p:cNvPr id="46" name="Freeform 8">
-            <a:extLst>
-              <a:ext uri="{FF2B5EF4-FFF2-40B4-BE49-F238E27FC236}">
-                <a16:creationId xmlns:a16="http://schemas.microsoft.com/office/drawing/2014/main" id="{36FD4D9D-3784-41E8-8405-A42B72F51331}"/>
-              </a:ext>
-              <a:ext uri="{C183D7F6-B498-43B3-948B-1728B52AA6E4}">
-                <adec:decorative xmlns:adec="http://schemas.microsoft.com/office/drawing/2017/decorative" val="1"/>
-              </a:ext>
-            </a:extLst>
-          </p:cNvPr>
-          <p:cNvSpPr>
-            <a:spLocks noGrp="1" noRot="1" noChangeAspect="1" noMove="1" noResize="1" noEditPoints="1" noAdjustHandles="1" noChangeArrowheads="1" noChangeShapeType="1" noTextEdit="1"/>
-          </p:cNvSpPr>
-          <p:nvPr>
-            <p:extLst>
-              <p:ext uri="{386F3935-93C4-4BCD-93E2-E3B085C9AB24}">
-                <p16:designElem xmlns:p16="http://schemas.microsoft.com/office/powerpoint/2015/main" val="1"/>
-              </p:ext>
-            </p:extLst>
-          </p:nvPr>
-        </p:nvSpPr>
-        <p:spPr>
-          <a:xfrm flipH="1">
-            <a:off x="4135692" y="-1"/>
-            <a:ext cx="559472" cy="3709642"/>
-          </a:xfrm>
-          <a:custGeom>
-            <a:avLst/>
-            <a:gdLst>
-              <a:gd name="connsiteX0" fmla="*/ 0 w 559472"/>
-              <a:gd name="connsiteY0" fmla="*/ 0 h 3709642"/>
-              <a:gd name="connsiteX1" fmla="*/ 473952 w 559472"/>
-              <a:gd name="connsiteY1" fmla="*/ 0 h 3709642"/>
-              <a:gd name="connsiteX2" fmla="*/ 485840 w 559472"/>
-              <a:gd name="connsiteY2" fmla="*/ 161194 h 3709642"/>
-              <a:gd name="connsiteX3" fmla="*/ 523949 w 559472"/>
-              <a:gd name="connsiteY3" fmla="*/ 3672197 h 3709642"/>
-              <a:gd name="connsiteX4" fmla="*/ 454748 w 559472"/>
-              <a:gd name="connsiteY4" fmla="*/ 3709642 h 3709642"/>
-              <a:gd name="connsiteX5" fmla="*/ 448224 w 559472"/>
-              <a:gd name="connsiteY5" fmla="*/ 3510471 h 3709642"/>
-              <a:gd name="connsiteX6" fmla="*/ 443564 w 559472"/>
-              <a:gd name="connsiteY6" fmla="*/ 3408563 h 3709642"/>
-              <a:gd name="connsiteX7" fmla="*/ 438902 w 559472"/>
-              <a:gd name="connsiteY7" fmla="*/ 3304407 h 3709642"/>
-              <a:gd name="connsiteX8" fmla="*/ 433941 w 559472"/>
-              <a:gd name="connsiteY8" fmla="*/ 3198777 h 3709642"/>
-              <a:gd name="connsiteX9" fmla="*/ 427584 w 559472"/>
-              <a:gd name="connsiteY9" fmla="*/ 3092510 h 3709642"/>
-              <a:gd name="connsiteX10" fmla="*/ 420988 w 559472"/>
-              <a:gd name="connsiteY10" fmla="*/ 2984390 h 3709642"/>
-              <a:gd name="connsiteX11" fmla="*/ 414330 w 559472"/>
-              <a:gd name="connsiteY11" fmla="*/ 2874401 h 3709642"/>
-              <a:gd name="connsiteX12" fmla="*/ 406840 w 559472"/>
-              <a:gd name="connsiteY12" fmla="*/ 2762980 h 3709642"/>
-              <a:gd name="connsiteX13" fmla="*/ 397745 w 559472"/>
-              <a:gd name="connsiteY13" fmla="*/ 2650566 h 3709642"/>
-              <a:gd name="connsiteX14" fmla="*/ 389154 w 559472"/>
-              <a:gd name="connsiteY14" fmla="*/ 2536612 h 3709642"/>
-              <a:gd name="connsiteX15" fmla="*/ 379225 w 559472"/>
-              <a:gd name="connsiteY15" fmla="*/ 2421642 h 3709642"/>
-              <a:gd name="connsiteX16" fmla="*/ 368316 w 559472"/>
-              <a:gd name="connsiteY16" fmla="*/ 2305627 h 3709642"/>
-              <a:gd name="connsiteX17" fmla="*/ 357466 w 559472"/>
-              <a:gd name="connsiteY17" fmla="*/ 2189233 h 3709642"/>
-              <a:gd name="connsiteX18" fmla="*/ 344982 w 559472"/>
-              <a:gd name="connsiteY18" fmla="*/ 2071473 h 3709642"/>
-              <a:gd name="connsiteX19" fmla="*/ 332466 w 559472"/>
-              <a:gd name="connsiteY19" fmla="*/ 1952216 h 3709642"/>
-              <a:gd name="connsiteX20" fmla="*/ 319121 w 559472"/>
-              <a:gd name="connsiteY20" fmla="*/ 1833776 h 3709642"/>
-              <a:gd name="connsiteX21" fmla="*/ 304408 w 559472"/>
-              <a:gd name="connsiteY21" fmla="*/ 1713948 h 3709642"/>
-              <a:gd name="connsiteX22" fmla="*/ 288685 w 559472"/>
-              <a:gd name="connsiteY22" fmla="*/ 1592703 h 3709642"/>
-              <a:gd name="connsiteX23" fmla="*/ 273050 w 559472"/>
-              <a:gd name="connsiteY23" fmla="*/ 1471451 h 3709642"/>
-              <a:gd name="connsiteX24" fmla="*/ 255813 w 559472"/>
-              <a:gd name="connsiteY24" fmla="*/ 1350328 h 3709642"/>
-              <a:gd name="connsiteX25" fmla="*/ 237060 w 559472"/>
-              <a:gd name="connsiteY25" fmla="*/ 1227080 h 3709642"/>
-              <a:gd name="connsiteX26" fmla="*/ 218488 w 559472"/>
-              <a:gd name="connsiteY26" fmla="*/ 1106065 h 3709642"/>
-              <a:gd name="connsiteX27" fmla="*/ 198221 w 559472"/>
-              <a:gd name="connsiteY27" fmla="*/ 982940 h 3709642"/>
-              <a:gd name="connsiteX28" fmla="*/ 177152 w 559472"/>
-              <a:gd name="connsiteY28" fmla="*/ 858755 h 3709642"/>
-              <a:gd name="connsiteX29" fmla="*/ 155551 w 559472"/>
-              <a:gd name="connsiteY29" fmla="*/ 736861 h 3709642"/>
-              <a:gd name="connsiteX30" fmla="*/ 131782 w 559472"/>
-              <a:gd name="connsiteY30" fmla="*/ 613645 h 3709642"/>
-              <a:gd name="connsiteX31" fmla="*/ 107123 w 559472"/>
-              <a:gd name="connsiteY31" fmla="*/ 490500 h 3709642"/>
-              <a:gd name="connsiteX32" fmla="*/ 82552 w 559472"/>
-              <a:gd name="connsiteY32" fmla="*/ 367348 h 3709642"/>
-              <a:gd name="connsiteX33" fmla="*/ 55608 w 559472"/>
-              <a:gd name="connsiteY33" fmla="*/ 244762 h 3709642"/>
-              <a:gd name="connsiteX34" fmla="*/ 28130 w 559472"/>
-              <a:gd name="connsiteY34" fmla="*/ 122220 h 3709642"/>
-              <a:gd name="connsiteX35" fmla="*/ 0 w 559472"/>
-              <a:gd name="connsiteY35" fmla="*/ 0 h 3709642"/>
-            </a:gdLst>
-            <a:ahLst/>
-            <a:cxnLst>
-              <a:cxn ang="0">
-                <a:pos x="connsiteX0" y="connsiteY0"/>
-              </a:cxn>
-              <a:cxn ang="0">
-                <a:pos x="connsiteX1" y="connsiteY1"/>
-              </a:cxn>
-              <a:cxn ang="0">
-                <a:pos x="connsiteX2" y="connsiteY2"/>
-              </a:cxn>
-              <a:cxn ang="0">
-                <a:pos x="connsiteX3" y="connsiteY3"/>
-              </a:cxn>
-              <a:cxn ang="0">
-                <a:pos x="connsiteX4" y="connsiteY4"/>
-              </a:cxn>
-              <a:cxn ang="0">
-                <a:pos x="connsiteX5" y="connsiteY5"/>
-              </a:cxn>
-              <a:cxn ang="0">
-                <a:pos x="connsiteX6" y="connsiteY6"/>
-              </a:cxn>
-              <a:cxn ang="0">
-                <a:pos x="connsiteX7" y="connsiteY7"/>
-              </a:cxn>
-              <a:cxn ang="0">
-                <a:pos x="connsiteX8" y="connsiteY8"/>
-              </a:cxn>
-              <a:cxn ang="0">
-                <a:pos x="connsiteX9" y="connsiteY9"/>
-              </a:cxn>
-              <a:cxn ang="0">
-                <a:pos x="connsiteX10" y="connsiteY10"/>
-              </a:cxn>
-              <a:cxn ang="0">
-                <a:pos x="connsiteX11" y="connsiteY11"/>
-              </a:cxn>
-              <a:cxn ang="0">
-                <a:pos x="connsiteX12" y="connsiteY12"/>
-              </a:cxn>
-              <a:cxn ang="0">
-                <a:pos x="connsiteX13" y="connsiteY13"/>
-              </a:cxn>
-              <a:cxn ang="0">
-                <a:pos x="connsiteX14" y="connsiteY14"/>
-              </a:cxn>
-              <a:cxn ang="0">
-                <a:pos x="connsiteX15" y="connsiteY15"/>
-              </a:cxn>
-              <a:cxn ang="0">
-                <a:pos x="connsiteX16" y="connsiteY16"/>
-              </a:cxn>
-              <a:cxn ang="0">
-                <a:pos x="connsiteX17" y="connsiteY17"/>
-              </a:cxn>
-              <a:cxn ang="0">
-                <a:pos x="connsiteX18" y="connsiteY18"/>
-              </a:cxn>
-              <a:cxn ang="0">
-                <a:pos x="connsiteX19" y="connsiteY19"/>
-              </a:cxn>
-              <a:cxn ang="0">
-                <a:pos x="connsiteX20" y="connsiteY20"/>
-              </a:cxn>
-              <a:cxn ang="0">
-                <a:pos x="connsiteX21" y="connsiteY21"/>
-              </a:cxn>
-              <a:cxn ang="0">
-                <a:pos x="connsiteX22" y="connsiteY22"/>
-              </a:cxn>
-              <a:cxn ang="0">
-                <a:pos x="connsiteX23" y="connsiteY23"/>
-              </a:cxn>
-              <a:cxn ang="0">
-                <a:pos x="connsiteX24" y="connsiteY24"/>
-              </a:cxn>
-              <a:cxn ang="0">
-                <a:pos x="connsiteX25" y="connsiteY25"/>
-              </a:cxn>
-              <a:cxn ang="0">
-                <a:pos x="connsiteX26" y="connsiteY26"/>
-              </a:cxn>
-              <a:cxn ang="0">
-                <a:pos x="connsiteX27" y="connsiteY27"/>
-              </a:cxn>
-              <a:cxn ang="0">
-                <a:pos x="connsiteX28" y="connsiteY28"/>
-              </a:cxn>
-              <a:cxn ang="0">
-                <a:pos x="connsiteX29" y="connsiteY29"/>
-              </a:cxn>
-              <a:cxn ang="0">
-                <a:pos x="connsiteX30" y="connsiteY30"/>
-              </a:cxn>
-              <a:cxn ang="0">
-                <a:pos x="connsiteX31" y="connsiteY31"/>
-              </a:cxn>
-              <a:cxn ang="0">
-                <a:pos x="connsiteX32" y="connsiteY32"/>
-              </a:cxn>
-              <a:cxn ang="0">
-                <a:pos x="connsiteX33" y="connsiteY33"/>
-              </a:cxn>
-              <a:cxn ang="0">
-                <a:pos x="connsiteX34" y="connsiteY34"/>
-              </a:cxn>
-              <a:cxn ang="0">
-                <a:pos x="connsiteX35" y="connsiteY35"/>
-              </a:cxn>
-            </a:cxnLst>
-            <a:rect l="l" t="t" r="r" b="b"/>
-            <a:pathLst>
-              <a:path w="559472" h="3709642">
-                <a:moveTo>
-                  <a:pt x="0" y="0"/>
-                </a:moveTo>
-                <a:lnTo>
-                  <a:pt x="473952" y="0"/>
-                </a:lnTo>
-                <a:lnTo>
-                  <a:pt x="485840" y="161194"/>
-                </a:lnTo>
-                <a:cubicBezTo>
-                  <a:pt x="552063" y="1147770"/>
-                  <a:pt x="592441" y="3086737"/>
-                  <a:pt x="523949" y="3672197"/>
-                </a:cubicBezTo>
-                <a:cubicBezTo>
-                  <a:pt x="500842" y="3684557"/>
-                  <a:pt x="477855" y="3697282"/>
-                  <a:pt x="454748" y="3709642"/>
-                </a:cubicBezTo>
-                <a:lnTo>
-                  <a:pt x="448224" y="3510471"/>
-                </a:lnTo>
-                <a:lnTo>
-                  <a:pt x="443564" y="3408563"/>
-                </a:lnTo>
-                <a:lnTo>
-                  <a:pt x="438902" y="3304407"/>
-                </a:lnTo>
-                <a:lnTo>
-                  <a:pt x="433941" y="3198777"/>
-                </a:lnTo>
-                <a:lnTo>
-                  <a:pt x="427584" y="3092510"/>
-                </a:lnTo>
-                <a:lnTo>
-                  <a:pt x="420988" y="2984390"/>
-                </a:lnTo>
-                <a:lnTo>
-                  <a:pt x="414330" y="2874401"/>
-                </a:lnTo>
-                <a:lnTo>
-                  <a:pt x="406840" y="2762980"/>
-                </a:lnTo>
-                <a:lnTo>
-                  <a:pt x="397745" y="2650566"/>
-                </a:lnTo>
-                <a:lnTo>
-                  <a:pt x="389154" y="2536612"/>
-                </a:lnTo>
-                <a:lnTo>
-                  <a:pt x="379225" y="2421642"/>
-                </a:lnTo>
-                <a:lnTo>
-                  <a:pt x="368316" y="2305627"/>
-                </a:lnTo>
-                <a:lnTo>
-                  <a:pt x="357466" y="2189233"/>
-                </a:lnTo>
-                <a:lnTo>
-                  <a:pt x="344982" y="2071473"/>
-                </a:lnTo>
-                <a:lnTo>
-                  <a:pt x="332466" y="1952216"/>
-                </a:lnTo>
-                <a:lnTo>
-                  <a:pt x="319121" y="1833776"/>
-                </a:lnTo>
-                <a:lnTo>
-                  <a:pt x="304408" y="1713948"/>
-                </a:lnTo>
-                <a:lnTo>
-                  <a:pt x="288685" y="1592703"/>
-                </a:lnTo>
-                <a:lnTo>
-                  <a:pt x="273050" y="1471451"/>
-                </a:lnTo>
-                <a:lnTo>
-                  <a:pt x="255813" y="1350328"/>
-                </a:lnTo>
-                <a:lnTo>
-                  <a:pt x="237060" y="1227080"/>
-                </a:lnTo>
-                <a:lnTo>
-                  <a:pt x="218488" y="1106065"/>
-                </a:lnTo>
-                <a:lnTo>
-                  <a:pt x="198221" y="982940"/>
-                </a:lnTo>
-                <a:lnTo>
-                  <a:pt x="177152" y="858755"/>
-                </a:lnTo>
-                <a:lnTo>
-                  <a:pt x="155551" y="736861"/>
-                </a:lnTo>
-                <a:lnTo>
-                  <a:pt x="131782" y="613645"/>
-                </a:lnTo>
-                <a:lnTo>
-                  <a:pt x="107123" y="490500"/>
-                </a:lnTo>
-                <a:lnTo>
-                  <a:pt x="82552" y="367348"/>
-                </a:lnTo>
-                <a:lnTo>
-                  <a:pt x="55608" y="244762"/>
-                </a:lnTo>
-                <a:lnTo>
-                  <a:pt x="28130" y="122220"/>
-                </a:lnTo>
-                <a:lnTo>
-                  <a:pt x="0" y="0"/>
-                </a:lnTo>
-                <a:close/>
-              </a:path>
-            </a:pathLst>
-          </a:custGeom>
-          <a:solidFill>
-            <a:schemeClr val="bg1">
-              <a:alpha val="20000"/>
-            </a:schemeClr>
-          </a:solidFill>
-          <a:ln>
-            <a:noFill/>
-          </a:ln>
-        </p:spPr>
-        <p:txBody>
-          <a:bodyPr rtlCol="0" anchor="ctr"/>
-          <a:lstStyle/>
-          <a:p>
-            <a:pPr algn="ctr"/>
-            <a:endParaRPr lang="en-US"/>
-          </a:p>
-        </p:txBody>
-      </p:sp>
-      <p:sp useBgFill="1">
-        <p:nvSpPr>
-          <p:cNvPr id="48" name="Freeform: Shape 47">
-            <a:extLst>
-              <a:ext uri="{FF2B5EF4-FFF2-40B4-BE49-F238E27FC236}">
-                <a16:creationId xmlns:a16="http://schemas.microsoft.com/office/drawing/2014/main" id="{09811DF6-66E4-43D5-B564-3151796531ED}"/>
-              </a:ext>
-              <a:ext uri="{C183D7F6-B498-43B3-948B-1728B52AA6E4}">
-                <adec:decorative xmlns:adec="http://schemas.microsoft.com/office/drawing/2017/decorative" val="1"/>
-              </a:ext>
-            </a:extLst>
-          </p:cNvPr>
-          <p:cNvSpPr>
-            <a:spLocks noGrp="1" noRot="1" noChangeAspect="1" noMove="1" noResize="1" noEditPoints="1" noAdjustHandles="1" noChangeArrowheads="1" noChangeShapeType="1" noTextEdit="1"/>
-          </p:cNvSpPr>
-          <p:nvPr>
-            <p:extLst>
-              <p:ext uri="{386F3935-93C4-4BCD-93E2-E3B085C9AB24}">
-                <p16:designElem xmlns:p16="http://schemas.microsoft.com/office/powerpoint/2015/main" val="1"/>
-              </p:ext>
-            </p:extLst>
-          </p:nvPr>
-        </p:nvSpPr>
-        <p:spPr>
-          <a:xfrm>
-            <a:off x="0" y="0"/>
-            <a:ext cx="4481964" cy="6858000"/>
-          </a:xfrm>
-          <a:custGeom>
-            <a:avLst/>
-            <a:gdLst>
-              <a:gd name="connsiteX0" fmla="*/ 3137249 w 4481964"/>
-              <a:gd name="connsiteY0" fmla="*/ 0 h 6858000"/>
-              <a:gd name="connsiteX1" fmla="*/ 4480787 w 4481964"/>
-              <a:gd name="connsiteY1" fmla="*/ 0 h 6858000"/>
-              <a:gd name="connsiteX2" fmla="*/ 4455742 w 4481964"/>
-              <a:gd name="connsiteY2" fmla="*/ 155676 h 6858000"/>
-              <a:gd name="connsiteX3" fmla="*/ 4431873 w 4481964"/>
-              <a:gd name="connsiteY3" fmla="*/ 310667 h 6858000"/>
-              <a:gd name="connsiteX4" fmla="*/ 4408509 w 4481964"/>
-              <a:gd name="connsiteY4" fmla="*/ 466344 h 6858000"/>
-              <a:gd name="connsiteX5" fmla="*/ 4388506 w 4481964"/>
-              <a:gd name="connsiteY5" fmla="*/ 622706 h 6858000"/>
-              <a:gd name="connsiteX6" fmla="*/ 4368335 w 4481964"/>
-              <a:gd name="connsiteY6" fmla="*/ 778383 h 6858000"/>
-              <a:gd name="connsiteX7" fmla="*/ 4349509 w 4481964"/>
-              <a:gd name="connsiteY7" fmla="*/ 934745 h 6858000"/>
-              <a:gd name="connsiteX8" fmla="*/ 4333373 w 4481964"/>
-              <a:gd name="connsiteY8" fmla="*/ 1089050 h 6858000"/>
-              <a:gd name="connsiteX9" fmla="*/ 4318077 w 4481964"/>
-              <a:gd name="connsiteY9" fmla="*/ 1245413 h 6858000"/>
-              <a:gd name="connsiteX10" fmla="*/ 4304125 w 4481964"/>
-              <a:gd name="connsiteY10" fmla="*/ 1401089 h 6858000"/>
-              <a:gd name="connsiteX11" fmla="*/ 4292023 w 4481964"/>
-              <a:gd name="connsiteY11" fmla="*/ 1554023 h 6858000"/>
-              <a:gd name="connsiteX12" fmla="*/ 4279920 w 4481964"/>
-              <a:gd name="connsiteY12" fmla="*/ 1709013 h 6858000"/>
-              <a:gd name="connsiteX13" fmla="*/ 4269835 w 4481964"/>
-              <a:gd name="connsiteY13" fmla="*/ 1861947 h 6858000"/>
-              <a:gd name="connsiteX14" fmla="*/ 4261935 w 4481964"/>
-              <a:gd name="connsiteY14" fmla="*/ 2014880 h 6858000"/>
-              <a:gd name="connsiteX15" fmla="*/ 4253698 w 4481964"/>
-              <a:gd name="connsiteY15" fmla="*/ 2167128 h 6858000"/>
-              <a:gd name="connsiteX16" fmla="*/ 4246807 w 4481964"/>
-              <a:gd name="connsiteY16" fmla="*/ 2318004 h 6858000"/>
-              <a:gd name="connsiteX17" fmla="*/ 4241932 w 4481964"/>
-              <a:gd name="connsiteY17" fmla="*/ 2467508 h 6858000"/>
-              <a:gd name="connsiteX18" fmla="*/ 4237730 w 4481964"/>
-              <a:gd name="connsiteY18" fmla="*/ 2617013 h 6858000"/>
-              <a:gd name="connsiteX19" fmla="*/ 4233696 w 4481964"/>
-              <a:gd name="connsiteY19" fmla="*/ 2765145 h 6858000"/>
-              <a:gd name="connsiteX20" fmla="*/ 4231847 w 4481964"/>
-              <a:gd name="connsiteY20" fmla="*/ 2911221 h 6858000"/>
-              <a:gd name="connsiteX21" fmla="*/ 4229830 w 4481964"/>
-              <a:gd name="connsiteY21" fmla="*/ 3057296 h 6858000"/>
-              <a:gd name="connsiteX22" fmla="*/ 4228821 w 4481964"/>
-              <a:gd name="connsiteY22" fmla="*/ 3201314 h 6858000"/>
-              <a:gd name="connsiteX23" fmla="*/ 4229830 w 4481964"/>
-              <a:gd name="connsiteY23" fmla="*/ 3343960 h 6858000"/>
-              <a:gd name="connsiteX24" fmla="*/ 4229830 w 4481964"/>
-              <a:gd name="connsiteY24" fmla="*/ 3485235 h 6858000"/>
-              <a:gd name="connsiteX25" fmla="*/ 4231847 w 4481964"/>
-              <a:gd name="connsiteY25" fmla="*/ 3625138 h 6858000"/>
-              <a:gd name="connsiteX26" fmla="*/ 4234872 w 4481964"/>
-              <a:gd name="connsiteY26" fmla="*/ 3762298 h 6858000"/>
-              <a:gd name="connsiteX27" fmla="*/ 4237730 w 4481964"/>
-              <a:gd name="connsiteY27" fmla="*/ 3898087 h 6858000"/>
-              <a:gd name="connsiteX28" fmla="*/ 4240924 w 4481964"/>
-              <a:gd name="connsiteY28" fmla="*/ 4031132 h 6858000"/>
-              <a:gd name="connsiteX29" fmla="*/ 4245798 w 4481964"/>
-              <a:gd name="connsiteY29" fmla="*/ 4163491 h 6858000"/>
-              <a:gd name="connsiteX30" fmla="*/ 4251009 w 4481964"/>
-              <a:gd name="connsiteY30" fmla="*/ 4293793 h 6858000"/>
-              <a:gd name="connsiteX31" fmla="*/ 4255715 w 4481964"/>
-              <a:gd name="connsiteY31" fmla="*/ 4421352 h 6858000"/>
-              <a:gd name="connsiteX32" fmla="*/ 4268995 w 4481964"/>
-              <a:gd name="connsiteY32" fmla="*/ 4670298 h 6858000"/>
-              <a:gd name="connsiteX33" fmla="*/ 4283114 w 4481964"/>
-              <a:gd name="connsiteY33" fmla="*/ 4908956 h 6858000"/>
-              <a:gd name="connsiteX34" fmla="*/ 4297906 w 4481964"/>
-              <a:gd name="connsiteY34" fmla="*/ 5138013 h 6858000"/>
-              <a:gd name="connsiteX35" fmla="*/ 4314211 w 4481964"/>
-              <a:gd name="connsiteY35" fmla="*/ 5354726 h 6858000"/>
-              <a:gd name="connsiteX36" fmla="*/ 4331188 w 4481964"/>
-              <a:gd name="connsiteY36" fmla="*/ 5561838 h 6858000"/>
-              <a:gd name="connsiteX37" fmla="*/ 4349509 w 4481964"/>
-              <a:gd name="connsiteY37" fmla="*/ 5753862 h 6858000"/>
-              <a:gd name="connsiteX38" fmla="*/ 4367495 w 4481964"/>
-              <a:gd name="connsiteY38" fmla="*/ 5934227 h 6858000"/>
-              <a:gd name="connsiteX39" fmla="*/ 4385480 w 4481964"/>
-              <a:gd name="connsiteY39" fmla="*/ 6100191 h 6858000"/>
-              <a:gd name="connsiteX40" fmla="*/ 4402457 w 4481964"/>
-              <a:gd name="connsiteY40" fmla="*/ 6252438 h 6858000"/>
-              <a:gd name="connsiteX41" fmla="*/ 4418594 w 4481964"/>
-              <a:gd name="connsiteY41" fmla="*/ 6387541 h 6858000"/>
-              <a:gd name="connsiteX42" fmla="*/ 4433890 w 4481964"/>
-              <a:gd name="connsiteY42" fmla="*/ 6509613 h 6858000"/>
-              <a:gd name="connsiteX43" fmla="*/ 4446665 w 4481964"/>
-              <a:gd name="connsiteY43" fmla="*/ 6612483 h 6858000"/>
-              <a:gd name="connsiteX44" fmla="*/ 4458767 w 4481964"/>
-              <a:gd name="connsiteY44" fmla="*/ 6698894 h 6858000"/>
-              <a:gd name="connsiteX45" fmla="*/ 4476081 w 4481964"/>
-              <a:gd name="connsiteY45" fmla="*/ 6817538 h 6858000"/>
-              <a:gd name="connsiteX46" fmla="*/ 4481964 w 4481964"/>
-              <a:gd name="connsiteY46" fmla="*/ 6858000 h 6858000"/>
-              <a:gd name="connsiteX47" fmla="*/ 3577807 w 4481964"/>
-              <a:gd name="connsiteY47" fmla="*/ 6858000 h 6858000"/>
-              <a:gd name="connsiteX48" fmla="*/ 3577807 w 4481964"/>
-              <a:gd name="connsiteY48" fmla="*/ 6858000 h 6858000"/>
-              <a:gd name="connsiteX49" fmla="*/ 0 w 4481964"/>
-              <a:gd name="connsiteY49" fmla="*/ 6858000 h 6858000"/>
-              <a:gd name="connsiteX50" fmla="*/ 0 w 4481964"/>
-              <a:gd name="connsiteY50" fmla="*/ 0 h 6858000"/>
-              <a:gd name="connsiteX51" fmla="*/ 3137249 w 4481964"/>
-              <a:gd name="connsiteY51" fmla="*/ 0 h 6858000"/>
-            </a:gdLst>
-            <a:ahLst/>
-            <a:cxnLst>
-              <a:cxn ang="0">
-                <a:pos x="connsiteX0" y="connsiteY0"/>
-              </a:cxn>
-              <a:cxn ang="0">
-                <a:pos x="connsiteX1" y="connsiteY1"/>
-              </a:cxn>
-              <a:cxn ang="0">
-                <a:pos x="connsiteX2" y="connsiteY2"/>
-              </a:cxn>
-              <a:cxn ang="0">
-                <a:pos x="connsiteX3" y="connsiteY3"/>
-              </a:cxn>
-              <a:cxn ang="0">
-                <a:pos x="connsiteX4" y="connsiteY4"/>
-              </a:cxn>
-              <a:cxn ang="0">
-                <a:pos x="connsiteX5" y="connsiteY5"/>
-              </a:cxn>
-              <a:cxn ang="0">
-                <a:pos x="connsiteX6" y="connsiteY6"/>
-              </a:cxn>
-              <a:cxn ang="0">
-                <a:pos x="connsiteX7" y="connsiteY7"/>
-              </a:cxn>
-              <a:cxn ang="0">
-                <a:pos x="connsiteX8" y="connsiteY8"/>
-              </a:cxn>
-              <a:cxn ang="0">
-                <a:pos x="connsiteX9" y="connsiteY9"/>
-              </a:cxn>
-              <a:cxn ang="0">
-                <a:pos x="connsiteX10" y="connsiteY10"/>
-              </a:cxn>
-              <a:cxn ang="0">
-                <a:pos x="connsiteX11" y="connsiteY11"/>
-              </a:cxn>
-              <a:cxn ang="0">
-                <a:pos x="connsiteX12" y="connsiteY12"/>
-              </a:cxn>
-              <a:cxn ang="0">
-                <a:pos x="connsiteX13" y="connsiteY13"/>
-              </a:cxn>
-              <a:cxn ang="0">
-                <a:pos x="connsiteX14" y="connsiteY14"/>
-              </a:cxn>
-              <a:cxn ang="0">
-                <a:pos x="connsiteX15" y="connsiteY15"/>
-              </a:cxn>
-              <a:cxn ang="0">
-                <a:pos x="connsiteX16" y="connsiteY16"/>
-              </a:cxn>
-              <a:cxn ang="0">
-                <a:pos x="connsiteX17" y="connsiteY17"/>
-              </a:cxn>
-              <a:cxn ang="0">
-                <a:pos x="connsiteX18" y="connsiteY18"/>
-              </a:cxn>
-              <a:cxn ang="0">
-                <a:pos x="connsiteX19" y="connsiteY19"/>
-              </a:cxn>
-              <a:cxn ang="0">
-                <a:pos x="connsiteX20" y="connsiteY20"/>
-              </a:cxn>
-              <a:cxn ang="0">
-                <a:pos x="connsiteX21" y="connsiteY21"/>
-              </a:cxn>
-              <a:cxn ang="0">
-                <a:pos x="connsiteX22" y="connsiteY22"/>
-              </a:cxn>
-              <a:cxn ang="0">
-                <a:pos x="connsiteX23" y="connsiteY23"/>
-              </a:cxn>
-              <a:cxn ang="0">
-                <a:pos x="connsiteX24" y="connsiteY24"/>
-              </a:cxn>
-              <a:cxn ang="0">
-                <a:pos x="connsiteX25" y="connsiteY25"/>
-              </a:cxn>
-              <a:cxn ang="0">
-                <a:pos x="connsiteX26" y="connsiteY26"/>
-              </a:cxn>
-              <a:cxn ang="0">
-                <a:pos x="connsiteX27" y="connsiteY27"/>
-              </a:cxn>
-              <a:cxn ang="0">
-                <a:pos x="connsiteX28" y="connsiteY28"/>
-              </a:cxn>
-              <a:cxn ang="0">
-                <a:pos x="connsiteX29" y="connsiteY29"/>
-              </a:cxn>
-              <a:cxn ang="0">
-                <a:pos x="connsiteX30" y="connsiteY30"/>
-              </a:cxn>
-              <a:cxn ang="0">
-                <a:pos x="connsiteX31" y="connsiteY31"/>
-              </a:cxn>
-              <a:cxn ang="0">
-                <a:pos x="connsiteX32" y="connsiteY32"/>
-              </a:cxn>
-              <a:cxn ang="0">
-                <a:pos x="connsiteX33" y="connsiteY33"/>
-              </a:cxn>
-              <a:cxn ang="0">
-                <a:pos x="connsiteX34" y="connsiteY34"/>
-              </a:cxn>
-              <a:cxn ang="0">
-                <a:pos x="connsiteX35" y="connsiteY35"/>
-              </a:cxn>
-              <a:cxn ang="0">
-                <a:pos x="connsiteX36" y="connsiteY36"/>
-              </a:cxn>
-              <a:cxn ang="0">
-                <a:pos x="connsiteX37" y="connsiteY37"/>
-              </a:cxn>
-              <a:cxn ang="0">
-                <a:pos x="connsiteX38" y="connsiteY38"/>
-              </a:cxn>
-              <a:cxn ang="0">
-                <a:pos x="connsiteX39" y="connsiteY39"/>
-              </a:cxn>
-              <a:cxn ang="0">
-                <a:pos x="connsiteX40" y="connsiteY40"/>
-              </a:cxn>
-              <a:cxn ang="0">
-                <a:pos x="connsiteX41" y="connsiteY41"/>
-              </a:cxn>
-              <a:cxn ang="0">
-                <a:pos x="connsiteX42" y="connsiteY42"/>
-              </a:cxn>
-              <a:cxn ang="0">
-                <a:pos x="connsiteX43" y="connsiteY43"/>
-              </a:cxn>
-              <a:cxn ang="0">
-                <a:pos x="connsiteX44" y="connsiteY44"/>
-              </a:cxn>
-              <a:cxn ang="0">
-                <a:pos x="connsiteX45" y="connsiteY45"/>
-              </a:cxn>
-              <a:cxn ang="0">
-                <a:pos x="connsiteX46" y="connsiteY46"/>
-              </a:cxn>
-              <a:cxn ang="0">
-                <a:pos x="connsiteX47" y="connsiteY47"/>
-              </a:cxn>
-              <a:cxn ang="0">
-                <a:pos x="connsiteX48" y="connsiteY48"/>
-              </a:cxn>
-              <a:cxn ang="0">
-                <a:pos x="connsiteX49" y="connsiteY49"/>
-              </a:cxn>
-              <a:cxn ang="0">
-                <a:pos x="connsiteX50" y="connsiteY50"/>
-              </a:cxn>
-              <a:cxn ang="0">
-                <a:pos x="connsiteX51" y="connsiteY51"/>
-              </a:cxn>
-            </a:cxnLst>
-            <a:rect l="l" t="t" r="r" b="b"/>
-            <a:pathLst>
-              <a:path w="4481964" h="6858000">
-                <a:moveTo>
-                  <a:pt x="3137249" y="0"/>
-                </a:moveTo>
-                <a:lnTo>
-                  <a:pt x="4480787" y="0"/>
-                </a:lnTo>
-                <a:lnTo>
-                  <a:pt x="4455742" y="155676"/>
-                </a:lnTo>
-                <a:lnTo>
-                  <a:pt x="4431873" y="310667"/>
-                </a:lnTo>
-                <a:lnTo>
-                  <a:pt x="4408509" y="466344"/>
-                </a:lnTo>
-                <a:lnTo>
-                  <a:pt x="4388506" y="622706"/>
-                </a:lnTo>
-                <a:lnTo>
-                  <a:pt x="4368335" y="778383"/>
-                </a:lnTo>
-                <a:lnTo>
-                  <a:pt x="4349509" y="934745"/>
-                </a:lnTo>
-                <a:lnTo>
-                  <a:pt x="4333373" y="1089050"/>
-                </a:lnTo>
-                <a:lnTo>
-                  <a:pt x="4318077" y="1245413"/>
-                </a:lnTo>
-                <a:lnTo>
-                  <a:pt x="4304125" y="1401089"/>
-                </a:lnTo>
-                <a:lnTo>
-                  <a:pt x="4292023" y="1554023"/>
-                </a:lnTo>
-                <a:lnTo>
-                  <a:pt x="4279920" y="1709013"/>
-                </a:lnTo>
-                <a:lnTo>
-                  <a:pt x="4269835" y="1861947"/>
-                </a:lnTo>
-                <a:lnTo>
-                  <a:pt x="4261935" y="2014880"/>
-                </a:lnTo>
-                <a:lnTo>
-                  <a:pt x="4253698" y="2167128"/>
-                </a:lnTo>
-                <a:lnTo>
-                  <a:pt x="4246807" y="2318004"/>
-                </a:lnTo>
-                <a:lnTo>
-                  <a:pt x="4241932" y="2467508"/>
-                </a:lnTo>
-                <a:lnTo>
-                  <a:pt x="4237730" y="2617013"/>
-                </a:lnTo>
-                <a:lnTo>
-                  <a:pt x="4233696" y="2765145"/>
-                </a:lnTo>
-                <a:lnTo>
-                  <a:pt x="4231847" y="2911221"/>
-                </a:lnTo>
-                <a:lnTo>
-                  <a:pt x="4229830" y="3057296"/>
-                </a:lnTo>
-                <a:lnTo>
-                  <a:pt x="4228821" y="3201314"/>
-                </a:lnTo>
-                <a:lnTo>
-                  <a:pt x="4229830" y="3343960"/>
-                </a:lnTo>
-                <a:lnTo>
-                  <a:pt x="4229830" y="3485235"/>
-                </a:lnTo>
-                <a:lnTo>
-                  <a:pt x="4231847" y="3625138"/>
-                </a:lnTo>
-                <a:lnTo>
-                  <a:pt x="4234872" y="3762298"/>
-                </a:lnTo>
-                <a:lnTo>
-                  <a:pt x="4237730" y="3898087"/>
-                </a:lnTo>
-                <a:lnTo>
-                  <a:pt x="4240924" y="4031132"/>
-                </a:lnTo>
-                <a:lnTo>
-                  <a:pt x="4245798" y="4163491"/>
-                </a:lnTo>
-                <a:lnTo>
-                  <a:pt x="4251009" y="4293793"/>
-                </a:lnTo>
-                <a:lnTo>
-                  <a:pt x="4255715" y="4421352"/>
-                </a:lnTo>
-                <a:lnTo>
-                  <a:pt x="4268995" y="4670298"/>
-                </a:lnTo>
-                <a:lnTo>
-                  <a:pt x="4283114" y="4908956"/>
-                </a:lnTo>
-                <a:lnTo>
-                  <a:pt x="4297906" y="5138013"/>
-                </a:lnTo>
-                <a:lnTo>
-                  <a:pt x="4314211" y="5354726"/>
-                </a:lnTo>
-                <a:lnTo>
-                  <a:pt x="4331188" y="5561838"/>
-                </a:lnTo>
-                <a:lnTo>
-                  <a:pt x="4349509" y="5753862"/>
-                </a:lnTo>
-                <a:lnTo>
-                  <a:pt x="4367495" y="5934227"/>
-                </a:lnTo>
-                <a:lnTo>
-                  <a:pt x="4385480" y="6100191"/>
-                </a:lnTo>
-                <a:lnTo>
-                  <a:pt x="4402457" y="6252438"/>
-                </a:lnTo>
-                <a:lnTo>
-                  <a:pt x="4418594" y="6387541"/>
-                </a:lnTo>
-                <a:lnTo>
-                  <a:pt x="4433890" y="6509613"/>
-                </a:lnTo>
-                <a:lnTo>
-                  <a:pt x="4446665" y="6612483"/>
-                </a:lnTo>
-                <a:lnTo>
-                  <a:pt x="4458767" y="6698894"/>
-                </a:lnTo>
-                <a:lnTo>
-                  <a:pt x="4476081" y="6817538"/>
-                </a:lnTo>
-                <a:lnTo>
-                  <a:pt x="4481964" y="6858000"/>
-                </a:lnTo>
-                <a:lnTo>
-                  <a:pt x="3577807" y="6858000"/>
-                </a:lnTo>
-                <a:lnTo>
-                  <a:pt x="3577807" y="6858000"/>
-                </a:lnTo>
-                <a:lnTo>
-                  <a:pt x="0" y="6858000"/>
-                </a:lnTo>
-                <a:lnTo>
-                  <a:pt x="0" y="0"/>
-                </a:lnTo>
-                <a:lnTo>
-                  <a:pt x="3137249" y="0"/>
-                </a:lnTo>
-                <a:close/>
-              </a:path>
-            </a:pathLst>
-          </a:custGeom>
-          <a:ln>
-            <a:noFill/>
-          </a:ln>
-        </p:spPr>
-        <p:style>
-          <a:lnRef idx="2">
-            <a:schemeClr val="accent1">
-              <a:shade val="50000"/>
-            </a:schemeClr>
-          </a:lnRef>
-          <a:fillRef idx="1">
-            <a:schemeClr val="accent1"/>
-          </a:fillRef>
-          <a:effectRef idx="0">
-            <a:schemeClr val="accent1"/>
-          </a:effectRef>
-          <a:fontRef idx="minor">
-            <a:schemeClr val="lt1"/>
-          </a:fontRef>
-        </p:style>
-        <p:txBody>
-          <a:bodyPr wrap="square" rtlCol="0" anchor="ctr">
-            <a:noAutofit/>
-          </a:bodyPr>
-          <a:lstStyle/>
-          <a:p>
-            <a:pPr algn="ctr"/>
-            <a:endParaRPr lang="en-US"/>
-          </a:p>
-        </p:txBody>
-      </p:sp>
-      <p:sp>
-        <p:nvSpPr>
-          <p:cNvPr id="50" name="Rectangle 49">
-            <a:extLst>
-              <a:ext uri="{FF2B5EF4-FFF2-40B4-BE49-F238E27FC236}">
-                <a16:creationId xmlns:a16="http://schemas.microsoft.com/office/drawing/2014/main" id="{60817A52-B891-4228-A61E-0C0A57632DDA}"/>
-              </a:ext>
-              <a:ext uri="{C183D7F6-B498-43B3-948B-1728B52AA6E4}">
-                <adec:decorative xmlns:adec="http://schemas.microsoft.com/office/drawing/2017/decorative" val="1"/>
-              </a:ext>
-            </a:extLst>
-          </p:cNvPr>
-          <p:cNvSpPr>
-            <a:spLocks noGrp="1" noRot="1" noChangeAspect="1" noMove="1" noResize="1" noEditPoints="1" noAdjustHandles="1" noChangeArrowheads="1" noChangeShapeType="1" noTextEdit="1"/>
-          </p:cNvSpPr>
-          <p:nvPr>
-            <p:extLst>
-              <p:ext uri="{386F3935-93C4-4BCD-93E2-E3B085C9AB24}">
-                <p16:designElem xmlns:p16="http://schemas.microsoft.com/office/powerpoint/2015/main" val="1"/>
-              </p:ext>
-            </p:extLst>
-          </p:nvPr>
-        </p:nvSpPr>
-        <p:spPr>
-          <a:xfrm>
-            <a:off x="10437812" y="0"/>
-            <a:ext cx="685800" cy="1143000"/>
-          </a:xfrm>
-          <a:prstGeom prst="rect">
-            <a:avLst/>
-          </a:prstGeom>
-          <a:solidFill>
-            <a:schemeClr val="accent1"/>
-          </a:solidFill>
-          <a:ln>
-            <a:noFill/>
-          </a:ln>
-        </p:spPr>
-        <p:style>
-          <a:lnRef idx="1">
-            <a:schemeClr val="accent1"/>
-          </a:lnRef>
-          <a:fillRef idx="3">
-            <a:schemeClr val="accent1"/>
-          </a:fillRef>
-          <a:effectRef idx="2">
-            <a:schemeClr val="accent1"/>
-          </a:effectRef>
-          <a:fontRef idx="minor">
-            <a:schemeClr val="lt1"/>
-          </a:fontRef>
-        </p:style>
-      </p:sp>
-      <p:pic>
-        <p:nvPicPr>
-          <p:cNvPr id="3" name="Picture 2">
-            <a:extLst>
-              <a:ext uri="{FF2B5EF4-FFF2-40B4-BE49-F238E27FC236}">
-                <a16:creationId xmlns:a16="http://schemas.microsoft.com/office/drawing/2014/main" id="{D462212E-4436-46EB-B72C-92DBBDE7BDBA}"/>
-              </a:ext>
-            </a:extLst>
-          </p:cNvPr>
-          <p:cNvPicPr>
-            <a:picLocks noChangeAspect="1"/>
-          </p:cNvPicPr>
-          <p:nvPr/>
-        </p:nvPicPr>
-        <p:blipFill>
-          <a:blip r:embed="rId6"/>
-          <a:stretch>
-            <a:fillRect/>
-          </a:stretch>
-        </p:blipFill>
-        <p:spPr>
-          <a:xfrm>
-            <a:off x="647240" y="2394263"/>
-            <a:ext cx="2936836" cy="2298073"/>
-          </a:xfrm>
-          <a:prstGeom prst="rect">
-            <a:avLst/>
-          </a:prstGeom>
-          <a:effectLst/>
-        </p:spPr>
-      </p:pic>
-    </p:spTree>
-    <p:extLst>
-      <p:ext uri="{BB962C8B-B14F-4D97-AF65-F5344CB8AC3E}">
-        <p14:creationId xmlns:p14="http://schemas.microsoft.com/office/powerpoint/2010/main" val="141069696"/>
-      </p:ext>
-    </p:extLst>
-  </p:cSld>
-  <p:clrMapOvr>
-    <a:overrideClrMapping bg1="lt1" tx1="dk1" bg2="lt2" tx2="dk2" accent1="accent1" accent2="accent2" accent3="accent3" accent4="accent4" accent5="accent5" accent6="accent6" hlink="hlink" folHlink="folHlink"/>
-  </p:clrMapOvr>
-</p:sld>
-</file>
-
 <file path=ppt/theme/theme1.xml><?xml version="1.0" encoding="utf-8"?>
 <a:theme xmlns:a="http://schemas.openxmlformats.org/drawingml/2006/main" name="Ion">
   <a:themeElements>

</xml_diff>

<commit_message>
Added: Additional slide in the MonoGame project
</commit_message>
<xml_diff>
--- a/MonoGame - 4.19.2019/Presentation.pptx
+++ b/MonoGame - 4.19.2019/Presentation.pptx
@@ -6,16 +6,17 @@
   </p:sldMasterIdLst>
   <p:sldIdLst>
     <p:sldId id="256" r:id="rId2"/>
-    <p:sldId id="257" r:id="rId3"/>
-    <p:sldId id="267" r:id="rId4"/>
-    <p:sldId id="260" r:id="rId5"/>
-    <p:sldId id="258" r:id="rId6"/>
-    <p:sldId id="265" r:id="rId7"/>
-    <p:sldId id="266" r:id="rId8"/>
-    <p:sldId id="261" r:id="rId9"/>
-    <p:sldId id="262" r:id="rId10"/>
-    <p:sldId id="263" r:id="rId11"/>
-    <p:sldId id="264" r:id="rId12"/>
+    <p:sldId id="268" r:id="rId3"/>
+    <p:sldId id="257" r:id="rId4"/>
+    <p:sldId id="267" r:id="rId5"/>
+    <p:sldId id="260" r:id="rId6"/>
+    <p:sldId id="258" r:id="rId7"/>
+    <p:sldId id="265" r:id="rId8"/>
+    <p:sldId id="266" r:id="rId9"/>
+    <p:sldId id="261" r:id="rId10"/>
+    <p:sldId id="262" r:id="rId11"/>
+    <p:sldId id="263" r:id="rId12"/>
+    <p:sldId id="264" r:id="rId13"/>
   </p:sldIdLst>
   <p:sldSz cx="12192000" cy="6858000"/>
   <p:notesSz cx="6858000" cy="9144000"/>
@@ -2606,10 +2607,10 @@
         <a:lstStyle/>
         <a:p>
           <a:r>
-            <a:rPr lang="en-US" b="0" i="0"/>
+            <a:rPr lang="en-US" b="0" i="0" dirty="0"/>
             <a:t>Content Pipeline</a:t>
           </a:r>
-          <a:endParaRPr lang="en-US"/>
+          <a:endParaRPr lang="en-US" dirty="0"/>
         </a:p>
       </dgm:t>
     </dgm:pt>
@@ -3831,10 +3832,10 @@
             <a:buNone/>
           </a:pPr>
           <a:r>
-            <a:rPr lang="en-US" sz="3000" b="0" i="0" kern="1200"/>
+            <a:rPr lang="en-US" sz="3000" b="0" i="0" kern="1200" dirty="0"/>
             <a:t>Content Pipeline</a:t>
           </a:r>
-          <a:endParaRPr lang="en-US" sz="3000" kern="1200"/>
+          <a:endParaRPr lang="en-US" sz="3000" kern="1200" dirty="0"/>
         </a:p>
       </dsp:txBody>
       <dsp:txXfrm>
@@ -9367,7 +9368,7 @@
           <a:p>
             <a:fld id="{48A87A34-81AB-432B-8DAE-1953F412C126}" type="datetimeFigureOut">
               <a:rPr lang="en-US" smtClean="0"/>
-              <a:t>4/15/2019</a:t>
+              <a:t>4/18/2019</a:t>
             </a:fld>
             <a:endParaRPr lang="en-US" dirty="0"/>
           </a:p>
@@ -9642,7 +9643,7 @@
           <a:p>
             <a:fld id="{48A87A34-81AB-432B-8DAE-1953F412C126}" type="datetimeFigureOut">
               <a:rPr lang="en-US" smtClean="0"/>
-              <a:t>4/15/2019</a:t>
+              <a:t>4/18/2019</a:t>
             </a:fld>
             <a:endParaRPr lang="en-US" dirty="0"/>
           </a:p>
@@ -9836,7 +9837,7 @@
           <a:p>
             <a:fld id="{48A87A34-81AB-432B-8DAE-1953F412C126}" type="datetimeFigureOut">
               <a:rPr lang="en-US" smtClean="0"/>
-              <a:t>4/15/2019</a:t>
+              <a:t>4/18/2019</a:t>
             </a:fld>
             <a:endParaRPr lang="en-US" dirty="0"/>
           </a:p>
@@ -10110,7 +10111,7 @@
             <a:fld id="{48A87A34-81AB-432B-8DAE-1953F412C126}" type="datetimeFigureOut">
               <a:rPr lang="en-US" smtClean="0"/>
               <a:pPr/>
-              <a:t>4/15/2019</a:t>
+              <a:t>4/18/2019</a:t>
             </a:fld>
             <a:endParaRPr lang="en-US" dirty="0"/>
           </a:p>
@@ -10453,7 +10454,7 @@
             <a:fld id="{48A87A34-81AB-432B-8DAE-1953F412C126}" type="datetimeFigureOut">
               <a:rPr lang="en-US" smtClean="0"/>
               <a:pPr/>
-              <a:t>4/15/2019</a:t>
+              <a:t>4/18/2019</a:t>
             </a:fld>
             <a:endParaRPr lang="en-US" dirty="0"/>
           </a:p>
@@ -11077,7 +11078,7 @@
           <a:p>
             <a:fld id="{48A87A34-81AB-432B-8DAE-1953F412C126}" type="datetimeFigureOut">
               <a:rPr lang="en-US" smtClean="0"/>
-              <a:t>4/15/2019</a:t>
+              <a:t>4/18/2019</a:t>
             </a:fld>
             <a:endParaRPr lang="en-US" dirty="0"/>
           </a:p>
@@ -11937,7 +11938,7 @@
           <a:p>
             <a:fld id="{48A87A34-81AB-432B-8DAE-1953F412C126}" type="datetimeFigureOut">
               <a:rPr lang="en-US" smtClean="0"/>
-              <a:t>4/15/2019</a:t>
+              <a:t>4/18/2019</a:t>
             </a:fld>
             <a:endParaRPr lang="en-US" dirty="0"/>
           </a:p>
@@ -12107,7 +12108,7 @@
           <a:p>
             <a:fld id="{48A87A34-81AB-432B-8DAE-1953F412C126}" type="datetimeFigureOut">
               <a:rPr lang="en-US" smtClean="0"/>
-              <a:t>4/15/2019</a:t>
+              <a:t>4/18/2019</a:t>
             </a:fld>
             <a:endParaRPr lang="en-US" dirty="0"/>
           </a:p>
@@ -12287,7 +12288,7 @@
           <a:p>
             <a:fld id="{48A87A34-81AB-432B-8DAE-1953F412C126}" type="datetimeFigureOut">
               <a:rPr lang="en-US" smtClean="0"/>
-              <a:t>4/15/2019</a:t>
+              <a:t>4/18/2019</a:t>
             </a:fld>
             <a:endParaRPr lang="en-US" dirty="0"/>
           </a:p>
@@ -12457,7 +12458,7 @@
           <a:p>
             <a:fld id="{48A87A34-81AB-432B-8DAE-1953F412C126}" type="datetimeFigureOut">
               <a:rPr lang="en-US" smtClean="0"/>
-              <a:t>4/15/2019</a:t>
+              <a:t>4/18/2019</a:t>
             </a:fld>
             <a:endParaRPr lang="en-US" dirty="0"/>
           </a:p>
@@ -12704,7 +12705,7 @@
           <a:p>
             <a:fld id="{48A87A34-81AB-432B-8DAE-1953F412C126}" type="datetimeFigureOut">
               <a:rPr lang="en-US" smtClean="0"/>
-              <a:t>4/15/2019</a:t>
+              <a:t>4/18/2019</a:t>
             </a:fld>
             <a:endParaRPr lang="en-US" dirty="0"/>
           </a:p>
@@ -12996,7 +12997,7 @@
           <a:p>
             <a:fld id="{48A87A34-81AB-432B-8DAE-1953F412C126}" type="datetimeFigureOut">
               <a:rPr lang="en-US" smtClean="0"/>
-              <a:t>4/15/2019</a:t>
+              <a:t>4/18/2019</a:t>
             </a:fld>
             <a:endParaRPr lang="en-US" dirty="0"/>
           </a:p>
@@ -13440,7 +13441,7 @@
           <a:p>
             <a:fld id="{48A87A34-81AB-432B-8DAE-1953F412C126}" type="datetimeFigureOut">
               <a:rPr lang="en-US" smtClean="0"/>
-              <a:t>4/15/2019</a:t>
+              <a:t>4/18/2019</a:t>
             </a:fld>
             <a:endParaRPr lang="en-US" dirty="0"/>
           </a:p>
@@ -13558,7 +13559,7 @@
           <a:p>
             <a:fld id="{48A87A34-81AB-432B-8DAE-1953F412C126}" type="datetimeFigureOut">
               <a:rPr lang="en-US" smtClean="0"/>
-              <a:t>4/15/2019</a:t>
+              <a:t>4/18/2019</a:t>
             </a:fld>
             <a:endParaRPr lang="en-US" dirty="0"/>
           </a:p>
@@ -13653,7 +13654,7 @@
           <a:p>
             <a:fld id="{48A87A34-81AB-432B-8DAE-1953F412C126}" type="datetimeFigureOut">
               <a:rPr lang="en-US" smtClean="0"/>
-              <a:t>4/15/2019</a:t>
+              <a:t>4/18/2019</a:t>
             </a:fld>
             <a:endParaRPr lang="en-US" dirty="0"/>
           </a:p>
@@ -13932,7 +13933,7 @@
           <a:p>
             <a:fld id="{48A87A34-81AB-432B-8DAE-1953F412C126}" type="datetimeFigureOut">
               <a:rPr lang="en-US" smtClean="0"/>
-              <a:t>4/15/2019</a:t>
+              <a:t>4/18/2019</a:t>
             </a:fld>
             <a:endParaRPr lang="en-US" dirty="0"/>
           </a:p>
@@ -14207,7 +14208,7 @@
           <a:p>
             <a:fld id="{48A87A34-81AB-432B-8DAE-1953F412C126}" type="datetimeFigureOut">
               <a:rPr lang="en-US" smtClean="0"/>
-              <a:t>4/15/2019</a:t>
+              <a:t>4/18/2019</a:t>
             </a:fld>
             <a:endParaRPr lang="en-US" dirty="0"/>
           </a:p>
@@ -14637,7 +14638,7 @@
             <a:fld id="{48A87A34-81AB-432B-8DAE-1953F412C126}" type="datetimeFigureOut">
               <a:rPr lang="en-US" smtClean="0"/>
               <a:pPr/>
-              <a:t>4/15/2019</a:t>
+              <a:t>4/18/2019</a:t>
             </a:fld>
             <a:endParaRPr lang="en-US" dirty="0"/>
           </a:p>
@@ -16255,6 +16256,1236 @@
           <a:chExt cx="0" cy="0"/>
         </a:xfrm>
       </p:grpSpPr>
+      <p:sp>
+        <p:nvSpPr>
+          <p:cNvPr id="19" name="Rectangle 9">
+            <a:extLst>
+              <a:ext uri="{FF2B5EF4-FFF2-40B4-BE49-F238E27FC236}">
+                <a16:creationId xmlns:a16="http://schemas.microsoft.com/office/drawing/2014/main" id="{B4AAD3FD-83A5-4B89-9F8F-01B8870865BE}"/>
+              </a:ext>
+              <a:ext uri="{C183D7F6-B498-43B3-948B-1728B52AA6E4}">
+                <adec:decorative xmlns:adec="http://schemas.microsoft.com/office/drawing/2017/decorative" val="1"/>
+              </a:ext>
+            </a:extLst>
+          </p:cNvPr>
+          <p:cNvSpPr>
+            <a:spLocks noGrp="1" noRot="1" noChangeAspect="1" noMove="1" noResize="1" noEditPoints="1" noAdjustHandles="1" noChangeArrowheads="1" noChangeShapeType="1" noTextEdit="1"/>
+          </p:cNvSpPr>
+          <p:nvPr>
+            <p:extLst>
+              <p:ext uri="{386F3935-93C4-4BCD-93E2-E3B085C9AB24}">
+                <p16:designElem xmlns:p16="http://schemas.microsoft.com/office/powerpoint/2015/main" val="1"/>
+              </p:ext>
+            </p:extLst>
+          </p:nvPr>
+        </p:nvSpPr>
+        <p:spPr>
+          <a:xfrm>
+            <a:off x="0" y="0"/>
+            <a:ext cx="12192000" cy="6858000"/>
+          </a:xfrm>
+          <a:prstGeom prst="rect">
+            <a:avLst/>
+          </a:prstGeom>
+          <a:ln>
+            <a:noFill/>
+          </a:ln>
+        </p:spPr>
+        <p:style>
+          <a:lnRef idx="2">
+            <a:schemeClr val="accent1">
+              <a:shade val="50000"/>
+            </a:schemeClr>
+          </a:lnRef>
+          <a:fillRef idx="1003">
+            <a:schemeClr val="dk2"/>
+          </a:fillRef>
+          <a:effectRef idx="0">
+            <a:schemeClr val="accent1"/>
+          </a:effectRef>
+          <a:fontRef idx="minor">
+            <a:schemeClr val="lt1"/>
+          </a:fontRef>
+        </p:style>
+        <p:txBody>
+          <a:bodyPr rtlCol="0" anchor="ctr"/>
+          <a:lstStyle/>
+          <a:p>
+            <a:pPr algn="ctr"/>
+            <a:endParaRPr lang="en-US"/>
+          </a:p>
+        </p:txBody>
+      </p:sp>
+      <p:sp>
+        <p:nvSpPr>
+          <p:cNvPr id="2" name="Title 1">
+            <a:extLst>
+              <a:ext uri="{FF2B5EF4-FFF2-40B4-BE49-F238E27FC236}">
+                <a16:creationId xmlns:a16="http://schemas.microsoft.com/office/drawing/2014/main" id="{DEF9F8A9-8E48-450E-A0FD-29521D149AB9}"/>
+              </a:ext>
+            </a:extLst>
+          </p:cNvPr>
+          <p:cNvSpPr>
+            <a:spLocks noGrp="1"/>
+          </p:cNvSpPr>
+          <p:nvPr>
+            <p:ph type="title"/>
+          </p:nvPr>
+        </p:nvSpPr>
+        <p:spPr>
+          <a:xfrm>
+            <a:off x="648931" y="629266"/>
+            <a:ext cx="4166510" cy="1622321"/>
+          </a:xfrm>
+        </p:spPr>
+        <p:txBody>
+          <a:bodyPr>
+            <a:normAutofit/>
+          </a:bodyPr>
+          <a:lstStyle/>
+          <a:p>
+            <a:r>
+              <a:rPr lang="en-US">
+                <a:solidFill>
+                  <a:srgbClr val="EBEBEB"/>
+                </a:solidFill>
+              </a:rPr>
+              <a:t>Things to keep in mind</a:t>
+            </a:r>
+          </a:p>
+        </p:txBody>
+      </p:sp>
+      <p:sp>
+        <p:nvSpPr>
+          <p:cNvPr id="3" name="Content Placeholder 2">
+            <a:extLst>
+              <a:ext uri="{FF2B5EF4-FFF2-40B4-BE49-F238E27FC236}">
+                <a16:creationId xmlns:a16="http://schemas.microsoft.com/office/drawing/2014/main" id="{D7A60E3A-F337-4A62-BD11-42E5E987F3C8}"/>
+              </a:ext>
+            </a:extLst>
+          </p:cNvPr>
+          <p:cNvSpPr>
+            <a:spLocks noGrp="1"/>
+          </p:cNvSpPr>
+          <p:nvPr>
+            <p:ph idx="1"/>
+          </p:nvPr>
+        </p:nvSpPr>
+        <p:spPr>
+          <a:xfrm>
+            <a:off x="648931" y="2438400"/>
+            <a:ext cx="4166509" cy="3785419"/>
+          </a:xfrm>
+        </p:spPr>
+        <p:txBody>
+          <a:bodyPr>
+            <a:normAutofit/>
+          </a:bodyPr>
+          <a:lstStyle/>
+          <a:p>
+            <a:r>
+              <a:rPr lang="en-US" dirty="0">
+                <a:solidFill>
+                  <a:srgbClr val="EBEBEB"/>
+                </a:solidFill>
+              </a:rPr>
+              <a:t>Resolution Scaling</a:t>
+            </a:r>
+          </a:p>
+          <a:p>
+            <a:pPr lvl="1"/>
+            <a:r>
+              <a:rPr lang="en-US" dirty="0">
+                <a:solidFill>
+                  <a:srgbClr val="EBEBEB"/>
+                </a:solidFill>
+              </a:rPr>
+              <a:t>Use Highest Resolution Assets available</a:t>
+            </a:r>
+          </a:p>
+          <a:p>
+            <a:r>
+              <a:rPr lang="en-US" dirty="0">
+                <a:solidFill>
+                  <a:srgbClr val="EBEBEB"/>
+                </a:solidFill>
+              </a:rPr>
+              <a:t>Architect up front</a:t>
+            </a:r>
+          </a:p>
+          <a:p>
+            <a:pPr lvl="1"/>
+            <a:r>
+              <a:rPr lang="en-US" dirty="0">
+                <a:solidFill>
+                  <a:srgbClr val="EBEBEB"/>
+                </a:solidFill>
+              </a:rPr>
+              <a:t>Long term time savings</a:t>
+            </a:r>
+          </a:p>
+          <a:p>
+            <a:r>
+              <a:rPr lang="en-US" dirty="0">
+                <a:solidFill>
+                  <a:srgbClr val="EBEBEB"/>
+                </a:solidFill>
+              </a:rPr>
+              <a:t>Playtest early and often</a:t>
+            </a:r>
+          </a:p>
+          <a:p>
+            <a:endParaRPr lang="en-US" dirty="0">
+              <a:solidFill>
+                <a:srgbClr val="EBEBEB"/>
+              </a:solidFill>
+            </a:endParaRPr>
+          </a:p>
+        </p:txBody>
+      </p:sp>
+      <p:sp>
+        <p:nvSpPr>
+          <p:cNvPr id="20" name="Freeform 31">
+            <a:extLst>
+              <a:ext uri="{FF2B5EF4-FFF2-40B4-BE49-F238E27FC236}">
+                <a16:creationId xmlns:a16="http://schemas.microsoft.com/office/drawing/2014/main" id="{61752F1D-FC0F-4103-9584-630E643CCDA6}"/>
+              </a:ext>
+              <a:ext uri="{C183D7F6-B498-43B3-948B-1728B52AA6E4}">
+                <adec:decorative xmlns:adec="http://schemas.microsoft.com/office/drawing/2017/decorative" val="1"/>
+              </a:ext>
+            </a:extLst>
+          </p:cNvPr>
+          <p:cNvSpPr>
+            <a:spLocks noGrp="1" noRot="1" noChangeAspect="1" noMove="1" noResize="1" noEditPoints="1" noAdjustHandles="1" noChangeArrowheads="1" noChangeShapeType="1" noTextEdit="1"/>
+          </p:cNvSpPr>
+          <p:nvPr>
+            <p:extLst>
+              <p:ext uri="{386F3935-93C4-4BCD-93E2-E3B085C9AB24}">
+                <p16:designElem xmlns:p16="http://schemas.microsoft.com/office/powerpoint/2015/main" val="1"/>
+              </p:ext>
+            </p:extLst>
+          </p:nvPr>
+        </p:nvSpPr>
+        <p:spPr>
+          <a:xfrm>
+            <a:off x="4994020" y="-1"/>
+            <a:ext cx="559472" cy="3709642"/>
+          </a:xfrm>
+          <a:custGeom>
+            <a:avLst/>
+            <a:gdLst>
+              <a:gd name="connsiteX0" fmla="*/ 0 w 559472"/>
+              <a:gd name="connsiteY0" fmla="*/ 0 h 3709642"/>
+              <a:gd name="connsiteX1" fmla="*/ 473952 w 559472"/>
+              <a:gd name="connsiteY1" fmla="*/ 0 h 3709642"/>
+              <a:gd name="connsiteX2" fmla="*/ 485840 w 559472"/>
+              <a:gd name="connsiteY2" fmla="*/ 161194 h 3709642"/>
+              <a:gd name="connsiteX3" fmla="*/ 523949 w 559472"/>
+              <a:gd name="connsiteY3" fmla="*/ 3672197 h 3709642"/>
+              <a:gd name="connsiteX4" fmla="*/ 454748 w 559472"/>
+              <a:gd name="connsiteY4" fmla="*/ 3709642 h 3709642"/>
+              <a:gd name="connsiteX5" fmla="*/ 448224 w 559472"/>
+              <a:gd name="connsiteY5" fmla="*/ 3510471 h 3709642"/>
+              <a:gd name="connsiteX6" fmla="*/ 443564 w 559472"/>
+              <a:gd name="connsiteY6" fmla="*/ 3408563 h 3709642"/>
+              <a:gd name="connsiteX7" fmla="*/ 438902 w 559472"/>
+              <a:gd name="connsiteY7" fmla="*/ 3304407 h 3709642"/>
+              <a:gd name="connsiteX8" fmla="*/ 433941 w 559472"/>
+              <a:gd name="connsiteY8" fmla="*/ 3198777 h 3709642"/>
+              <a:gd name="connsiteX9" fmla="*/ 427584 w 559472"/>
+              <a:gd name="connsiteY9" fmla="*/ 3092510 h 3709642"/>
+              <a:gd name="connsiteX10" fmla="*/ 420988 w 559472"/>
+              <a:gd name="connsiteY10" fmla="*/ 2984390 h 3709642"/>
+              <a:gd name="connsiteX11" fmla="*/ 414330 w 559472"/>
+              <a:gd name="connsiteY11" fmla="*/ 2874401 h 3709642"/>
+              <a:gd name="connsiteX12" fmla="*/ 406840 w 559472"/>
+              <a:gd name="connsiteY12" fmla="*/ 2762980 h 3709642"/>
+              <a:gd name="connsiteX13" fmla="*/ 397745 w 559472"/>
+              <a:gd name="connsiteY13" fmla="*/ 2650566 h 3709642"/>
+              <a:gd name="connsiteX14" fmla="*/ 389154 w 559472"/>
+              <a:gd name="connsiteY14" fmla="*/ 2536612 h 3709642"/>
+              <a:gd name="connsiteX15" fmla="*/ 379225 w 559472"/>
+              <a:gd name="connsiteY15" fmla="*/ 2421642 h 3709642"/>
+              <a:gd name="connsiteX16" fmla="*/ 368316 w 559472"/>
+              <a:gd name="connsiteY16" fmla="*/ 2305627 h 3709642"/>
+              <a:gd name="connsiteX17" fmla="*/ 357466 w 559472"/>
+              <a:gd name="connsiteY17" fmla="*/ 2189233 h 3709642"/>
+              <a:gd name="connsiteX18" fmla="*/ 344982 w 559472"/>
+              <a:gd name="connsiteY18" fmla="*/ 2071473 h 3709642"/>
+              <a:gd name="connsiteX19" fmla="*/ 332466 w 559472"/>
+              <a:gd name="connsiteY19" fmla="*/ 1952216 h 3709642"/>
+              <a:gd name="connsiteX20" fmla="*/ 319121 w 559472"/>
+              <a:gd name="connsiteY20" fmla="*/ 1833776 h 3709642"/>
+              <a:gd name="connsiteX21" fmla="*/ 304408 w 559472"/>
+              <a:gd name="connsiteY21" fmla="*/ 1713948 h 3709642"/>
+              <a:gd name="connsiteX22" fmla="*/ 288685 w 559472"/>
+              <a:gd name="connsiteY22" fmla="*/ 1592703 h 3709642"/>
+              <a:gd name="connsiteX23" fmla="*/ 273050 w 559472"/>
+              <a:gd name="connsiteY23" fmla="*/ 1471451 h 3709642"/>
+              <a:gd name="connsiteX24" fmla="*/ 255813 w 559472"/>
+              <a:gd name="connsiteY24" fmla="*/ 1350328 h 3709642"/>
+              <a:gd name="connsiteX25" fmla="*/ 237060 w 559472"/>
+              <a:gd name="connsiteY25" fmla="*/ 1227080 h 3709642"/>
+              <a:gd name="connsiteX26" fmla="*/ 218488 w 559472"/>
+              <a:gd name="connsiteY26" fmla="*/ 1106065 h 3709642"/>
+              <a:gd name="connsiteX27" fmla="*/ 198221 w 559472"/>
+              <a:gd name="connsiteY27" fmla="*/ 982940 h 3709642"/>
+              <a:gd name="connsiteX28" fmla="*/ 177152 w 559472"/>
+              <a:gd name="connsiteY28" fmla="*/ 858755 h 3709642"/>
+              <a:gd name="connsiteX29" fmla="*/ 155551 w 559472"/>
+              <a:gd name="connsiteY29" fmla="*/ 736861 h 3709642"/>
+              <a:gd name="connsiteX30" fmla="*/ 131782 w 559472"/>
+              <a:gd name="connsiteY30" fmla="*/ 613645 h 3709642"/>
+              <a:gd name="connsiteX31" fmla="*/ 107123 w 559472"/>
+              <a:gd name="connsiteY31" fmla="*/ 490500 h 3709642"/>
+              <a:gd name="connsiteX32" fmla="*/ 82552 w 559472"/>
+              <a:gd name="connsiteY32" fmla="*/ 367348 h 3709642"/>
+              <a:gd name="connsiteX33" fmla="*/ 55608 w 559472"/>
+              <a:gd name="connsiteY33" fmla="*/ 244762 h 3709642"/>
+              <a:gd name="connsiteX34" fmla="*/ 28130 w 559472"/>
+              <a:gd name="connsiteY34" fmla="*/ 122220 h 3709642"/>
+              <a:gd name="connsiteX35" fmla="*/ 0 w 559472"/>
+              <a:gd name="connsiteY35" fmla="*/ 0 h 3709642"/>
+            </a:gdLst>
+            <a:ahLst/>
+            <a:cxnLst>
+              <a:cxn ang="0">
+                <a:pos x="connsiteX0" y="connsiteY0"/>
+              </a:cxn>
+              <a:cxn ang="0">
+                <a:pos x="connsiteX1" y="connsiteY1"/>
+              </a:cxn>
+              <a:cxn ang="0">
+                <a:pos x="connsiteX2" y="connsiteY2"/>
+              </a:cxn>
+              <a:cxn ang="0">
+                <a:pos x="connsiteX3" y="connsiteY3"/>
+              </a:cxn>
+              <a:cxn ang="0">
+                <a:pos x="connsiteX4" y="connsiteY4"/>
+              </a:cxn>
+              <a:cxn ang="0">
+                <a:pos x="connsiteX5" y="connsiteY5"/>
+              </a:cxn>
+              <a:cxn ang="0">
+                <a:pos x="connsiteX6" y="connsiteY6"/>
+              </a:cxn>
+              <a:cxn ang="0">
+                <a:pos x="connsiteX7" y="connsiteY7"/>
+              </a:cxn>
+              <a:cxn ang="0">
+                <a:pos x="connsiteX8" y="connsiteY8"/>
+              </a:cxn>
+              <a:cxn ang="0">
+                <a:pos x="connsiteX9" y="connsiteY9"/>
+              </a:cxn>
+              <a:cxn ang="0">
+                <a:pos x="connsiteX10" y="connsiteY10"/>
+              </a:cxn>
+              <a:cxn ang="0">
+                <a:pos x="connsiteX11" y="connsiteY11"/>
+              </a:cxn>
+              <a:cxn ang="0">
+                <a:pos x="connsiteX12" y="connsiteY12"/>
+              </a:cxn>
+              <a:cxn ang="0">
+                <a:pos x="connsiteX13" y="connsiteY13"/>
+              </a:cxn>
+              <a:cxn ang="0">
+                <a:pos x="connsiteX14" y="connsiteY14"/>
+              </a:cxn>
+              <a:cxn ang="0">
+                <a:pos x="connsiteX15" y="connsiteY15"/>
+              </a:cxn>
+              <a:cxn ang="0">
+                <a:pos x="connsiteX16" y="connsiteY16"/>
+              </a:cxn>
+              <a:cxn ang="0">
+                <a:pos x="connsiteX17" y="connsiteY17"/>
+              </a:cxn>
+              <a:cxn ang="0">
+                <a:pos x="connsiteX18" y="connsiteY18"/>
+              </a:cxn>
+              <a:cxn ang="0">
+                <a:pos x="connsiteX19" y="connsiteY19"/>
+              </a:cxn>
+              <a:cxn ang="0">
+                <a:pos x="connsiteX20" y="connsiteY20"/>
+              </a:cxn>
+              <a:cxn ang="0">
+                <a:pos x="connsiteX21" y="connsiteY21"/>
+              </a:cxn>
+              <a:cxn ang="0">
+                <a:pos x="connsiteX22" y="connsiteY22"/>
+              </a:cxn>
+              <a:cxn ang="0">
+                <a:pos x="connsiteX23" y="connsiteY23"/>
+              </a:cxn>
+              <a:cxn ang="0">
+                <a:pos x="connsiteX24" y="connsiteY24"/>
+              </a:cxn>
+              <a:cxn ang="0">
+                <a:pos x="connsiteX25" y="connsiteY25"/>
+              </a:cxn>
+              <a:cxn ang="0">
+                <a:pos x="connsiteX26" y="connsiteY26"/>
+              </a:cxn>
+              <a:cxn ang="0">
+                <a:pos x="connsiteX27" y="connsiteY27"/>
+              </a:cxn>
+              <a:cxn ang="0">
+                <a:pos x="connsiteX28" y="connsiteY28"/>
+              </a:cxn>
+              <a:cxn ang="0">
+                <a:pos x="connsiteX29" y="connsiteY29"/>
+              </a:cxn>
+              <a:cxn ang="0">
+                <a:pos x="connsiteX30" y="connsiteY30"/>
+              </a:cxn>
+              <a:cxn ang="0">
+                <a:pos x="connsiteX31" y="connsiteY31"/>
+              </a:cxn>
+              <a:cxn ang="0">
+                <a:pos x="connsiteX32" y="connsiteY32"/>
+              </a:cxn>
+              <a:cxn ang="0">
+                <a:pos x="connsiteX33" y="connsiteY33"/>
+              </a:cxn>
+              <a:cxn ang="0">
+                <a:pos x="connsiteX34" y="connsiteY34"/>
+              </a:cxn>
+              <a:cxn ang="0">
+                <a:pos x="connsiteX35" y="connsiteY35"/>
+              </a:cxn>
+            </a:cxnLst>
+            <a:rect l="l" t="t" r="r" b="b"/>
+            <a:pathLst>
+              <a:path w="559472" h="3709642">
+                <a:moveTo>
+                  <a:pt x="0" y="0"/>
+                </a:moveTo>
+                <a:lnTo>
+                  <a:pt x="473952" y="0"/>
+                </a:lnTo>
+                <a:lnTo>
+                  <a:pt x="485840" y="161194"/>
+                </a:lnTo>
+                <a:cubicBezTo>
+                  <a:pt x="552063" y="1147770"/>
+                  <a:pt x="592441" y="3086737"/>
+                  <a:pt x="523949" y="3672197"/>
+                </a:cubicBezTo>
+                <a:cubicBezTo>
+                  <a:pt x="500842" y="3684557"/>
+                  <a:pt x="477855" y="3697282"/>
+                  <a:pt x="454748" y="3709642"/>
+                </a:cubicBezTo>
+                <a:lnTo>
+                  <a:pt x="448224" y="3510471"/>
+                </a:lnTo>
+                <a:lnTo>
+                  <a:pt x="443564" y="3408563"/>
+                </a:lnTo>
+                <a:lnTo>
+                  <a:pt x="438902" y="3304407"/>
+                </a:lnTo>
+                <a:lnTo>
+                  <a:pt x="433941" y="3198777"/>
+                </a:lnTo>
+                <a:lnTo>
+                  <a:pt x="427584" y="3092510"/>
+                </a:lnTo>
+                <a:lnTo>
+                  <a:pt x="420988" y="2984390"/>
+                </a:lnTo>
+                <a:lnTo>
+                  <a:pt x="414330" y="2874401"/>
+                </a:lnTo>
+                <a:lnTo>
+                  <a:pt x="406840" y="2762980"/>
+                </a:lnTo>
+                <a:lnTo>
+                  <a:pt x="397745" y="2650566"/>
+                </a:lnTo>
+                <a:lnTo>
+                  <a:pt x="389154" y="2536612"/>
+                </a:lnTo>
+                <a:lnTo>
+                  <a:pt x="379225" y="2421642"/>
+                </a:lnTo>
+                <a:lnTo>
+                  <a:pt x="368316" y="2305627"/>
+                </a:lnTo>
+                <a:lnTo>
+                  <a:pt x="357466" y="2189233"/>
+                </a:lnTo>
+                <a:lnTo>
+                  <a:pt x="344982" y="2071473"/>
+                </a:lnTo>
+                <a:lnTo>
+                  <a:pt x="332466" y="1952216"/>
+                </a:lnTo>
+                <a:lnTo>
+                  <a:pt x="319121" y="1833776"/>
+                </a:lnTo>
+                <a:lnTo>
+                  <a:pt x="304408" y="1713948"/>
+                </a:lnTo>
+                <a:lnTo>
+                  <a:pt x="288685" y="1592703"/>
+                </a:lnTo>
+                <a:lnTo>
+                  <a:pt x="273050" y="1471451"/>
+                </a:lnTo>
+                <a:lnTo>
+                  <a:pt x="255813" y="1350328"/>
+                </a:lnTo>
+                <a:lnTo>
+                  <a:pt x="237060" y="1227080"/>
+                </a:lnTo>
+                <a:lnTo>
+                  <a:pt x="218488" y="1106065"/>
+                </a:lnTo>
+                <a:lnTo>
+                  <a:pt x="198221" y="982940"/>
+                </a:lnTo>
+                <a:lnTo>
+                  <a:pt x="177152" y="858755"/>
+                </a:lnTo>
+                <a:lnTo>
+                  <a:pt x="155551" y="736861"/>
+                </a:lnTo>
+                <a:lnTo>
+                  <a:pt x="131782" y="613645"/>
+                </a:lnTo>
+                <a:lnTo>
+                  <a:pt x="107123" y="490500"/>
+                </a:lnTo>
+                <a:lnTo>
+                  <a:pt x="82552" y="367348"/>
+                </a:lnTo>
+                <a:lnTo>
+                  <a:pt x="55608" y="244762"/>
+                </a:lnTo>
+                <a:lnTo>
+                  <a:pt x="28130" y="122220"/>
+                </a:lnTo>
+                <a:lnTo>
+                  <a:pt x="0" y="0"/>
+                </a:lnTo>
+                <a:close/>
+              </a:path>
+            </a:pathLst>
+          </a:custGeom>
+          <a:solidFill>
+            <a:schemeClr val="bg1">
+              <a:alpha val="20000"/>
+            </a:schemeClr>
+          </a:solidFill>
+          <a:ln>
+            <a:noFill/>
+          </a:ln>
+        </p:spPr>
+        <p:txBody>
+          <a:bodyPr rtlCol="0" anchor="ctr"/>
+          <a:lstStyle/>
+          <a:p>
+            <a:pPr algn="ctr"/>
+            <a:endParaRPr lang="en-US"/>
+          </a:p>
+        </p:txBody>
+      </p:sp>
+      <p:sp useBgFill="1">
+        <p:nvSpPr>
+          <p:cNvPr id="21" name="Rectangle 13">
+            <a:extLst>
+              <a:ext uri="{FF2B5EF4-FFF2-40B4-BE49-F238E27FC236}">
+                <a16:creationId xmlns:a16="http://schemas.microsoft.com/office/drawing/2014/main" id="{126C04EF-6428-472D-B316-74A19385B08F}"/>
+              </a:ext>
+              <a:ext uri="{C183D7F6-B498-43B3-948B-1728B52AA6E4}">
+                <adec:decorative xmlns:adec="http://schemas.microsoft.com/office/drawing/2017/decorative" val="1"/>
+              </a:ext>
+            </a:extLst>
+          </p:cNvPr>
+          <p:cNvSpPr>
+            <a:spLocks noGrp="1" noRot="1" noChangeAspect="1" noMove="1" noResize="1" noEditPoints="1" noAdjustHandles="1" noChangeArrowheads="1" noChangeShapeType="1" noTextEdit="1"/>
+          </p:cNvSpPr>
+          <p:nvPr>
+            <p:extLst>
+              <p:ext uri="{386F3935-93C4-4BCD-93E2-E3B085C9AB24}">
+                <p16:designElem xmlns:p16="http://schemas.microsoft.com/office/powerpoint/2015/main" val="1"/>
+              </p:ext>
+            </p:extLst>
+          </p:nvPr>
+        </p:nvSpPr>
+        <p:spPr>
+          <a:xfrm>
+            <a:off x="6093992" y="0"/>
+            <a:ext cx="6098427" cy="6858000"/>
+          </a:xfrm>
+          <a:prstGeom prst="rect">
+            <a:avLst/>
+          </a:prstGeom>
+          <a:ln>
+            <a:noFill/>
+          </a:ln>
+        </p:spPr>
+        <p:style>
+          <a:lnRef idx="2">
+            <a:schemeClr val="accent1">
+              <a:shade val="50000"/>
+            </a:schemeClr>
+          </a:lnRef>
+          <a:fillRef idx="1">
+            <a:schemeClr val="accent1"/>
+          </a:fillRef>
+          <a:effectRef idx="0">
+            <a:schemeClr val="accent1"/>
+          </a:effectRef>
+          <a:fontRef idx="minor">
+            <a:schemeClr val="lt1"/>
+          </a:fontRef>
+        </p:style>
+        <p:txBody>
+          <a:bodyPr rtlCol="0" anchor="ctr"/>
+          <a:lstStyle/>
+          <a:p>
+            <a:pPr algn="ctr"/>
+            <a:endParaRPr lang="en-US"/>
+          </a:p>
+        </p:txBody>
+      </p:sp>
+      <p:sp useBgFill="1">
+        <p:nvSpPr>
+          <p:cNvPr id="22" name="Freeform 5">
+            <a:extLst>
+              <a:ext uri="{FF2B5EF4-FFF2-40B4-BE49-F238E27FC236}">
+                <a16:creationId xmlns:a16="http://schemas.microsoft.com/office/drawing/2014/main" id="{AE50896D-AACB-4C0A-855D-ECEFB4A0DA9A}"/>
+              </a:ext>
+              <a:ext uri="{C183D7F6-B498-43B3-948B-1728B52AA6E4}">
+                <adec:decorative xmlns:adec="http://schemas.microsoft.com/office/drawing/2017/decorative" val="1"/>
+              </a:ext>
+            </a:extLst>
+          </p:cNvPr>
+          <p:cNvSpPr>
+            <a:spLocks noGrp="1" noRot="1" noChangeAspect="1" noMove="1" noResize="1" noEditPoints="1" noAdjustHandles="1" noChangeArrowheads="1" noChangeShapeType="1" noTextEdit="1"/>
+          </p:cNvSpPr>
+          <p:nvPr>
+            <p:extLst>
+              <p:ext uri="{386F3935-93C4-4BCD-93E2-E3B085C9AB24}">
+                <p16:designElem xmlns:p16="http://schemas.microsoft.com/office/powerpoint/2015/main" val="1"/>
+              </p:ext>
+            </p:extLst>
+          </p:nvPr>
+        </p:nvSpPr>
+        <p:spPr bwMode="gray">
+          <a:xfrm rot="16200000">
+            <a:off x="2450577" y="2756642"/>
+            <a:ext cx="6858000" cy="1344715"/>
+          </a:xfrm>
+          <a:custGeom>
+            <a:avLst/>
+            <a:gdLst/>
+            <a:ahLst/>
+            <a:cxnLst/>
+            <a:rect l="l" t="t" r="r" b="b"/>
+            <a:pathLst>
+              <a:path w="10000" h="8000">
+                <a:moveTo>
+                  <a:pt x="0" y="0"/>
+                </a:moveTo>
+                <a:lnTo>
+                  <a:pt x="0" y="7970"/>
+                </a:lnTo>
+                <a:lnTo>
+                  <a:pt x="10000" y="8000"/>
+                </a:lnTo>
+                <a:lnTo>
+                  <a:pt x="10000" y="7"/>
+                </a:lnTo>
+                <a:lnTo>
+                  <a:pt x="10000" y="7"/>
+                </a:lnTo>
+                <a:lnTo>
+                  <a:pt x="9773" y="156"/>
+                </a:lnTo>
+                <a:lnTo>
+                  <a:pt x="9547" y="298"/>
+                </a:lnTo>
+                <a:lnTo>
+                  <a:pt x="9320" y="437"/>
+                </a:lnTo>
+                <a:lnTo>
+                  <a:pt x="9092" y="556"/>
+                </a:lnTo>
+                <a:lnTo>
+                  <a:pt x="8865" y="676"/>
+                </a:lnTo>
+                <a:lnTo>
+                  <a:pt x="8637" y="788"/>
+                </a:lnTo>
+                <a:lnTo>
+                  <a:pt x="8412" y="884"/>
+                </a:lnTo>
+                <a:lnTo>
+                  <a:pt x="8184" y="975"/>
+                </a:lnTo>
+                <a:lnTo>
+                  <a:pt x="7957" y="1058"/>
+                </a:lnTo>
+                <a:lnTo>
+                  <a:pt x="7734" y="1130"/>
+                </a:lnTo>
+                <a:lnTo>
+                  <a:pt x="7508" y="1202"/>
+                </a:lnTo>
+                <a:lnTo>
+                  <a:pt x="7285" y="1262"/>
+                </a:lnTo>
+                <a:lnTo>
+                  <a:pt x="7062" y="1309"/>
+                </a:lnTo>
+                <a:lnTo>
+                  <a:pt x="6840" y="1358"/>
+                </a:lnTo>
+                <a:lnTo>
+                  <a:pt x="6620" y="1399"/>
+                </a:lnTo>
+                <a:lnTo>
+                  <a:pt x="6402" y="1428"/>
+                </a:lnTo>
+                <a:lnTo>
+                  <a:pt x="6184" y="1453"/>
+                </a:lnTo>
+                <a:lnTo>
+                  <a:pt x="5968" y="1477"/>
+                </a:lnTo>
+                <a:lnTo>
+                  <a:pt x="5755" y="1488"/>
+                </a:lnTo>
+                <a:lnTo>
+                  <a:pt x="5542" y="1500"/>
+                </a:lnTo>
+                <a:lnTo>
+                  <a:pt x="5332" y="1506"/>
+                </a:lnTo>
+                <a:lnTo>
+                  <a:pt x="5124" y="1500"/>
+                </a:lnTo>
+                <a:lnTo>
+                  <a:pt x="4918" y="1500"/>
+                </a:lnTo>
+                <a:lnTo>
+                  <a:pt x="4714" y="1488"/>
+                </a:lnTo>
+                <a:lnTo>
+                  <a:pt x="4514" y="1470"/>
+                </a:lnTo>
+                <a:lnTo>
+                  <a:pt x="4316" y="1453"/>
+                </a:lnTo>
+                <a:lnTo>
+                  <a:pt x="4122" y="1434"/>
+                </a:lnTo>
+                <a:lnTo>
+                  <a:pt x="3929" y="1405"/>
+                </a:lnTo>
+                <a:lnTo>
+                  <a:pt x="3739" y="1374"/>
+                </a:lnTo>
+                <a:lnTo>
+                  <a:pt x="3553" y="1346"/>
+                </a:lnTo>
+                <a:lnTo>
+                  <a:pt x="3190" y="1267"/>
+                </a:lnTo>
+                <a:lnTo>
+                  <a:pt x="2842" y="1183"/>
+                </a:lnTo>
+                <a:lnTo>
+                  <a:pt x="2508" y="1095"/>
+                </a:lnTo>
+                <a:lnTo>
+                  <a:pt x="2192" y="998"/>
+                </a:lnTo>
+                <a:lnTo>
+                  <a:pt x="1890" y="897"/>
+                </a:lnTo>
+                <a:lnTo>
+                  <a:pt x="1610" y="788"/>
+                </a:lnTo>
+                <a:lnTo>
+                  <a:pt x="1347" y="681"/>
+                </a:lnTo>
+                <a:lnTo>
+                  <a:pt x="1105" y="574"/>
+                </a:lnTo>
+                <a:lnTo>
+                  <a:pt x="883" y="473"/>
+                </a:lnTo>
+                <a:lnTo>
+                  <a:pt x="686" y="377"/>
+                </a:lnTo>
+                <a:lnTo>
+                  <a:pt x="508" y="286"/>
+                </a:lnTo>
+                <a:lnTo>
+                  <a:pt x="358" y="210"/>
+                </a:lnTo>
+                <a:lnTo>
+                  <a:pt x="232" y="138"/>
+                </a:lnTo>
+                <a:lnTo>
+                  <a:pt x="59" y="35"/>
+                </a:lnTo>
+                <a:lnTo>
+                  <a:pt x="0" y="0"/>
+                </a:lnTo>
+                <a:lnTo>
+                  <a:pt x="0" y="0"/>
+                </a:lnTo>
+                <a:close/>
+              </a:path>
+            </a:pathLst>
+          </a:custGeom>
+          <a:ln>
+            <a:noFill/>
+          </a:ln>
+        </p:spPr>
+      </p:sp>
+      <p:pic>
+        <p:nvPicPr>
+          <p:cNvPr id="7" name="Graphic 6" descr="Head with Gears">
+            <a:extLst>
+              <a:ext uri="{FF2B5EF4-FFF2-40B4-BE49-F238E27FC236}">
+                <a16:creationId xmlns:a16="http://schemas.microsoft.com/office/drawing/2014/main" id="{569949DD-B856-4B6D-BBED-C3A6B77C2399}"/>
+              </a:ext>
+            </a:extLst>
+          </p:cNvPr>
+          <p:cNvPicPr>
+            <a:picLocks noChangeAspect="1"/>
+          </p:cNvPicPr>
+          <p:nvPr/>
+        </p:nvPicPr>
+        <p:blipFill>
+          <a:blip r:embed="rId2">
+            <a:extLst>
+              <a:ext uri="{28A0092B-C50C-407E-A947-70E740481C1C}">
+                <a14:useLocalDpi xmlns:a14="http://schemas.microsoft.com/office/drawing/2010/main" val="0"/>
+              </a:ext>
+              <a:ext uri="{96DAC541-7B7A-43D3-8B79-37D633B846F1}">
+                <asvg:svgBlip xmlns:asvg="http://schemas.microsoft.com/office/drawing/2016/SVG/main" r:embed="rId3"/>
+              </a:ext>
+            </a:extLst>
+          </a:blip>
+          <a:stretch>
+            <a:fillRect/>
+          </a:stretch>
+        </p:blipFill>
+        <p:spPr>
+          <a:xfrm>
+            <a:off x="6093992" y="704054"/>
+            <a:ext cx="5449889" cy="5449889"/>
+          </a:xfrm>
+          <a:prstGeom prst="rect">
+            <a:avLst/>
+          </a:prstGeom>
+          <a:effectLst/>
+        </p:spPr>
+      </p:pic>
+      <p:sp>
+        <p:nvSpPr>
+          <p:cNvPr id="18" name="Rectangle 17">
+            <a:extLst>
+              <a:ext uri="{FF2B5EF4-FFF2-40B4-BE49-F238E27FC236}">
+                <a16:creationId xmlns:a16="http://schemas.microsoft.com/office/drawing/2014/main" id="{A92A1116-1C84-41DF-B803-1F7B0883EC82}"/>
+              </a:ext>
+              <a:ext uri="{C183D7F6-B498-43B3-948B-1728B52AA6E4}">
+                <adec:decorative xmlns:adec="http://schemas.microsoft.com/office/drawing/2017/decorative" val="1"/>
+              </a:ext>
+            </a:extLst>
+          </p:cNvPr>
+          <p:cNvSpPr>
+            <a:spLocks noGrp="1" noRot="1" noChangeAspect="1" noMove="1" noResize="1" noEditPoints="1" noAdjustHandles="1" noChangeArrowheads="1" noChangeShapeType="1" noTextEdit="1"/>
+          </p:cNvSpPr>
+          <p:nvPr>
+            <p:extLst>
+              <p:ext uri="{386F3935-93C4-4BCD-93E2-E3B085C9AB24}">
+                <p16:designElem xmlns:p16="http://schemas.microsoft.com/office/powerpoint/2015/main" val="1"/>
+              </p:ext>
+            </p:extLst>
+          </p:nvPr>
+        </p:nvSpPr>
+        <p:spPr>
+          <a:xfrm>
+            <a:off x="10442448" y="0"/>
+            <a:ext cx="685800" cy="1143000"/>
+          </a:xfrm>
+          <a:prstGeom prst="rect">
+            <a:avLst/>
+          </a:prstGeom>
+          <a:solidFill>
+            <a:schemeClr val="accent1"/>
+          </a:solidFill>
+          <a:ln>
+            <a:noFill/>
+          </a:ln>
+        </p:spPr>
+        <p:style>
+          <a:lnRef idx="1">
+            <a:schemeClr val="accent1"/>
+          </a:lnRef>
+          <a:fillRef idx="3">
+            <a:schemeClr val="accent1"/>
+          </a:fillRef>
+          <a:effectRef idx="2">
+            <a:schemeClr val="accent1"/>
+          </a:effectRef>
+          <a:fontRef idx="minor">
+            <a:schemeClr val="lt1"/>
+          </a:fontRef>
+        </p:style>
+      </p:sp>
+    </p:spTree>
+    <p:extLst>
+      <p:ext uri="{BB962C8B-B14F-4D97-AF65-F5344CB8AC3E}">
+        <p14:creationId xmlns:p14="http://schemas.microsoft.com/office/powerpoint/2010/main" val="2953930957"/>
+      </p:ext>
+    </p:extLst>
+  </p:cSld>
+  <p:clrMapOvr>
+    <a:overrideClrMapping bg1="lt1" tx1="dk1" bg2="lt2" tx2="dk2" accent1="accent1" accent2="accent2" accent3="accent3" accent4="accent4" accent5="accent5" accent6="accent6" hlink="hlink" folHlink="folHlink"/>
+  </p:clrMapOvr>
+  <p:timing>
+    <p:tnLst>
+      <p:par>
+        <p:cTn id="1" dur="indefinite" restart="never" nodeType="tmRoot">
+          <p:childTnLst>
+            <p:seq concurrent="1" nextAc="seek">
+              <p:cTn id="2" dur="indefinite" nodeType="mainSeq">
+                <p:childTnLst>
+                  <p:par>
+                    <p:cTn id="3" fill="hold">
+                      <p:stCondLst>
+                        <p:cond delay="indefinite"/>
+                      </p:stCondLst>
+                      <p:childTnLst>
+                        <p:par>
+                          <p:cTn id="4" fill="hold">
+                            <p:stCondLst>
+                              <p:cond delay="0"/>
+                            </p:stCondLst>
+                            <p:childTnLst>
+                              <p:par>
+                                <p:cTn id="5" presetID="10" presetClass="entr" presetSubtype="0" fill="hold" grpId="0" nodeType="clickEffect">
+                                  <p:stCondLst>
+                                    <p:cond delay="0"/>
+                                  </p:stCondLst>
+                                  <p:childTnLst>
+                                    <p:set>
+                                      <p:cBhvr>
+                                        <p:cTn id="6" dur="1" fill="hold">
+                                          <p:stCondLst>
+                                            <p:cond delay="0"/>
+                                          </p:stCondLst>
+                                        </p:cTn>
+                                        <p:tgtEl>
+                                          <p:spTgt spid="3">
+                                            <p:txEl>
+                                              <p:pRg st="0" end="0"/>
+                                            </p:txEl>
+                                          </p:spTgt>
+                                        </p:tgtEl>
+                                        <p:attrNameLst>
+                                          <p:attrName>style.visibility</p:attrName>
+                                        </p:attrNameLst>
+                                      </p:cBhvr>
+                                      <p:to>
+                                        <p:strVal val="visible"/>
+                                      </p:to>
+                                    </p:set>
+                                    <p:animEffect transition="in" filter="fade">
+                                      <p:cBhvr>
+                                        <p:cTn id="7" dur="500"/>
+                                        <p:tgtEl>
+                                          <p:spTgt spid="3">
+                                            <p:txEl>
+                                              <p:pRg st="0" end="0"/>
+                                            </p:txEl>
+                                          </p:spTgt>
+                                        </p:tgtEl>
+                                      </p:cBhvr>
+                                    </p:animEffect>
+                                  </p:childTnLst>
+                                </p:cTn>
+                              </p:par>
+                              <p:par>
+                                <p:cTn id="8" presetID="10" presetClass="entr" presetSubtype="0" fill="hold" grpId="0" nodeType="withEffect">
+                                  <p:stCondLst>
+                                    <p:cond delay="0"/>
+                                  </p:stCondLst>
+                                  <p:childTnLst>
+                                    <p:set>
+                                      <p:cBhvr>
+                                        <p:cTn id="9" dur="1" fill="hold">
+                                          <p:stCondLst>
+                                            <p:cond delay="0"/>
+                                          </p:stCondLst>
+                                        </p:cTn>
+                                        <p:tgtEl>
+                                          <p:spTgt spid="3">
+                                            <p:txEl>
+                                              <p:pRg st="1" end="1"/>
+                                            </p:txEl>
+                                          </p:spTgt>
+                                        </p:tgtEl>
+                                        <p:attrNameLst>
+                                          <p:attrName>style.visibility</p:attrName>
+                                        </p:attrNameLst>
+                                      </p:cBhvr>
+                                      <p:to>
+                                        <p:strVal val="visible"/>
+                                      </p:to>
+                                    </p:set>
+                                    <p:animEffect transition="in" filter="fade">
+                                      <p:cBhvr>
+                                        <p:cTn id="10" dur="500"/>
+                                        <p:tgtEl>
+                                          <p:spTgt spid="3">
+                                            <p:txEl>
+                                              <p:pRg st="1" end="1"/>
+                                            </p:txEl>
+                                          </p:spTgt>
+                                        </p:tgtEl>
+                                      </p:cBhvr>
+                                    </p:animEffect>
+                                  </p:childTnLst>
+                                </p:cTn>
+                              </p:par>
+                            </p:childTnLst>
+                          </p:cTn>
+                        </p:par>
+                      </p:childTnLst>
+                    </p:cTn>
+                  </p:par>
+                  <p:par>
+                    <p:cTn id="11" fill="hold">
+                      <p:stCondLst>
+                        <p:cond delay="indefinite"/>
+                      </p:stCondLst>
+                      <p:childTnLst>
+                        <p:par>
+                          <p:cTn id="12" fill="hold">
+                            <p:stCondLst>
+                              <p:cond delay="0"/>
+                            </p:stCondLst>
+                            <p:childTnLst>
+                              <p:par>
+                                <p:cTn id="13" presetID="10" presetClass="entr" presetSubtype="0" fill="hold" grpId="0" nodeType="clickEffect">
+                                  <p:stCondLst>
+                                    <p:cond delay="0"/>
+                                  </p:stCondLst>
+                                  <p:childTnLst>
+                                    <p:set>
+                                      <p:cBhvr>
+                                        <p:cTn id="14" dur="1" fill="hold">
+                                          <p:stCondLst>
+                                            <p:cond delay="0"/>
+                                          </p:stCondLst>
+                                        </p:cTn>
+                                        <p:tgtEl>
+                                          <p:spTgt spid="3">
+                                            <p:txEl>
+                                              <p:pRg st="2" end="2"/>
+                                            </p:txEl>
+                                          </p:spTgt>
+                                        </p:tgtEl>
+                                        <p:attrNameLst>
+                                          <p:attrName>style.visibility</p:attrName>
+                                        </p:attrNameLst>
+                                      </p:cBhvr>
+                                      <p:to>
+                                        <p:strVal val="visible"/>
+                                      </p:to>
+                                    </p:set>
+                                    <p:animEffect transition="in" filter="fade">
+                                      <p:cBhvr>
+                                        <p:cTn id="15" dur="500"/>
+                                        <p:tgtEl>
+                                          <p:spTgt spid="3">
+                                            <p:txEl>
+                                              <p:pRg st="2" end="2"/>
+                                            </p:txEl>
+                                          </p:spTgt>
+                                        </p:tgtEl>
+                                      </p:cBhvr>
+                                    </p:animEffect>
+                                  </p:childTnLst>
+                                </p:cTn>
+                              </p:par>
+                              <p:par>
+                                <p:cTn id="16" presetID="10" presetClass="entr" presetSubtype="0" fill="hold" grpId="0" nodeType="withEffect">
+                                  <p:stCondLst>
+                                    <p:cond delay="0"/>
+                                  </p:stCondLst>
+                                  <p:childTnLst>
+                                    <p:set>
+                                      <p:cBhvr>
+                                        <p:cTn id="17" dur="1" fill="hold">
+                                          <p:stCondLst>
+                                            <p:cond delay="0"/>
+                                          </p:stCondLst>
+                                        </p:cTn>
+                                        <p:tgtEl>
+                                          <p:spTgt spid="3">
+                                            <p:txEl>
+                                              <p:pRg st="3" end="3"/>
+                                            </p:txEl>
+                                          </p:spTgt>
+                                        </p:tgtEl>
+                                        <p:attrNameLst>
+                                          <p:attrName>style.visibility</p:attrName>
+                                        </p:attrNameLst>
+                                      </p:cBhvr>
+                                      <p:to>
+                                        <p:strVal val="visible"/>
+                                      </p:to>
+                                    </p:set>
+                                    <p:animEffect transition="in" filter="fade">
+                                      <p:cBhvr>
+                                        <p:cTn id="18" dur="500"/>
+                                        <p:tgtEl>
+                                          <p:spTgt spid="3">
+                                            <p:txEl>
+                                              <p:pRg st="3" end="3"/>
+                                            </p:txEl>
+                                          </p:spTgt>
+                                        </p:tgtEl>
+                                      </p:cBhvr>
+                                    </p:animEffect>
+                                  </p:childTnLst>
+                                </p:cTn>
+                              </p:par>
+                            </p:childTnLst>
+                          </p:cTn>
+                        </p:par>
+                      </p:childTnLst>
+                    </p:cTn>
+                  </p:par>
+                  <p:par>
+                    <p:cTn id="19" fill="hold">
+                      <p:stCondLst>
+                        <p:cond delay="indefinite"/>
+                      </p:stCondLst>
+                      <p:childTnLst>
+                        <p:par>
+                          <p:cTn id="20" fill="hold">
+                            <p:stCondLst>
+                              <p:cond delay="0"/>
+                            </p:stCondLst>
+                            <p:childTnLst>
+                              <p:par>
+                                <p:cTn id="21" presetID="10" presetClass="entr" presetSubtype="0" fill="hold" grpId="0" nodeType="clickEffect">
+                                  <p:stCondLst>
+                                    <p:cond delay="0"/>
+                                  </p:stCondLst>
+                                  <p:childTnLst>
+                                    <p:set>
+                                      <p:cBhvr>
+                                        <p:cTn id="22" dur="1" fill="hold">
+                                          <p:stCondLst>
+                                            <p:cond delay="0"/>
+                                          </p:stCondLst>
+                                        </p:cTn>
+                                        <p:tgtEl>
+                                          <p:spTgt spid="3">
+                                            <p:txEl>
+                                              <p:pRg st="4" end="4"/>
+                                            </p:txEl>
+                                          </p:spTgt>
+                                        </p:tgtEl>
+                                        <p:attrNameLst>
+                                          <p:attrName>style.visibility</p:attrName>
+                                        </p:attrNameLst>
+                                      </p:cBhvr>
+                                      <p:to>
+                                        <p:strVal val="visible"/>
+                                      </p:to>
+                                    </p:set>
+                                    <p:animEffect transition="in" filter="fade">
+                                      <p:cBhvr>
+                                        <p:cTn id="23" dur="500"/>
+                                        <p:tgtEl>
+                                          <p:spTgt spid="3">
+                                            <p:txEl>
+                                              <p:pRg st="4" end="4"/>
+                                            </p:txEl>
+                                          </p:spTgt>
+                                        </p:tgtEl>
+                                      </p:cBhvr>
+                                    </p:animEffect>
+                                  </p:childTnLst>
+                                </p:cTn>
+                              </p:par>
+                            </p:childTnLst>
+                          </p:cTn>
+                        </p:par>
+                      </p:childTnLst>
+                    </p:cTn>
+                  </p:par>
+                </p:childTnLst>
+              </p:cTn>
+              <p:prevCondLst>
+                <p:cond evt="onPrev" delay="0">
+                  <p:tgtEl>
+                    <p:sldTgt/>
+                  </p:tgtEl>
+                </p:cond>
+              </p:prevCondLst>
+              <p:nextCondLst>
+                <p:cond evt="onNext" delay="0">
+                  <p:tgtEl>
+                    <p:sldTgt/>
+                  </p:tgtEl>
+                </p:cond>
+              </p:nextCondLst>
+            </p:seq>
+          </p:childTnLst>
+        </p:cTn>
+      </p:par>
+    </p:tnLst>
+    <p:bldLst>
+      <p:bldP spid="3" grpId="0" build="p"/>
+    </p:bldLst>
+  </p:timing>
+</p:sld>
+</file>
+
+<file path=ppt/slides/slide11.xml><?xml version="1.0" encoding="utf-8"?>
+<p:sld xmlns:a="http://schemas.openxmlformats.org/drawingml/2006/main" xmlns:r="http://schemas.openxmlformats.org/officeDocument/2006/relationships" xmlns:p="http://schemas.openxmlformats.org/presentationml/2006/main">
+  <p:cSld>
+    <p:bg>
+      <p:bgPr>
+        <a:solidFill>
+          <a:schemeClr val="bg1"/>
+        </a:solidFill>
+        <a:effectLst/>
+      </p:bgPr>
+    </p:bg>
+    <p:spTree>
+      <p:nvGrpSpPr>
+        <p:cNvPr id="1" name=""/>
+        <p:cNvGrpSpPr/>
+        <p:nvPr/>
+      </p:nvGrpSpPr>
+      <p:grpSpPr>
+        <a:xfrm>
+          <a:off x="0" y="0"/>
+          <a:ext cx="0" cy="0"/>
+          <a:chOff x="0" y="0"/>
+          <a:chExt cx="0" cy="0"/>
+        </a:xfrm>
+      </p:grpSpPr>
       <p:pic>
         <p:nvPicPr>
           <p:cNvPr id="32" name="Picture 31">
@@ -17612,7 +18843,7 @@
 </p:sld>
 </file>
 
-<file path=ppt/slides/slide11.xml><?xml version="1.0" encoding="utf-8"?>
+<file path=ppt/slides/slide12.xml><?xml version="1.0" encoding="utf-8"?>
 <p:sld xmlns:a="http://schemas.openxmlformats.org/drawingml/2006/main" xmlns:r="http://schemas.openxmlformats.org/officeDocument/2006/relationships" xmlns:p="http://schemas.openxmlformats.org/presentationml/2006/main">
   <p:cSld>
     <p:bg>
@@ -18698,6 +19929,480 @@
 <file path=ppt/slides/slide2.xml><?xml version="1.0" encoding="utf-8"?>
 <p:sld xmlns:a="http://schemas.openxmlformats.org/drawingml/2006/main" xmlns:r="http://schemas.openxmlformats.org/officeDocument/2006/relationships" xmlns:p="http://schemas.openxmlformats.org/presentationml/2006/main">
   <p:cSld>
+    <p:spTree>
+      <p:nvGrpSpPr>
+        <p:cNvPr id="1" name=""/>
+        <p:cNvGrpSpPr/>
+        <p:nvPr/>
+      </p:nvGrpSpPr>
+      <p:grpSpPr>
+        <a:xfrm>
+          <a:off x="0" y="0"/>
+          <a:ext cx="0" cy="0"/>
+          <a:chOff x="0" y="0"/>
+          <a:chExt cx="0" cy="0"/>
+        </a:xfrm>
+      </p:grpSpPr>
+      <p:sp>
+        <p:nvSpPr>
+          <p:cNvPr id="2" name="Title 1">
+            <a:extLst>
+              <a:ext uri="{FF2B5EF4-FFF2-40B4-BE49-F238E27FC236}">
+                <a16:creationId xmlns:a16="http://schemas.microsoft.com/office/drawing/2014/main" id="{EC718E69-E0D7-49B2-8462-A071780A2213}"/>
+              </a:ext>
+            </a:extLst>
+          </p:cNvPr>
+          <p:cNvSpPr>
+            <a:spLocks noGrp="1"/>
+          </p:cNvSpPr>
+          <p:nvPr>
+            <p:ph type="title"/>
+          </p:nvPr>
+        </p:nvSpPr>
+        <p:spPr>
+          <a:xfrm>
+            <a:off x="1786653" y="1003326"/>
+            <a:ext cx="2244573" cy="658327"/>
+          </a:xfrm>
+        </p:spPr>
+        <p:txBody>
+          <a:bodyPr/>
+          <a:lstStyle/>
+          <a:p>
+            <a:r>
+              <a:rPr lang="en-US" dirty="0"/>
+              <a:t>DREAM</a:t>
+            </a:r>
+          </a:p>
+        </p:txBody>
+      </p:sp>
+      <p:pic>
+        <p:nvPicPr>
+          <p:cNvPr id="1026" name="Picture 2" descr="See the source image">
+            <a:extLst>
+              <a:ext uri="{FF2B5EF4-FFF2-40B4-BE49-F238E27FC236}">
+                <a16:creationId xmlns:a16="http://schemas.microsoft.com/office/drawing/2014/main" id="{82DDDAA7-6F75-4F45-A367-1AA8828D795C}"/>
+              </a:ext>
+            </a:extLst>
+          </p:cNvPr>
+          <p:cNvPicPr>
+            <a:picLocks noChangeAspect="1" noChangeArrowheads="1"/>
+          </p:cNvPicPr>
+          <p:nvPr/>
+        </p:nvPicPr>
+        <p:blipFill>
+          <a:blip r:embed="rId2">
+            <a:extLst>
+              <a:ext uri="{28A0092B-C50C-407E-A947-70E740481C1C}">
+                <a14:useLocalDpi xmlns:a14="http://schemas.microsoft.com/office/drawing/2010/main" val="0"/>
+              </a:ext>
+            </a:extLst>
+          </a:blip>
+          <a:srcRect/>
+          <a:stretch>
+            <a:fillRect/>
+          </a:stretch>
+        </p:blipFill>
+        <p:spPr bwMode="auto">
+          <a:xfrm>
+            <a:off x="518292" y="1825281"/>
+            <a:ext cx="5056599" cy="3371066"/>
+          </a:xfrm>
+          <a:prstGeom prst="rect">
+            <a:avLst/>
+          </a:prstGeom>
+          <a:noFill/>
+          <a:extLst>
+            <a:ext uri="{909E8E84-426E-40DD-AFC4-6F175D3DCCD1}">
+              <a14:hiddenFill xmlns:a14="http://schemas.microsoft.com/office/drawing/2010/main">
+                <a:solidFill>
+                  <a:srgbClr val="FFFFFF"/>
+                </a:solidFill>
+              </a14:hiddenFill>
+            </a:ext>
+          </a:extLst>
+        </p:spPr>
+      </p:pic>
+      <p:pic>
+        <p:nvPicPr>
+          <p:cNvPr id="1028" name="Picture 4" descr="See the source image">
+            <a:extLst>
+              <a:ext uri="{FF2B5EF4-FFF2-40B4-BE49-F238E27FC236}">
+                <a16:creationId xmlns:a16="http://schemas.microsoft.com/office/drawing/2014/main" id="{66851B15-F6E6-4C14-A19F-5915C75C0B27}"/>
+              </a:ext>
+            </a:extLst>
+          </p:cNvPr>
+          <p:cNvPicPr>
+            <a:picLocks noChangeArrowheads="1"/>
+          </p:cNvPicPr>
+          <p:nvPr/>
+        </p:nvPicPr>
+        <p:blipFill>
+          <a:blip r:embed="rId3">
+            <a:extLst>
+              <a:ext uri="{28A0092B-C50C-407E-A947-70E740481C1C}">
+                <a14:useLocalDpi xmlns:a14="http://schemas.microsoft.com/office/drawing/2010/main" val="0"/>
+              </a:ext>
+            </a:extLst>
+          </a:blip>
+          <a:srcRect/>
+          <a:stretch>
+            <a:fillRect/>
+          </a:stretch>
+        </p:blipFill>
+        <p:spPr bwMode="auto">
+          <a:xfrm>
+            <a:off x="6245327" y="1825280"/>
+            <a:ext cx="5056632" cy="3374136"/>
+          </a:xfrm>
+          <a:prstGeom prst="rect">
+            <a:avLst/>
+          </a:prstGeom>
+          <a:noFill/>
+          <a:extLst>
+            <a:ext uri="{909E8E84-426E-40DD-AFC4-6F175D3DCCD1}">
+              <a14:hiddenFill xmlns:a14="http://schemas.microsoft.com/office/drawing/2010/main">
+                <a:solidFill>
+                  <a:srgbClr val="FFFFFF"/>
+                </a:solidFill>
+              </a14:hiddenFill>
+            </a:ext>
+          </a:extLst>
+        </p:spPr>
+      </p:pic>
+      <p:sp>
+        <p:nvSpPr>
+          <p:cNvPr id="6" name="Title 1">
+            <a:extLst>
+              <a:ext uri="{FF2B5EF4-FFF2-40B4-BE49-F238E27FC236}">
+                <a16:creationId xmlns:a16="http://schemas.microsoft.com/office/drawing/2014/main" id="{2411927C-E714-45EA-84ED-67020B998679}"/>
+              </a:ext>
+            </a:extLst>
+          </p:cNvPr>
+          <p:cNvSpPr txBox="1">
+            <a:spLocks/>
+          </p:cNvSpPr>
+          <p:nvPr/>
+        </p:nvSpPr>
+        <p:spPr>
+          <a:xfrm>
+            <a:off x="7769582" y="1003326"/>
+            <a:ext cx="2244573" cy="658327"/>
+          </a:xfrm>
+          <a:prstGeom prst="rect">
+            <a:avLst/>
+          </a:prstGeom>
+        </p:spPr>
+        <p:txBody>
+          <a:bodyPr vert="horz" lIns="91440" tIns="45720" rIns="91440" bIns="45720" rtlCol="0" anchor="t">
+            <a:noAutofit/>
+          </a:bodyPr>
+          <a:lstStyle>
+            <a:lvl1pPr algn="l" defTabSz="457200" rtl="0" eaLnBrk="1" latinLnBrk="0" hangingPunct="1">
+              <a:spcBef>
+                <a:spcPct val="0"/>
+              </a:spcBef>
+              <a:buNone/>
+              <a:defRPr sz="4200" b="0" i="0" kern="1200">
+                <a:solidFill>
+                  <a:schemeClr val="tx2"/>
+                </a:solidFill>
+                <a:latin typeface="+mj-lt"/>
+                <a:ea typeface="+mj-ea"/>
+                <a:cs typeface="+mj-cs"/>
+              </a:defRPr>
+            </a:lvl1pPr>
+            <a:lvl2pPr eaLnBrk="1" hangingPunct="1">
+              <a:defRPr>
+                <a:solidFill>
+                  <a:schemeClr val="tx2"/>
+                </a:solidFill>
+              </a:defRPr>
+            </a:lvl2pPr>
+            <a:lvl3pPr eaLnBrk="1" hangingPunct="1">
+              <a:defRPr>
+                <a:solidFill>
+                  <a:schemeClr val="tx2"/>
+                </a:solidFill>
+              </a:defRPr>
+            </a:lvl3pPr>
+            <a:lvl4pPr eaLnBrk="1" hangingPunct="1">
+              <a:defRPr>
+                <a:solidFill>
+                  <a:schemeClr val="tx2"/>
+                </a:solidFill>
+              </a:defRPr>
+            </a:lvl4pPr>
+            <a:lvl5pPr eaLnBrk="1" hangingPunct="1">
+              <a:defRPr>
+                <a:solidFill>
+                  <a:schemeClr val="tx2"/>
+                </a:solidFill>
+              </a:defRPr>
+            </a:lvl5pPr>
+            <a:lvl6pPr eaLnBrk="1" hangingPunct="1">
+              <a:defRPr>
+                <a:solidFill>
+                  <a:schemeClr val="tx2"/>
+                </a:solidFill>
+              </a:defRPr>
+            </a:lvl6pPr>
+            <a:lvl7pPr eaLnBrk="1" hangingPunct="1">
+              <a:defRPr>
+                <a:solidFill>
+                  <a:schemeClr val="tx2"/>
+                </a:solidFill>
+              </a:defRPr>
+            </a:lvl7pPr>
+            <a:lvl8pPr eaLnBrk="1" hangingPunct="1">
+              <a:defRPr>
+                <a:solidFill>
+                  <a:schemeClr val="tx2"/>
+                </a:solidFill>
+              </a:defRPr>
+            </a:lvl8pPr>
+            <a:lvl9pPr eaLnBrk="1" hangingPunct="1">
+              <a:defRPr>
+                <a:solidFill>
+                  <a:schemeClr val="tx2"/>
+                </a:solidFill>
+              </a:defRPr>
+            </a:lvl9pPr>
+          </a:lstStyle>
+          <a:p>
+            <a:r>
+              <a:rPr lang="en-US" dirty="0"/>
+              <a:t>REALITY</a:t>
+            </a:r>
+          </a:p>
+        </p:txBody>
+      </p:sp>
+    </p:spTree>
+    <p:extLst>
+      <p:ext uri="{BB962C8B-B14F-4D97-AF65-F5344CB8AC3E}">
+        <p14:creationId xmlns:p14="http://schemas.microsoft.com/office/powerpoint/2010/main" val="3488280214"/>
+      </p:ext>
+    </p:extLst>
+  </p:cSld>
+  <p:clrMapOvr>
+    <a:masterClrMapping/>
+  </p:clrMapOvr>
+  <p:timing>
+    <p:tnLst>
+      <p:par>
+        <p:cTn id="1" dur="indefinite" restart="never" nodeType="tmRoot">
+          <p:childTnLst>
+            <p:seq concurrent="1" nextAc="seek">
+              <p:cTn id="2" dur="indefinite" nodeType="mainSeq">
+                <p:childTnLst>
+                  <p:par>
+                    <p:cTn id="3" fill="hold">
+                      <p:stCondLst>
+                        <p:cond delay="indefinite"/>
+                      </p:stCondLst>
+                      <p:childTnLst>
+                        <p:par>
+                          <p:cTn id="4" fill="hold">
+                            <p:stCondLst>
+                              <p:cond delay="0"/>
+                            </p:stCondLst>
+                            <p:childTnLst>
+                              <p:par>
+                                <p:cTn id="5" presetID="10" presetClass="entr" presetSubtype="0" fill="hold" nodeType="clickEffect">
+                                  <p:stCondLst>
+                                    <p:cond delay="0"/>
+                                  </p:stCondLst>
+                                  <p:childTnLst>
+                                    <p:set>
+                                      <p:cBhvr>
+                                        <p:cTn id="6" dur="1" fill="hold">
+                                          <p:stCondLst>
+                                            <p:cond delay="0"/>
+                                          </p:stCondLst>
+                                        </p:cTn>
+                                        <p:tgtEl>
+                                          <p:spTgt spid="1026"/>
+                                        </p:tgtEl>
+                                        <p:attrNameLst>
+                                          <p:attrName>style.visibility</p:attrName>
+                                        </p:attrNameLst>
+                                      </p:cBhvr>
+                                      <p:to>
+                                        <p:strVal val="visible"/>
+                                      </p:to>
+                                    </p:set>
+                                    <p:animEffect transition="in" filter="fade">
+                                      <p:cBhvr>
+                                        <p:cTn id="7" dur="500"/>
+                                        <p:tgtEl>
+                                          <p:spTgt spid="1026"/>
+                                        </p:tgtEl>
+                                      </p:cBhvr>
+                                    </p:animEffect>
+                                  </p:childTnLst>
+                                </p:cTn>
+                              </p:par>
+                              <p:par>
+                                <p:cTn id="8" presetID="10" presetClass="entr" presetSubtype="0" fill="hold" grpId="0" nodeType="withEffect">
+                                  <p:stCondLst>
+                                    <p:cond delay="0"/>
+                                  </p:stCondLst>
+                                  <p:childTnLst>
+                                    <p:set>
+                                      <p:cBhvr>
+                                        <p:cTn id="9" dur="1" fill="hold">
+                                          <p:stCondLst>
+                                            <p:cond delay="0"/>
+                                          </p:stCondLst>
+                                        </p:cTn>
+                                        <p:tgtEl>
+                                          <p:spTgt spid="2"/>
+                                        </p:tgtEl>
+                                        <p:attrNameLst>
+                                          <p:attrName>style.visibility</p:attrName>
+                                        </p:attrNameLst>
+                                      </p:cBhvr>
+                                      <p:to>
+                                        <p:strVal val="visible"/>
+                                      </p:to>
+                                    </p:set>
+                                    <p:animEffect transition="in" filter="fade">
+                                      <p:cBhvr>
+                                        <p:cTn id="10" dur="500"/>
+                                        <p:tgtEl>
+                                          <p:spTgt spid="2"/>
+                                        </p:tgtEl>
+                                      </p:cBhvr>
+                                    </p:animEffect>
+                                  </p:childTnLst>
+                                </p:cTn>
+                              </p:par>
+                            </p:childTnLst>
+                          </p:cTn>
+                        </p:par>
+                      </p:childTnLst>
+                    </p:cTn>
+                  </p:par>
+                  <p:par>
+                    <p:cTn id="11" fill="hold">
+                      <p:stCondLst>
+                        <p:cond delay="indefinite"/>
+                      </p:stCondLst>
+                      <p:childTnLst>
+                        <p:par>
+                          <p:cTn id="12" fill="hold">
+                            <p:stCondLst>
+                              <p:cond delay="0"/>
+                            </p:stCondLst>
+                            <p:childTnLst>
+                              <p:par>
+                                <p:cTn id="13" presetID="10" presetClass="entr" presetSubtype="0" fill="hold" grpId="0" nodeType="clickEffect">
+                                  <p:stCondLst>
+                                    <p:cond delay="0"/>
+                                  </p:stCondLst>
+                                  <p:childTnLst>
+                                    <p:set>
+                                      <p:cBhvr>
+                                        <p:cTn id="14" dur="1" fill="hold">
+                                          <p:stCondLst>
+                                            <p:cond delay="0"/>
+                                          </p:stCondLst>
+                                        </p:cTn>
+                                        <p:tgtEl>
+                                          <p:spTgt spid="6"/>
+                                        </p:tgtEl>
+                                        <p:attrNameLst>
+                                          <p:attrName>style.visibility</p:attrName>
+                                        </p:attrNameLst>
+                                      </p:cBhvr>
+                                      <p:to>
+                                        <p:strVal val="visible"/>
+                                      </p:to>
+                                    </p:set>
+                                    <p:animEffect transition="in" filter="fade">
+                                      <p:cBhvr>
+                                        <p:cTn id="15" dur="500"/>
+                                        <p:tgtEl>
+                                          <p:spTgt spid="6"/>
+                                        </p:tgtEl>
+                                      </p:cBhvr>
+                                    </p:animEffect>
+                                  </p:childTnLst>
+                                </p:cTn>
+                              </p:par>
+                              <p:par>
+                                <p:cTn id="16" presetID="10" presetClass="entr" presetSubtype="0" fill="hold" nodeType="withEffect">
+                                  <p:stCondLst>
+                                    <p:cond delay="0"/>
+                                  </p:stCondLst>
+                                  <p:childTnLst>
+                                    <p:set>
+                                      <p:cBhvr>
+                                        <p:cTn id="17" dur="1" fill="hold">
+                                          <p:stCondLst>
+                                            <p:cond delay="0"/>
+                                          </p:stCondLst>
+                                        </p:cTn>
+                                        <p:tgtEl>
+                                          <p:spTgt spid="1028"/>
+                                        </p:tgtEl>
+                                        <p:attrNameLst>
+                                          <p:attrName>style.visibility</p:attrName>
+                                        </p:attrNameLst>
+                                      </p:cBhvr>
+                                      <p:to>
+                                        <p:strVal val="visible"/>
+                                      </p:to>
+                                    </p:set>
+                                    <p:animEffect transition="in" filter="fade">
+                                      <p:cBhvr>
+                                        <p:cTn id="18" dur="500"/>
+                                        <p:tgtEl>
+                                          <p:spTgt spid="1028"/>
+                                        </p:tgtEl>
+                                      </p:cBhvr>
+                                    </p:animEffect>
+                                  </p:childTnLst>
+                                </p:cTn>
+                              </p:par>
+                            </p:childTnLst>
+                          </p:cTn>
+                        </p:par>
+                      </p:childTnLst>
+                    </p:cTn>
+                  </p:par>
+                </p:childTnLst>
+              </p:cTn>
+              <p:prevCondLst>
+                <p:cond evt="onPrev" delay="0">
+                  <p:tgtEl>
+                    <p:sldTgt/>
+                  </p:tgtEl>
+                </p:cond>
+              </p:prevCondLst>
+              <p:nextCondLst>
+                <p:cond evt="onNext" delay="0">
+                  <p:tgtEl>
+                    <p:sldTgt/>
+                  </p:tgtEl>
+                </p:cond>
+              </p:nextCondLst>
+            </p:seq>
+          </p:childTnLst>
+        </p:cTn>
+      </p:par>
+    </p:tnLst>
+    <p:bldLst>
+      <p:bldP spid="2" grpId="0"/>
+      <p:bldP spid="6" grpId="0"/>
+    </p:bldLst>
+  </p:timing>
+</p:sld>
+</file>
+
+<file path=ppt/slides/slide3.xml><?xml version="1.0" encoding="utf-8"?>
+<p:sld xmlns:a="http://schemas.openxmlformats.org/drawingml/2006/main" xmlns:r="http://schemas.openxmlformats.org/officeDocument/2006/relationships" xmlns:p="http://schemas.openxmlformats.org/presentationml/2006/main">
+  <p:cSld>
     <p:bg>
       <p:bgPr>
         <a:blipFill rotWithShape="1">
@@ -18716,7 +20421,6 @@
                 <a:lumMod val="132000"/>
               </a:schemeClr>
             </a:duotone>
-            <a:extLst/>
           </a:blip>
           <a:stretch/>
         </a:blipFill>
@@ -19382,7 +21086,7 @@
 </p:sld>
 </file>
 
-<file path=ppt/slides/slide3.xml><?xml version="1.0" encoding="utf-8"?>
+<file path=ppt/slides/slide4.xml><?xml version="1.0" encoding="utf-8"?>
 <p:sld xmlns:a="http://schemas.openxmlformats.org/drawingml/2006/main" xmlns:r="http://schemas.openxmlformats.org/officeDocument/2006/relationships" xmlns:p="http://schemas.openxmlformats.org/presentationml/2006/main">
   <p:cSld>
     <p:bg>
@@ -20440,7 +22144,7 @@
 </p:sld>
 </file>
 
-<file path=ppt/slides/slide4.xml><?xml version="1.0" encoding="utf-8"?>
+<file path=ppt/slides/slide5.xml><?xml version="1.0" encoding="utf-8"?>
 <p:sld xmlns:a="http://schemas.openxmlformats.org/drawingml/2006/main" xmlns:r="http://schemas.openxmlformats.org/officeDocument/2006/relationships" xmlns:p="http://schemas.openxmlformats.org/presentationml/2006/main">
   <p:cSld>
     <p:spTree>
@@ -20891,7 +22595,7 @@
           <a:p>
             <a:r>
               <a:rPr lang="en-US" dirty="0"/>
-              <a:t>PS4, Xbox One and Nintendo Switch require developer program registration</a:t>
+              <a:t>*PS4, Xbox One and Nintendo Switch require developer program registration</a:t>
             </a:r>
           </a:p>
         </p:txBody>
@@ -20909,7 +22613,7 @@
 </p:sld>
 </file>
 
-<file path=ppt/slides/slide5.xml><?xml version="1.0" encoding="utf-8"?>
+<file path=ppt/slides/slide6.xml><?xml version="1.0" encoding="utf-8"?>
 <p:sld xmlns:a="http://schemas.openxmlformats.org/drawingml/2006/main" xmlns:r="http://schemas.openxmlformats.org/officeDocument/2006/relationships" xmlns:p="http://schemas.openxmlformats.org/presentationml/2006/main">
   <p:cSld>
     <p:bg>
@@ -20930,7 +22634,6 @@
                 <a:lumMod val="132000"/>
               </a:schemeClr>
             </a:duotone>
-            <a:extLst/>
           </a:blip>
           <a:stretch/>
         </a:blipFill>
@@ -21412,10 +23115,128 @@
   <p:clrMapOvr>
     <a:masterClrMapping/>
   </p:clrMapOvr>
+  <p:timing>
+    <p:tnLst>
+      <p:par>
+        <p:cTn id="1" dur="indefinite" restart="never" nodeType="tmRoot">
+          <p:childTnLst>
+            <p:seq concurrent="1" nextAc="seek">
+              <p:cTn id="2" dur="indefinite" nodeType="mainSeq">
+                <p:childTnLst>
+                  <p:par>
+                    <p:cTn id="3" fill="hold">
+                      <p:stCondLst>
+                        <p:cond delay="indefinite"/>
+                      </p:stCondLst>
+                      <p:childTnLst>
+                        <p:par>
+                          <p:cTn id="4" fill="hold">
+                            <p:stCondLst>
+                              <p:cond delay="0"/>
+                            </p:stCondLst>
+                            <p:childTnLst>
+                              <p:par>
+                                <p:cTn id="5" presetID="10" presetClass="entr" presetSubtype="0" fill="hold" nodeType="clickEffect">
+                                  <p:stCondLst>
+                                    <p:cond delay="0"/>
+                                  </p:stCondLst>
+                                  <p:childTnLst>
+                                    <p:set>
+                                      <p:cBhvr>
+                                        <p:cTn id="6" dur="1" fill="hold">
+                                          <p:stCondLst>
+                                            <p:cond delay="0"/>
+                                          </p:stCondLst>
+                                        </p:cTn>
+                                        <p:tgtEl>
+                                          <p:spTgt spid="4"/>
+                                        </p:tgtEl>
+                                        <p:attrNameLst>
+                                          <p:attrName>style.visibility</p:attrName>
+                                        </p:attrNameLst>
+                                      </p:cBhvr>
+                                      <p:to>
+                                        <p:strVal val="visible"/>
+                                      </p:to>
+                                    </p:set>
+                                    <p:animEffect transition="in" filter="fade">
+                                      <p:cBhvr>
+                                        <p:cTn id="7" dur="500"/>
+                                        <p:tgtEl>
+                                          <p:spTgt spid="4"/>
+                                        </p:tgtEl>
+                                      </p:cBhvr>
+                                    </p:animEffect>
+                                  </p:childTnLst>
+                                </p:cTn>
+                              </p:par>
+                              <p:par>
+                                <p:cTn id="8" presetID="10" presetClass="entr" presetSubtype="0" fill="hold" nodeType="withEffect">
+                                  <p:stCondLst>
+                                    <p:cond delay="0"/>
+                                  </p:stCondLst>
+                                  <p:childTnLst>
+                                    <p:set>
+                                      <p:cBhvr>
+                                        <p:cTn id="9" dur="1" fill="hold">
+                                          <p:stCondLst>
+                                            <p:cond delay="0"/>
+                                          </p:stCondLst>
+                                        </p:cTn>
+                                        <p:tgtEl>
+                                          <p:spTgt spid="4098"/>
+                                        </p:tgtEl>
+                                        <p:attrNameLst>
+                                          <p:attrName>style.visibility</p:attrName>
+                                        </p:attrNameLst>
+                                      </p:cBhvr>
+                                      <p:to>
+                                        <p:strVal val="visible"/>
+                                      </p:to>
+                                    </p:set>
+                                    <p:animEffect transition="in" filter="fade">
+                                      <p:cBhvr>
+                                        <p:cTn id="10" dur="500"/>
+                                        <p:tgtEl>
+                                          <p:spTgt spid="4098"/>
+                                        </p:tgtEl>
+                                      </p:cBhvr>
+                                    </p:animEffect>
+                                  </p:childTnLst>
+                                </p:cTn>
+                              </p:par>
+                            </p:childTnLst>
+                          </p:cTn>
+                        </p:par>
+                      </p:childTnLst>
+                    </p:cTn>
+                  </p:par>
+                </p:childTnLst>
+              </p:cTn>
+              <p:prevCondLst>
+                <p:cond evt="onPrev" delay="0">
+                  <p:tgtEl>
+                    <p:sldTgt/>
+                  </p:tgtEl>
+                </p:cond>
+              </p:prevCondLst>
+              <p:nextCondLst>
+                <p:cond evt="onNext" delay="0">
+                  <p:tgtEl>
+                    <p:sldTgt/>
+                  </p:tgtEl>
+                </p:cond>
+              </p:nextCondLst>
+            </p:seq>
+          </p:childTnLst>
+        </p:cTn>
+      </p:par>
+    </p:tnLst>
+  </p:timing>
 </p:sld>
 </file>
 
-<file path=ppt/slides/slide6.xml><?xml version="1.0" encoding="utf-8"?>
+<file path=ppt/slides/slide7.xml><?xml version="1.0" encoding="utf-8"?>
 <p:sld xmlns:a="http://schemas.openxmlformats.org/drawingml/2006/main" xmlns:r="http://schemas.openxmlformats.org/officeDocument/2006/relationships" xmlns:p="http://schemas.openxmlformats.org/presentationml/2006/main">
   <p:cSld>
     <p:bg>
@@ -22495,10 +24316,98 @@
   <p:clrMapOvr>
     <a:overrideClrMapping bg1="lt1" tx1="dk1" bg2="lt2" tx2="dk2" accent1="accent1" accent2="accent2" accent3="accent3" accent4="accent4" accent5="accent5" accent6="accent6" hlink="hlink" folHlink="folHlink"/>
   </p:clrMapOvr>
+  <p:timing>
+    <p:tnLst>
+      <p:par>
+        <p:cTn id="1" dur="indefinite" restart="never" nodeType="tmRoot">
+          <p:childTnLst>
+            <p:seq concurrent="1" nextAc="seek">
+              <p:cTn id="2" dur="indefinite" nodeType="mainSeq">
+                <p:childTnLst>
+                  <p:par>
+                    <p:cTn id="3" fill="hold">
+                      <p:stCondLst>
+                        <p:cond delay="indefinite"/>
+                      </p:stCondLst>
+                      <p:childTnLst>
+                        <p:par>
+                          <p:cTn id="4" fill="hold">
+                            <p:stCondLst>
+                              <p:cond delay="0"/>
+                            </p:stCondLst>
+                            <p:childTnLst>
+                              <p:par>
+                                <p:cTn id="5" presetID="10" presetClass="entr" presetSubtype="0" fill="hold" grpId="0" nodeType="clickEffect">
+                                  <p:stCondLst>
+                                    <p:cond delay="0"/>
+                                  </p:stCondLst>
+                                  <p:childTnLst>
+                                    <p:set>
+                                      <p:cBhvr>
+                                        <p:cTn id="6" dur="1" fill="hold">
+                                          <p:stCondLst>
+                                            <p:cond delay="0"/>
+                                          </p:stCondLst>
+                                        </p:cTn>
+                                        <p:tgtEl>
+                                          <p:spTgt spid="5"/>
+                                        </p:tgtEl>
+                                        <p:attrNameLst>
+                                          <p:attrName>style.visibility</p:attrName>
+                                        </p:attrNameLst>
+                                      </p:cBhvr>
+                                      <p:to>
+                                        <p:strVal val="visible"/>
+                                      </p:to>
+                                    </p:set>
+                                    <p:animEffect transition="in" filter="fade">
+                                      <p:cBhvr>
+                                        <p:cTn id="7" dur="500"/>
+                                        <p:tgtEl>
+                                          <p:spTgt spid="5"/>
+                                        </p:tgtEl>
+                                      </p:cBhvr>
+                                    </p:animEffect>
+                                  </p:childTnLst>
+                                </p:cTn>
+                              </p:par>
+                            </p:childTnLst>
+                          </p:cTn>
+                        </p:par>
+                      </p:childTnLst>
+                    </p:cTn>
+                  </p:par>
+                </p:childTnLst>
+              </p:cTn>
+              <p:prevCondLst>
+                <p:cond evt="onPrev" delay="0">
+                  <p:tgtEl>
+                    <p:sldTgt/>
+                  </p:tgtEl>
+                </p:cond>
+              </p:prevCondLst>
+              <p:nextCondLst>
+                <p:cond evt="onNext" delay="0">
+                  <p:tgtEl>
+                    <p:sldTgt/>
+                  </p:tgtEl>
+                </p:cond>
+              </p:nextCondLst>
+            </p:seq>
+          </p:childTnLst>
+        </p:cTn>
+      </p:par>
+    </p:tnLst>
+    <p:bldLst>
+      <p:bldGraphic spid="5" grpId="0">
+        <p:bldAsOne/>
+      </p:bldGraphic>
+    </p:bldLst>
+  </p:timing>
 </p:sld>
 </file>
 
-<file path=ppt/slides/slide7.xml><?xml version="1.0" encoding="utf-8"?>
+<file path=ppt/slides/slide8.xml><?xml version="1.0" encoding="utf-8"?>
 <p:sld xmlns:a="http://schemas.openxmlformats.org/drawingml/2006/main" xmlns:r="http://schemas.openxmlformats.org/officeDocument/2006/relationships" xmlns:p="http://schemas.openxmlformats.org/presentationml/2006/main">
   <p:cSld>
     <p:bg>
@@ -22519,7 +24428,6 @@
                 <a:lumMod val="132000"/>
               </a:schemeClr>
             </a:duotone>
-            <a:extLst/>
           </a:blip>
           <a:stretch/>
         </a:blipFill>
@@ -23072,7 +24980,7 @@
 </p:sld>
 </file>
 
-<file path=ppt/slides/slide8.xml><?xml version="1.0" encoding="utf-8"?>
+<file path=ppt/slides/slide9.xml><?xml version="1.0" encoding="utf-8"?>
 <p:sld xmlns:a="http://schemas.openxmlformats.org/drawingml/2006/main" xmlns:r="http://schemas.openxmlformats.org/officeDocument/2006/relationships" xmlns:p="http://schemas.openxmlformats.org/presentationml/2006/main">
   <p:cSld>
     <p:bg>
@@ -24152,934 +26060,94 @@
   <p:clrMapOvr>
     <a:overrideClrMapping bg1="lt1" tx1="dk1" bg2="lt2" tx2="dk2" accent1="accent1" accent2="accent2" accent3="accent3" accent4="accent4" accent5="accent5" accent6="accent6" hlink="hlink" folHlink="folHlink"/>
   </p:clrMapOvr>
-</p:sld>
-</file>
-
-<file path=ppt/slides/slide9.xml><?xml version="1.0" encoding="utf-8"?>
-<p:sld xmlns:a="http://schemas.openxmlformats.org/drawingml/2006/main" xmlns:r="http://schemas.openxmlformats.org/officeDocument/2006/relationships" xmlns:p="http://schemas.openxmlformats.org/presentationml/2006/main">
-  <p:cSld>
-    <p:bg>
-      <p:bgPr>
-        <a:solidFill>
-          <a:schemeClr val="bg1"/>
-        </a:solidFill>
-        <a:effectLst/>
-      </p:bgPr>
-    </p:bg>
-    <p:spTree>
-      <p:nvGrpSpPr>
-        <p:cNvPr id="1" name=""/>
-        <p:cNvGrpSpPr/>
-        <p:nvPr/>
-      </p:nvGrpSpPr>
-      <p:grpSpPr>
-        <a:xfrm>
-          <a:off x="0" y="0"/>
-          <a:ext cx="0" cy="0"/>
-          <a:chOff x="0" y="0"/>
-          <a:chExt cx="0" cy="0"/>
-        </a:xfrm>
-      </p:grpSpPr>
-      <p:sp>
-        <p:nvSpPr>
-          <p:cNvPr id="19" name="Rectangle 9">
-            <a:extLst>
-              <a:ext uri="{FF2B5EF4-FFF2-40B4-BE49-F238E27FC236}">
-                <a16:creationId xmlns:a16="http://schemas.microsoft.com/office/drawing/2014/main" id="{B4AAD3FD-83A5-4B89-9F8F-01B8870865BE}"/>
-              </a:ext>
-              <a:ext uri="{C183D7F6-B498-43B3-948B-1728B52AA6E4}">
-                <adec:decorative xmlns:adec="http://schemas.microsoft.com/office/drawing/2017/decorative" val="1"/>
-              </a:ext>
-            </a:extLst>
-          </p:cNvPr>
-          <p:cNvSpPr>
-            <a:spLocks noGrp="1" noRot="1" noChangeAspect="1" noMove="1" noResize="1" noEditPoints="1" noAdjustHandles="1" noChangeArrowheads="1" noChangeShapeType="1" noTextEdit="1"/>
-          </p:cNvSpPr>
-          <p:nvPr>
-            <p:extLst>
-              <p:ext uri="{386F3935-93C4-4BCD-93E2-E3B085C9AB24}">
-                <p16:designElem xmlns:p16="http://schemas.microsoft.com/office/powerpoint/2015/main" val="1"/>
-              </p:ext>
-            </p:extLst>
-          </p:nvPr>
-        </p:nvSpPr>
-        <p:spPr>
-          <a:xfrm>
-            <a:off x="0" y="0"/>
-            <a:ext cx="12192000" cy="6858000"/>
-          </a:xfrm>
-          <a:prstGeom prst="rect">
-            <a:avLst/>
-          </a:prstGeom>
-          <a:ln>
-            <a:noFill/>
-          </a:ln>
-        </p:spPr>
-        <p:style>
-          <a:lnRef idx="2">
-            <a:schemeClr val="accent1">
-              <a:shade val="50000"/>
-            </a:schemeClr>
-          </a:lnRef>
-          <a:fillRef idx="1003">
-            <a:schemeClr val="dk2"/>
-          </a:fillRef>
-          <a:effectRef idx="0">
-            <a:schemeClr val="accent1"/>
-          </a:effectRef>
-          <a:fontRef idx="minor">
-            <a:schemeClr val="lt1"/>
-          </a:fontRef>
-        </p:style>
-        <p:txBody>
-          <a:bodyPr rtlCol="0" anchor="ctr"/>
-          <a:lstStyle/>
-          <a:p>
-            <a:pPr algn="ctr"/>
-            <a:endParaRPr lang="en-US"/>
-          </a:p>
-        </p:txBody>
-      </p:sp>
-      <p:sp>
-        <p:nvSpPr>
-          <p:cNvPr id="2" name="Title 1">
-            <a:extLst>
-              <a:ext uri="{FF2B5EF4-FFF2-40B4-BE49-F238E27FC236}">
-                <a16:creationId xmlns:a16="http://schemas.microsoft.com/office/drawing/2014/main" id="{DEF9F8A9-8E48-450E-A0FD-29521D149AB9}"/>
-              </a:ext>
-            </a:extLst>
-          </p:cNvPr>
-          <p:cNvSpPr>
-            <a:spLocks noGrp="1"/>
-          </p:cNvSpPr>
-          <p:nvPr>
-            <p:ph type="title"/>
-          </p:nvPr>
-        </p:nvSpPr>
-        <p:spPr>
-          <a:xfrm>
-            <a:off x="648931" y="629266"/>
-            <a:ext cx="4166510" cy="1622321"/>
-          </a:xfrm>
-        </p:spPr>
-        <p:txBody>
-          <a:bodyPr>
-            <a:normAutofit/>
-          </a:bodyPr>
-          <a:lstStyle/>
-          <a:p>
-            <a:r>
-              <a:rPr lang="en-US">
-                <a:solidFill>
-                  <a:srgbClr val="EBEBEB"/>
-                </a:solidFill>
-              </a:rPr>
-              <a:t>Things to keep in mind</a:t>
-            </a:r>
-          </a:p>
-        </p:txBody>
-      </p:sp>
-      <p:sp>
-        <p:nvSpPr>
-          <p:cNvPr id="3" name="Content Placeholder 2">
-            <a:extLst>
-              <a:ext uri="{FF2B5EF4-FFF2-40B4-BE49-F238E27FC236}">
-                <a16:creationId xmlns:a16="http://schemas.microsoft.com/office/drawing/2014/main" id="{D7A60E3A-F337-4A62-BD11-42E5E987F3C8}"/>
-              </a:ext>
-            </a:extLst>
-          </p:cNvPr>
-          <p:cNvSpPr>
-            <a:spLocks noGrp="1"/>
-          </p:cNvSpPr>
-          <p:nvPr>
-            <p:ph idx="1"/>
-          </p:nvPr>
-        </p:nvSpPr>
-        <p:spPr>
-          <a:xfrm>
-            <a:off x="648931" y="2438400"/>
-            <a:ext cx="4166509" cy="3785419"/>
-          </a:xfrm>
-        </p:spPr>
-        <p:txBody>
-          <a:bodyPr>
-            <a:normAutofit/>
-          </a:bodyPr>
-          <a:lstStyle/>
-          <a:p>
-            <a:r>
-              <a:rPr lang="en-US" dirty="0">
-                <a:solidFill>
-                  <a:srgbClr val="EBEBEB"/>
-                </a:solidFill>
-              </a:rPr>
-              <a:t>Resolution Scaling</a:t>
-            </a:r>
-          </a:p>
-          <a:p>
-            <a:pPr lvl="1"/>
-            <a:r>
-              <a:rPr lang="en-US" dirty="0">
-                <a:solidFill>
-                  <a:srgbClr val="EBEBEB"/>
-                </a:solidFill>
-              </a:rPr>
-              <a:t>Use Highest Resolution Assets available</a:t>
-            </a:r>
-          </a:p>
-          <a:p>
-            <a:r>
-              <a:rPr lang="en-US" dirty="0">
-                <a:solidFill>
-                  <a:srgbClr val="EBEBEB"/>
-                </a:solidFill>
-              </a:rPr>
-              <a:t>Architect up front</a:t>
-            </a:r>
-          </a:p>
-          <a:p>
-            <a:pPr lvl="1"/>
-            <a:r>
-              <a:rPr lang="en-US" dirty="0">
-                <a:solidFill>
-                  <a:srgbClr val="EBEBEB"/>
-                </a:solidFill>
-              </a:rPr>
-              <a:t>Long term time savings</a:t>
-            </a:r>
-          </a:p>
-          <a:p>
-            <a:r>
-              <a:rPr lang="en-US" dirty="0">
-                <a:solidFill>
-                  <a:srgbClr val="EBEBEB"/>
-                </a:solidFill>
-              </a:rPr>
-              <a:t>Playtest early and often</a:t>
-            </a:r>
-          </a:p>
-          <a:p>
-            <a:endParaRPr lang="en-US" dirty="0">
-              <a:solidFill>
-                <a:srgbClr val="EBEBEB"/>
-              </a:solidFill>
-            </a:endParaRPr>
-          </a:p>
-        </p:txBody>
-      </p:sp>
-      <p:sp>
-        <p:nvSpPr>
-          <p:cNvPr id="20" name="Freeform 31">
-            <a:extLst>
-              <a:ext uri="{FF2B5EF4-FFF2-40B4-BE49-F238E27FC236}">
-                <a16:creationId xmlns:a16="http://schemas.microsoft.com/office/drawing/2014/main" id="{61752F1D-FC0F-4103-9584-630E643CCDA6}"/>
-              </a:ext>
-              <a:ext uri="{C183D7F6-B498-43B3-948B-1728B52AA6E4}">
-                <adec:decorative xmlns:adec="http://schemas.microsoft.com/office/drawing/2017/decorative" val="1"/>
-              </a:ext>
-            </a:extLst>
-          </p:cNvPr>
-          <p:cNvSpPr>
-            <a:spLocks noGrp="1" noRot="1" noChangeAspect="1" noMove="1" noResize="1" noEditPoints="1" noAdjustHandles="1" noChangeArrowheads="1" noChangeShapeType="1" noTextEdit="1"/>
-          </p:cNvSpPr>
-          <p:nvPr>
-            <p:extLst>
-              <p:ext uri="{386F3935-93C4-4BCD-93E2-E3B085C9AB24}">
-                <p16:designElem xmlns:p16="http://schemas.microsoft.com/office/powerpoint/2015/main" val="1"/>
-              </p:ext>
-            </p:extLst>
-          </p:nvPr>
-        </p:nvSpPr>
-        <p:spPr>
-          <a:xfrm>
-            <a:off x="4994020" y="-1"/>
-            <a:ext cx="559472" cy="3709642"/>
-          </a:xfrm>
-          <a:custGeom>
-            <a:avLst/>
-            <a:gdLst>
-              <a:gd name="connsiteX0" fmla="*/ 0 w 559472"/>
-              <a:gd name="connsiteY0" fmla="*/ 0 h 3709642"/>
-              <a:gd name="connsiteX1" fmla="*/ 473952 w 559472"/>
-              <a:gd name="connsiteY1" fmla="*/ 0 h 3709642"/>
-              <a:gd name="connsiteX2" fmla="*/ 485840 w 559472"/>
-              <a:gd name="connsiteY2" fmla="*/ 161194 h 3709642"/>
-              <a:gd name="connsiteX3" fmla="*/ 523949 w 559472"/>
-              <a:gd name="connsiteY3" fmla="*/ 3672197 h 3709642"/>
-              <a:gd name="connsiteX4" fmla="*/ 454748 w 559472"/>
-              <a:gd name="connsiteY4" fmla="*/ 3709642 h 3709642"/>
-              <a:gd name="connsiteX5" fmla="*/ 448224 w 559472"/>
-              <a:gd name="connsiteY5" fmla="*/ 3510471 h 3709642"/>
-              <a:gd name="connsiteX6" fmla="*/ 443564 w 559472"/>
-              <a:gd name="connsiteY6" fmla="*/ 3408563 h 3709642"/>
-              <a:gd name="connsiteX7" fmla="*/ 438902 w 559472"/>
-              <a:gd name="connsiteY7" fmla="*/ 3304407 h 3709642"/>
-              <a:gd name="connsiteX8" fmla="*/ 433941 w 559472"/>
-              <a:gd name="connsiteY8" fmla="*/ 3198777 h 3709642"/>
-              <a:gd name="connsiteX9" fmla="*/ 427584 w 559472"/>
-              <a:gd name="connsiteY9" fmla="*/ 3092510 h 3709642"/>
-              <a:gd name="connsiteX10" fmla="*/ 420988 w 559472"/>
-              <a:gd name="connsiteY10" fmla="*/ 2984390 h 3709642"/>
-              <a:gd name="connsiteX11" fmla="*/ 414330 w 559472"/>
-              <a:gd name="connsiteY11" fmla="*/ 2874401 h 3709642"/>
-              <a:gd name="connsiteX12" fmla="*/ 406840 w 559472"/>
-              <a:gd name="connsiteY12" fmla="*/ 2762980 h 3709642"/>
-              <a:gd name="connsiteX13" fmla="*/ 397745 w 559472"/>
-              <a:gd name="connsiteY13" fmla="*/ 2650566 h 3709642"/>
-              <a:gd name="connsiteX14" fmla="*/ 389154 w 559472"/>
-              <a:gd name="connsiteY14" fmla="*/ 2536612 h 3709642"/>
-              <a:gd name="connsiteX15" fmla="*/ 379225 w 559472"/>
-              <a:gd name="connsiteY15" fmla="*/ 2421642 h 3709642"/>
-              <a:gd name="connsiteX16" fmla="*/ 368316 w 559472"/>
-              <a:gd name="connsiteY16" fmla="*/ 2305627 h 3709642"/>
-              <a:gd name="connsiteX17" fmla="*/ 357466 w 559472"/>
-              <a:gd name="connsiteY17" fmla="*/ 2189233 h 3709642"/>
-              <a:gd name="connsiteX18" fmla="*/ 344982 w 559472"/>
-              <a:gd name="connsiteY18" fmla="*/ 2071473 h 3709642"/>
-              <a:gd name="connsiteX19" fmla="*/ 332466 w 559472"/>
-              <a:gd name="connsiteY19" fmla="*/ 1952216 h 3709642"/>
-              <a:gd name="connsiteX20" fmla="*/ 319121 w 559472"/>
-              <a:gd name="connsiteY20" fmla="*/ 1833776 h 3709642"/>
-              <a:gd name="connsiteX21" fmla="*/ 304408 w 559472"/>
-              <a:gd name="connsiteY21" fmla="*/ 1713948 h 3709642"/>
-              <a:gd name="connsiteX22" fmla="*/ 288685 w 559472"/>
-              <a:gd name="connsiteY22" fmla="*/ 1592703 h 3709642"/>
-              <a:gd name="connsiteX23" fmla="*/ 273050 w 559472"/>
-              <a:gd name="connsiteY23" fmla="*/ 1471451 h 3709642"/>
-              <a:gd name="connsiteX24" fmla="*/ 255813 w 559472"/>
-              <a:gd name="connsiteY24" fmla="*/ 1350328 h 3709642"/>
-              <a:gd name="connsiteX25" fmla="*/ 237060 w 559472"/>
-              <a:gd name="connsiteY25" fmla="*/ 1227080 h 3709642"/>
-              <a:gd name="connsiteX26" fmla="*/ 218488 w 559472"/>
-              <a:gd name="connsiteY26" fmla="*/ 1106065 h 3709642"/>
-              <a:gd name="connsiteX27" fmla="*/ 198221 w 559472"/>
-              <a:gd name="connsiteY27" fmla="*/ 982940 h 3709642"/>
-              <a:gd name="connsiteX28" fmla="*/ 177152 w 559472"/>
-              <a:gd name="connsiteY28" fmla="*/ 858755 h 3709642"/>
-              <a:gd name="connsiteX29" fmla="*/ 155551 w 559472"/>
-              <a:gd name="connsiteY29" fmla="*/ 736861 h 3709642"/>
-              <a:gd name="connsiteX30" fmla="*/ 131782 w 559472"/>
-              <a:gd name="connsiteY30" fmla="*/ 613645 h 3709642"/>
-              <a:gd name="connsiteX31" fmla="*/ 107123 w 559472"/>
-              <a:gd name="connsiteY31" fmla="*/ 490500 h 3709642"/>
-              <a:gd name="connsiteX32" fmla="*/ 82552 w 559472"/>
-              <a:gd name="connsiteY32" fmla="*/ 367348 h 3709642"/>
-              <a:gd name="connsiteX33" fmla="*/ 55608 w 559472"/>
-              <a:gd name="connsiteY33" fmla="*/ 244762 h 3709642"/>
-              <a:gd name="connsiteX34" fmla="*/ 28130 w 559472"/>
-              <a:gd name="connsiteY34" fmla="*/ 122220 h 3709642"/>
-              <a:gd name="connsiteX35" fmla="*/ 0 w 559472"/>
-              <a:gd name="connsiteY35" fmla="*/ 0 h 3709642"/>
-            </a:gdLst>
-            <a:ahLst/>
-            <a:cxnLst>
-              <a:cxn ang="0">
-                <a:pos x="connsiteX0" y="connsiteY0"/>
-              </a:cxn>
-              <a:cxn ang="0">
-                <a:pos x="connsiteX1" y="connsiteY1"/>
-              </a:cxn>
-              <a:cxn ang="0">
-                <a:pos x="connsiteX2" y="connsiteY2"/>
-              </a:cxn>
-              <a:cxn ang="0">
-                <a:pos x="connsiteX3" y="connsiteY3"/>
-              </a:cxn>
-              <a:cxn ang="0">
-                <a:pos x="connsiteX4" y="connsiteY4"/>
-              </a:cxn>
-              <a:cxn ang="0">
-                <a:pos x="connsiteX5" y="connsiteY5"/>
-              </a:cxn>
-              <a:cxn ang="0">
-                <a:pos x="connsiteX6" y="connsiteY6"/>
-              </a:cxn>
-              <a:cxn ang="0">
-                <a:pos x="connsiteX7" y="connsiteY7"/>
-              </a:cxn>
-              <a:cxn ang="0">
-                <a:pos x="connsiteX8" y="connsiteY8"/>
-              </a:cxn>
-              <a:cxn ang="0">
-                <a:pos x="connsiteX9" y="connsiteY9"/>
-              </a:cxn>
-              <a:cxn ang="0">
-                <a:pos x="connsiteX10" y="connsiteY10"/>
-              </a:cxn>
-              <a:cxn ang="0">
-                <a:pos x="connsiteX11" y="connsiteY11"/>
-              </a:cxn>
-              <a:cxn ang="0">
-                <a:pos x="connsiteX12" y="connsiteY12"/>
-              </a:cxn>
-              <a:cxn ang="0">
-                <a:pos x="connsiteX13" y="connsiteY13"/>
-              </a:cxn>
-              <a:cxn ang="0">
-                <a:pos x="connsiteX14" y="connsiteY14"/>
-              </a:cxn>
-              <a:cxn ang="0">
-                <a:pos x="connsiteX15" y="connsiteY15"/>
-              </a:cxn>
-              <a:cxn ang="0">
-                <a:pos x="connsiteX16" y="connsiteY16"/>
-              </a:cxn>
-              <a:cxn ang="0">
-                <a:pos x="connsiteX17" y="connsiteY17"/>
-              </a:cxn>
-              <a:cxn ang="0">
-                <a:pos x="connsiteX18" y="connsiteY18"/>
-              </a:cxn>
-              <a:cxn ang="0">
-                <a:pos x="connsiteX19" y="connsiteY19"/>
-              </a:cxn>
-              <a:cxn ang="0">
-                <a:pos x="connsiteX20" y="connsiteY20"/>
-              </a:cxn>
-              <a:cxn ang="0">
-                <a:pos x="connsiteX21" y="connsiteY21"/>
-              </a:cxn>
-              <a:cxn ang="0">
-                <a:pos x="connsiteX22" y="connsiteY22"/>
-              </a:cxn>
-              <a:cxn ang="0">
-                <a:pos x="connsiteX23" y="connsiteY23"/>
-              </a:cxn>
-              <a:cxn ang="0">
-                <a:pos x="connsiteX24" y="connsiteY24"/>
-              </a:cxn>
-              <a:cxn ang="0">
-                <a:pos x="connsiteX25" y="connsiteY25"/>
-              </a:cxn>
-              <a:cxn ang="0">
-                <a:pos x="connsiteX26" y="connsiteY26"/>
-              </a:cxn>
-              <a:cxn ang="0">
-                <a:pos x="connsiteX27" y="connsiteY27"/>
-              </a:cxn>
-              <a:cxn ang="0">
-                <a:pos x="connsiteX28" y="connsiteY28"/>
-              </a:cxn>
-              <a:cxn ang="0">
-                <a:pos x="connsiteX29" y="connsiteY29"/>
-              </a:cxn>
-              <a:cxn ang="0">
-                <a:pos x="connsiteX30" y="connsiteY30"/>
-              </a:cxn>
-              <a:cxn ang="0">
-                <a:pos x="connsiteX31" y="connsiteY31"/>
-              </a:cxn>
-              <a:cxn ang="0">
-                <a:pos x="connsiteX32" y="connsiteY32"/>
-              </a:cxn>
-              <a:cxn ang="0">
-                <a:pos x="connsiteX33" y="connsiteY33"/>
-              </a:cxn>
-              <a:cxn ang="0">
-                <a:pos x="connsiteX34" y="connsiteY34"/>
-              </a:cxn>
-              <a:cxn ang="0">
-                <a:pos x="connsiteX35" y="connsiteY35"/>
-              </a:cxn>
-            </a:cxnLst>
-            <a:rect l="l" t="t" r="r" b="b"/>
-            <a:pathLst>
-              <a:path w="559472" h="3709642">
-                <a:moveTo>
-                  <a:pt x="0" y="0"/>
-                </a:moveTo>
-                <a:lnTo>
-                  <a:pt x="473952" y="0"/>
-                </a:lnTo>
-                <a:lnTo>
-                  <a:pt x="485840" y="161194"/>
-                </a:lnTo>
-                <a:cubicBezTo>
-                  <a:pt x="552063" y="1147770"/>
-                  <a:pt x="592441" y="3086737"/>
-                  <a:pt x="523949" y="3672197"/>
-                </a:cubicBezTo>
-                <a:cubicBezTo>
-                  <a:pt x="500842" y="3684557"/>
-                  <a:pt x="477855" y="3697282"/>
-                  <a:pt x="454748" y="3709642"/>
-                </a:cubicBezTo>
-                <a:lnTo>
-                  <a:pt x="448224" y="3510471"/>
-                </a:lnTo>
-                <a:lnTo>
-                  <a:pt x="443564" y="3408563"/>
-                </a:lnTo>
-                <a:lnTo>
-                  <a:pt x="438902" y="3304407"/>
-                </a:lnTo>
-                <a:lnTo>
-                  <a:pt x="433941" y="3198777"/>
-                </a:lnTo>
-                <a:lnTo>
-                  <a:pt x="427584" y="3092510"/>
-                </a:lnTo>
-                <a:lnTo>
-                  <a:pt x="420988" y="2984390"/>
-                </a:lnTo>
-                <a:lnTo>
-                  <a:pt x="414330" y="2874401"/>
-                </a:lnTo>
-                <a:lnTo>
-                  <a:pt x="406840" y="2762980"/>
-                </a:lnTo>
-                <a:lnTo>
-                  <a:pt x="397745" y="2650566"/>
-                </a:lnTo>
-                <a:lnTo>
-                  <a:pt x="389154" y="2536612"/>
-                </a:lnTo>
-                <a:lnTo>
-                  <a:pt x="379225" y="2421642"/>
-                </a:lnTo>
-                <a:lnTo>
-                  <a:pt x="368316" y="2305627"/>
-                </a:lnTo>
-                <a:lnTo>
-                  <a:pt x="357466" y="2189233"/>
-                </a:lnTo>
-                <a:lnTo>
-                  <a:pt x="344982" y="2071473"/>
-                </a:lnTo>
-                <a:lnTo>
-                  <a:pt x="332466" y="1952216"/>
-                </a:lnTo>
-                <a:lnTo>
-                  <a:pt x="319121" y="1833776"/>
-                </a:lnTo>
-                <a:lnTo>
-                  <a:pt x="304408" y="1713948"/>
-                </a:lnTo>
-                <a:lnTo>
-                  <a:pt x="288685" y="1592703"/>
-                </a:lnTo>
-                <a:lnTo>
-                  <a:pt x="273050" y="1471451"/>
-                </a:lnTo>
-                <a:lnTo>
-                  <a:pt x="255813" y="1350328"/>
-                </a:lnTo>
-                <a:lnTo>
-                  <a:pt x="237060" y="1227080"/>
-                </a:lnTo>
-                <a:lnTo>
-                  <a:pt x="218488" y="1106065"/>
-                </a:lnTo>
-                <a:lnTo>
-                  <a:pt x="198221" y="982940"/>
-                </a:lnTo>
-                <a:lnTo>
-                  <a:pt x="177152" y="858755"/>
-                </a:lnTo>
-                <a:lnTo>
-                  <a:pt x="155551" y="736861"/>
-                </a:lnTo>
-                <a:lnTo>
-                  <a:pt x="131782" y="613645"/>
-                </a:lnTo>
-                <a:lnTo>
-                  <a:pt x="107123" y="490500"/>
-                </a:lnTo>
-                <a:lnTo>
-                  <a:pt x="82552" y="367348"/>
-                </a:lnTo>
-                <a:lnTo>
-                  <a:pt x="55608" y="244762"/>
-                </a:lnTo>
-                <a:lnTo>
-                  <a:pt x="28130" y="122220"/>
-                </a:lnTo>
-                <a:lnTo>
-                  <a:pt x="0" y="0"/>
-                </a:lnTo>
-                <a:close/>
-              </a:path>
-            </a:pathLst>
-          </a:custGeom>
-          <a:solidFill>
-            <a:schemeClr val="bg1">
-              <a:alpha val="20000"/>
-            </a:schemeClr>
-          </a:solidFill>
-          <a:ln>
-            <a:noFill/>
-          </a:ln>
-        </p:spPr>
-        <p:txBody>
-          <a:bodyPr rtlCol="0" anchor="ctr"/>
-          <a:lstStyle/>
-          <a:p>
-            <a:pPr algn="ctr"/>
-            <a:endParaRPr lang="en-US"/>
-          </a:p>
-        </p:txBody>
-      </p:sp>
-      <p:sp useBgFill="1">
-        <p:nvSpPr>
-          <p:cNvPr id="21" name="Rectangle 13">
-            <a:extLst>
-              <a:ext uri="{FF2B5EF4-FFF2-40B4-BE49-F238E27FC236}">
-                <a16:creationId xmlns:a16="http://schemas.microsoft.com/office/drawing/2014/main" id="{126C04EF-6428-472D-B316-74A19385B08F}"/>
-              </a:ext>
-              <a:ext uri="{C183D7F6-B498-43B3-948B-1728B52AA6E4}">
-                <adec:decorative xmlns:adec="http://schemas.microsoft.com/office/drawing/2017/decorative" val="1"/>
-              </a:ext>
-            </a:extLst>
-          </p:cNvPr>
-          <p:cNvSpPr>
-            <a:spLocks noGrp="1" noRot="1" noChangeAspect="1" noMove="1" noResize="1" noEditPoints="1" noAdjustHandles="1" noChangeArrowheads="1" noChangeShapeType="1" noTextEdit="1"/>
-          </p:cNvSpPr>
-          <p:nvPr>
-            <p:extLst>
-              <p:ext uri="{386F3935-93C4-4BCD-93E2-E3B085C9AB24}">
-                <p16:designElem xmlns:p16="http://schemas.microsoft.com/office/powerpoint/2015/main" val="1"/>
-              </p:ext>
-            </p:extLst>
-          </p:nvPr>
-        </p:nvSpPr>
-        <p:spPr>
-          <a:xfrm>
-            <a:off x="6093992" y="0"/>
-            <a:ext cx="6098427" cy="6858000"/>
-          </a:xfrm>
-          <a:prstGeom prst="rect">
-            <a:avLst/>
-          </a:prstGeom>
-          <a:ln>
-            <a:noFill/>
-          </a:ln>
-        </p:spPr>
-        <p:style>
-          <a:lnRef idx="2">
-            <a:schemeClr val="accent1">
-              <a:shade val="50000"/>
-            </a:schemeClr>
-          </a:lnRef>
-          <a:fillRef idx="1">
-            <a:schemeClr val="accent1"/>
-          </a:fillRef>
-          <a:effectRef idx="0">
-            <a:schemeClr val="accent1"/>
-          </a:effectRef>
-          <a:fontRef idx="minor">
-            <a:schemeClr val="lt1"/>
-          </a:fontRef>
-        </p:style>
-        <p:txBody>
-          <a:bodyPr rtlCol="0" anchor="ctr"/>
-          <a:lstStyle/>
-          <a:p>
-            <a:pPr algn="ctr"/>
-            <a:endParaRPr lang="en-US"/>
-          </a:p>
-        </p:txBody>
-      </p:sp>
-      <p:sp useBgFill="1">
-        <p:nvSpPr>
-          <p:cNvPr id="22" name="Freeform 5">
-            <a:extLst>
-              <a:ext uri="{FF2B5EF4-FFF2-40B4-BE49-F238E27FC236}">
-                <a16:creationId xmlns:a16="http://schemas.microsoft.com/office/drawing/2014/main" id="{AE50896D-AACB-4C0A-855D-ECEFB4A0DA9A}"/>
-              </a:ext>
-              <a:ext uri="{C183D7F6-B498-43B3-948B-1728B52AA6E4}">
-                <adec:decorative xmlns:adec="http://schemas.microsoft.com/office/drawing/2017/decorative" val="1"/>
-              </a:ext>
-            </a:extLst>
-          </p:cNvPr>
-          <p:cNvSpPr>
-            <a:spLocks noGrp="1" noRot="1" noChangeAspect="1" noMove="1" noResize="1" noEditPoints="1" noAdjustHandles="1" noChangeArrowheads="1" noChangeShapeType="1" noTextEdit="1"/>
-          </p:cNvSpPr>
-          <p:nvPr>
-            <p:extLst>
-              <p:ext uri="{386F3935-93C4-4BCD-93E2-E3B085C9AB24}">
-                <p16:designElem xmlns:p16="http://schemas.microsoft.com/office/powerpoint/2015/main" val="1"/>
-              </p:ext>
-            </p:extLst>
-          </p:nvPr>
-        </p:nvSpPr>
-        <p:spPr bwMode="gray">
-          <a:xfrm rot="16200000">
-            <a:off x="2450577" y="2756642"/>
-            <a:ext cx="6858000" cy="1344715"/>
-          </a:xfrm>
-          <a:custGeom>
-            <a:avLst/>
-            <a:gdLst/>
-            <a:ahLst/>
-            <a:cxnLst/>
-            <a:rect l="l" t="t" r="r" b="b"/>
-            <a:pathLst>
-              <a:path w="10000" h="8000">
-                <a:moveTo>
-                  <a:pt x="0" y="0"/>
-                </a:moveTo>
-                <a:lnTo>
-                  <a:pt x="0" y="7970"/>
-                </a:lnTo>
-                <a:lnTo>
-                  <a:pt x="10000" y="8000"/>
-                </a:lnTo>
-                <a:lnTo>
-                  <a:pt x="10000" y="7"/>
-                </a:lnTo>
-                <a:lnTo>
-                  <a:pt x="10000" y="7"/>
-                </a:lnTo>
-                <a:lnTo>
-                  <a:pt x="9773" y="156"/>
-                </a:lnTo>
-                <a:lnTo>
-                  <a:pt x="9547" y="298"/>
-                </a:lnTo>
-                <a:lnTo>
-                  <a:pt x="9320" y="437"/>
-                </a:lnTo>
-                <a:lnTo>
-                  <a:pt x="9092" y="556"/>
-                </a:lnTo>
-                <a:lnTo>
-                  <a:pt x="8865" y="676"/>
-                </a:lnTo>
-                <a:lnTo>
-                  <a:pt x="8637" y="788"/>
-                </a:lnTo>
-                <a:lnTo>
-                  <a:pt x="8412" y="884"/>
-                </a:lnTo>
-                <a:lnTo>
-                  <a:pt x="8184" y="975"/>
-                </a:lnTo>
-                <a:lnTo>
-                  <a:pt x="7957" y="1058"/>
-                </a:lnTo>
-                <a:lnTo>
-                  <a:pt x="7734" y="1130"/>
-                </a:lnTo>
-                <a:lnTo>
-                  <a:pt x="7508" y="1202"/>
-                </a:lnTo>
-                <a:lnTo>
-                  <a:pt x="7285" y="1262"/>
-                </a:lnTo>
-                <a:lnTo>
-                  <a:pt x="7062" y="1309"/>
-                </a:lnTo>
-                <a:lnTo>
-                  <a:pt x="6840" y="1358"/>
-                </a:lnTo>
-                <a:lnTo>
-                  <a:pt x="6620" y="1399"/>
-                </a:lnTo>
-                <a:lnTo>
-                  <a:pt x="6402" y="1428"/>
-                </a:lnTo>
-                <a:lnTo>
-                  <a:pt x="6184" y="1453"/>
-                </a:lnTo>
-                <a:lnTo>
-                  <a:pt x="5968" y="1477"/>
-                </a:lnTo>
-                <a:lnTo>
-                  <a:pt x="5755" y="1488"/>
-                </a:lnTo>
-                <a:lnTo>
-                  <a:pt x="5542" y="1500"/>
-                </a:lnTo>
-                <a:lnTo>
-                  <a:pt x="5332" y="1506"/>
-                </a:lnTo>
-                <a:lnTo>
-                  <a:pt x="5124" y="1500"/>
-                </a:lnTo>
-                <a:lnTo>
-                  <a:pt x="4918" y="1500"/>
-                </a:lnTo>
-                <a:lnTo>
-                  <a:pt x="4714" y="1488"/>
-                </a:lnTo>
-                <a:lnTo>
-                  <a:pt x="4514" y="1470"/>
-                </a:lnTo>
-                <a:lnTo>
-                  <a:pt x="4316" y="1453"/>
-                </a:lnTo>
-                <a:lnTo>
-                  <a:pt x="4122" y="1434"/>
-                </a:lnTo>
-                <a:lnTo>
-                  <a:pt x="3929" y="1405"/>
-                </a:lnTo>
-                <a:lnTo>
-                  <a:pt x="3739" y="1374"/>
-                </a:lnTo>
-                <a:lnTo>
-                  <a:pt x="3553" y="1346"/>
-                </a:lnTo>
-                <a:lnTo>
-                  <a:pt x="3190" y="1267"/>
-                </a:lnTo>
-                <a:lnTo>
-                  <a:pt x="2842" y="1183"/>
-                </a:lnTo>
-                <a:lnTo>
-                  <a:pt x="2508" y="1095"/>
-                </a:lnTo>
-                <a:lnTo>
-                  <a:pt x="2192" y="998"/>
-                </a:lnTo>
-                <a:lnTo>
-                  <a:pt x="1890" y="897"/>
-                </a:lnTo>
-                <a:lnTo>
-                  <a:pt x="1610" y="788"/>
-                </a:lnTo>
-                <a:lnTo>
-                  <a:pt x="1347" y="681"/>
-                </a:lnTo>
-                <a:lnTo>
-                  <a:pt x="1105" y="574"/>
-                </a:lnTo>
-                <a:lnTo>
-                  <a:pt x="883" y="473"/>
-                </a:lnTo>
-                <a:lnTo>
-                  <a:pt x="686" y="377"/>
-                </a:lnTo>
-                <a:lnTo>
-                  <a:pt x="508" y="286"/>
-                </a:lnTo>
-                <a:lnTo>
-                  <a:pt x="358" y="210"/>
-                </a:lnTo>
-                <a:lnTo>
-                  <a:pt x="232" y="138"/>
-                </a:lnTo>
-                <a:lnTo>
-                  <a:pt x="59" y="35"/>
-                </a:lnTo>
-                <a:lnTo>
-                  <a:pt x="0" y="0"/>
-                </a:lnTo>
-                <a:lnTo>
-                  <a:pt x="0" y="0"/>
-                </a:lnTo>
-                <a:close/>
-              </a:path>
-            </a:pathLst>
-          </a:custGeom>
-          <a:ln>
-            <a:noFill/>
-          </a:ln>
-        </p:spPr>
-      </p:sp>
-      <p:pic>
-        <p:nvPicPr>
-          <p:cNvPr id="7" name="Graphic 6" descr="Head with Gears">
-            <a:extLst>
-              <a:ext uri="{FF2B5EF4-FFF2-40B4-BE49-F238E27FC236}">
-                <a16:creationId xmlns:a16="http://schemas.microsoft.com/office/drawing/2014/main" id="{569949DD-B856-4B6D-BBED-C3A6B77C2399}"/>
-              </a:ext>
-            </a:extLst>
-          </p:cNvPr>
-          <p:cNvPicPr>
-            <a:picLocks noChangeAspect="1"/>
-          </p:cNvPicPr>
-          <p:nvPr/>
-        </p:nvPicPr>
-        <p:blipFill>
-          <a:blip r:embed="rId2">
-            <a:extLst>
-              <a:ext uri="{28A0092B-C50C-407E-A947-70E740481C1C}">
-                <a14:useLocalDpi xmlns:a14="http://schemas.microsoft.com/office/drawing/2010/main" val="0"/>
-              </a:ext>
-              <a:ext uri="{96DAC541-7B7A-43D3-8B79-37D633B846F1}">
-                <asvg:svgBlip xmlns:asvg="http://schemas.microsoft.com/office/drawing/2016/SVG/main" r:embed="rId3"/>
-              </a:ext>
-            </a:extLst>
-          </a:blip>
-          <a:stretch>
-            <a:fillRect/>
-          </a:stretch>
-        </p:blipFill>
-        <p:spPr>
-          <a:xfrm>
-            <a:off x="6093992" y="704054"/>
-            <a:ext cx="5449889" cy="5449889"/>
-          </a:xfrm>
-          <a:prstGeom prst="rect">
-            <a:avLst/>
-          </a:prstGeom>
-          <a:effectLst/>
-        </p:spPr>
-      </p:pic>
-      <p:sp>
-        <p:nvSpPr>
-          <p:cNvPr id="18" name="Rectangle 17">
-            <a:extLst>
-              <a:ext uri="{FF2B5EF4-FFF2-40B4-BE49-F238E27FC236}">
-                <a16:creationId xmlns:a16="http://schemas.microsoft.com/office/drawing/2014/main" id="{A92A1116-1C84-41DF-B803-1F7B0883EC82}"/>
-              </a:ext>
-              <a:ext uri="{C183D7F6-B498-43B3-948B-1728B52AA6E4}">
-                <adec:decorative xmlns:adec="http://schemas.microsoft.com/office/drawing/2017/decorative" val="1"/>
-              </a:ext>
-            </a:extLst>
-          </p:cNvPr>
-          <p:cNvSpPr>
-            <a:spLocks noGrp="1" noRot="1" noChangeAspect="1" noMove="1" noResize="1" noEditPoints="1" noAdjustHandles="1" noChangeArrowheads="1" noChangeShapeType="1" noTextEdit="1"/>
-          </p:cNvSpPr>
-          <p:nvPr>
-            <p:extLst>
-              <p:ext uri="{386F3935-93C4-4BCD-93E2-E3B085C9AB24}">
-                <p16:designElem xmlns:p16="http://schemas.microsoft.com/office/powerpoint/2015/main" val="1"/>
-              </p:ext>
-            </p:extLst>
-          </p:nvPr>
-        </p:nvSpPr>
-        <p:spPr>
-          <a:xfrm>
-            <a:off x="10442448" y="0"/>
-            <a:ext cx="685800" cy="1143000"/>
-          </a:xfrm>
-          <a:prstGeom prst="rect">
-            <a:avLst/>
-          </a:prstGeom>
-          <a:solidFill>
-            <a:schemeClr val="accent1"/>
-          </a:solidFill>
-          <a:ln>
-            <a:noFill/>
-          </a:ln>
-        </p:spPr>
-        <p:style>
-          <a:lnRef idx="1">
-            <a:schemeClr val="accent1"/>
-          </a:lnRef>
-          <a:fillRef idx="3">
-            <a:schemeClr val="accent1"/>
-          </a:fillRef>
-          <a:effectRef idx="2">
-            <a:schemeClr val="accent1"/>
-          </a:effectRef>
-          <a:fontRef idx="minor">
-            <a:schemeClr val="lt1"/>
-          </a:fontRef>
-        </p:style>
-      </p:sp>
-    </p:spTree>
-    <p:extLst>
-      <p:ext uri="{BB962C8B-B14F-4D97-AF65-F5344CB8AC3E}">
-        <p14:creationId xmlns:p14="http://schemas.microsoft.com/office/powerpoint/2010/main" val="2953930957"/>
-      </p:ext>
-    </p:extLst>
-  </p:cSld>
-  <p:clrMapOvr>
-    <a:overrideClrMapping bg1="lt1" tx1="dk1" bg2="lt2" tx2="dk2" accent1="accent1" accent2="accent2" accent3="accent3" accent4="accent4" accent5="accent5" accent6="accent6" hlink="hlink" folHlink="folHlink"/>
-  </p:clrMapOvr>
+  <p:timing>
+    <p:tnLst>
+      <p:par>
+        <p:cTn id="1" dur="indefinite" restart="never" nodeType="tmRoot">
+          <p:childTnLst>
+            <p:seq concurrent="1" nextAc="seek">
+              <p:cTn id="2" dur="indefinite" nodeType="mainSeq">
+                <p:childTnLst>
+                  <p:par>
+                    <p:cTn id="3" fill="hold">
+                      <p:stCondLst>
+                        <p:cond delay="indefinite"/>
+                      </p:stCondLst>
+                      <p:childTnLst>
+                        <p:par>
+                          <p:cTn id="4" fill="hold">
+                            <p:stCondLst>
+                              <p:cond delay="0"/>
+                            </p:stCondLst>
+                            <p:childTnLst>
+                              <p:par>
+                                <p:cTn id="5" presetID="10" presetClass="entr" presetSubtype="0" fill="hold" grpId="0" nodeType="clickEffect">
+                                  <p:stCondLst>
+                                    <p:cond delay="0"/>
+                                  </p:stCondLst>
+                                  <p:childTnLst>
+                                    <p:set>
+                                      <p:cBhvr>
+                                        <p:cTn id="6" dur="1" fill="hold">
+                                          <p:stCondLst>
+                                            <p:cond delay="0"/>
+                                          </p:stCondLst>
+                                        </p:cTn>
+                                        <p:tgtEl>
+                                          <p:spTgt spid="16"/>
+                                        </p:tgtEl>
+                                        <p:attrNameLst>
+                                          <p:attrName>style.visibility</p:attrName>
+                                        </p:attrNameLst>
+                                      </p:cBhvr>
+                                      <p:to>
+                                        <p:strVal val="visible"/>
+                                      </p:to>
+                                    </p:set>
+                                    <p:animEffect transition="in" filter="fade">
+                                      <p:cBhvr>
+                                        <p:cTn id="7" dur="500"/>
+                                        <p:tgtEl>
+                                          <p:spTgt spid="16"/>
+                                        </p:tgtEl>
+                                      </p:cBhvr>
+                                    </p:animEffect>
+                                  </p:childTnLst>
+                                </p:cTn>
+                              </p:par>
+                            </p:childTnLst>
+                          </p:cTn>
+                        </p:par>
+                      </p:childTnLst>
+                    </p:cTn>
+                  </p:par>
+                </p:childTnLst>
+              </p:cTn>
+              <p:prevCondLst>
+                <p:cond evt="onPrev" delay="0">
+                  <p:tgtEl>
+                    <p:sldTgt/>
+                  </p:tgtEl>
+                </p:cond>
+              </p:prevCondLst>
+              <p:nextCondLst>
+                <p:cond evt="onNext" delay="0">
+                  <p:tgtEl>
+                    <p:sldTgt/>
+                  </p:tgtEl>
+                </p:cond>
+              </p:nextCondLst>
+            </p:seq>
+          </p:childTnLst>
+        </p:cTn>
+      </p:par>
+    </p:tnLst>
+    <p:bldLst>
+      <p:bldGraphic spid="16" grpId="0">
+        <p:bldAsOne/>
+      </p:bldGraphic>
+    </p:bldLst>
+  </p:timing>
 </p:sld>
 </file>
 

</xml_diff>